<commit_message>
week 4 , functions, array practice
</commit_message>
<xml_diff>
--- a/all/ExploringCSConceptsViaACSLCompetitions_all.pptx
+++ b/all/ExploringCSConceptsViaACSLCompetitions_all.pptx
@@ -5,7 +5,7 @@
     <p:sldMasterId id="2147483648" r:id="rId1"/>
   </p:sldMasterIdLst>
   <p:notesMasterIdLst>
-    <p:notesMasterId r:id="rId21"/>
+    <p:notesMasterId r:id="rId26"/>
   </p:notesMasterIdLst>
   <p:sldIdLst>
     <p:sldId id="256" r:id="rId2"/>
@@ -27,6 +27,11 @@
     <p:sldId id="280" r:id="rId18"/>
     <p:sldId id="279" r:id="rId19"/>
     <p:sldId id="281" r:id="rId20"/>
+    <p:sldId id="282" r:id="rId21"/>
+    <p:sldId id="283" r:id="rId22"/>
+    <p:sldId id="284" r:id="rId23"/>
+    <p:sldId id="285" r:id="rId24"/>
+    <p:sldId id="286" r:id="rId25"/>
   </p:sldIdLst>
   <p:sldSz cx="12192000" cy="6858000"/>
   <p:notesSz cx="6858000" cy="9144000"/>
@@ -133,6 +138,195 @@
 </p:presentation>
 </file>
 
+<file path=ppt/ink/ink1.xml><?xml version="1.0" encoding="utf-8"?>
+<inkml:ink xmlns:inkml="http://www.w3.org/2003/InkML">
+  <inkml:definitions>
+    <inkml:context xml:id="ctx0">
+      <inkml:inkSource xml:id="inkSrc0">
+        <inkml:traceFormat>
+          <inkml:channel name="X" type="integer" min="-2.14748E9" max="2.14748E9" units="cm"/>
+          <inkml:channel name="Y" type="integer" min="-2.14748E9" max="2.14748E9" units="cm"/>
+          <inkml:channel name="F" type="integer" max="32767" units="dev"/>
+        </inkml:traceFormat>
+        <inkml:channelProperties>
+          <inkml:channelProperty channel="X" name="resolution" value="1000" units="1/cm"/>
+          <inkml:channelProperty channel="Y" name="resolution" value="1000" units="1/cm"/>
+          <inkml:channelProperty channel="F" name="resolution" value="0" units="1/dev"/>
+        </inkml:channelProperties>
+      </inkml:inkSource>
+      <inkml:timestamp xml:id="ts0" timeString="2026-01-08T16:19:53.877"/>
+    </inkml:context>
+    <inkml:brush xml:id="br0">
+      <inkml:brushProperty name="width" value="0.05" units="cm"/>
+      <inkml:brushProperty name="height" value="0.05" units="cm"/>
+    </inkml:brush>
+  </inkml:definitions>
+  <inkml:trace contextRef="#ctx0" brushRef="#br0">0 0 24575</inkml:trace>
+</inkml:ink>
+</file>
+
+<file path=ppt/ink/ink2.xml><?xml version="1.0" encoding="utf-8"?>
+<inkml:ink xmlns:inkml="http://www.w3.org/2003/InkML">
+  <inkml:definitions>
+    <inkml:context xml:id="ctx0">
+      <inkml:inkSource xml:id="inkSrc0">
+        <inkml:traceFormat>
+          <inkml:channel name="X" type="integer" min="-2.14748E9" max="2.14748E9" units="cm"/>
+          <inkml:channel name="Y" type="integer" min="-2.14748E9" max="2.14748E9" units="cm"/>
+          <inkml:channel name="F" type="integer" max="32767" units="dev"/>
+        </inkml:traceFormat>
+        <inkml:channelProperties>
+          <inkml:channelProperty channel="X" name="resolution" value="1000" units="1/cm"/>
+          <inkml:channelProperty channel="Y" name="resolution" value="1000" units="1/cm"/>
+          <inkml:channelProperty channel="F" name="resolution" value="0" units="1/dev"/>
+        </inkml:channelProperties>
+      </inkml:inkSource>
+      <inkml:timestamp xml:id="ts0" timeString="2026-01-08T16:20:08.443"/>
+    </inkml:context>
+    <inkml:brush xml:id="br0">
+      <inkml:brushProperty name="width" value="0.05" units="cm"/>
+      <inkml:brushProperty name="height" value="0.05" units="cm"/>
+    </inkml:brush>
+  </inkml:definitions>
+  <inkml:trace contextRef="#ctx0" brushRef="#br0">0 262 24575,'3'0'0,"0"1"0,-1-1 0,1 1 0,-1 0 0,1 0 0,-1 0 0,1 0 0,-1 0 0,4 3 0,16 6 0,-15-8 0,0-1 0,1 0 0,0 0 0,-1-1 0,1 0 0,-1-1 0,1 1 0,-1-1 0,1-1 0,9-2 0,1-3 0,1 0 0,26-17 0,-35 19 0,33-15 0,2 2 0,92-24 0,-70 23 0,-3 3 0,-45 12 0,-1 0 0,0-1 0,0-1 0,0-1 0,20-11 0,-25 11 0,0 0 0,1 0 0,0 2 0,0 0 0,1 0 0,-1 1 0,1 1 0,0 1 0,0 0 0,27 0 0,-37 2 0,9 1 0,0-1 0,0 0 0,0-1 0,-1-1 0,1 0 0,0-1 0,-1 0 0,14-6 0,-53 2-1365,14 4-5461</inkml:trace>
+</inkml:ink>
+</file>
+
+<file path=ppt/ink/ink3.xml><?xml version="1.0" encoding="utf-8"?>
+<inkml:ink xmlns:inkml="http://www.w3.org/2003/InkML">
+  <inkml:definitions>
+    <inkml:context xml:id="ctx0">
+      <inkml:inkSource xml:id="inkSrc0">
+        <inkml:traceFormat>
+          <inkml:channel name="X" type="integer" min="-2.14748E9" max="2.14748E9" units="cm"/>
+          <inkml:channel name="Y" type="integer" min="-2.14748E9" max="2.14748E9" units="cm"/>
+          <inkml:channel name="F" type="integer" max="32767" units="dev"/>
+        </inkml:traceFormat>
+        <inkml:channelProperties>
+          <inkml:channelProperty channel="X" name="resolution" value="1000" units="1/cm"/>
+          <inkml:channelProperty channel="Y" name="resolution" value="1000" units="1/cm"/>
+          <inkml:channelProperty channel="F" name="resolution" value="0" units="1/dev"/>
+        </inkml:channelProperties>
+      </inkml:inkSource>
+      <inkml:timestamp xml:id="ts0" timeString="2026-01-08T16:20:10.128"/>
+    </inkml:context>
+    <inkml:brush xml:id="br0">
+      <inkml:brushProperty name="width" value="0.05" units="cm"/>
+      <inkml:brushProperty name="height" value="0.05" units="cm"/>
+    </inkml:brush>
+  </inkml:definitions>
+  <inkml:trace contextRef="#ctx0" brushRef="#br0">145 1 24575,'1'4'0,"0"0"0,1 0 0,0 0 0,-1 0 0,2 0 0,-1 0 0,0-1 0,1 1 0,0-1 0,-1 0 0,8 6 0,-7-7 0,0 0 0,0 0 0,1-1 0,-1 1 0,0-1 0,1 0 0,0 0 0,-1 0 0,1 0 0,-1-1 0,8 1 0,48-3 0,-28 0 0,-19 2 0,-4-1 0,-1 1 0,0 0 0,0 1 0,0 0 0,8 1 0,-13-1 0,0-1 0,-1 1 0,1 0 0,0 0 0,0 0 0,-1 0 0,1 0 0,-1 0 0,1 0 0,-1 0 0,0 0 0,1 1 0,-1-1 0,0 1 0,0-1 0,0 1 0,0-1 0,0 1 0,0 0 0,0-1 0,0 1 0,-1 0 0,1 0 0,0 2 0,0 0 0,-1-1 0,1 1 0,0 0 0,-1-1 0,0 1 0,0-1 0,0 1 0,0 0 0,-1-1 0,0 1 0,1 0 0,-1-1 0,0 1 0,-3 4 0,1-4 0,1 0 0,-1 0 0,0-1 0,-1 1 0,1-1 0,-1 0 0,1 0 0,-1 0 0,0 0 0,0-1 0,-5 3 0,-18 10 0,5-2 0,-2 0 0,0-1 0,-48 15 0,57-22 0,-1 1 0,2 1 0,-1 0 0,1 1 0,0 0 0,0 1 0,-22 20 0,0-1 0,35-27 27,1-1-59,-1 0 1,1 1-1,0-1 0,0 0 1,-1 1-1,1-1 0,0 0 1,0 0-1,-1 1 1,1-1-1,0 0 0,-1 0 1,1 0-1,0 1 0,-1-1 1,1 0-1,0 0 0,-1 0 1,1 0-1,-1 0 1,1 0-1,0 0 0,-1 0 1,1 0-1,0 0 0,-1 0 1,1 0-1,-1 0 0,1 0 1,0 0-1,-1 0 1,1 0-1,0-1 0,-1 1 1,1 0-1,0 0 0,-1 0 1,1 0-1,0-1 0,-1 1 1,1 0-1,0-1 1,-1 1-1</inkml:trace>
+</inkml:ink>
+</file>
+
+<file path=ppt/ink/ink4.xml><?xml version="1.0" encoding="utf-8"?>
+<inkml:ink xmlns:inkml="http://www.w3.org/2003/InkML">
+  <inkml:definitions>
+    <inkml:context xml:id="ctx0">
+      <inkml:inkSource xml:id="inkSrc0">
+        <inkml:traceFormat>
+          <inkml:channel name="X" type="integer" min="-2.14748E9" max="2.14748E9" units="cm"/>
+          <inkml:channel name="Y" type="integer" min="-2.14748E9" max="2.14748E9" units="cm"/>
+          <inkml:channel name="F" type="integer" max="32767" units="dev"/>
+        </inkml:traceFormat>
+        <inkml:channelProperties>
+          <inkml:channelProperty channel="X" name="resolution" value="1000" units="1/cm"/>
+          <inkml:channelProperty channel="Y" name="resolution" value="1000" units="1/cm"/>
+          <inkml:channelProperty channel="F" name="resolution" value="0" units="1/dev"/>
+        </inkml:channelProperties>
+      </inkml:inkSource>
+      <inkml:timestamp xml:id="ts0" timeString="2026-01-08T16:20:11.438"/>
+    </inkml:context>
+    <inkml:brush xml:id="br0">
+      <inkml:brushProperty name="width" value="0.05" units="cm"/>
+      <inkml:brushProperty name="height" value="0.05" units="cm"/>
+    </inkml:brush>
+  </inkml:definitions>
+  <inkml:trace contextRef="#ctx0" brushRef="#br0">1 109 24575,'3'2'0,"0"0"0,1 0 0,-1-1 0,0 0 0,1 1 0,0-1 0,-1-1 0,1 1 0,0 0 0,-1-1 0,1 0 0,0 0 0,5 0 0,7 0 0,383 4 0,-385-5 0,216-3 0,-174-2 0,14 0 0,-54 5 0,0-1 0,-1 0 0,1-1 0,20-7 0,-20 5 0,-15 5 7,0 0-1,-1 0 0,1 0 1,-1 0-1,1-1 1,0 1-1,-1 0 0,1 0 1,-1-1-1,1 1 1,-1-1-1,1 1 1,-1 0-1,1-1 0,-1 1 1,1-1-1,-1 1 1,1-1-1,-1 1 0,0-1 1,1 1-1,-1-1 1,0 0-1,0 1 0,1-1 1,-1 1-1,0-1 1,0 0-1,0 1 0,0-1 1,0 0-1,0 1 1,0-1-1,0 0 0,0 1 1,0-1-1,0 1 1,0-1-1,0 0 0,-1 1 1,1-1-1,0 0 1,0 1-1,-1-1 1,1 1-1,0-1 0,-1 1 1,1-1-1,-1 0 1,-26-31-717,20 24-266,-11-12-5850</inkml:trace>
+</inkml:ink>
+</file>
+
+<file path=ppt/ink/ink5.xml><?xml version="1.0" encoding="utf-8"?>
+<inkml:ink xmlns:inkml="http://www.w3.org/2003/InkML">
+  <inkml:definitions>
+    <inkml:context xml:id="ctx0">
+      <inkml:inkSource xml:id="inkSrc0">
+        <inkml:traceFormat>
+          <inkml:channel name="X" type="integer" min="-2.14748E9" max="2.14748E9" units="cm"/>
+          <inkml:channel name="Y" type="integer" min="-2.14748E9" max="2.14748E9" units="cm"/>
+          <inkml:channel name="F" type="integer" max="32767" units="dev"/>
+        </inkml:traceFormat>
+        <inkml:channelProperties>
+          <inkml:channelProperty channel="X" name="resolution" value="1000" units="1/cm"/>
+          <inkml:channelProperty channel="Y" name="resolution" value="1000" units="1/cm"/>
+          <inkml:channelProperty channel="F" name="resolution" value="0" units="1/dev"/>
+        </inkml:channelProperties>
+      </inkml:inkSource>
+      <inkml:timestamp xml:id="ts0" timeString="2026-01-08T16:20:12.343"/>
+    </inkml:context>
+    <inkml:brush xml:id="br0">
+      <inkml:brushProperty name="width" value="0.05" units="cm"/>
+      <inkml:brushProperty name="height" value="0.05" units="cm"/>
+    </inkml:brush>
+  </inkml:definitions>
+  <inkml:trace contextRef="#ctx0" brushRef="#br0">147 1 24575,'8'1'0,"-1"1"0,0 0 0,0 0 0,0 1 0,0 0 0,-1 0 0,1 1 0,-1-1 0,0 2 0,7 4 0,0 0 0,12 9 0,0 1 0,29 32 0,-5-5 0,-46-44 0,-1 0 0,1 0 0,-1 0 0,1 1 0,-1-1 0,0 1 0,0-1 0,3 6 0,-5-7 0,0 0 0,0-1 0,0 1 0,1 0 0,-1 0 0,0 0 0,0 0 0,-1-1 0,1 1 0,0 0 0,0 0 0,0 0 0,-1 0 0,1-1 0,0 1 0,-1 0 0,1 0 0,0-1 0,-1 1 0,1 0 0,-1-1 0,1 1 0,-1 0 0,0-1 0,1 1 0,-1-1 0,1 1 0,-1-1 0,0 1 0,0-1 0,1 0 0,-1 1 0,0-1 0,0 0 0,1 1 0,-3-1 0,-25 12 0,-2-2 0,0-1 0,0-1 0,-45 5 0,-36 10 0,87-18 0,17-4 0,-1 1 0,0 0 0,1 1 0,-1-1 0,-9 6 0,16-7 0,1-1 0,0 0-1,0 0 1,-1 0 0,1 0-1,0 0 1,0 0-1,-1 1 1,1-1 0,0 0-1,0 0 1,-1 0 0,1 0-1,0 0 1,-1 0 0,1 0-1,0 0 1,0 0 0,-1 0-1,1 0 1,0 0 0,-1-1-1,1 1 1,0 0 0,0 0-1,-1 0 1,1 0 0,0 0-1,0 0 1,-1-1 0,1 1-1,0 0 1,0 0-1,0 0 1,-1-1 0,1 1-1,0 0 1,0 0 0,0-1-1,0 1 1,0 0 0,-1 0-1,1-1 1,0 1 0,0 0-1,0 0 1,0-1 0,0 1-1,0 0 1,0-1 0,0 1-1,-2-5-1346,-3-4-5479</inkml:trace>
+</inkml:ink>
+</file>
+
+<file path=ppt/ink/ink6.xml><?xml version="1.0" encoding="utf-8"?>
+<inkml:ink xmlns:inkml="http://www.w3.org/2003/InkML">
+  <inkml:definitions>
+    <inkml:context xml:id="ctx0">
+      <inkml:inkSource xml:id="inkSrc0">
+        <inkml:traceFormat>
+          <inkml:channel name="X" type="integer" min="-2.14748E9" max="2.14748E9" units="cm"/>
+          <inkml:channel name="Y" type="integer" min="-2.14748E9" max="2.14748E9" units="cm"/>
+          <inkml:channel name="F" type="integer" max="32767" units="dev"/>
+        </inkml:traceFormat>
+        <inkml:channelProperties>
+          <inkml:channelProperty channel="X" name="resolution" value="1000" units="1/cm"/>
+          <inkml:channelProperty channel="Y" name="resolution" value="1000" units="1/cm"/>
+          <inkml:channelProperty channel="F" name="resolution" value="0" units="1/dev"/>
+        </inkml:channelProperties>
+      </inkml:inkSource>
+      <inkml:timestamp xml:id="ts0" timeString="2026-01-08T16:20:13.854"/>
+    </inkml:context>
+    <inkml:brush xml:id="br0">
+      <inkml:brushProperty name="width" value="0.05" units="cm"/>
+      <inkml:brushProperty name="height" value="0.05" units="cm"/>
+    </inkml:brush>
+  </inkml:definitions>
+  <inkml:trace contextRef="#ctx0" brushRef="#br0">1 0 24575,'24'1'0,"0"1"0,0 1 0,0 2 0,-1 0 0,1 1 0,-1 1 0,0 1 0,-1 2 0,0 0 0,-1 1 0,0 1 0,39 29 0,-39-25 0,275 230 0,-281-234 0,1-1 0,1-1 0,-1 0 0,1-1 0,1-1 0,0 0 0,0-2 0,23 6 0,-31-9 0,0-2 0,19 2 0,-22-2 0,1-1 0,-1 1 0,0 0 0,1 1 0,-1 0 0,11 4 0,-22-9 21,1 1 0,0 0 1,0-1-1,0 0 0,0 1 0,1-1 0,-5-6 0,-4-4-1555,-5-4-5292</inkml:trace>
+</inkml:ink>
+</file>
+
+<file path=ppt/ink/ink7.xml><?xml version="1.0" encoding="utf-8"?>
+<inkml:ink xmlns:inkml="http://www.w3.org/2003/InkML">
+  <inkml:definitions>
+    <inkml:context xml:id="ctx0">
+      <inkml:inkSource xml:id="inkSrc0">
+        <inkml:traceFormat>
+          <inkml:channel name="X" type="integer" min="-2.14748E9" max="2.14748E9" units="cm"/>
+          <inkml:channel name="Y" type="integer" min="-2.14748E9" max="2.14748E9" units="cm"/>
+          <inkml:channel name="F" type="integer" max="32767" units="dev"/>
+        </inkml:traceFormat>
+        <inkml:channelProperties>
+          <inkml:channelProperty channel="X" name="resolution" value="1000" units="1/cm"/>
+          <inkml:channelProperty channel="Y" name="resolution" value="1000" units="1/cm"/>
+          <inkml:channelProperty channel="F" name="resolution" value="0" units="1/dev"/>
+        </inkml:channelProperties>
+      </inkml:inkSource>
+      <inkml:timestamp xml:id="ts0" timeString="2026-01-08T16:20:14.634"/>
+    </inkml:context>
+    <inkml:brush xml:id="br0">
+      <inkml:brushProperty name="width" value="0.05" units="cm"/>
+      <inkml:brushProperty name="height" value="0.05" units="cm"/>
+    </inkml:brush>
+  </inkml:definitions>
+  <inkml:trace contextRef="#ctx0" brushRef="#br0">292 1 24575,'4'1'0,"1"0"0,-1 1 0,1-1 0,-1 1 0,0 0 0,1 1 0,-1-1 0,0 1 0,-1 0 0,1 0 0,0 0 0,-1 0 0,6 7 0,13 10 0,108 88 0,-106-89 0,-19-17 0,0 1 0,-1 0 0,0 1 0,0-1 0,0 1 0,5 7 0,-8-11 0,-1 1 0,0-1 0,0 1 0,0-1 0,0 1 0,0-1 0,0 1 0,0-1 0,0 1 0,0 0 0,0-1 0,0 1 0,0-1 0,-1 1 0,1-1 0,0 1 0,0-1 0,0 1 0,-1-1 0,1 1 0,0-1 0,-1 1 0,1-1 0,0 0 0,-1 1 0,1-1 0,-1 1 0,1-1 0,0 0 0,-1 1 0,1-1 0,-1 0 0,1 0 0,-1 1 0,1-1 0,-1 0 0,0 0 0,1 0 0,-2 0 0,-23 8 0,-97 15 0,-118 31 0,222-48 0,1 2 0,0 0 0,-27 18 0,24-14 0,-29 14 0,48-27-2,1 1-1,0-1 0,0 1 1,0-1-1,0 1 1,-1-1-1,1 1 1,0-1-1,0 1 0,0-1 1,0 1-1,0-1 1,0 1-1,1-1 0,-1 1 1,0-1-1,0 1 1,0-1-1,0 1 0,0-1 1,1 1-1,-1 0 1,0-1-1,1 0 0,0-4-1297,2-5-5526</inkml:trace>
+</inkml:ink>
+</file>
+
 <file path=ppt/notesMasters/notesMaster1.xml><?xml version="1.0" encoding="utf-8"?>
 <p:notesMaster xmlns:a="http://schemas.openxmlformats.org/drawingml/2006/main" xmlns:r="http://schemas.openxmlformats.org/officeDocument/2006/relationships" xmlns:p="http://schemas.openxmlformats.org/presentationml/2006/main">
   <p:cSld>
@@ -215,7 +409,7 @@
           <a:p>
             <a:fld id="{15653688-98A8-4F3B-A740-8E6568AE1BCB}" type="datetimeFigureOut">
               <a:rPr lang="en-US" smtClean="0"/>
-              <a:t>12/18/2025</a:t>
+              <a:t>1/8/2026</a:t>
             </a:fld>
             <a:endParaRPr lang="en-US"/>
           </a:p>
@@ -821,7 +1015,7 @@
           <a:p>
             <a:fld id="{20CB266D-A331-4A79-AB46-FEF40B16CF9B}" type="datetimeFigureOut">
               <a:rPr lang="en-US" smtClean="0"/>
-              <a:t>12/18/2025</a:t>
+              <a:t>1/8/2026</a:t>
             </a:fld>
             <a:endParaRPr lang="en-US"/>
           </a:p>
@@ -1019,7 +1213,7 @@
           <a:p>
             <a:fld id="{20CB266D-A331-4A79-AB46-FEF40B16CF9B}" type="datetimeFigureOut">
               <a:rPr lang="en-US" smtClean="0"/>
-              <a:t>12/18/2025</a:t>
+              <a:t>1/8/2026</a:t>
             </a:fld>
             <a:endParaRPr lang="en-US"/>
           </a:p>
@@ -1227,7 +1421,7 @@
           <a:p>
             <a:fld id="{20CB266D-A331-4A79-AB46-FEF40B16CF9B}" type="datetimeFigureOut">
               <a:rPr lang="en-US" smtClean="0"/>
-              <a:t>12/18/2025</a:t>
+              <a:t>1/8/2026</a:t>
             </a:fld>
             <a:endParaRPr lang="en-US"/>
           </a:p>
@@ -1425,7 +1619,7 @@
           <a:p>
             <a:fld id="{20CB266D-A331-4A79-AB46-FEF40B16CF9B}" type="datetimeFigureOut">
               <a:rPr lang="en-US" smtClean="0"/>
-              <a:t>12/18/2025</a:t>
+              <a:t>1/8/2026</a:t>
             </a:fld>
             <a:endParaRPr lang="en-US"/>
           </a:p>
@@ -1700,7 +1894,7 @@
           <a:p>
             <a:fld id="{20CB266D-A331-4A79-AB46-FEF40B16CF9B}" type="datetimeFigureOut">
               <a:rPr lang="en-US" smtClean="0"/>
-              <a:t>12/18/2025</a:t>
+              <a:t>1/8/2026</a:t>
             </a:fld>
             <a:endParaRPr lang="en-US"/>
           </a:p>
@@ -1965,7 +2159,7 @@
           <a:p>
             <a:fld id="{20CB266D-A331-4A79-AB46-FEF40B16CF9B}" type="datetimeFigureOut">
               <a:rPr lang="en-US" smtClean="0"/>
-              <a:t>12/18/2025</a:t>
+              <a:t>1/8/2026</a:t>
             </a:fld>
             <a:endParaRPr lang="en-US"/>
           </a:p>
@@ -2377,7 +2571,7 @@
           <a:p>
             <a:fld id="{20CB266D-A331-4A79-AB46-FEF40B16CF9B}" type="datetimeFigureOut">
               <a:rPr lang="en-US" smtClean="0"/>
-              <a:t>12/18/2025</a:t>
+              <a:t>1/8/2026</a:t>
             </a:fld>
             <a:endParaRPr lang="en-US"/>
           </a:p>
@@ -2518,7 +2712,7 @@
           <a:p>
             <a:fld id="{20CB266D-A331-4A79-AB46-FEF40B16CF9B}" type="datetimeFigureOut">
               <a:rPr lang="en-US" smtClean="0"/>
-              <a:t>12/18/2025</a:t>
+              <a:t>1/8/2026</a:t>
             </a:fld>
             <a:endParaRPr lang="en-US"/>
           </a:p>
@@ -2631,7 +2825,7 @@
           <a:p>
             <a:fld id="{20CB266D-A331-4A79-AB46-FEF40B16CF9B}" type="datetimeFigureOut">
               <a:rPr lang="en-US" smtClean="0"/>
-              <a:t>12/18/2025</a:t>
+              <a:t>1/8/2026</a:t>
             </a:fld>
             <a:endParaRPr lang="en-US"/>
           </a:p>
@@ -2942,7 +3136,7 @@
           <a:p>
             <a:fld id="{20CB266D-A331-4A79-AB46-FEF40B16CF9B}" type="datetimeFigureOut">
               <a:rPr lang="en-US" smtClean="0"/>
-              <a:t>12/18/2025</a:t>
+              <a:t>1/8/2026</a:t>
             </a:fld>
             <a:endParaRPr lang="en-US"/>
           </a:p>
@@ -3230,7 +3424,7 @@
           <a:p>
             <a:fld id="{20CB266D-A331-4A79-AB46-FEF40B16CF9B}" type="datetimeFigureOut">
               <a:rPr lang="en-US" smtClean="0"/>
-              <a:t>12/18/2025</a:t>
+              <a:t>1/8/2026</a:t>
             </a:fld>
             <a:endParaRPr lang="en-US"/>
           </a:p>
@@ -3471,7 +3665,7 @@
           <a:p>
             <a:fld id="{20CB266D-A331-4A79-AB46-FEF40B16CF9B}" type="datetimeFigureOut">
               <a:rPr lang="en-US" smtClean="0"/>
-              <a:t>12/18/2025</a:t>
+              <a:t>1/8/2026</a:t>
             </a:fld>
             <a:endParaRPr lang="en-US"/>
           </a:p>
@@ -5328,7 +5522,7 @@
             <a:pPr lvl="1"/>
             <a:r>
               <a:rPr lang="en-US" dirty="0"/>
-              <a:t>99</a:t>
+              <a:t>45</a:t>
             </a:r>
             <a:r>
               <a:rPr lang="en-US" baseline="-25000" dirty="0"/>
@@ -6189,7 +6383,7 @@
               <a:rPr lang="en-US" dirty="0">
                 <a:sym typeface="Wingdings" panose="05000000000000000000" pitchFamily="2" charset="2"/>
               </a:rPr>
-              <a:t>// group by 3 , added extra 0 in the front</a:t>
+              <a:t>// group by 3s , added extra 0s in the front</a:t>
             </a:r>
           </a:p>
           <a:p>
@@ -6471,7 +6665,7 @@
               <a:rPr lang="en-US" dirty="0">
                 <a:sym typeface="Wingdings" panose="05000000000000000000" pitchFamily="2" charset="2"/>
               </a:rPr>
-              <a:t>// group by 3 , added extra 0 in the front</a:t>
+              <a:t>// group by 3 , removed 0s in the front</a:t>
             </a:r>
           </a:p>
           <a:p>
@@ -7199,6 +7393,1757 @@
     <p:extLst>
       <p:ext uri="{BB962C8B-B14F-4D97-AF65-F5344CB8AC3E}">
         <p14:creationId xmlns:p14="http://schemas.microsoft.com/office/powerpoint/2010/main" val="1764282807"/>
+      </p:ext>
+    </p:extLst>
+  </p:cSld>
+  <p:clrMapOvr>
+    <a:masterClrMapping/>
+  </p:clrMapOvr>
+</p:sld>
+</file>
+
+<file path=ppt/slides/slide20.xml><?xml version="1.0" encoding="utf-8"?>
+<p:sld xmlns:a="http://schemas.openxmlformats.org/drawingml/2006/main" xmlns:r="http://schemas.openxmlformats.org/officeDocument/2006/relationships" xmlns:p="http://schemas.openxmlformats.org/presentationml/2006/main">
+  <p:cSld>
+    <p:spTree>
+      <p:nvGrpSpPr>
+        <p:cNvPr id="1" name=""/>
+        <p:cNvGrpSpPr/>
+        <p:nvPr/>
+      </p:nvGrpSpPr>
+      <p:grpSpPr>
+        <a:xfrm>
+          <a:off x="0" y="0"/>
+          <a:ext cx="0" cy="0"/>
+          <a:chOff x="0" y="0"/>
+          <a:chExt cx="0" cy="0"/>
+        </a:xfrm>
+      </p:grpSpPr>
+      <p:sp>
+        <p:nvSpPr>
+          <p:cNvPr id="2" name="Title 1">
+            <a:extLst>
+              <a:ext uri="{FF2B5EF4-FFF2-40B4-BE49-F238E27FC236}">
+                <a16:creationId xmlns:a16="http://schemas.microsoft.com/office/drawing/2014/main" id="{82A35361-C439-F244-59BE-387062C3B219}"/>
+              </a:ext>
+            </a:extLst>
+          </p:cNvPr>
+          <p:cNvSpPr>
+            <a:spLocks noGrp="1"/>
+          </p:cNvSpPr>
+          <p:nvPr>
+            <p:ph type="title"/>
+          </p:nvPr>
+        </p:nvSpPr>
+        <p:spPr/>
+        <p:txBody>
+          <a:bodyPr/>
+          <a:lstStyle/>
+          <a:p>
+            <a:r>
+              <a:rPr lang="en-US" dirty="0"/>
+              <a:t>Relations</a:t>
+            </a:r>
+            <a:endParaRPr lang="en-US" i="1" dirty="0"/>
+          </a:p>
+        </p:txBody>
+      </p:sp>
+      <p:sp>
+        <p:nvSpPr>
+          <p:cNvPr id="3" name="Content Placeholder 2">
+            <a:extLst>
+              <a:ext uri="{FF2B5EF4-FFF2-40B4-BE49-F238E27FC236}">
+                <a16:creationId xmlns:a16="http://schemas.microsoft.com/office/drawing/2014/main" id="{3A9D45C0-F44A-0C13-FFC8-529E49204130}"/>
+              </a:ext>
+            </a:extLst>
+          </p:cNvPr>
+          <p:cNvSpPr>
+            <a:spLocks noGrp="1"/>
+          </p:cNvSpPr>
+          <p:nvPr>
+            <p:ph idx="1"/>
+          </p:nvPr>
+        </p:nvSpPr>
+        <p:spPr/>
+        <p:txBody>
+          <a:bodyPr>
+            <a:normAutofit lnSpcReduction="10000"/>
+          </a:bodyPr>
+          <a:lstStyle/>
+          <a:p>
+            <a:r>
+              <a:rPr lang="en-US" dirty="0"/>
+              <a:t>A </a:t>
+            </a:r>
+            <a:r>
+              <a:rPr lang="en-US" b="1" dirty="0"/>
+              <a:t>relation</a:t>
+            </a:r>
+            <a:r>
+              <a:rPr lang="en-US" dirty="0"/>
+              <a:t> : connection/mapping between elements of two or more sets, Some characteristics …</a:t>
+            </a:r>
+          </a:p>
+          <a:p>
+            <a:pPr lvl="1"/>
+            <a:r>
+              <a:rPr lang="en-US" dirty="0"/>
+              <a:t>It is a </a:t>
+            </a:r>
+            <a:r>
+              <a:rPr lang="en-US" b="1" dirty="0"/>
+              <a:t>mapping</a:t>
+            </a:r>
+            <a:r>
+              <a:rPr lang="en-US" dirty="0"/>
+              <a:t> as </a:t>
+            </a:r>
+            <a:r>
+              <a:rPr lang="en-US" i="1" dirty="0"/>
+              <a:t>shown in figure</a:t>
+            </a:r>
+          </a:p>
+          <a:p>
+            <a:pPr lvl="1"/>
+            <a:r>
+              <a:rPr lang="en-US" dirty="0"/>
+              <a:t>Can be written as </a:t>
+            </a:r>
+            <a:r>
+              <a:rPr lang="en-US" b="1" dirty="0"/>
+              <a:t>Ordered pairs </a:t>
+            </a:r>
+          </a:p>
+          <a:p>
+            <a:pPr lvl="2"/>
+            <a:r>
+              <a:rPr lang="en-US" dirty="0"/>
+              <a:t>{(1,c), (2,n),(5,a),(7,n)}</a:t>
+            </a:r>
+          </a:p>
+          <a:p>
+            <a:pPr lvl="1"/>
+            <a:r>
+              <a:rPr lang="en-US" dirty="0"/>
+              <a:t>Not always unique</a:t>
+            </a:r>
+          </a:p>
+          <a:p>
+            <a:pPr lvl="2"/>
+            <a:r>
+              <a:rPr lang="en-US" dirty="0"/>
+              <a:t>E.g. y</a:t>
+            </a:r>
+            <a:r>
+              <a:rPr lang="en-US" baseline="30000" dirty="0"/>
+              <a:t>2</a:t>
+            </a:r>
+            <a:r>
+              <a:rPr lang="en-US" dirty="0"/>
+              <a:t> = 4 has multiple solutions (how many?)(</a:t>
+            </a:r>
+          </a:p>
+          <a:p>
+            <a:r>
+              <a:rPr lang="en-US" dirty="0"/>
+              <a:t>Examples</a:t>
+            </a:r>
+          </a:p>
+          <a:p>
+            <a:pPr lvl="1"/>
+            <a:r>
+              <a:rPr lang="en-US" dirty="0"/>
+              <a:t>Numerical relationship : 4+3 = 7</a:t>
+            </a:r>
+          </a:p>
+          <a:p>
+            <a:pPr lvl="1"/>
+            <a:r>
+              <a:rPr lang="en-US" dirty="0"/>
+              <a:t>Equation : y = 2x+3</a:t>
+            </a:r>
+          </a:p>
+          <a:p>
+            <a:pPr lvl="1"/>
+            <a:r>
+              <a:rPr lang="en-US" dirty="0"/>
+              <a:t>Geometry : two congruent triangles</a:t>
+            </a:r>
+          </a:p>
+          <a:p>
+            <a:pPr lvl="1"/>
+            <a:r>
+              <a:rPr lang="en-US" dirty="0"/>
+              <a:t>Set theory : A is a subset of B </a:t>
+            </a:r>
+          </a:p>
+          <a:p>
+            <a:pPr lvl="2"/>
+            <a:endParaRPr lang="en-US" dirty="0"/>
+          </a:p>
+          <a:p>
+            <a:pPr lvl="1"/>
+            <a:endParaRPr lang="en-US" dirty="0"/>
+          </a:p>
+          <a:p>
+            <a:pPr lvl="1"/>
+            <a:endParaRPr lang="en-US" dirty="0"/>
+          </a:p>
+        </p:txBody>
+      </p:sp>
+      <p:pic>
+        <p:nvPicPr>
+          <p:cNvPr id="5" name="Picture 4">
+            <a:extLst>
+              <a:ext uri="{FF2B5EF4-FFF2-40B4-BE49-F238E27FC236}">
+                <a16:creationId xmlns:a16="http://schemas.microsoft.com/office/drawing/2014/main" id="{096BF3F3-E264-E655-5183-8CDB033A4673}"/>
+              </a:ext>
+            </a:extLst>
+          </p:cNvPr>
+          <p:cNvPicPr>
+            <a:picLocks noChangeAspect="1"/>
+          </p:cNvPicPr>
+          <p:nvPr/>
+        </p:nvPicPr>
+        <p:blipFill>
+          <a:blip r:embed="rId2"/>
+          <a:stretch>
+            <a:fillRect/>
+          </a:stretch>
+        </p:blipFill>
+        <p:spPr>
+          <a:xfrm>
+            <a:off x="7500624" y="2247774"/>
+            <a:ext cx="3429176" cy="1790792"/>
+          </a:xfrm>
+          <a:prstGeom prst="rect">
+            <a:avLst/>
+          </a:prstGeom>
+        </p:spPr>
+      </p:pic>
+    </p:spTree>
+    <p:extLst>
+      <p:ext uri="{BB962C8B-B14F-4D97-AF65-F5344CB8AC3E}">
+        <p14:creationId xmlns:p14="http://schemas.microsoft.com/office/powerpoint/2010/main" val="677112092"/>
+      </p:ext>
+    </p:extLst>
+  </p:cSld>
+  <p:clrMapOvr>
+    <a:masterClrMapping/>
+  </p:clrMapOvr>
+</p:sld>
+</file>
+
+<file path=ppt/slides/slide21.xml><?xml version="1.0" encoding="utf-8"?>
+<p:sld xmlns:a="http://schemas.openxmlformats.org/drawingml/2006/main" xmlns:r="http://schemas.openxmlformats.org/officeDocument/2006/relationships" xmlns:p="http://schemas.openxmlformats.org/presentationml/2006/main">
+  <p:cSld>
+    <p:spTree>
+      <p:nvGrpSpPr>
+        <p:cNvPr id="1" name=""/>
+        <p:cNvGrpSpPr/>
+        <p:nvPr/>
+      </p:nvGrpSpPr>
+      <p:grpSpPr>
+        <a:xfrm>
+          <a:off x="0" y="0"/>
+          <a:ext cx="0" cy="0"/>
+          <a:chOff x="0" y="0"/>
+          <a:chExt cx="0" cy="0"/>
+        </a:xfrm>
+      </p:grpSpPr>
+      <p:sp>
+        <p:nvSpPr>
+          <p:cNvPr id="2" name="Title 1">
+            <a:extLst>
+              <a:ext uri="{FF2B5EF4-FFF2-40B4-BE49-F238E27FC236}">
+                <a16:creationId xmlns:a16="http://schemas.microsoft.com/office/drawing/2014/main" id="{FC3656C5-174E-2FB6-65E4-CA2111D70633}"/>
+              </a:ext>
+            </a:extLst>
+          </p:cNvPr>
+          <p:cNvSpPr>
+            <a:spLocks noGrp="1"/>
+          </p:cNvSpPr>
+          <p:nvPr>
+            <p:ph type="title"/>
+          </p:nvPr>
+        </p:nvSpPr>
+        <p:spPr/>
+        <p:txBody>
+          <a:bodyPr/>
+          <a:lstStyle/>
+          <a:p>
+            <a:r>
+              <a:rPr lang="en-US" dirty="0"/>
+              <a:t>Functions , mathematical kind</a:t>
+            </a:r>
+          </a:p>
+        </p:txBody>
+      </p:sp>
+      <p:sp>
+        <p:nvSpPr>
+          <p:cNvPr id="3" name="Content Placeholder 2">
+            <a:extLst>
+              <a:ext uri="{FF2B5EF4-FFF2-40B4-BE49-F238E27FC236}">
+                <a16:creationId xmlns:a16="http://schemas.microsoft.com/office/drawing/2014/main" id="{9C84E198-62A9-A7DA-7EB7-D2E9BE70DAF5}"/>
+              </a:ext>
+            </a:extLst>
+          </p:cNvPr>
+          <p:cNvSpPr>
+            <a:spLocks noGrp="1"/>
+          </p:cNvSpPr>
+          <p:nvPr>
+            <p:ph idx="1"/>
+          </p:nvPr>
+        </p:nvSpPr>
+        <p:spPr/>
+        <p:txBody>
+          <a:bodyPr>
+            <a:normAutofit/>
+          </a:bodyPr>
+          <a:lstStyle/>
+          <a:p>
+            <a:r>
+              <a:rPr lang="en-US" dirty="0"/>
+              <a:t>A </a:t>
+            </a:r>
+            <a:r>
+              <a:rPr lang="en-US" b="1" dirty="0"/>
+              <a:t>relation</a:t>
+            </a:r>
+            <a:r>
+              <a:rPr lang="en-US" dirty="0"/>
+              <a:t> that gives exactly </a:t>
+            </a:r>
+            <a:r>
+              <a:rPr lang="en-US" b="1" dirty="0"/>
+              <a:t>one unique output for each input</a:t>
+            </a:r>
+          </a:p>
+          <a:p>
+            <a:pPr marL="0" indent="0">
+              <a:buNone/>
+            </a:pPr>
+            <a:r>
+              <a:rPr lang="en-US" dirty="0"/>
+              <a:t>x </a:t>
+            </a:r>
+            <a:r>
+              <a:rPr lang="en-US" dirty="0">
+                <a:sym typeface="Wingdings" panose="05000000000000000000" pitchFamily="2" charset="2"/>
+              </a:rPr>
+              <a:t>               y     :this is a function as you always get one answer</a:t>
+            </a:r>
+          </a:p>
+          <a:p>
+            <a:pPr marL="0" indent="0">
+              <a:buNone/>
+            </a:pPr>
+            <a:r>
+              <a:rPr lang="en-US" dirty="0"/>
+              <a:t>x </a:t>
+            </a:r>
+            <a:r>
+              <a:rPr lang="en-US" dirty="0">
+                <a:sym typeface="Wingdings" panose="05000000000000000000" pitchFamily="2" charset="2"/>
+              </a:rPr>
+              <a:t>                           :Not a function as you get multiple answers</a:t>
+            </a:r>
+          </a:p>
+          <a:p>
+            <a:endParaRPr lang="en-US" dirty="0">
+              <a:sym typeface="Wingdings" panose="05000000000000000000" pitchFamily="2" charset="2"/>
+            </a:endParaRPr>
+          </a:p>
+          <a:p>
+            <a:r>
+              <a:rPr lang="en-US" dirty="0"/>
+              <a:t>Representation </a:t>
+            </a:r>
+          </a:p>
+          <a:p>
+            <a:pPr lvl="1"/>
+            <a:r>
+              <a:rPr lang="en-US" dirty="0"/>
+              <a:t>f(x)  = 2x+1 : this is a function </a:t>
+            </a:r>
+          </a:p>
+          <a:p>
+            <a:pPr lvl="1"/>
+            <a:r>
+              <a:rPr lang="en-US" dirty="0"/>
+              <a:t>g(x) = ± 3x  : this is </a:t>
+            </a:r>
+            <a:r>
+              <a:rPr lang="en-US" b="1" dirty="0"/>
+              <a:t>not </a:t>
+            </a:r>
+            <a:r>
+              <a:rPr lang="en-US" dirty="0"/>
+              <a:t>a function , why?</a:t>
+            </a:r>
+          </a:p>
+          <a:p>
+            <a:r>
+              <a:rPr lang="en-US" dirty="0"/>
+              <a:t>Follow up reading : </a:t>
+            </a:r>
+            <a:r>
+              <a:rPr lang="en-US" dirty="0" err="1"/>
+              <a:t>pg</a:t>
+            </a:r>
+            <a:r>
+              <a:rPr lang="en-US" dirty="0"/>
+              <a:t> 11-13 : </a:t>
+            </a:r>
+            <a:r>
+              <a:rPr lang="en-US" dirty="0">
+                <a:hlinkClick r:id="rId2"/>
+              </a:rPr>
+              <a:t>functions</a:t>
+            </a:r>
+            <a:endParaRPr lang="en-US" dirty="0"/>
+          </a:p>
+          <a:p>
+            <a:endParaRPr lang="en-US" b="1" dirty="0"/>
+          </a:p>
+          <a:p>
+            <a:pPr lvl="1"/>
+            <a:endParaRPr lang="en-US" b="1" dirty="0"/>
+          </a:p>
+        </p:txBody>
+      </p:sp>
+      <p:sp>
+        <p:nvSpPr>
+          <p:cNvPr id="7" name="Rectangle 6">
+            <a:extLst>
+              <a:ext uri="{FF2B5EF4-FFF2-40B4-BE49-F238E27FC236}">
+                <a16:creationId xmlns:a16="http://schemas.microsoft.com/office/drawing/2014/main" id="{68151C7A-8B6C-8009-415E-F91BB003110A}"/>
+              </a:ext>
+            </a:extLst>
+          </p:cNvPr>
+          <p:cNvSpPr/>
+          <p:nvPr/>
+        </p:nvSpPr>
+        <p:spPr>
+          <a:xfrm>
+            <a:off x="1838880" y="2348280"/>
+            <a:ext cx="731520" cy="365760"/>
+          </a:xfrm>
+          <a:prstGeom prst="rect">
+            <a:avLst/>
+          </a:prstGeom>
+          <a:solidFill>
+            <a:srgbClr val="000000">
+              <a:alpha val="5000"/>
+            </a:srgbClr>
+          </a:solidFill>
+          <a:ln w="18000">
+            <a:solidFill>
+              <a:srgbClr val="000000"/>
+            </a:solidFill>
+          </a:ln>
+        </p:spPr>
+        <p:style>
+          <a:lnRef idx="2">
+            <a:schemeClr val="accent1">
+              <a:shade val="15000"/>
+            </a:schemeClr>
+          </a:lnRef>
+          <a:fillRef idx="1">
+            <a:schemeClr val="accent1"/>
+          </a:fillRef>
+          <a:effectRef idx="0">
+            <a:schemeClr val="accent1"/>
+          </a:effectRef>
+          <a:fontRef idx="minor">
+            <a:schemeClr val="lt1"/>
+          </a:fontRef>
+        </p:style>
+        <p:txBody>
+          <a:bodyPr rtlCol="0" anchor="ctr"/>
+          <a:lstStyle/>
+          <a:p>
+            <a:pPr algn="ctr"/>
+            <a:endParaRPr lang="en-US">
+              <a:solidFill>
+                <a:srgbClr val="000000"/>
+              </a:solidFill>
+            </a:endParaRPr>
+          </a:p>
+        </p:txBody>
+      </p:sp>
+      <p:sp>
+        <p:nvSpPr>
+          <p:cNvPr id="13" name="TextBox 12">
+            <a:extLst>
+              <a:ext uri="{FF2B5EF4-FFF2-40B4-BE49-F238E27FC236}">
+                <a16:creationId xmlns:a16="http://schemas.microsoft.com/office/drawing/2014/main" id="{AC6B4BE5-A952-1A8B-54BC-63ED314339FD}"/>
+              </a:ext>
+            </a:extLst>
+          </p:cNvPr>
+          <p:cNvSpPr txBox="1"/>
+          <p:nvPr/>
+        </p:nvSpPr>
+        <p:spPr>
+          <a:xfrm>
+            <a:off x="1860641" y="2348280"/>
+            <a:ext cx="687998" cy="369332"/>
+          </a:xfrm>
+          <a:prstGeom prst="rect">
+            <a:avLst/>
+          </a:prstGeom>
+          <a:noFill/>
+        </p:spPr>
+        <p:txBody>
+          <a:bodyPr wrap="square" rtlCol="0">
+            <a:spAutoFit/>
+          </a:bodyPr>
+          <a:lstStyle/>
+          <a:p>
+            <a:r>
+              <a:rPr lang="en-US" dirty="0"/>
+              <a:t>Rule</a:t>
+            </a:r>
+          </a:p>
+        </p:txBody>
+      </p:sp>
+      <p:sp>
+        <p:nvSpPr>
+          <p:cNvPr id="14" name="TextBox 13">
+            <a:extLst>
+              <a:ext uri="{FF2B5EF4-FFF2-40B4-BE49-F238E27FC236}">
+                <a16:creationId xmlns:a16="http://schemas.microsoft.com/office/drawing/2014/main" id="{7E9EF14B-CA2E-6982-AF5C-489BC285D936}"/>
+              </a:ext>
+            </a:extLst>
+          </p:cNvPr>
+          <p:cNvSpPr txBox="1"/>
+          <p:nvPr/>
+        </p:nvSpPr>
+        <p:spPr>
+          <a:xfrm>
+            <a:off x="1838880" y="2882925"/>
+            <a:ext cx="687998" cy="369332"/>
+          </a:xfrm>
+          <a:prstGeom prst="rect">
+            <a:avLst/>
+          </a:prstGeom>
+          <a:noFill/>
+        </p:spPr>
+        <p:txBody>
+          <a:bodyPr wrap="square" rtlCol="0">
+            <a:spAutoFit/>
+          </a:bodyPr>
+          <a:lstStyle/>
+          <a:p>
+            <a:r>
+              <a:rPr lang="en-US" dirty="0"/>
+              <a:t>Rule</a:t>
+            </a:r>
+          </a:p>
+        </p:txBody>
+      </p:sp>
+      <p:sp>
+        <p:nvSpPr>
+          <p:cNvPr id="16" name="Rectangle 15">
+            <a:extLst>
+              <a:ext uri="{FF2B5EF4-FFF2-40B4-BE49-F238E27FC236}">
+                <a16:creationId xmlns:a16="http://schemas.microsoft.com/office/drawing/2014/main" id="{640DAEC3-6CB2-B53A-492C-9AF9FB397D56}"/>
+              </a:ext>
+            </a:extLst>
+          </p:cNvPr>
+          <p:cNvSpPr/>
+          <p:nvPr/>
+        </p:nvSpPr>
+        <p:spPr>
+          <a:xfrm>
+            <a:off x="1842120" y="2909160"/>
+            <a:ext cx="731520" cy="365760"/>
+          </a:xfrm>
+          <a:prstGeom prst="rect">
+            <a:avLst/>
+          </a:prstGeom>
+          <a:solidFill>
+            <a:srgbClr val="000000">
+              <a:alpha val="5000"/>
+            </a:srgbClr>
+          </a:solidFill>
+          <a:ln w="18000">
+            <a:solidFill>
+              <a:srgbClr val="000000"/>
+            </a:solidFill>
+          </a:ln>
+        </p:spPr>
+        <p:style>
+          <a:lnRef idx="2">
+            <a:schemeClr val="accent1">
+              <a:shade val="15000"/>
+            </a:schemeClr>
+          </a:lnRef>
+          <a:fillRef idx="1">
+            <a:schemeClr val="accent1"/>
+          </a:fillRef>
+          <a:effectRef idx="0">
+            <a:schemeClr val="accent1"/>
+          </a:effectRef>
+          <a:fontRef idx="minor">
+            <a:schemeClr val="lt1"/>
+          </a:fontRef>
+        </p:style>
+        <p:txBody>
+          <a:bodyPr rtlCol="0" anchor="ctr"/>
+          <a:lstStyle/>
+          <a:p>
+            <a:pPr algn="ctr"/>
+            <a:endParaRPr lang="en-US">
+              <a:solidFill>
+                <a:srgbClr val="000000"/>
+              </a:solidFill>
+            </a:endParaRPr>
+          </a:p>
+        </p:txBody>
+      </p:sp>
+      <mc:AlternateContent xmlns:mc="http://schemas.openxmlformats.org/markup-compatibility/2006" xmlns:p14="http://schemas.microsoft.com/office/powerpoint/2010/main">
+        <mc:Choice Requires="p14">
+          <p:contentPart p14:bwMode="auto" r:id="rId3">
+            <p14:nvContentPartPr>
+              <p14:cNvPr id="17" name="Ink 16">
+                <a:extLst>
+                  <a:ext uri="{FF2B5EF4-FFF2-40B4-BE49-F238E27FC236}">
+                    <a16:creationId xmlns:a16="http://schemas.microsoft.com/office/drawing/2014/main" id="{F875B4C7-A359-6018-2157-AE5ABA315C18}"/>
+                  </a:ext>
+                </a:extLst>
+              </p14:cNvPr>
+              <p14:cNvContentPartPr/>
+              <p14:nvPr/>
+            </p14:nvContentPartPr>
+            <p14:xfrm>
+              <a:off x="2936679" y="2998246"/>
+              <a:ext cx="360" cy="360"/>
+            </p14:xfrm>
+          </p:contentPart>
+        </mc:Choice>
+        <mc:Fallback xmlns="">
+          <p:pic>
+            <p:nvPicPr>
+              <p:cNvPr id="17" name="Ink 16">
+                <a:extLst>
+                  <a:ext uri="{FF2B5EF4-FFF2-40B4-BE49-F238E27FC236}">
+                    <a16:creationId xmlns:a16="http://schemas.microsoft.com/office/drawing/2014/main" id="{F875B4C7-A359-6018-2157-AE5ABA315C18}"/>
+                  </a:ext>
+                </a:extLst>
+              </p:cNvPr>
+              <p:cNvPicPr/>
+              <p:nvPr/>
+            </p:nvPicPr>
+            <p:blipFill>
+              <a:blip r:embed="rId4"/>
+              <a:stretch>
+                <a:fillRect/>
+              </a:stretch>
+            </p:blipFill>
+            <p:spPr>
+              <a:xfrm>
+                <a:off x="2927679" y="2989246"/>
+                <a:ext cx="18000" cy="18000"/>
+              </a:xfrm>
+              <a:prstGeom prst="rect">
+                <a:avLst/>
+              </a:prstGeom>
+            </p:spPr>
+          </p:pic>
+        </mc:Fallback>
+      </mc:AlternateContent>
+      <p:grpSp>
+        <p:nvGrpSpPr>
+          <p:cNvPr id="25" name="Group 24">
+            <a:extLst>
+              <a:ext uri="{FF2B5EF4-FFF2-40B4-BE49-F238E27FC236}">
+                <a16:creationId xmlns:a16="http://schemas.microsoft.com/office/drawing/2014/main" id="{9C0F5BCF-D0F2-30A7-9946-861FA1711ABA}"/>
+              </a:ext>
+            </a:extLst>
+          </p:cNvPr>
+          <p:cNvGrpSpPr/>
+          <p:nvPr/>
+        </p:nvGrpSpPr>
+        <p:grpSpPr>
+          <a:xfrm>
+            <a:off x="2721039" y="2857126"/>
+            <a:ext cx="445320" cy="303840"/>
+            <a:chOff x="2721039" y="2857126"/>
+            <a:chExt cx="445320" cy="303840"/>
+          </a:xfrm>
+        </p:grpSpPr>
+        <mc:AlternateContent xmlns:mc="http://schemas.openxmlformats.org/markup-compatibility/2006" xmlns:p14="http://schemas.microsoft.com/office/powerpoint/2010/main">
+          <mc:Choice Requires="p14">
+            <p:contentPart p14:bwMode="auto" r:id="rId5">
+              <p14:nvContentPartPr>
+                <p14:cNvPr id="19" name="Ink 18">
+                  <a:extLst>
+                    <a:ext uri="{FF2B5EF4-FFF2-40B4-BE49-F238E27FC236}">
+                      <a16:creationId xmlns:a16="http://schemas.microsoft.com/office/drawing/2014/main" id="{B8C7FEF2-D3AE-3E3C-A68D-D3F43971E802}"/>
+                    </a:ext>
+                  </a:extLst>
+                </p14:cNvPr>
+                <p14:cNvContentPartPr/>
+                <p14:nvPr/>
+              </p14:nvContentPartPr>
+              <p14:xfrm>
+                <a:off x="2721039" y="2908246"/>
+                <a:ext cx="376920" cy="104040"/>
+              </p14:xfrm>
+            </p:contentPart>
+          </mc:Choice>
+          <mc:Fallback xmlns="">
+            <p:pic>
+              <p:nvPicPr>
+                <p:cNvPr id="19" name="Ink 18">
+                  <a:extLst>
+                    <a:ext uri="{FF2B5EF4-FFF2-40B4-BE49-F238E27FC236}">
+                      <a16:creationId xmlns:a16="http://schemas.microsoft.com/office/drawing/2014/main" id="{B8C7FEF2-D3AE-3E3C-A68D-D3F43971E802}"/>
+                    </a:ext>
+                  </a:extLst>
+                </p:cNvPr>
+                <p:cNvPicPr/>
+                <p:nvPr/>
+              </p:nvPicPr>
+              <p:blipFill>
+                <a:blip r:embed="rId6"/>
+                <a:stretch>
+                  <a:fillRect/>
+                </a:stretch>
+              </p:blipFill>
+              <p:spPr>
+                <a:xfrm>
+                  <a:off x="2712039" y="2899246"/>
+                  <a:ext cx="394560" cy="121680"/>
+                </a:xfrm>
+                <a:prstGeom prst="rect">
+                  <a:avLst/>
+                </a:prstGeom>
+              </p:spPr>
+            </p:pic>
+          </mc:Fallback>
+        </mc:AlternateContent>
+        <mc:AlternateContent xmlns:mc="http://schemas.openxmlformats.org/markup-compatibility/2006" xmlns:p14="http://schemas.microsoft.com/office/powerpoint/2010/main">
+          <mc:Choice Requires="p14">
+            <p:contentPart p14:bwMode="auto" r:id="rId7">
+              <p14:nvContentPartPr>
+                <p14:cNvPr id="20" name="Ink 19">
+                  <a:extLst>
+                    <a:ext uri="{FF2B5EF4-FFF2-40B4-BE49-F238E27FC236}">
+                      <a16:creationId xmlns:a16="http://schemas.microsoft.com/office/drawing/2014/main" id="{C8ECC4D9-1F6F-1158-5D0B-145F4119AC69}"/>
+                    </a:ext>
+                  </a:extLst>
+                </p14:cNvPr>
+                <p14:cNvContentPartPr/>
+                <p14:nvPr/>
+              </p14:nvContentPartPr>
+              <p14:xfrm>
+                <a:off x="2985639" y="2857126"/>
+                <a:ext cx="149040" cy="141120"/>
+              </p14:xfrm>
+            </p:contentPart>
+          </mc:Choice>
+          <mc:Fallback xmlns="">
+            <p:pic>
+              <p:nvPicPr>
+                <p:cNvPr id="20" name="Ink 19">
+                  <a:extLst>
+                    <a:ext uri="{FF2B5EF4-FFF2-40B4-BE49-F238E27FC236}">
+                      <a16:creationId xmlns:a16="http://schemas.microsoft.com/office/drawing/2014/main" id="{C8ECC4D9-1F6F-1158-5D0B-145F4119AC69}"/>
+                    </a:ext>
+                  </a:extLst>
+                </p:cNvPr>
+                <p:cNvPicPr/>
+                <p:nvPr/>
+              </p:nvPicPr>
+              <p:blipFill>
+                <a:blip r:embed="rId8"/>
+                <a:stretch>
+                  <a:fillRect/>
+                </a:stretch>
+              </p:blipFill>
+              <p:spPr>
+                <a:xfrm>
+                  <a:off x="2976639" y="2848486"/>
+                  <a:ext cx="166680" cy="158760"/>
+                </a:xfrm>
+                <a:prstGeom prst="rect">
+                  <a:avLst/>
+                </a:prstGeom>
+              </p:spPr>
+            </p:pic>
+          </mc:Fallback>
+        </mc:AlternateContent>
+        <mc:AlternateContent xmlns:mc="http://schemas.openxmlformats.org/markup-compatibility/2006" xmlns:p14="http://schemas.microsoft.com/office/powerpoint/2010/main">
+          <mc:Choice Requires="p14">
+            <p:contentPart p14:bwMode="auto" r:id="rId9">
+              <p14:nvContentPartPr>
+                <p14:cNvPr id="22" name="Ink 21">
+                  <a:extLst>
+                    <a:ext uri="{FF2B5EF4-FFF2-40B4-BE49-F238E27FC236}">
+                      <a16:creationId xmlns:a16="http://schemas.microsoft.com/office/drawing/2014/main" id="{766648FE-AFBB-2E70-8ED4-3195243117CC}"/>
+                    </a:ext>
+                  </a:extLst>
+                </p14:cNvPr>
+                <p14:cNvContentPartPr/>
+                <p14:nvPr/>
+              </p14:nvContentPartPr>
+              <p14:xfrm>
+                <a:off x="2769279" y="3081766"/>
+                <a:ext cx="349200" cy="45360"/>
+              </p14:xfrm>
+            </p:contentPart>
+          </mc:Choice>
+          <mc:Fallback xmlns="">
+            <p:pic>
+              <p:nvPicPr>
+                <p:cNvPr id="22" name="Ink 21">
+                  <a:extLst>
+                    <a:ext uri="{FF2B5EF4-FFF2-40B4-BE49-F238E27FC236}">
+                      <a16:creationId xmlns:a16="http://schemas.microsoft.com/office/drawing/2014/main" id="{766648FE-AFBB-2E70-8ED4-3195243117CC}"/>
+                    </a:ext>
+                  </a:extLst>
+                </p:cNvPr>
+                <p:cNvPicPr/>
+                <p:nvPr/>
+              </p:nvPicPr>
+              <p:blipFill>
+                <a:blip r:embed="rId10"/>
+                <a:stretch>
+                  <a:fillRect/>
+                </a:stretch>
+              </p:blipFill>
+              <p:spPr>
+                <a:xfrm>
+                  <a:off x="2760639" y="3073126"/>
+                  <a:ext cx="366840" cy="63000"/>
+                </a:xfrm>
+                <a:prstGeom prst="rect">
+                  <a:avLst/>
+                </a:prstGeom>
+              </p:spPr>
+            </p:pic>
+          </mc:Fallback>
+        </mc:AlternateContent>
+        <mc:AlternateContent xmlns:mc="http://schemas.openxmlformats.org/markup-compatibility/2006" xmlns:p14="http://schemas.microsoft.com/office/powerpoint/2010/main">
+          <mc:Choice Requires="p14">
+            <p:contentPart p14:bwMode="auto" r:id="rId11">
+              <p14:nvContentPartPr>
+                <p14:cNvPr id="24" name="Ink 23">
+                  <a:extLst>
+                    <a:ext uri="{FF2B5EF4-FFF2-40B4-BE49-F238E27FC236}">
+                      <a16:creationId xmlns:a16="http://schemas.microsoft.com/office/drawing/2014/main" id="{37090F1C-D55F-8CC3-89BB-7EB84048F0D5}"/>
+                    </a:ext>
+                  </a:extLst>
+                </p14:cNvPr>
+                <p14:cNvContentPartPr/>
+                <p14:nvPr/>
+              </p14:nvContentPartPr>
+              <p14:xfrm>
+                <a:off x="3015519" y="3041806"/>
+                <a:ext cx="150840" cy="119160"/>
+              </p14:xfrm>
+            </p:contentPart>
+          </mc:Choice>
+          <mc:Fallback xmlns="">
+            <p:pic>
+              <p:nvPicPr>
+                <p:cNvPr id="24" name="Ink 23">
+                  <a:extLst>
+                    <a:ext uri="{FF2B5EF4-FFF2-40B4-BE49-F238E27FC236}">
+                      <a16:creationId xmlns:a16="http://schemas.microsoft.com/office/drawing/2014/main" id="{37090F1C-D55F-8CC3-89BB-7EB84048F0D5}"/>
+                    </a:ext>
+                  </a:extLst>
+                </p:cNvPr>
+                <p:cNvPicPr/>
+                <p:nvPr/>
+              </p:nvPicPr>
+              <p:blipFill>
+                <a:blip r:embed="rId12"/>
+                <a:stretch>
+                  <a:fillRect/>
+                </a:stretch>
+              </p:blipFill>
+              <p:spPr>
+                <a:xfrm>
+                  <a:off x="3006879" y="3033166"/>
+                  <a:ext cx="168480" cy="136800"/>
+                </a:xfrm>
+                <a:prstGeom prst="rect">
+                  <a:avLst/>
+                </a:prstGeom>
+              </p:spPr>
+            </p:pic>
+          </mc:Fallback>
+        </mc:AlternateContent>
+      </p:grpSp>
+      <p:grpSp>
+        <p:nvGrpSpPr>
+          <p:cNvPr id="28" name="Group 27">
+            <a:extLst>
+              <a:ext uri="{FF2B5EF4-FFF2-40B4-BE49-F238E27FC236}">
+                <a16:creationId xmlns:a16="http://schemas.microsoft.com/office/drawing/2014/main" id="{FFCD7125-712B-D955-04CB-A6D6EA861E7E}"/>
+              </a:ext>
+            </a:extLst>
+          </p:cNvPr>
+          <p:cNvGrpSpPr/>
+          <p:nvPr/>
+        </p:nvGrpSpPr>
+        <p:grpSpPr>
+          <a:xfrm>
+            <a:off x="2769279" y="3244126"/>
+            <a:ext cx="389520" cy="255240"/>
+            <a:chOff x="2769279" y="3244126"/>
+            <a:chExt cx="389520" cy="255240"/>
+          </a:xfrm>
+        </p:grpSpPr>
+        <mc:AlternateContent xmlns:mc="http://schemas.openxmlformats.org/markup-compatibility/2006" xmlns:p14="http://schemas.microsoft.com/office/powerpoint/2010/main">
+          <mc:Choice Requires="p14">
+            <p:contentPart p14:bwMode="auto" r:id="rId13">
+              <p14:nvContentPartPr>
+                <p14:cNvPr id="26" name="Ink 25">
+                  <a:extLst>
+                    <a:ext uri="{FF2B5EF4-FFF2-40B4-BE49-F238E27FC236}">
+                      <a16:creationId xmlns:a16="http://schemas.microsoft.com/office/drawing/2014/main" id="{BAD88289-ECFD-B45F-2CF4-BB5A981B9584}"/>
+                    </a:ext>
+                  </a:extLst>
+                </p14:cNvPr>
+                <p14:cNvContentPartPr/>
+                <p14:nvPr/>
+              </p14:nvContentPartPr>
+              <p14:xfrm>
+                <a:off x="2769279" y="3244126"/>
+                <a:ext cx="338400" cy="176040"/>
+              </p14:xfrm>
+            </p:contentPart>
+          </mc:Choice>
+          <mc:Fallback xmlns="">
+            <p:pic>
+              <p:nvPicPr>
+                <p:cNvPr id="26" name="Ink 25">
+                  <a:extLst>
+                    <a:ext uri="{FF2B5EF4-FFF2-40B4-BE49-F238E27FC236}">
+                      <a16:creationId xmlns:a16="http://schemas.microsoft.com/office/drawing/2014/main" id="{BAD88289-ECFD-B45F-2CF4-BB5A981B9584}"/>
+                    </a:ext>
+                  </a:extLst>
+                </p:cNvPr>
+                <p:cNvPicPr/>
+                <p:nvPr/>
+              </p:nvPicPr>
+              <p:blipFill>
+                <a:blip r:embed="rId14"/>
+                <a:stretch>
+                  <a:fillRect/>
+                </a:stretch>
+              </p:blipFill>
+              <p:spPr>
+                <a:xfrm>
+                  <a:off x="2760639" y="3235126"/>
+                  <a:ext cx="356040" cy="193680"/>
+                </a:xfrm>
+                <a:prstGeom prst="rect">
+                  <a:avLst/>
+                </a:prstGeom>
+              </p:spPr>
+            </p:pic>
+          </mc:Fallback>
+        </mc:AlternateContent>
+        <mc:AlternateContent xmlns:mc="http://schemas.openxmlformats.org/markup-compatibility/2006" xmlns:p14="http://schemas.microsoft.com/office/powerpoint/2010/main">
+          <mc:Choice Requires="p14">
+            <p:contentPart p14:bwMode="auto" r:id="rId15">
+              <p14:nvContentPartPr>
+                <p14:cNvPr id="27" name="Ink 26">
+                  <a:extLst>
+                    <a:ext uri="{FF2B5EF4-FFF2-40B4-BE49-F238E27FC236}">
+                      <a16:creationId xmlns:a16="http://schemas.microsoft.com/office/drawing/2014/main" id="{30CC6CB1-5945-9D71-1B4F-5864922A7BD9}"/>
+                    </a:ext>
+                  </a:extLst>
+                </p14:cNvPr>
+                <p14:cNvContentPartPr/>
+                <p14:nvPr/>
+              </p14:nvContentPartPr>
+              <p14:xfrm>
+                <a:off x="2954679" y="3353926"/>
+                <a:ext cx="204120" cy="145440"/>
+              </p14:xfrm>
+            </p:contentPart>
+          </mc:Choice>
+          <mc:Fallback xmlns="">
+            <p:pic>
+              <p:nvPicPr>
+                <p:cNvPr id="27" name="Ink 26">
+                  <a:extLst>
+                    <a:ext uri="{FF2B5EF4-FFF2-40B4-BE49-F238E27FC236}">
+                      <a16:creationId xmlns:a16="http://schemas.microsoft.com/office/drawing/2014/main" id="{30CC6CB1-5945-9D71-1B4F-5864922A7BD9}"/>
+                    </a:ext>
+                  </a:extLst>
+                </p:cNvPr>
+                <p:cNvPicPr/>
+                <p:nvPr/>
+              </p:nvPicPr>
+              <p:blipFill>
+                <a:blip r:embed="rId16"/>
+                <a:stretch>
+                  <a:fillRect/>
+                </a:stretch>
+              </p:blipFill>
+              <p:spPr>
+                <a:xfrm>
+                  <a:off x="2945679" y="3345286"/>
+                  <a:ext cx="221760" cy="163080"/>
+                </a:xfrm>
+                <a:prstGeom prst="rect">
+                  <a:avLst/>
+                </a:prstGeom>
+              </p:spPr>
+            </p:pic>
+          </mc:Fallback>
+        </mc:AlternateContent>
+      </p:grpSp>
+      <p:sp>
+        <p:nvSpPr>
+          <p:cNvPr id="29" name="TextBox 28">
+            <a:extLst>
+              <a:ext uri="{FF2B5EF4-FFF2-40B4-BE49-F238E27FC236}">
+                <a16:creationId xmlns:a16="http://schemas.microsoft.com/office/drawing/2014/main" id="{F80D0CA2-9126-FD7A-E450-E50AFF13D531}"/>
+              </a:ext>
+            </a:extLst>
+          </p:cNvPr>
+          <p:cNvSpPr txBox="1"/>
+          <p:nvPr/>
+        </p:nvSpPr>
+        <p:spPr>
+          <a:xfrm>
+            <a:off x="3201639" y="2714040"/>
+            <a:ext cx="527538" cy="923330"/>
+          </a:xfrm>
+          <a:prstGeom prst="rect">
+            <a:avLst/>
+          </a:prstGeom>
+          <a:noFill/>
+        </p:spPr>
+        <p:txBody>
+          <a:bodyPr wrap="square" rtlCol="0">
+            <a:spAutoFit/>
+          </a:bodyPr>
+          <a:lstStyle/>
+          <a:p>
+            <a:r>
+              <a:rPr lang="en-US" dirty="0"/>
+              <a:t>a </a:t>
+            </a:r>
+          </a:p>
+          <a:p>
+            <a:r>
+              <a:rPr lang="en-US" dirty="0"/>
+              <a:t>b</a:t>
+            </a:r>
+          </a:p>
+          <a:p>
+            <a:r>
+              <a:rPr lang="en-US" dirty="0"/>
+              <a:t>c</a:t>
+            </a:r>
+          </a:p>
+        </p:txBody>
+      </p:sp>
+    </p:spTree>
+    <p:extLst>
+      <p:ext uri="{BB962C8B-B14F-4D97-AF65-F5344CB8AC3E}">
+        <p14:creationId xmlns:p14="http://schemas.microsoft.com/office/powerpoint/2010/main" val="1775769137"/>
+      </p:ext>
+    </p:extLst>
+  </p:cSld>
+  <p:clrMapOvr>
+    <a:masterClrMapping/>
+  </p:clrMapOvr>
+</p:sld>
+</file>
+
+<file path=ppt/slides/slide22.xml><?xml version="1.0" encoding="utf-8"?>
+<p:sld xmlns:a="http://schemas.openxmlformats.org/drawingml/2006/main" xmlns:r="http://schemas.openxmlformats.org/officeDocument/2006/relationships" xmlns:p="http://schemas.openxmlformats.org/presentationml/2006/main">
+  <p:cSld>
+    <p:spTree>
+      <p:nvGrpSpPr>
+        <p:cNvPr id="1" name=""/>
+        <p:cNvGrpSpPr/>
+        <p:nvPr/>
+      </p:nvGrpSpPr>
+      <p:grpSpPr>
+        <a:xfrm>
+          <a:off x="0" y="0"/>
+          <a:ext cx="0" cy="0"/>
+          <a:chOff x="0" y="0"/>
+          <a:chExt cx="0" cy="0"/>
+        </a:xfrm>
+      </p:grpSpPr>
+      <p:sp>
+        <p:nvSpPr>
+          <p:cNvPr id="2" name="Title 1">
+            <a:extLst>
+              <a:ext uri="{FF2B5EF4-FFF2-40B4-BE49-F238E27FC236}">
+                <a16:creationId xmlns:a16="http://schemas.microsoft.com/office/drawing/2014/main" id="{01902945-0AC2-97D6-21F3-4A5D08BD2AC7}"/>
+              </a:ext>
+            </a:extLst>
+          </p:cNvPr>
+          <p:cNvSpPr>
+            <a:spLocks noGrp="1"/>
+          </p:cNvSpPr>
+          <p:nvPr>
+            <p:ph type="title"/>
+          </p:nvPr>
+        </p:nvSpPr>
+        <p:spPr/>
+        <p:txBody>
+          <a:bodyPr/>
+          <a:lstStyle/>
+          <a:p>
+            <a:r>
+              <a:rPr lang="en-US" dirty="0"/>
+              <a:t>Evaluating functions</a:t>
+            </a:r>
+          </a:p>
+        </p:txBody>
+      </p:sp>
+      <p:sp>
+        <p:nvSpPr>
+          <p:cNvPr id="3" name="Content Placeholder 2">
+            <a:extLst>
+              <a:ext uri="{FF2B5EF4-FFF2-40B4-BE49-F238E27FC236}">
+                <a16:creationId xmlns:a16="http://schemas.microsoft.com/office/drawing/2014/main" id="{562889C3-04D9-9556-4A46-3112030614FB}"/>
+              </a:ext>
+            </a:extLst>
+          </p:cNvPr>
+          <p:cNvSpPr>
+            <a:spLocks noGrp="1"/>
+          </p:cNvSpPr>
+          <p:nvPr>
+            <p:ph idx="1"/>
+          </p:nvPr>
+        </p:nvSpPr>
+        <p:spPr/>
+        <p:txBody>
+          <a:bodyPr/>
+          <a:lstStyle/>
+          <a:p>
+            <a:r>
+              <a:rPr lang="en-US" dirty="0"/>
+              <a:t>Solving </a:t>
+            </a:r>
+          </a:p>
+          <a:p>
+            <a:pPr lvl="1"/>
+            <a:r>
+              <a:rPr lang="en-US" dirty="0"/>
+              <a:t>Substitute variables with numerals</a:t>
+            </a:r>
+          </a:p>
+          <a:p>
+            <a:pPr lvl="1"/>
+            <a:r>
+              <a:rPr lang="en-US" dirty="0"/>
+              <a:t>Evaluate</a:t>
+            </a:r>
+          </a:p>
+          <a:p>
+            <a:pPr lvl="2"/>
+            <a:r>
+              <a:rPr lang="en-US" dirty="0"/>
+              <a:t>Follow PEMDAS/BODMAS</a:t>
+            </a:r>
+          </a:p>
+          <a:p>
+            <a:r>
+              <a:rPr lang="en-US" dirty="0"/>
+              <a:t>Solve for x = 0,1,2,3</a:t>
+            </a:r>
+          </a:p>
+          <a:p>
+            <a:pPr lvl="1"/>
+            <a:r>
+              <a:rPr lang="en-US" dirty="0"/>
+              <a:t>f(x) = 3x + 1</a:t>
+            </a:r>
+          </a:p>
+          <a:p>
+            <a:pPr lvl="1"/>
+            <a:r>
+              <a:rPr lang="en-US" dirty="0"/>
+              <a:t>g(x) = 2x</a:t>
+            </a:r>
+            <a:r>
+              <a:rPr lang="en-US" baseline="30000" dirty="0"/>
+              <a:t>2 </a:t>
+            </a:r>
+            <a:r>
+              <a:rPr lang="en-US" dirty="0"/>
+              <a:t>+ 3</a:t>
+            </a:r>
+          </a:p>
+          <a:p>
+            <a:pPr lvl="1"/>
+            <a:r>
+              <a:rPr lang="en-US" dirty="0"/>
+              <a:t>h(x) = x</a:t>
+            </a:r>
+            <a:r>
+              <a:rPr lang="en-US" baseline="30000" dirty="0"/>
+              <a:t>2</a:t>
+            </a:r>
+            <a:r>
+              <a:rPr lang="en-US" dirty="0"/>
+              <a:t> + 2x +1</a:t>
+            </a:r>
+          </a:p>
+        </p:txBody>
+      </p:sp>
+    </p:spTree>
+    <p:extLst>
+      <p:ext uri="{BB962C8B-B14F-4D97-AF65-F5344CB8AC3E}">
+        <p14:creationId xmlns:p14="http://schemas.microsoft.com/office/powerpoint/2010/main" val="2419863978"/>
+      </p:ext>
+    </p:extLst>
+  </p:cSld>
+  <p:clrMapOvr>
+    <a:masterClrMapping/>
+  </p:clrMapOvr>
+</p:sld>
+</file>
+
+<file path=ppt/slides/slide23.xml><?xml version="1.0" encoding="utf-8"?>
+<p:sld xmlns:a="http://schemas.openxmlformats.org/drawingml/2006/main" xmlns:r="http://schemas.openxmlformats.org/officeDocument/2006/relationships" xmlns:p="http://schemas.openxmlformats.org/presentationml/2006/main">
+  <p:cSld>
+    <p:spTree>
+      <p:nvGrpSpPr>
+        <p:cNvPr id="1" name=""/>
+        <p:cNvGrpSpPr/>
+        <p:nvPr/>
+      </p:nvGrpSpPr>
+      <p:grpSpPr>
+        <a:xfrm>
+          <a:off x="0" y="0"/>
+          <a:ext cx="0" cy="0"/>
+          <a:chOff x="0" y="0"/>
+          <a:chExt cx="0" cy="0"/>
+        </a:xfrm>
+      </p:grpSpPr>
+      <p:sp>
+        <p:nvSpPr>
+          <p:cNvPr id="2" name="Title 1">
+            <a:extLst>
+              <a:ext uri="{FF2B5EF4-FFF2-40B4-BE49-F238E27FC236}">
+                <a16:creationId xmlns:a16="http://schemas.microsoft.com/office/drawing/2014/main" id="{07CBAF36-C99B-4C0F-D9A1-F97EBF1C3330}"/>
+              </a:ext>
+            </a:extLst>
+          </p:cNvPr>
+          <p:cNvSpPr>
+            <a:spLocks noGrp="1"/>
+          </p:cNvSpPr>
+          <p:nvPr>
+            <p:ph type="title"/>
+          </p:nvPr>
+        </p:nvSpPr>
+        <p:spPr/>
+        <p:txBody>
+          <a:bodyPr/>
+          <a:lstStyle/>
+          <a:p>
+            <a:r>
+              <a:rPr lang="en-US" dirty="0"/>
+              <a:t>Recursive Functions</a:t>
+            </a:r>
+          </a:p>
+        </p:txBody>
+      </p:sp>
+      <p:sp>
+        <p:nvSpPr>
+          <p:cNvPr id="3" name="Content Placeholder 2">
+            <a:extLst>
+              <a:ext uri="{FF2B5EF4-FFF2-40B4-BE49-F238E27FC236}">
+                <a16:creationId xmlns:a16="http://schemas.microsoft.com/office/drawing/2014/main" id="{EDD1E908-BFA9-6149-6F25-D118365B8B6A}"/>
+              </a:ext>
+            </a:extLst>
+          </p:cNvPr>
+          <p:cNvSpPr>
+            <a:spLocks noGrp="1"/>
+          </p:cNvSpPr>
+          <p:nvPr>
+            <p:ph idx="1"/>
+          </p:nvPr>
+        </p:nvSpPr>
+        <p:spPr/>
+        <p:txBody>
+          <a:bodyPr>
+            <a:normAutofit fontScale="77500" lnSpcReduction="20000"/>
+          </a:bodyPr>
+          <a:lstStyle/>
+          <a:p>
+            <a:r>
+              <a:rPr lang="en-US" dirty="0"/>
+              <a:t>Functions calling themselves</a:t>
+            </a:r>
+          </a:p>
+          <a:p>
+            <a:pPr marL="0" indent="0">
+              <a:buNone/>
+            </a:pPr>
+            <a:endParaRPr lang="en-US" dirty="0"/>
+          </a:p>
+          <a:p>
+            <a:pPr lvl="1"/>
+            <a:endParaRPr lang="en-US" dirty="0"/>
+          </a:p>
+          <a:p>
+            <a:endParaRPr lang="en-US" dirty="0"/>
+          </a:p>
+          <a:p>
+            <a:endParaRPr lang="en-US" dirty="0">
+              <a:hlinkClick r:id="rId2"/>
+            </a:endParaRPr>
+          </a:p>
+          <a:p>
+            <a:endParaRPr lang="en-US" dirty="0">
+              <a:hlinkClick r:id="rId2"/>
+            </a:endParaRPr>
+          </a:p>
+          <a:p>
+            <a:endParaRPr lang="en-US" dirty="0">
+              <a:hlinkClick r:id="rId2"/>
+            </a:endParaRPr>
+          </a:p>
+          <a:p>
+            <a:endParaRPr lang="en-US" dirty="0">
+              <a:hlinkClick r:id="rId2"/>
+            </a:endParaRPr>
+          </a:p>
+          <a:p>
+            <a:endParaRPr lang="en-US" dirty="0">
+              <a:hlinkClick r:id="rId2"/>
+            </a:endParaRPr>
+          </a:p>
+          <a:p>
+            <a:endParaRPr lang="en-US" dirty="0"/>
+          </a:p>
+          <a:p>
+            <a:r>
+              <a:rPr lang="en-US" dirty="0"/>
+              <a:t>Evaluate for ‘n’ = 2 , 4, 5, 6</a:t>
+            </a:r>
+          </a:p>
+          <a:p>
+            <a:r>
+              <a:rPr lang="en-US" dirty="0"/>
+              <a:t>Follow up reading : </a:t>
+            </a:r>
+            <a:r>
+              <a:rPr lang="en-US" dirty="0">
+                <a:hlinkClick r:id="rId2"/>
+              </a:rPr>
+              <a:t>nested functions visualized</a:t>
+            </a:r>
+            <a:endParaRPr lang="en-US" dirty="0"/>
+          </a:p>
+        </p:txBody>
+      </p:sp>
+      <p:pic>
+        <p:nvPicPr>
+          <p:cNvPr id="5" name="Picture 4">
+            <a:extLst>
+              <a:ext uri="{FF2B5EF4-FFF2-40B4-BE49-F238E27FC236}">
+                <a16:creationId xmlns:a16="http://schemas.microsoft.com/office/drawing/2014/main" id="{133B07FF-705F-B2EE-4909-718D1ECDC4F2}"/>
+              </a:ext>
+            </a:extLst>
+          </p:cNvPr>
+          <p:cNvPicPr>
+            <a:picLocks noChangeAspect="1"/>
+          </p:cNvPicPr>
+          <p:nvPr/>
+        </p:nvPicPr>
+        <p:blipFill>
+          <a:blip r:embed="rId3"/>
+          <a:stretch>
+            <a:fillRect/>
+          </a:stretch>
+        </p:blipFill>
+        <p:spPr>
+          <a:xfrm>
+            <a:off x="5725136" y="2233628"/>
+            <a:ext cx="3333921" cy="1124008"/>
+          </a:xfrm>
+          <a:prstGeom prst="rect">
+            <a:avLst/>
+          </a:prstGeom>
+        </p:spPr>
+      </p:pic>
+      <p:graphicFrame>
+        <p:nvGraphicFramePr>
+          <p:cNvPr id="6" name="Table 5">
+            <a:extLst>
+              <a:ext uri="{FF2B5EF4-FFF2-40B4-BE49-F238E27FC236}">
+                <a16:creationId xmlns:a16="http://schemas.microsoft.com/office/drawing/2014/main" id="{9ED924A9-7C44-EBC3-DDF7-0205456CDCDE}"/>
+              </a:ext>
+            </a:extLst>
+          </p:cNvPr>
+          <p:cNvGraphicFramePr>
+            <a:graphicFrameLocks noGrp="1"/>
+          </p:cNvGraphicFramePr>
+          <p:nvPr>
+            <p:extLst>
+              <p:ext uri="{D42A27DB-BD31-4B8C-83A1-F6EECF244321}">
+                <p14:modId xmlns:p14="http://schemas.microsoft.com/office/powerpoint/2010/main" val="3567114464"/>
+              </p:ext>
+            </p:extLst>
+          </p:nvPr>
+        </p:nvGraphicFramePr>
+        <p:xfrm>
+          <a:off x="1071459" y="2316479"/>
+          <a:ext cx="8861106" cy="2821776"/>
+        </p:xfrm>
+        <a:graphic>
+          <a:graphicData uri="http://schemas.openxmlformats.org/drawingml/2006/table">
+            <a:tbl>
+              <a:tblPr firstRow="1" bandRow="1">
+                <a:tableStyleId>{5940675A-B579-460E-94D1-54222C63F5DA}</a:tableStyleId>
+              </a:tblPr>
+              <a:tblGrid>
+                <a:gridCol w="4430553">
+                  <a:extLst>
+                    <a:ext uri="{9D8B030D-6E8A-4147-A177-3AD203B41FA5}">
+                      <a16:colId xmlns:a16="http://schemas.microsoft.com/office/drawing/2014/main" val="2496394709"/>
+                    </a:ext>
+                  </a:extLst>
+                </a:gridCol>
+                <a:gridCol w="4430553">
+                  <a:extLst>
+                    <a:ext uri="{9D8B030D-6E8A-4147-A177-3AD203B41FA5}">
+                      <a16:colId xmlns:a16="http://schemas.microsoft.com/office/drawing/2014/main" val="1375899388"/>
+                    </a:ext>
+                  </a:extLst>
+                </a:gridCol>
+              </a:tblGrid>
+              <a:tr h="940592">
+                <a:tc>
+                  <a:txBody>
+                    <a:bodyPr/>
+                    <a:lstStyle/>
+                    <a:p>
+                      <a:r>
+                        <a:rPr lang="en-US" b="1" dirty="0"/>
+                        <a:t>Fibonacci </a:t>
+                      </a:r>
+                      <a:r>
+                        <a:rPr lang="en-US" b="0" dirty="0"/>
+                        <a:t>numbers</a:t>
+                      </a:r>
+                    </a:p>
+                  </a:txBody>
+                  <a:tcPr/>
+                </a:tc>
+                <a:tc>
+                  <a:txBody>
+                    <a:bodyPr/>
+                    <a:lstStyle/>
+                    <a:p>
+                      <a:endParaRPr lang="en-US" dirty="0"/>
+                    </a:p>
+                  </a:txBody>
+                  <a:tcPr/>
+                </a:tc>
+                <a:extLst>
+                  <a:ext uri="{0D108BD9-81ED-4DB2-BD59-A6C34878D82A}">
+                    <a16:rowId xmlns:a16="http://schemas.microsoft.com/office/drawing/2014/main" val="1018360927"/>
+                  </a:ext>
+                </a:extLst>
+              </a:tr>
+              <a:tr h="940592">
+                <a:tc>
+                  <a:txBody>
+                    <a:bodyPr/>
+                    <a:lstStyle/>
+                    <a:p>
+                      <a:r>
+                        <a:rPr lang="en-US" b="1" dirty="0"/>
+                        <a:t>Factorial </a:t>
+                      </a:r>
+                    </a:p>
+                  </a:txBody>
+                  <a:tcPr/>
+                </a:tc>
+                <a:tc>
+                  <a:txBody>
+                    <a:bodyPr/>
+                    <a:lstStyle/>
+                    <a:p>
+                      <a:r>
+                        <a:rPr lang="en-US" b="1" dirty="0"/>
+                        <a:t>    fact(n) = n * fact(n-1)</a:t>
+                      </a:r>
+                    </a:p>
+                    <a:p>
+                      <a:r>
+                        <a:rPr lang="en-US" dirty="0"/>
+                        <a:t>    {given, </a:t>
+                      </a:r>
+                      <a:r>
+                        <a:rPr lang="en-US" i="1" dirty="0"/>
+                        <a:t> fact(1) = fact(0) =1}</a:t>
+                      </a:r>
+                    </a:p>
+                  </a:txBody>
+                  <a:tcPr/>
+                </a:tc>
+                <a:extLst>
+                  <a:ext uri="{0D108BD9-81ED-4DB2-BD59-A6C34878D82A}">
+                    <a16:rowId xmlns:a16="http://schemas.microsoft.com/office/drawing/2014/main" val="1259044372"/>
+                  </a:ext>
+                </a:extLst>
+              </a:tr>
+              <a:tr h="940592">
+                <a:tc>
+                  <a:txBody>
+                    <a:bodyPr/>
+                    <a:lstStyle/>
+                    <a:p>
+                      <a:r>
+                        <a:rPr lang="en-US" b="1" dirty="0"/>
+                        <a:t>Lucas </a:t>
+                      </a:r>
+                      <a:r>
+                        <a:rPr lang="en-US" b="0" dirty="0"/>
+                        <a:t>numbers</a:t>
+                      </a:r>
+                      <a:br>
+                        <a:rPr lang="en-US" b="0" dirty="0"/>
+                      </a:br>
+                      <a:r>
+                        <a:rPr lang="en-US" dirty="0"/>
+                        <a:t>(</a:t>
+                      </a:r>
+                      <a:r>
+                        <a:rPr lang="en-US" i="1" dirty="0"/>
+                        <a:t>same rule as Fibonacci but with different starting values</a:t>
+                      </a:r>
+                      <a:r>
+                        <a:rPr lang="en-US" dirty="0"/>
+                        <a:t>)</a:t>
+                      </a:r>
+                    </a:p>
+                  </a:txBody>
+                  <a:tcPr/>
+                </a:tc>
+                <a:tc>
+                  <a:txBody>
+                    <a:bodyPr/>
+                    <a:lstStyle/>
+                    <a:p>
+                      <a:r>
+                        <a:rPr lang="en-US" b="1" dirty="0"/>
+                        <a:t>    l (n) = l(n-1) + l(n-2)</a:t>
+                      </a:r>
+                    </a:p>
+                    <a:p>
+                      <a:r>
+                        <a:rPr lang="en-US" dirty="0"/>
+                        <a:t>    {given , </a:t>
+                      </a:r>
+                      <a:r>
+                        <a:rPr lang="en-US" i="1" dirty="0"/>
+                        <a:t>l(0) = 2, l(1) = 1}</a:t>
+                      </a:r>
+                      <a:endParaRPr lang="en-US" dirty="0"/>
+                    </a:p>
+                    <a:p>
+                      <a:endParaRPr lang="en-US" dirty="0"/>
+                    </a:p>
+                  </a:txBody>
+                  <a:tcPr/>
+                </a:tc>
+                <a:extLst>
+                  <a:ext uri="{0D108BD9-81ED-4DB2-BD59-A6C34878D82A}">
+                    <a16:rowId xmlns:a16="http://schemas.microsoft.com/office/drawing/2014/main" val="3746291438"/>
+                  </a:ext>
+                </a:extLst>
+              </a:tr>
+            </a:tbl>
+          </a:graphicData>
+        </a:graphic>
+      </p:graphicFrame>
+    </p:spTree>
+    <p:extLst>
+      <p:ext uri="{BB962C8B-B14F-4D97-AF65-F5344CB8AC3E}">
+        <p14:creationId xmlns:p14="http://schemas.microsoft.com/office/powerpoint/2010/main" val="2212921216"/>
+      </p:ext>
+    </p:extLst>
+  </p:cSld>
+  <p:clrMapOvr>
+    <a:masterClrMapping/>
+  </p:clrMapOvr>
+</p:sld>
+</file>
+
+<file path=ppt/slides/slide24.xml><?xml version="1.0" encoding="utf-8"?>
+<p:sld xmlns:a="http://schemas.openxmlformats.org/drawingml/2006/main" xmlns:r="http://schemas.openxmlformats.org/officeDocument/2006/relationships" xmlns:p="http://schemas.openxmlformats.org/presentationml/2006/main">
+  <p:cSld>
+    <p:spTree>
+      <p:nvGrpSpPr>
+        <p:cNvPr id="1" name=""/>
+        <p:cNvGrpSpPr/>
+        <p:nvPr/>
+      </p:nvGrpSpPr>
+      <p:grpSpPr>
+        <a:xfrm>
+          <a:off x="0" y="0"/>
+          <a:ext cx="0" cy="0"/>
+          <a:chOff x="0" y="0"/>
+          <a:chExt cx="0" cy="0"/>
+        </a:xfrm>
+      </p:grpSpPr>
+      <p:sp>
+        <p:nvSpPr>
+          <p:cNvPr id="2" name="Title 1">
+            <a:extLst>
+              <a:ext uri="{FF2B5EF4-FFF2-40B4-BE49-F238E27FC236}">
+                <a16:creationId xmlns:a16="http://schemas.microsoft.com/office/drawing/2014/main" id="{12DEB84F-B0DC-79D2-7C5F-8C3A6D23B6AA}"/>
+              </a:ext>
+            </a:extLst>
+          </p:cNvPr>
+          <p:cNvSpPr>
+            <a:spLocks noGrp="1"/>
+          </p:cNvSpPr>
+          <p:nvPr>
+            <p:ph type="title"/>
+          </p:nvPr>
+        </p:nvSpPr>
+        <p:spPr/>
+        <p:txBody>
+          <a:bodyPr/>
+          <a:lstStyle/>
+          <a:p>
+            <a:r>
+              <a:rPr lang="en-US" dirty="0"/>
+              <a:t>Programming, , Test #1</a:t>
+            </a:r>
+          </a:p>
+        </p:txBody>
+      </p:sp>
+      <p:sp>
+        <p:nvSpPr>
+          <p:cNvPr id="3" name="Content Placeholder 2">
+            <a:extLst>
+              <a:ext uri="{FF2B5EF4-FFF2-40B4-BE49-F238E27FC236}">
+                <a16:creationId xmlns:a16="http://schemas.microsoft.com/office/drawing/2014/main" id="{F6BEA891-9323-41D9-4413-E83293264D33}"/>
+              </a:ext>
+            </a:extLst>
+          </p:cNvPr>
+          <p:cNvSpPr>
+            <a:spLocks noGrp="1"/>
+          </p:cNvSpPr>
+          <p:nvPr>
+            <p:ph idx="1"/>
+          </p:nvPr>
+        </p:nvSpPr>
+        <p:spPr/>
+        <p:txBody>
+          <a:bodyPr/>
+          <a:lstStyle/>
+          <a:p>
+            <a:r>
+              <a:rPr lang="en-US" dirty="0"/>
+              <a:t>Need to know </a:t>
+            </a:r>
+          </a:p>
+          <a:p>
+            <a:pPr lvl="1"/>
+            <a:r>
+              <a:rPr lang="en-US" dirty="0"/>
+              <a:t>Data types</a:t>
+            </a:r>
+          </a:p>
+          <a:p>
+            <a:pPr lvl="1"/>
+            <a:r>
+              <a:rPr lang="en-US" dirty="0"/>
+              <a:t>Conditionals</a:t>
+            </a:r>
+          </a:p>
+          <a:p>
+            <a:pPr lvl="2"/>
+            <a:r>
+              <a:rPr lang="en-US" dirty="0"/>
+              <a:t>If/else</a:t>
+            </a:r>
+          </a:p>
+          <a:p>
+            <a:pPr lvl="1"/>
+            <a:r>
+              <a:rPr lang="en-US" dirty="0"/>
+              <a:t>Loops</a:t>
+            </a:r>
+          </a:p>
+          <a:p>
+            <a:pPr lvl="2"/>
+            <a:r>
+              <a:rPr lang="en-US" dirty="0"/>
+              <a:t>for</a:t>
+            </a:r>
+          </a:p>
+          <a:p>
+            <a:pPr lvl="1"/>
+            <a:r>
+              <a:rPr lang="en-US" dirty="0"/>
+              <a:t>Arrays </a:t>
+            </a:r>
+          </a:p>
+          <a:p>
+            <a:pPr lvl="2"/>
+            <a:r>
+              <a:rPr lang="en-US" dirty="0"/>
+              <a:t>2 dimensional</a:t>
+            </a:r>
+          </a:p>
+          <a:p>
+            <a:r>
+              <a:rPr lang="en-US"/>
+              <a:t>Practice </a:t>
+            </a:r>
+            <a:endParaRPr lang="en-US" dirty="0"/>
+          </a:p>
+          <a:p>
+            <a:pPr lvl="1"/>
+            <a:r>
+              <a:rPr lang="en-US" dirty="0">
+                <a:hlinkClick r:id="rId2"/>
+              </a:rPr>
+              <a:t>Arrays- DS (</a:t>
+            </a:r>
+            <a:r>
+              <a:rPr lang="en-US" dirty="0" err="1">
+                <a:hlinkClick r:id="rId2"/>
+              </a:rPr>
+              <a:t>Hackerrank</a:t>
+            </a:r>
+            <a:r>
+              <a:rPr lang="en-US" dirty="0">
+                <a:hlinkClick r:id="rId2"/>
+              </a:rPr>
+              <a:t>)</a:t>
+            </a:r>
+            <a:r>
+              <a:rPr lang="en-US" dirty="0"/>
+              <a:t> : 6 problems</a:t>
+            </a:r>
+          </a:p>
+          <a:p>
+            <a:pPr lvl="2"/>
+            <a:endParaRPr lang="en-US" dirty="0"/>
+          </a:p>
+        </p:txBody>
+      </p:sp>
+    </p:spTree>
+    <p:extLst>
+      <p:ext uri="{BB962C8B-B14F-4D97-AF65-F5344CB8AC3E}">
+        <p14:creationId xmlns:p14="http://schemas.microsoft.com/office/powerpoint/2010/main" val="633546530"/>
       </p:ext>
     </p:extLst>
   </p:cSld>

</xml_diff>

<commit_message>
wk 07 content draft added
</commit_message>
<xml_diff>
--- a/all/ExploringCSConceptsViaACSLCompetitions_all.pptx
+++ b/all/ExploringCSConceptsViaACSLCompetitions_all.pptx
@@ -5,7 +5,7 @@
     <p:sldMasterId id="2147483648" r:id="rId1"/>
   </p:sldMasterIdLst>
   <p:notesMasterIdLst>
-    <p:notesMasterId r:id="rId52"/>
+    <p:notesMasterId r:id="rId57"/>
   </p:notesMasterIdLst>
   <p:sldIdLst>
     <p:sldId id="256" r:id="rId2"/>
@@ -58,6 +58,11 @@
     <p:sldId id="313" r:id="rId49"/>
     <p:sldId id="315" r:id="rId50"/>
     <p:sldId id="314" r:id="rId51"/>
+    <p:sldId id="316" r:id="rId52"/>
+    <p:sldId id="317" r:id="rId53"/>
+    <p:sldId id="318" r:id="rId54"/>
+    <p:sldId id="319" r:id="rId55"/>
+    <p:sldId id="320" r:id="rId56"/>
   </p:sldIdLst>
   <p:sldSz cx="12192000" cy="6858000"/>
   <p:notesSz cx="6858000" cy="9144000"/>
@@ -435,7 +440,7 @@
           <a:p>
             <a:fld id="{15653688-98A8-4F3B-A740-8E6568AE1BCB}" type="datetimeFigureOut">
               <a:rPr lang="en-US" smtClean="0"/>
-              <a:t>1/26/2026</a:t>
+              <a:t>1/29/2026</a:t>
             </a:fld>
             <a:endParaRPr lang="en-US"/>
           </a:p>
@@ -1041,7 +1046,7 @@
           <a:p>
             <a:fld id="{20CB266D-A331-4A79-AB46-FEF40B16CF9B}" type="datetimeFigureOut">
               <a:rPr lang="en-US" smtClean="0"/>
-              <a:t>1/26/2026</a:t>
+              <a:t>1/29/2026</a:t>
             </a:fld>
             <a:endParaRPr lang="en-US"/>
           </a:p>
@@ -1239,7 +1244,7 @@
           <a:p>
             <a:fld id="{20CB266D-A331-4A79-AB46-FEF40B16CF9B}" type="datetimeFigureOut">
               <a:rPr lang="en-US" smtClean="0"/>
-              <a:t>1/26/2026</a:t>
+              <a:t>1/29/2026</a:t>
             </a:fld>
             <a:endParaRPr lang="en-US"/>
           </a:p>
@@ -1447,7 +1452,7 @@
           <a:p>
             <a:fld id="{20CB266D-A331-4A79-AB46-FEF40B16CF9B}" type="datetimeFigureOut">
               <a:rPr lang="en-US" smtClean="0"/>
-              <a:t>1/26/2026</a:t>
+              <a:t>1/29/2026</a:t>
             </a:fld>
             <a:endParaRPr lang="en-US"/>
           </a:p>
@@ -1645,7 +1650,7 @@
           <a:p>
             <a:fld id="{20CB266D-A331-4A79-AB46-FEF40B16CF9B}" type="datetimeFigureOut">
               <a:rPr lang="en-US" smtClean="0"/>
-              <a:t>1/26/2026</a:t>
+              <a:t>1/29/2026</a:t>
             </a:fld>
             <a:endParaRPr lang="en-US"/>
           </a:p>
@@ -1920,7 +1925,7 @@
           <a:p>
             <a:fld id="{20CB266D-A331-4A79-AB46-FEF40B16CF9B}" type="datetimeFigureOut">
               <a:rPr lang="en-US" smtClean="0"/>
-              <a:t>1/26/2026</a:t>
+              <a:t>1/29/2026</a:t>
             </a:fld>
             <a:endParaRPr lang="en-US"/>
           </a:p>
@@ -2185,7 +2190,7 @@
           <a:p>
             <a:fld id="{20CB266D-A331-4A79-AB46-FEF40B16CF9B}" type="datetimeFigureOut">
               <a:rPr lang="en-US" smtClean="0"/>
-              <a:t>1/26/2026</a:t>
+              <a:t>1/29/2026</a:t>
             </a:fld>
             <a:endParaRPr lang="en-US"/>
           </a:p>
@@ -2597,7 +2602,7 @@
           <a:p>
             <a:fld id="{20CB266D-A331-4A79-AB46-FEF40B16CF9B}" type="datetimeFigureOut">
               <a:rPr lang="en-US" smtClean="0"/>
-              <a:t>1/26/2026</a:t>
+              <a:t>1/29/2026</a:t>
             </a:fld>
             <a:endParaRPr lang="en-US"/>
           </a:p>
@@ -2738,7 +2743,7 @@
           <a:p>
             <a:fld id="{20CB266D-A331-4A79-AB46-FEF40B16CF9B}" type="datetimeFigureOut">
               <a:rPr lang="en-US" smtClean="0"/>
-              <a:t>1/26/2026</a:t>
+              <a:t>1/29/2026</a:t>
             </a:fld>
             <a:endParaRPr lang="en-US"/>
           </a:p>
@@ -2851,7 +2856,7 @@
           <a:p>
             <a:fld id="{20CB266D-A331-4A79-AB46-FEF40B16CF9B}" type="datetimeFigureOut">
               <a:rPr lang="en-US" smtClean="0"/>
-              <a:t>1/26/2026</a:t>
+              <a:t>1/29/2026</a:t>
             </a:fld>
             <a:endParaRPr lang="en-US"/>
           </a:p>
@@ -3162,7 +3167,7 @@
           <a:p>
             <a:fld id="{20CB266D-A331-4A79-AB46-FEF40B16CF9B}" type="datetimeFigureOut">
               <a:rPr lang="en-US" smtClean="0"/>
-              <a:t>1/26/2026</a:t>
+              <a:t>1/29/2026</a:t>
             </a:fld>
             <a:endParaRPr lang="en-US"/>
           </a:p>
@@ -3450,7 +3455,7 @@
           <a:p>
             <a:fld id="{20CB266D-A331-4A79-AB46-FEF40B16CF9B}" type="datetimeFigureOut">
               <a:rPr lang="en-US" smtClean="0"/>
-              <a:t>1/26/2026</a:t>
+              <a:t>1/29/2026</a:t>
             </a:fld>
             <a:endParaRPr lang="en-US"/>
           </a:p>
@@ -3691,7 +3696,7 @@
           <a:p>
             <a:fld id="{20CB266D-A331-4A79-AB46-FEF40B16CF9B}" type="datetimeFigureOut">
               <a:rPr lang="en-US" smtClean="0"/>
-              <a:t>1/26/2026</a:t>
+              <a:t>1/29/2026</a:t>
             </a:fld>
             <a:endParaRPr lang="en-US"/>
           </a:p>
@@ -15913,13 +15918,13 @@
             <p:ph idx="1"/>
             <p:extLst>
               <p:ext uri="{D42A27DB-BD31-4B8C-83A1-F6EECF244321}">
-                <p14:modId xmlns:p14="http://schemas.microsoft.com/office/powerpoint/2010/main" val="2864924142"/>
+                <p14:modId xmlns:p14="http://schemas.microsoft.com/office/powerpoint/2010/main" val="927131913"/>
               </p:ext>
             </p:extLst>
           </p:nvPr>
         </p:nvGraphicFramePr>
         <p:xfrm>
-          <a:off x="950310" y="4009325"/>
+          <a:off x="950310" y="3429000"/>
           <a:ext cx="8784895" cy="1899360"/>
         </p:xfrm>
         <a:graphic>
@@ -16344,13 +16349,13 @@
           <p:nvPr>
             <p:extLst>
               <p:ext uri="{D42A27DB-BD31-4B8C-83A1-F6EECF244321}">
-                <p14:modId xmlns:p14="http://schemas.microsoft.com/office/powerpoint/2010/main" val="4289582990"/>
+                <p14:modId xmlns:p14="http://schemas.microsoft.com/office/powerpoint/2010/main" val="1449788260"/>
               </p:ext>
             </p:extLst>
           </p:nvPr>
         </p:nvGraphicFramePr>
         <p:xfrm>
-          <a:off x="950310" y="2595762"/>
+          <a:off x="950310" y="1839017"/>
           <a:ext cx="3619938" cy="1112520"/>
         </p:xfrm>
         <a:graphic>
@@ -17031,7 +17036,7 @@
             <a:pPr lvl="1"/>
             <a:r>
               <a:rPr lang="en-US" dirty="0"/>
-              <a:t>Enough of linear shifts would result in all 0s</a:t>
+              <a:t>Shifting by word size (or more) would result in all 0s</a:t>
             </a:r>
           </a:p>
           <a:p>
@@ -17044,7 +17049,7 @@
             <a:pPr lvl="1"/>
             <a:r>
               <a:rPr lang="en-US" dirty="0"/>
-              <a:t>Shifting by the number of word size , same bit sequence would be obtained</a:t>
+              <a:t>Shifting by the number of word size , same bit sequence would be produced</a:t>
             </a:r>
           </a:p>
         </p:txBody>
@@ -20596,6 +20601,1811 @@
     <p:extLst>
       <p:ext uri="{BB962C8B-B14F-4D97-AF65-F5344CB8AC3E}">
         <p14:creationId xmlns:p14="http://schemas.microsoft.com/office/powerpoint/2010/main" val="2972385401"/>
+      </p:ext>
+    </p:extLst>
+  </p:cSld>
+  <p:clrMapOvr>
+    <a:masterClrMapping/>
+  </p:clrMapOvr>
+</p:sld>
+</file>
+
+<file path=ppt/slides/slide51.xml><?xml version="1.0" encoding="utf-8"?>
+<p:sld xmlns:a="http://schemas.openxmlformats.org/drawingml/2006/main" xmlns:r="http://schemas.openxmlformats.org/officeDocument/2006/relationships" xmlns:p="http://schemas.openxmlformats.org/presentationml/2006/main">
+  <p:cSld>
+    <p:spTree>
+      <p:nvGrpSpPr>
+        <p:cNvPr id="1" name="">
+          <a:extLst>
+            <a:ext uri="{FF2B5EF4-FFF2-40B4-BE49-F238E27FC236}">
+              <a16:creationId xmlns:a16="http://schemas.microsoft.com/office/drawing/2014/main" id="{574F13F6-DCD3-F70A-99B5-3DCB19518FE9}"/>
+            </a:ext>
+          </a:extLst>
+        </p:cNvPr>
+        <p:cNvGrpSpPr/>
+        <p:nvPr/>
+      </p:nvGrpSpPr>
+      <p:grpSpPr>
+        <a:xfrm>
+          <a:off x="0" y="0"/>
+          <a:ext cx="0" cy="0"/>
+          <a:chOff x="0" y="0"/>
+          <a:chExt cx="0" cy="0"/>
+        </a:xfrm>
+      </p:grpSpPr>
+      <p:sp>
+        <p:nvSpPr>
+          <p:cNvPr id="2" name="Title 1">
+            <a:extLst>
+              <a:ext uri="{FF2B5EF4-FFF2-40B4-BE49-F238E27FC236}">
+                <a16:creationId xmlns:a16="http://schemas.microsoft.com/office/drawing/2014/main" id="{05907715-F916-4B95-F4FF-7837E46636EC}"/>
+              </a:ext>
+            </a:extLst>
+          </p:cNvPr>
+          <p:cNvSpPr>
+            <a:spLocks noGrp="1"/>
+          </p:cNvSpPr>
+          <p:nvPr>
+            <p:ph type="title"/>
+          </p:nvPr>
+        </p:nvSpPr>
+        <p:spPr/>
+        <p:txBody>
+          <a:bodyPr/>
+          <a:lstStyle/>
+          <a:p>
+            <a:r>
+              <a:rPr lang="en-US" dirty="0"/>
+              <a:t>Operations </a:t>
+            </a:r>
+            <a:r>
+              <a:rPr lang="en-US" sz="2000" dirty="0"/>
+              <a:t>(evaluate)</a:t>
+            </a:r>
+          </a:p>
+        </p:txBody>
+      </p:sp>
+      <p:sp>
+        <p:nvSpPr>
+          <p:cNvPr id="3" name="Content Placeholder 2">
+            <a:extLst>
+              <a:ext uri="{FF2B5EF4-FFF2-40B4-BE49-F238E27FC236}">
+                <a16:creationId xmlns:a16="http://schemas.microsoft.com/office/drawing/2014/main" id="{EA610971-A49D-885C-875C-44C95655F309}"/>
+              </a:ext>
+            </a:extLst>
+          </p:cNvPr>
+          <p:cNvSpPr>
+            <a:spLocks noGrp="1"/>
+          </p:cNvSpPr>
+          <p:nvPr>
+            <p:ph idx="1"/>
+          </p:nvPr>
+        </p:nvSpPr>
+        <p:spPr/>
+        <p:txBody>
+          <a:bodyPr/>
+          <a:lstStyle/>
+          <a:p>
+            <a:r>
+              <a:rPr lang="en-US" dirty="0"/>
+              <a:t>0110 </a:t>
+            </a:r>
+            <a:r>
+              <a:rPr lang="en-US" dirty="0">
+                <a:solidFill>
+                  <a:schemeClr val="bg2">
+                    <a:lumMod val="50000"/>
+                  </a:schemeClr>
+                </a:solidFill>
+                <a:latin typeface="Consolas" panose="020B0609020204030204" pitchFamily="49" charset="0"/>
+              </a:rPr>
+              <a:t>AND</a:t>
+            </a:r>
+            <a:r>
+              <a:rPr lang="en-US" dirty="0"/>
+              <a:t> 1011 </a:t>
+            </a:r>
+          </a:p>
+          <a:p>
+            <a:r>
+              <a:rPr lang="en-US" dirty="0"/>
+              <a:t>1100  </a:t>
+            </a:r>
+            <a:r>
+              <a:rPr lang="en-US" dirty="0">
+                <a:solidFill>
+                  <a:schemeClr val="bg2">
+                    <a:lumMod val="50000"/>
+                  </a:schemeClr>
+                </a:solidFill>
+                <a:latin typeface="Consolas" panose="020B0609020204030204" pitchFamily="49" charset="0"/>
+              </a:rPr>
+              <a:t>OR</a:t>
+            </a:r>
+            <a:r>
+              <a:rPr lang="en-US" dirty="0"/>
+              <a:t>   0101</a:t>
+            </a:r>
+          </a:p>
+          <a:p>
+            <a:r>
+              <a:rPr lang="en-US" dirty="0"/>
+              <a:t>1010 </a:t>
+            </a:r>
+            <a:r>
+              <a:rPr lang="en-US" dirty="0">
+                <a:solidFill>
+                  <a:schemeClr val="bg2">
+                    <a:lumMod val="50000"/>
+                  </a:schemeClr>
+                </a:solidFill>
+                <a:latin typeface="Consolas" panose="020B0609020204030204" pitchFamily="49" charset="0"/>
+              </a:rPr>
+              <a:t>XOR</a:t>
+            </a:r>
+            <a:r>
+              <a:rPr lang="en-US" dirty="0"/>
+              <a:t> 1111</a:t>
+            </a:r>
+          </a:p>
+          <a:p>
+            <a:r>
+              <a:rPr lang="en-US" dirty="0"/>
+              <a:t> 1010 </a:t>
+            </a:r>
+            <a:r>
+              <a:rPr lang="en-US" dirty="0">
+                <a:solidFill>
+                  <a:schemeClr val="bg2">
+                    <a:lumMod val="50000"/>
+                  </a:schemeClr>
+                </a:solidFill>
+                <a:latin typeface="Consolas" panose="020B0609020204030204" pitchFamily="49" charset="0"/>
+              </a:rPr>
+              <a:t>AND</a:t>
+            </a:r>
+            <a:r>
+              <a:rPr lang="en-US" dirty="0"/>
+              <a:t> 1100    </a:t>
+            </a:r>
+            <a:r>
+              <a:rPr lang="en-US" dirty="0">
+                <a:solidFill>
+                  <a:schemeClr val="bg2">
+                    <a:lumMod val="50000"/>
+                  </a:schemeClr>
+                </a:solidFill>
+                <a:latin typeface="Consolas" panose="020B0609020204030204" pitchFamily="49" charset="0"/>
+              </a:rPr>
+              <a:t>OR</a:t>
+            </a:r>
+            <a:r>
+              <a:rPr lang="en-US" dirty="0"/>
+              <a:t>   0001</a:t>
+            </a:r>
+          </a:p>
+          <a:p>
+            <a:r>
+              <a:rPr lang="en-US" dirty="0"/>
+              <a:t> 0011  </a:t>
+            </a:r>
+            <a:r>
+              <a:rPr lang="en-US" dirty="0">
+                <a:solidFill>
+                  <a:schemeClr val="bg2">
+                    <a:lumMod val="50000"/>
+                  </a:schemeClr>
+                </a:solidFill>
+                <a:latin typeface="Consolas" panose="020B0609020204030204" pitchFamily="49" charset="0"/>
+              </a:rPr>
+              <a:t>OR</a:t>
+            </a:r>
+            <a:r>
+              <a:rPr lang="en-US" dirty="0"/>
+              <a:t>  1010    </a:t>
+            </a:r>
+            <a:r>
+              <a:rPr lang="en-US" dirty="0">
+                <a:solidFill>
+                  <a:schemeClr val="bg2">
+                    <a:lumMod val="50000"/>
+                  </a:schemeClr>
+                </a:solidFill>
+                <a:latin typeface="Consolas" panose="020B0609020204030204" pitchFamily="49" charset="0"/>
+              </a:rPr>
+              <a:t>AND</a:t>
+            </a:r>
+            <a:r>
+              <a:rPr lang="en-US" dirty="0"/>
+              <a:t> 0110</a:t>
+            </a:r>
+          </a:p>
+          <a:p>
+            <a:r>
+              <a:rPr lang="en-US" dirty="0"/>
+              <a:t>(1100 </a:t>
+            </a:r>
+            <a:r>
+              <a:rPr lang="en-US" dirty="0">
+                <a:solidFill>
+                  <a:schemeClr val="bg2">
+                    <a:lumMod val="50000"/>
+                  </a:schemeClr>
+                </a:solidFill>
+                <a:latin typeface="Consolas" panose="020B0609020204030204" pitchFamily="49" charset="0"/>
+              </a:rPr>
+              <a:t>XOR</a:t>
+            </a:r>
+            <a:r>
+              <a:rPr lang="en-US" dirty="0"/>
+              <a:t> 1010) </a:t>
+            </a:r>
+            <a:r>
+              <a:rPr lang="en-US" dirty="0">
+                <a:solidFill>
+                  <a:schemeClr val="bg2">
+                    <a:lumMod val="50000"/>
+                  </a:schemeClr>
+                </a:solidFill>
+                <a:latin typeface="Consolas" panose="020B0609020204030204" pitchFamily="49" charset="0"/>
+              </a:rPr>
+              <a:t>AND</a:t>
+            </a:r>
+            <a:r>
+              <a:rPr lang="en-US" dirty="0"/>
+              <a:t> 0110</a:t>
+            </a:r>
+          </a:p>
+          <a:p>
+            <a:endParaRPr lang="en-US" dirty="0"/>
+          </a:p>
+          <a:p>
+            <a:endParaRPr lang="en-US" dirty="0"/>
+          </a:p>
+          <a:p>
+            <a:endParaRPr lang="en-US" dirty="0"/>
+          </a:p>
+          <a:p>
+            <a:endParaRPr lang="en-US" dirty="0"/>
+          </a:p>
+        </p:txBody>
+      </p:sp>
+      <p:sp>
+        <p:nvSpPr>
+          <p:cNvPr id="5" name="Footer Placeholder 4">
+            <a:extLst>
+              <a:ext uri="{FF2B5EF4-FFF2-40B4-BE49-F238E27FC236}">
+                <a16:creationId xmlns:a16="http://schemas.microsoft.com/office/drawing/2014/main" id="{41E09262-8A0F-6858-976A-183276173902}"/>
+              </a:ext>
+            </a:extLst>
+          </p:cNvPr>
+          <p:cNvSpPr>
+            <a:spLocks noGrp="1"/>
+          </p:cNvSpPr>
+          <p:nvPr>
+            <p:ph type="ftr" sz="quarter" idx="11"/>
+          </p:nvPr>
+        </p:nvSpPr>
+        <p:spPr/>
+        <p:txBody>
+          <a:bodyPr/>
+          <a:lstStyle/>
+          <a:p>
+            <a:r>
+              <a:rPr lang="en-US"/>
+              <a:t>Week 7</a:t>
+            </a:r>
+          </a:p>
+        </p:txBody>
+      </p:sp>
+    </p:spTree>
+    <p:extLst>
+      <p:ext uri="{BB962C8B-B14F-4D97-AF65-F5344CB8AC3E}">
+        <p14:creationId xmlns:p14="http://schemas.microsoft.com/office/powerpoint/2010/main" val="1033989901"/>
+      </p:ext>
+    </p:extLst>
+  </p:cSld>
+  <p:clrMapOvr>
+    <a:masterClrMapping/>
+  </p:clrMapOvr>
+</p:sld>
+</file>
+
+<file path=ppt/slides/slide52.xml><?xml version="1.0" encoding="utf-8"?>
+<p:sld xmlns:a="http://schemas.openxmlformats.org/drawingml/2006/main" xmlns:r="http://schemas.openxmlformats.org/officeDocument/2006/relationships" xmlns:p="http://schemas.openxmlformats.org/presentationml/2006/main">
+  <p:cSld>
+    <p:spTree>
+      <p:nvGrpSpPr>
+        <p:cNvPr id="1" name=""/>
+        <p:cNvGrpSpPr/>
+        <p:nvPr/>
+      </p:nvGrpSpPr>
+      <p:grpSpPr>
+        <a:xfrm>
+          <a:off x="0" y="0"/>
+          <a:ext cx="0" cy="0"/>
+          <a:chOff x="0" y="0"/>
+          <a:chExt cx="0" cy="0"/>
+        </a:xfrm>
+      </p:grpSpPr>
+      <p:sp>
+        <p:nvSpPr>
+          <p:cNvPr id="2" name="Title 1">
+            <a:extLst>
+              <a:ext uri="{FF2B5EF4-FFF2-40B4-BE49-F238E27FC236}">
+                <a16:creationId xmlns:a16="http://schemas.microsoft.com/office/drawing/2014/main" id="{9557676B-DF2F-0D75-1F2F-D5706E969BAF}"/>
+              </a:ext>
+            </a:extLst>
+          </p:cNvPr>
+          <p:cNvSpPr>
+            <a:spLocks noGrp="1"/>
+          </p:cNvSpPr>
+          <p:nvPr>
+            <p:ph type="title"/>
+          </p:nvPr>
+        </p:nvSpPr>
+        <p:spPr/>
+        <p:txBody>
+          <a:bodyPr/>
+          <a:lstStyle/>
+          <a:p>
+            <a:r>
+              <a:rPr lang="en-US" dirty="0"/>
+              <a:t>Operations : Shift </a:t>
+            </a:r>
+            <a:r>
+              <a:rPr lang="en-US" sz="2000" dirty="0"/>
+              <a:t>(evaluate)</a:t>
+            </a:r>
+          </a:p>
+        </p:txBody>
+      </p:sp>
+      <p:sp>
+        <p:nvSpPr>
+          <p:cNvPr id="3" name="Content Placeholder 2">
+            <a:extLst>
+              <a:ext uri="{FF2B5EF4-FFF2-40B4-BE49-F238E27FC236}">
+                <a16:creationId xmlns:a16="http://schemas.microsoft.com/office/drawing/2014/main" id="{E3D903CD-CB6C-2FEA-F395-0E130814EAA9}"/>
+              </a:ext>
+            </a:extLst>
+          </p:cNvPr>
+          <p:cNvSpPr>
+            <a:spLocks noGrp="1"/>
+          </p:cNvSpPr>
+          <p:nvPr>
+            <p:ph idx="1"/>
+          </p:nvPr>
+        </p:nvSpPr>
+        <p:spPr/>
+        <p:txBody>
+          <a:bodyPr/>
+          <a:lstStyle/>
+          <a:p>
+            <a:pPr marL="514350" indent="-514350">
+              <a:buFont typeface="+mj-lt"/>
+              <a:buAutoNum type="arabicPeriod"/>
+            </a:pPr>
+            <a:r>
+              <a:rPr lang="en-US" dirty="0"/>
+              <a:t>(</a:t>
+            </a:r>
+            <a:r>
+              <a:rPr lang="en-US" dirty="0">
+                <a:solidFill>
+                  <a:schemeClr val="bg1">
+                    <a:lumMod val="50000"/>
+                  </a:schemeClr>
+                </a:solidFill>
+              </a:rPr>
+              <a:t>LSHIFT-1</a:t>
+            </a:r>
+            <a:r>
+              <a:rPr lang="en-US" dirty="0"/>
+              <a:t> 10101) </a:t>
+            </a:r>
+            <a:r>
+              <a:rPr lang="en-US" dirty="0">
+                <a:solidFill>
+                  <a:schemeClr val="bg2">
+                    <a:lumMod val="50000"/>
+                  </a:schemeClr>
+                </a:solidFill>
+                <a:latin typeface="Consolas" panose="020B0609020204030204" pitchFamily="49" charset="0"/>
+              </a:rPr>
+              <a:t>AND</a:t>
+            </a:r>
+            <a:r>
+              <a:rPr lang="en-US" dirty="0"/>
+              <a:t> (</a:t>
+            </a:r>
+            <a:r>
+              <a:rPr lang="en-US" dirty="0">
+                <a:solidFill>
+                  <a:schemeClr val="bg1">
+                    <a:lumMod val="50000"/>
+                  </a:schemeClr>
+                </a:solidFill>
+              </a:rPr>
+              <a:t>RSHIFT-2</a:t>
+            </a:r>
+            <a:r>
+              <a:rPr lang="en-US" dirty="0"/>
+              <a:t> 11010)</a:t>
+            </a:r>
+          </a:p>
+          <a:p>
+            <a:pPr marL="514350" indent="-514350">
+              <a:buFont typeface="+mj-lt"/>
+              <a:buAutoNum type="arabicPeriod"/>
+            </a:pPr>
+            <a:r>
+              <a:rPr lang="en-US" dirty="0"/>
+              <a:t>(</a:t>
+            </a:r>
+            <a:r>
+              <a:rPr lang="en-US" dirty="0">
+                <a:solidFill>
+                  <a:schemeClr val="bg1">
+                    <a:lumMod val="50000"/>
+                  </a:schemeClr>
+                </a:solidFill>
+              </a:rPr>
+              <a:t>RCIRC-2</a:t>
+            </a:r>
+            <a:r>
+              <a:rPr lang="en-US" dirty="0"/>
+              <a:t> 01111) </a:t>
+            </a:r>
+            <a:r>
+              <a:rPr lang="en-US" dirty="0">
+                <a:solidFill>
+                  <a:schemeClr val="bg1">
+                    <a:lumMod val="50000"/>
+                  </a:schemeClr>
+                </a:solidFill>
+              </a:rPr>
+              <a:t>OR</a:t>
+            </a:r>
+            <a:r>
+              <a:rPr lang="en-US" dirty="0"/>
+              <a:t> (</a:t>
+            </a:r>
+            <a:r>
+              <a:rPr lang="en-US" dirty="0">
+                <a:solidFill>
+                  <a:schemeClr val="bg1">
+                    <a:lumMod val="50000"/>
+                  </a:schemeClr>
+                </a:solidFill>
+              </a:rPr>
+              <a:t>LSHIFT-3</a:t>
+            </a:r>
+            <a:r>
+              <a:rPr lang="en-US" dirty="0"/>
+              <a:t> 10010)</a:t>
+            </a:r>
+          </a:p>
+          <a:p>
+            <a:pPr marL="514350" indent="-514350">
+              <a:buFont typeface="+mj-lt"/>
+              <a:buAutoNum type="arabicPeriod"/>
+            </a:pPr>
+            <a:r>
+              <a:rPr lang="en-US" dirty="0"/>
+              <a:t>(</a:t>
+            </a:r>
+            <a:r>
+              <a:rPr lang="en-US" dirty="0">
+                <a:solidFill>
+                  <a:schemeClr val="bg1">
+                    <a:lumMod val="50000"/>
+                  </a:schemeClr>
+                </a:solidFill>
+              </a:rPr>
+              <a:t>RSHIFT-1</a:t>
+            </a:r>
+            <a:r>
+              <a:rPr lang="en-US" dirty="0"/>
+              <a:t> 11100) </a:t>
+            </a:r>
+            <a:r>
+              <a:rPr lang="en-US" dirty="0">
+                <a:solidFill>
+                  <a:schemeClr val="bg1">
+                    <a:lumMod val="50000"/>
+                  </a:schemeClr>
+                </a:solidFill>
+              </a:rPr>
+              <a:t>XOR</a:t>
+            </a:r>
+            <a:r>
+              <a:rPr lang="en-US" dirty="0"/>
+              <a:t> (</a:t>
+            </a:r>
+            <a:r>
+              <a:rPr lang="en-US" dirty="0">
+                <a:solidFill>
+                  <a:schemeClr val="bg1">
+                    <a:lumMod val="50000"/>
+                  </a:schemeClr>
+                </a:solidFill>
+              </a:rPr>
+              <a:t>LCIRC-2</a:t>
+            </a:r>
+            <a:r>
+              <a:rPr lang="en-US" dirty="0"/>
+              <a:t> 01011)</a:t>
+            </a:r>
+          </a:p>
+          <a:p>
+            <a:pPr marL="514350" indent="-514350">
+              <a:buFont typeface="+mj-lt"/>
+              <a:buAutoNum type="arabicPeriod"/>
+            </a:pPr>
+            <a:r>
+              <a:rPr lang="en-US" dirty="0"/>
+              <a:t>(</a:t>
+            </a:r>
+            <a:r>
+              <a:rPr lang="en-US" dirty="0">
+                <a:solidFill>
+                  <a:schemeClr val="bg1">
+                    <a:lumMod val="50000"/>
+                  </a:schemeClr>
+                </a:solidFill>
+              </a:rPr>
+              <a:t>LSHIFT-2</a:t>
+            </a:r>
+            <a:r>
+              <a:rPr lang="en-US" dirty="0"/>
+              <a:t> 00110) </a:t>
+            </a:r>
+            <a:r>
+              <a:rPr lang="en-US" dirty="0">
+                <a:solidFill>
+                  <a:schemeClr val="bg1">
+                    <a:lumMod val="50000"/>
+                  </a:schemeClr>
+                </a:solidFill>
+              </a:rPr>
+              <a:t>OR</a:t>
+            </a:r>
+            <a:r>
+              <a:rPr lang="en-US" dirty="0"/>
+              <a:t> (</a:t>
+            </a:r>
+            <a:r>
+              <a:rPr lang="en-US" dirty="0">
+                <a:solidFill>
+                  <a:schemeClr val="bg1">
+                    <a:lumMod val="50000"/>
+                  </a:schemeClr>
+                </a:solidFill>
+              </a:rPr>
+              <a:t>RCIRC-1</a:t>
+            </a:r>
+            <a:r>
+              <a:rPr lang="en-US" dirty="0"/>
+              <a:t> 10101) </a:t>
+            </a:r>
+            <a:r>
+              <a:rPr lang="en-US" dirty="0">
+                <a:solidFill>
+                  <a:schemeClr val="bg1">
+                    <a:lumMod val="50000"/>
+                  </a:schemeClr>
+                </a:solidFill>
+              </a:rPr>
+              <a:t>AND</a:t>
+            </a:r>
+            <a:r>
+              <a:rPr lang="en-US" dirty="0"/>
+              <a:t> (</a:t>
+            </a:r>
+            <a:r>
+              <a:rPr lang="en-US" dirty="0">
+                <a:solidFill>
+                  <a:schemeClr val="bg1">
+                    <a:lumMod val="50000"/>
+                  </a:schemeClr>
+                </a:solidFill>
+              </a:rPr>
+              <a:t>RSHIFT-3</a:t>
+            </a:r>
+            <a:r>
+              <a:rPr lang="en-US" dirty="0"/>
+              <a:t> 11101)</a:t>
+            </a:r>
+          </a:p>
+          <a:p>
+            <a:pPr marL="514350" indent="-514350">
+              <a:buFont typeface="+mj-lt"/>
+              <a:buAutoNum type="arabicPeriod"/>
+            </a:pPr>
+            <a:r>
+              <a:rPr lang="en-US" dirty="0"/>
+              <a:t>(</a:t>
+            </a:r>
+            <a:r>
+              <a:rPr lang="en-US" dirty="0">
+                <a:solidFill>
+                  <a:schemeClr val="bg1">
+                    <a:lumMod val="50000"/>
+                  </a:schemeClr>
+                </a:solidFill>
+              </a:rPr>
+              <a:t>LCIRC-3</a:t>
+            </a:r>
+            <a:r>
+              <a:rPr lang="en-US" dirty="0"/>
+              <a:t> 11001) </a:t>
+            </a:r>
+            <a:r>
+              <a:rPr lang="en-US" dirty="0">
+                <a:solidFill>
+                  <a:schemeClr val="bg1">
+                    <a:lumMod val="50000"/>
+                  </a:schemeClr>
+                </a:solidFill>
+              </a:rPr>
+              <a:t>AND</a:t>
+            </a:r>
+            <a:r>
+              <a:rPr lang="en-US" dirty="0"/>
+              <a:t> (</a:t>
+            </a:r>
+            <a:r>
+              <a:rPr lang="en-US" dirty="0">
+                <a:solidFill>
+                  <a:schemeClr val="bg1">
+                    <a:lumMod val="50000"/>
+                  </a:schemeClr>
+                </a:solidFill>
+              </a:rPr>
+              <a:t>RSHIFT-2</a:t>
+            </a:r>
+            <a:r>
+              <a:rPr lang="en-US" dirty="0"/>
+              <a:t> 10110)</a:t>
+            </a:r>
+          </a:p>
+          <a:p>
+            <a:pPr marL="514350" indent="-514350">
+              <a:buFont typeface="+mj-lt"/>
+              <a:buAutoNum type="arabicPeriod"/>
+            </a:pPr>
+            <a:r>
+              <a:rPr lang="en-US" dirty="0"/>
+              <a:t>(</a:t>
+            </a:r>
+            <a:r>
+              <a:rPr lang="en-US" dirty="0">
+                <a:solidFill>
+                  <a:schemeClr val="bg1">
+                    <a:lumMod val="50000"/>
+                  </a:schemeClr>
+                </a:solidFill>
+              </a:rPr>
+              <a:t>RCIRC-4</a:t>
+            </a:r>
+            <a:r>
+              <a:rPr lang="en-US" dirty="0"/>
+              <a:t> 10011) </a:t>
+            </a:r>
+            <a:r>
+              <a:rPr lang="en-US" dirty="0">
+                <a:solidFill>
+                  <a:schemeClr val="bg1">
+                    <a:lumMod val="50000"/>
+                  </a:schemeClr>
+                </a:solidFill>
+              </a:rPr>
+              <a:t>OR</a:t>
+            </a:r>
+            <a:r>
+              <a:rPr lang="en-US" dirty="0"/>
+              <a:t> (</a:t>
+            </a:r>
+            <a:r>
+              <a:rPr lang="en-US" dirty="0">
+                <a:solidFill>
+                  <a:schemeClr val="bg1">
+                    <a:lumMod val="50000"/>
+                  </a:schemeClr>
+                </a:solidFill>
+              </a:rPr>
+              <a:t>LSHIFT-1</a:t>
+            </a:r>
+            <a:r>
+              <a:rPr lang="en-US" dirty="0"/>
+              <a:t> 01101)</a:t>
+            </a:r>
+          </a:p>
+          <a:p>
+            <a:pPr marL="514350" indent="-514350">
+              <a:buFont typeface="+mj-lt"/>
+              <a:buAutoNum type="arabicPeriod"/>
+            </a:pPr>
+            <a:r>
+              <a:rPr lang="en-US" dirty="0"/>
+              <a:t>(</a:t>
+            </a:r>
+            <a:r>
+              <a:rPr lang="en-US" dirty="0">
+                <a:solidFill>
+                  <a:schemeClr val="bg1">
+                    <a:lumMod val="50000"/>
+                  </a:schemeClr>
+                </a:solidFill>
+              </a:rPr>
+              <a:t>RSHIFT-3</a:t>
+            </a:r>
+            <a:r>
+              <a:rPr lang="en-US" dirty="0"/>
+              <a:t> 11110) </a:t>
+            </a:r>
+            <a:r>
+              <a:rPr lang="en-US" dirty="0">
+                <a:solidFill>
+                  <a:schemeClr val="bg1">
+                    <a:lumMod val="50000"/>
+                  </a:schemeClr>
+                </a:solidFill>
+              </a:rPr>
+              <a:t>AND</a:t>
+            </a:r>
+            <a:r>
+              <a:rPr lang="en-US" dirty="0"/>
+              <a:t> (</a:t>
+            </a:r>
+            <a:r>
+              <a:rPr lang="en-US" dirty="0">
+                <a:solidFill>
+                  <a:schemeClr val="bg1">
+                    <a:lumMod val="50000"/>
+                  </a:schemeClr>
+                </a:solidFill>
+              </a:rPr>
+              <a:t>LCIRC-1</a:t>
+            </a:r>
+            <a:r>
+              <a:rPr lang="en-US" dirty="0"/>
+              <a:t> 00111) </a:t>
+            </a:r>
+            <a:r>
+              <a:rPr lang="en-US" dirty="0">
+                <a:solidFill>
+                  <a:schemeClr val="bg1">
+                    <a:lumMod val="50000"/>
+                  </a:schemeClr>
+                </a:solidFill>
+              </a:rPr>
+              <a:t>OR</a:t>
+            </a:r>
+            <a:r>
+              <a:rPr lang="en-US" dirty="0"/>
+              <a:t> (</a:t>
+            </a:r>
+            <a:r>
+              <a:rPr lang="en-US" dirty="0">
+                <a:solidFill>
+                  <a:schemeClr val="bg1">
+                    <a:lumMod val="50000"/>
+                  </a:schemeClr>
+                </a:solidFill>
+              </a:rPr>
+              <a:t>LSHIFT-2</a:t>
+            </a:r>
+            <a:r>
+              <a:rPr lang="en-US" dirty="0"/>
+              <a:t> 01010)</a:t>
+            </a:r>
+          </a:p>
+          <a:p>
+            <a:pPr marL="514350" indent="-514350">
+              <a:buFont typeface="+mj-lt"/>
+              <a:buAutoNum type="arabicPeriod"/>
+            </a:pPr>
+            <a:r>
+              <a:rPr lang="en-US" dirty="0"/>
+              <a:t>(</a:t>
+            </a:r>
+            <a:r>
+              <a:rPr lang="en-US" dirty="0">
+                <a:solidFill>
+                  <a:schemeClr val="bg1">
+                    <a:lumMod val="50000"/>
+                  </a:schemeClr>
+                </a:solidFill>
+              </a:rPr>
+              <a:t>LSHIFT-2</a:t>
+            </a:r>
+            <a:r>
+              <a:rPr lang="en-US" dirty="0"/>
+              <a:t> 01101) </a:t>
+            </a:r>
+            <a:r>
+              <a:rPr lang="en-US" dirty="0">
+                <a:solidFill>
+                  <a:schemeClr val="bg1">
+                    <a:lumMod val="50000"/>
+                  </a:schemeClr>
+                </a:solidFill>
+              </a:rPr>
+              <a:t>OR</a:t>
+            </a:r>
+            <a:r>
+              <a:rPr lang="en-US" dirty="0"/>
+              <a:t> (</a:t>
+            </a:r>
+            <a:r>
+              <a:rPr lang="en-US" dirty="0">
+                <a:solidFill>
+                  <a:schemeClr val="bg1">
+                    <a:lumMod val="50000"/>
+                  </a:schemeClr>
+                </a:solidFill>
+              </a:rPr>
+              <a:t>RCIRC-3</a:t>
+            </a:r>
+            <a:r>
+              <a:rPr lang="en-US" dirty="0"/>
+              <a:t> 10110) </a:t>
+            </a:r>
+            <a:r>
+              <a:rPr lang="en-US" dirty="0">
+                <a:solidFill>
+                  <a:schemeClr val="bg1">
+                    <a:lumMod val="50000"/>
+                  </a:schemeClr>
+                </a:solidFill>
+              </a:rPr>
+              <a:t>AND</a:t>
+            </a:r>
+            <a:r>
+              <a:rPr lang="en-US" dirty="0"/>
+              <a:t> (</a:t>
+            </a:r>
+            <a:r>
+              <a:rPr lang="en-US" dirty="0">
+                <a:solidFill>
+                  <a:schemeClr val="bg1">
+                    <a:lumMod val="50000"/>
+                  </a:schemeClr>
+                </a:solidFill>
+              </a:rPr>
+              <a:t>RSHIFT-1</a:t>
+            </a:r>
+            <a:r>
+              <a:rPr lang="en-US" dirty="0"/>
+              <a:t> 11011)</a:t>
+            </a:r>
+          </a:p>
+        </p:txBody>
+      </p:sp>
+    </p:spTree>
+    <p:extLst>
+      <p:ext uri="{BB962C8B-B14F-4D97-AF65-F5344CB8AC3E}">
+        <p14:creationId xmlns:p14="http://schemas.microsoft.com/office/powerpoint/2010/main" val="3855716963"/>
+      </p:ext>
+    </p:extLst>
+  </p:cSld>
+  <p:clrMapOvr>
+    <a:masterClrMapping/>
+  </p:clrMapOvr>
+</p:sld>
+</file>
+
+<file path=ppt/slides/slide53.xml><?xml version="1.0" encoding="utf-8"?>
+<p:sld xmlns:a="http://schemas.openxmlformats.org/drawingml/2006/main" xmlns:r="http://schemas.openxmlformats.org/officeDocument/2006/relationships" xmlns:p="http://schemas.openxmlformats.org/presentationml/2006/main">
+  <p:cSld>
+    <p:spTree>
+      <p:nvGrpSpPr>
+        <p:cNvPr id="1" name=""/>
+        <p:cNvGrpSpPr/>
+        <p:nvPr/>
+      </p:nvGrpSpPr>
+      <p:grpSpPr>
+        <a:xfrm>
+          <a:off x="0" y="0"/>
+          <a:ext cx="0" cy="0"/>
+          <a:chOff x="0" y="0"/>
+          <a:chExt cx="0" cy="0"/>
+        </a:xfrm>
+      </p:grpSpPr>
+      <p:sp>
+        <p:nvSpPr>
+          <p:cNvPr id="2" name="Title 1">
+            <a:extLst>
+              <a:ext uri="{FF2B5EF4-FFF2-40B4-BE49-F238E27FC236}">
+                <a16:creationId xmlns:a16="http://schemas.microsoft.com/office/drawing/2014/main" id="{2E4BB2FC-C20D-29F2-EA67-7864CD43370F}"/>
+              </a:ext>
+            </a:extLst>
+          </p:cNvPr>
+          <p:cNvSpPr>
+            <a:spLocks noGrp="1"/>
+          </p:cNvSpPr>
+          <p:nvPr>
+            <p:ph type="title"/>
+          </p:nvPr>
+        </p:nvSpPr>
+        <p:spPr/>
+        <p:txBody>
+          <a:bodyPr/>
+          <a:lstStyle/>
+          <a:p>
+            <a:r>
+              <a:rPr lang="en-US" dirty="0" err="1"/>
+              <a:t>Answsers</a:t>
+            </a:r>
+            <a:r>
+              <a:rPr lang="en-US" dirty="0"/>
+              <a:t> 1..3</a:t>
+            </a:r>
+          </a:p>
+        </p:txBody>
+      </p:sp>
+      <p:sp>
+        <p:nvSpPr>
+          <p:cNvPr id="3" name="Content Placeholder 2">
+            <a:extLst>
+              <a:ext uri="{FF2B5EF4-FFF2-40B4-BE49-F238E27FC236}">
+                <a16:creationId xmlns:a16="http://schemas.microsoft.com/office/drawing/2014/main" id="{690C4EEE-6173-2D24-0658-2C120397B99F}"/>
+              </a:ext>
+            </a:extLst>
+          </p:cNvPr>
+          <p:cNvSpPr>
+            <a:spLocks noGrp="1"/>
+          </p:cNvSpPr>
+          <p:nvPr>
+            <p:ph idx="1"/>
+          </p:nvPr>
+        </p:nvSpPr>
+        <p:spPr/>
+        <p:txBody>
+          <a:bodyPr/>
+          <a:lstStyle/>
+          <a:p>
+            <a:pPr marL="514350" indent="-514350">
+              <a:buFont typeface="+mj-lt"/>
+              <a:buAutoNum type="arabicPeriod"/>
+            </a:pPr>
+            <a:r>
+              <a:rPr lang="en-US" dirty="0"/>
+              <a:t>(</a:t>
+            </a:r>
+            <a:r>
+              <a:rPr lang="en-US" dirty="0">
+                <a:solidFill>
+                  <a:schemeClr val="bg1">
+                    <a:lumMod val="50000"/>
+                  </a:schemeClr>
+                </a:solidFill>
+              </a:rPr>
+              <a:t>LSHIFT-1</a:t>
+            </a:r>
+            <a:r>
+              <a:rPr lang="en-US" dirty="0"/>
+              <a:t> 10101) </a:t>
+            </a:r>
+            <a:r>
+              <a:rPr lang="en-US" dirty="0">
+                <a:solidFill>
+                  <a:schemeClr val="bg2">
+                    <a:lumMod val="50000"/>
+                  </a:schemeClr>
+                </a:solidFill>
+                <a:latin typeface="Consolas" panose="020B0609020204030204" pitchFamily="49" charset="0"/>
+              </a:rPr>
+              <a:t>AND</a:t>
+            </a:r>
+            <a:r>
+              <a:rPr lang="en-US" dirty="0"/>
+              <a:t> (</a:t>
+            </a:r>
+            <a:r>
+              <a:rPr lang="en-US" dirty="0">
+                <a:solidFill>
+                  <a:schemeClr val="bg1">
+                    <a:lumMod val="50000"/>
+                  </a:schemeClr>
+                </a:solidFill>
+              </a:rPr>
+              <a:t>RSHIFT-2</a:t>
+            </a:r>
+            <a:r>
+              <a:rPr lang="en-US" dirty="0"/>
+              <a:t> 11010)</a:t>
+            </a:r>
+          </a:p>
+          <a:p>
+            <a:pPr lvl="1"/>
+            <a:r>
+              <a:rPr lang="en-US" dirty="0"/>
+              <a:t>→ 01010 AND 00110 </a:t>
+            </a:r>
+          </a:p>
+          <a:p>
+            <a:pPr lvl="1"/>
+            <a:r>
+              <a:rPr lang="en-US" dirty="0"/>
+              <a:t>→ </a:t>
+            </a:r>
+            <a:r>
+              <a:rPr lang="en-US" b="1" dirty="0"/>
+              <a:t>00010</a:t>
+            </a:r>
+          </a:p>
+          <a:p>
+            <a:pPr marL="514350" indent="-514350">
+              <a:buFont typeface="+mj-lt"/>
+              <a:buAutoNum type="arabicPeriod"/>
+            </a:pPr>
+            <a:r>
+              <a:rPr lang="en-US" dirty="0"/>
+              <a:t>(</a:t>
+            </a:r>
+            <a:r>
+              <a:rPr lang="en-US" dirty="0">
+                <a:solidFill>
+                  <a:schemeClr val="bg1">
+                    <a:lumMod val="50000"/>
+                  </a:schemeClr>
+                </a:solidFill>
+              </a:rPr>
+              <a:t>RCIRC-2</a:t>
+            </a:r>
+            <a:r>
+              <a:rPr lang="en-US" dirty="0"/>
+              <a:t> 01111) </a:t>
+            </a:r>
+            <a:r>
+              <a:rPr lang="en-US" dirty="0">
+                <a:solidFill>
+                  <a:schemeClr val="bg1">
+                    <a:lumMod val="50000"/>
+                  </a:schemeClr>
+                </a:solidFill>
+              </a:rPr>
+              <a:t>OR</a:t>
+            </a:r>
+            <a:r>
+              <a:rPr lang="en-US" dirty="0"/>
+              <a:t> (</a:t>
+            </a:r>
+            <a:r>
+              <a:rPr lang="en-US" dirty="0">
+                <a:solidFill>
+                  <a:schemeClr val="bg1">
+                    <a:lumMod val="50000"/>
+                  </a:schemeClr>
+                </a:solidFill>
+              </a:rPr>
+              <a:t>LSHIFT-3</a:t>
+            </a:r>
+            <a:r>
+              <a:rPr lang="en-US" dirty="0"/>
+              <a:t> 10010)</a:t>
+            </a:r>
+          </a:p>
+          <a:p>
+            <a:pPr marL="971550" lvl="1" indent="-514350">
+              <a:buFont typeface="+mj-lt"/>
+              <a:buAutoNum type="arabicPeriod"/>
+            </a:pPr>
+            <a:r>
+              <a:rPr lang="en-US" dirty="0"/>
+              <a:t>→ 11011 OR 10000 </a:t>
+            </a:r>
+          </a:p>
+          <a:p>
+            <a:pPr marL="971550" lvl="1" indent="-514350">
+              <a:buFont typeface="+mj-lt"/>
+              <a:buAutoNum type="arabicPeriod"/>
+            </a:pPr>
+            <a:r>
+              <a:rPr lang="en-US" dirty="0"/>
+              <a:t>→ </a:t>
+            </a:r>
+            <a:r>
+              <a:rPr lang="en-US" b="1" dirty="0"/>
+              <a:t>11011</a:t>
+            </a:r>
+          </a:p>
+          <a:p>
+            <a:pPr marL="514350" indent="-514350">
+              <a:buFont typeface="+mj-lt"/>
+              <a:buAutoNum type="arabicPeriod"/>
+            </a:pPr>
+            <a:r>
+              <a:rPr lang="en-US" dirty="0"/>
+              <a:t>(</a:t>
+            </a:r>
+            <a:r>
+              <a:rPr lang="en-US" dirty="0">
+                <a:solidFill>
+                  <a:schemeClr val="bg1">
+                    <a:lumMod val="50000"/>
+                  </a:schemeClr>
+                </a:solidFill>
+              </a:rPr>
+              <a:t>RSHIFT-1</a:t>
+            </a:r>
+            <a:r>
+              <a:rPr lang="en-US" dirty="0"/>
+              <a:t> 11100) </a:t>
+            </a:r>
+            <a:r>
+              <a:rPr lang="en-US" dirty="0">
+                <a:solidFill>
+                  <a:schemeClr val="bg1">
+                    <a:lumMod val="50000"/>
+                  </a:schemeClr>
+                </a:solidFill>
+              </a:rPr>
+              <a:t>XOR</a:t>
+            </a:r>
+            <a:r>
+              <a:rPr lang="en-US" dirty="0"/>
+              <a:t> (</a:t>
+            </a:r>
+            <a:r>
+              <a:rPr lang="en-US" dirty="0">
+                <a:solidFill>
+                  <a:schemeClr val="bg1">
+                    <a:lumMod val="50000"/>
+                  </a:schemeClr>
+                </a:solidFill>
+              </a:rPr>
+              <a:t>LCIRC-2</a:t>
+            </a:r>
+            <a:r>
+              <a:rPr lang="en-US" dirty="0"/>
+              <a:t> 01011)</a:t>
+            </a:r>
+          </a:p>
+          <a:p>
+            <a:pPr marL="971550" lvl="1" indent="-514350">
+              <a:buFont typeface="+mj-lt"/>
+              <a:buAutoNum type="arabicPeriod"/>
+            </a:pPr>
+            <a:r>
+              <a:rPr lang="en-US" dirty="0"/>
+              <a:t>→ 01110 XOR 01101 </a:t>
+            </a:r>
+          </a:p>
+          <a:p>
+            <a:pPr marL="971550" lvl="1" indent="-514350">
+              <a:buFont typeface="+mj-lt"/>
+              <a:buAutoNum type="arabicPeriod"/>
+            </a:pPr>
+            <a:r>
+              <a:rPr lang="en-US" dirty="0"/>
+              <a:t>→ </a:t>
+            </a:r>
+            <a:r>
+              <a:rPr lang="en-US" b="1" dirty="0"/>
+              <a:t>00011</a:t>
+            </a:r>
+          </a:p>
+          <a:p>
+            <a:endParaRPr lang="en-US" dirty="0"/>
+          </a:p>
+        </p:txBody>
+      </p:sp>
+    </p:spTree>
+    <p:extLst>
+      <p:ext uri="{BB962C8B-B14F-4D97-AF65-F5344CB8AC3E}">
+        <p14:creationId xmlns:p14="http://schemas.microsoft.com/office/powerpoint/2010/main" val="3860563823"/>
+      </p:ext>
+    </p:extLst>
+  </p:cSld>
+  <p:clrMapOvr>
+    <a:masterClrMapping/>
+  </p:clrMapOvr>
+</p:sld>
+</file>
+
+<file path=ppt/slides/slide54.xml><?xml version="1.0" encoding="utf-8"?>
+<p:sld xmlns:a="http://schemas.openxmlformats.org/drawingml/2006/main" xmlns:r="http://schemas.openxmlformats.org/officeDocument/2006/relationships" xmlns:p="http://schemas.openxmlformats.org/presentationml/2006/main">
+  <p:cSld>
+    <p:spTree>
+      <p:nvGrpSpPr>
+        <p:cNvPr id="1" name=""/>
+        <p:cNvGrpSpPr/>
+        <p:nvPr/>
+      </p:nvGrpSpPr>
+      <p:grpSpPr>
+        <a:xfrm>
+          <a:off x="0" y="0"/>
+          <a:ext cx="0" cy="0"/>
+          <a:chOff x="0" y="0"/>
+          <a:chExt cx="0" cy="0"/>
+        </a:xfrm>
+      </p:grpSpPr>
+      <p:sp>
+        <p:nvSpPr>
+          <p:cNvPr id="2" name="Title 1">
+            <a:extLst>
+              <a:ext uri="{FF2B5EF4-FFF2-40B4-BE49-F238E27FC236}">
+                <a16:creationId xmlns:a16="http://schemas.microsoft.com/office/drawing/2014/main" id="{7059BD7F-A798-35AE-793C-868D060F56BA}"/>
+              </a:ext>
+            </a:extLst>
+          </p:cNvPr>
+          <p:cNvSpPr>
+            <a:spLocks noGrp="1"/>
+          </p:cNvSpPr>
+          <p:nvPr>
+            <p:ph type="title"/>
+          </p:nvPr>
+        </p:nvSpPr>
+        <p:spPr/>
+        <p:txBody>
+          <a:bodyPr/>
+          <a:lstStyle/>
+          <a:p>
+            <a:endParaRPr lang="en-US"/>
+          </a:p>
+        </p:txBody>
+      </p:sp>
+      <p:sp>
+        <p:nvSpPr>
+          <p:cNvPr id="3" name="Content Placeholder 2">
+            <a:extLst>
+              <a:ext uri="{FF2B5EF4-FFF2-40B4-BE49-F238E27FC236}">
+                <a16:creationId xmlns:a16="http://schemas.microsoft.com/office/drawing/2014/main" id="{0077ECD0-8B39-0692-C574-6ABB3CEA7C67}"/>
+              </a:ext>
+            </a:extLst>
+          </p:cNvPr>
+          <p:cNvSpPr>
+            <a:spLocks noGrp="1"/>
+          </p:cNvSpPr>
+          <p:nvPr>
+            <p:ph idx="1"/>
+          </p:nvPr>
+        </p:nvSpPr>
+        <p:spPr/>
+        <p:txBody>
+          <a:bodyPr>
+            <a:normAutofit lnSpcReduction="10000"/>
+          </a:bodyPr>
+          <a:lstStyle/>
+          <a:p>
+            <a:pPr marL="514350" indent="-514350">
+              <a:buFont typeface="+mj-lt"/>
+              <a:buAutoNum type="arabicPeriod" startAt="4"/>
+            </a:pPr>
+            <a:r>
+              <a:rPr lang="en-US" dirty="0"/>
+              <a:t>(</a:t>
+            </a:r>
+            <a:r>
+              <a:rPr lang="en-US" dirty="0">
+                <a:solidFill>
+                  <a:schemeClr val="bg1">
+                    <a:lumMod val="50000"/>
+                  </a:schemeClr>
+                </a:solidFill>
+              </a:rPr>
+              <a:t>LSHIFT-2</a:t>
+            </a:r>
+            <a:r>
+              <a:rPr lang="en-US" dirty="0"/>
+              <a:t> 00110) </a:t>
+            </a:r>
+            <a:r>
+              <a:rPr lang="en-US" dirty="0">
+                <a:solidFill>
+                  <a:schemeClr val="bg1">
+                    <a:lumMod val="50000"/>
+                  </a:schemeClr>
+                </a:solidFill>
+              </a:rPr>
+              <a:t>OR</a:t>
+            </a:r>
+            <a:r>
+              <a:rPr lang="en-US" dirty="0"/>
+              <a:t> (</a:t>
+            </a:r>
+            <a:r>
+              <a:rPr lang="en-US" dirty="0">
+                <a:solidFill>
+                  <a:schemeClr val="bg1">
+                    <a:lumMod val="50000"/>
+                  </a:schemeClr>
+                </a:solidFill>
+              </a:rPr>
+              <a:t>RCIRC-1</a:t>
+            </a:r>
+            <a:r>
+              <a:rPr lang="en-US" dirty="0"/>
+              <a:t> 10101) </a:t>
+            </a:r>
+            <a:r>
+              <a:rPr lang="en-US" dirty="0">
+                <a:solidFill>
+                  <a:schemeClr val="bg1">
+                    <a:lumMod val="50000"/>
+                  </a:schemeClr>
+                </a:solidFill>
+              </a:rPr>
+              <a:t>AND</a:t>
+            </a:r>
+            <a:r>
+              <a:rPr lang="en-US" dirty="0"/>
+              <a:t> (</a:t>
+            </a:r>
+            <a:r>
+              <a:rPr lang="en-US" dirty="0">
+                <a:solidFill>
+                  <a:schemeClr val="bg1">
+                    <a:lumMod val="50000"/>
+                  </a:schemeClr>
+                </a:solidFill>
+              </a:rPr>
+              <a:t>RSHIFT-3</a:t>
+            </a:r>
+            <a:r>
+              <a:rPr lang="en-US" dirty="0"/>
+              <a:t> 11101)</a:t>
+            </a:r>
+          </a:p>
+          <a:p>
+            <a:pPr lvl="1"/>
+            <a:r>
+              <a:rPr lang="en-US" dirty="0"/>
+              <a:t>11000 OR 11010 AND 00011 </a:t>
+            </a:r>
+            <a:r>
+              <a:rPr lang="en-US" i="1" dirty="0"/>
+              <a:t>//parenthesis evaluated first</a:t>
+            </a:r>
+          </a:p>
+          <a:p>
+            <a:pPr lvl="1"/>
+            <a:r>
+              <a:rPr lang="en-US" dirty="0"/>
+              <a:t>11000 OR 00010 </a:t>
+            </a:r>
+            <a:r>
+              <a:rPr lang="en-US" i="1" dirty="0"/>
+              <a:t>// And has higher precedence so evaluated first</a:t>
+            </a:r>
+          </a:p>
+          <a:p>
+            <a:pPr lvl="1"/>
+            <a:r>
+              <a:rPr lang="en-US" b="1" dirty="0"/>
+              <a:t>11010</a:t>
+            </a:r>
+          </a:p>
+          <a:p>
+            <a:pPr marL="514350" indent="-514350">
+              <a:buFont typeface="+mj-lt"/>
+              <a:buAutoNum type="arabicPeriod" startAt="4"/>
+            </a:pPr>
+            <a:r>
+              <a:rPr lang="en-US" dirty="0"/>
+              <a:t>(</a:t>
+            </a:r>
+            <a:r>
+              <a:rPr lang="en-US" dirty="0">
+                <a:solidFill>
+                  <a:schemeClr val="bg1">
+                    <a:lumMod val="50000"/>
+                  </a:schemeClr>
+                </a:solidFill>
+              </a:rPr>
+              <a:t>LCIRC-3</a:t>
+            </a:r>
+            <a:r>
+              <a:rPr lang="en-US" dirty="0"/>
+              <a:t> 11001) </a:t>
+            </a:r>
+            <a:r>
+              <a:rPr lang="en-US" dirty="0">
+                <a:solidFill>
+                  <a:schemeClr val="bg1">
+                    <a:lumMod val="50000"/>
+                  </a:schemeClr>
+                </a:solidFill>
+              </a:rPr>
+              <a:t>AND</a:t>
+            </a:r>
+            <a:r>
+              <a:rPr lang="en-US" dirty="0"/>
+              <a:t> (</a:t>
+            </a:r>
+            <a:r>
+              <a:rPr lang="en-US" dirty="0">
+                <a:solidFill>
+                  <a:schemeClr val="bg1">
+                    <a:lumMod val="50000"/>
+                  </a:schemeClr>
+                </a:solidFill>
+              </a:rPr>
+              <a:t>RSHIFT-2</a:t>
+            </a:r>
+            <a:r>
+              <a:rPr lang="en-US" dirty="0"/>
+              <a:t> 10110)</a:t>
+            </a:r>
+          </a:p>
+          <a:p>
+            <a:pPr lvl="1"/>
+            <a:r>
+              <a:rPr lang="en-US" dirty="0"/>
+              <a:t>01110 AND (RSHIFT-2 10110)</a:t>
+            </a:r>
+          </a:p>
+          <a:p>
+            <a:pPr lvl="1"/>
+            <a:r>
+              <a:rPr lang="en-US" dirty="0"/>
+              <a:t>01110 AND 00101</a:t>
+            </a:r>
+          </a:p>
+          <a:p>
+            <a:pPr lvl="1"/>
+            <a:r>
+              <a:rPr lang="en-US" b="1" dirty="0"/>
+              <a:t>00100</a:t>
+            </a:r>
+          </a:p>
+          <a:p>
+            <a:pPr marL="514350" indent="-514350">
+              <a:buFont typeface="+mj-lt"/>
+              <a:buAutoNum type="arabicPeriod" startAt="4"/>
+            </a:pPr>
+            <a:r>
+              <a:rPr lang="en-US" dirty="0"/>
+              <a:t>(</a:t>
+            </a:r>
+            <a:r>
+              <a:rPr lang="en-US" dirty="0">
+                <a:solidFill>
+                  <a:schemeClr val="bg1">
+                    <a:lumMod val="50000"/>
+                  </a:schemeClr>
+                </a:solidFill>
+              </a:rPr>
+              <a:t>RCIRC-4</a:t>
+            </a:r>
+            <a:r>
+              <a:rPr lang="en-US" dirty="0"/>
+              <a:t> 10011) </a:t>
+            </a:r>
+            <a:r>
+              <a:rPr lang="en-US" dirty="0">
+                <a:solidFill>
+                  <a:schemeClr val="bg1">
+                    <a:lumMod val="50000"/>
+                  </a:schemeClr>
+                </a:solidFill>
+              </a:rPr>
+              <a:t>OR</a:t>
+            </a:r>
+            <a:r>
+              <a:rPr lang="en-US" dirty="0"/>
+              <a:t> (</a:t>
+            </a:r>
+            <a:r>
+              <a:rPr lang="en-US" dirty="0">
+                <a:solidFill>
+                  <a:schemeClr val="bg1">
+                    <a:lumMod val="50000"/>
+                  </a:schemeClr>
+                </a:solidFill>
+              </a:rPr>
+              <a:t>LSHIFT-1</a:t>
+            </a:r>
+            <a:r>
+              <a:rPr lang="en-US" dirty="0"/>
+              <a:t> 01101)</a:t>
+            </a:r>
+          </a:p>
+          <a:p>
+            <a:pPr lvl="1"/>
+            <a:r>
+              <a:rPr lang="en-US" dirty="0"/>
+              <a:t>00111 OR 11010</a:t>
+            </a:r>
+          </a:p>
+          <a:p>
+            <a:pPr lvl="1"/>
+            <a:r>
+              <a:rPr lang="en-US" b="1" dirty="0"/>
+              <a:t>11111</a:t>
+            </a:r>
+          </a:p>
+          <a:p>
+            <a:endParaRPr lang="en-US" dirty="0"/>
+          </a:p>
+        </p:txBody>
+      </p:sp>
+    </p:spTree>
+    <p:extLst>
+      <p:ext uri="{BB962C8B-B14F-4D97-AF65-F5344CB8AC3E}">
+        <p14:creationId xmlns:p14="http://schemas.microsoft.com/office/powerpoint/2010/main" val="3427507082"/>
+      </p:ext>
+    </p:extLst>
+  </p:cSld>
+  <p:clrMapOvr>
+    <a:masterClrMapping/>
+  </p:clrMapOvr>
+</p:sld>
+</file>
+
+<file path=ppt/slides/slide55.xml><?xml version="1.0" encoding="utf-8"?>
+<p:sld xmlns:a="http://schemas.openxmlformats.org/drawingml/2006/main" xmlns:r="http://schemas.openxmlformats.org/officeDocument/2006/relationships" xmlns:p="http://schemas.openxmlformats.org/presentationml/2006/main">
+  <p:cSld>
+    <p:spTree>
+      <p:nvGrpSpPr>
+        <p:cNvPr id="1" name=""/>
+        <p:cNvGrpSpPr/>
+        <p:nvPr/>
+      </p:nvGrpSpPr>
+      <p:grpSpPr>
+        <a:xfrm>
+          <a:off x="0" y="0"/>
+          <a:ext cx="0" cy="0"/>
+          <a:chOff x="0" y="0"/>
+          <a:chExt cx="0" cy="0"/>
+        </a:xfrm>
+      </p:grpSpPr>
+      <p:sp>
+        <p:nvSpPr>
+          <p:cNvPr id="2" name="Title 1">
+            <a:extLst>
+              <a:ext uri="{FF2B5EF4-FFF2-40B4-BE49-F238E27FC236}">
+                <a16:creationId xmlns:a16="http://schemas.microsoft.com/office/drawing/2014/main" id="{7ED75B44-46CD-74DE-1EC2-6C3ABA92D13F}"/>
+              </a:ext>
+            </a:extLst>
+          </p:cNvPr>
+          <p:cNvSpPr>
+            <a:spLocks noGrp="1"/>
+          </p:cNvSpPr>
+          <p:nvPr>
+            <p:ph type="title"/>
+          </p:nvPr>
+        </p:nvSpPr>
+        <p:spPr/>
+        <p:txBody>
+          <a:bodyPr/>
+          <a:lstStyle/>
+          <a:p>
+            <a:endParaRPr lang="en-US"/>
+          </a:p>
+        </p:txBody>
+      </p:sp>
+      <p:sp>
+        <p:nvSpPr>
+          <p:cNvPr id="3" name="Content Placeholder 2">
+            <a:extLst>
+              <a:ext uri="{FF2B5EF4-FFF2-40B4-BE49-F238E27FC236}">
+                <a16:creationId xmlns:a16="http://schemas.microsoft.com/office/drawing/2014/main" id="{85EA9FC4-3A4E-8667-749A-CA557659A321}"/>
+              </a:ext>
+            </a:extLst>
+          </p:cNvPr>
+          <p:cNvSpPr>
+            <a:spLocks noGrp="1"/>
+          </p:cNvSpPr>
+          <p:nvPr>
+            <p:ph idx="1"/>
+          </p:nvPr>
+        </p:nvSpPr>
+        <p:spPr/>
+        <p:txBody>
+          <a:bodyPr/>
+          <a:lstStyle/>
+          <a:p>
+            <a:pPr marL="514350" indent="-514350">
+              <a:buFont typeface="+mj-lt"/>
+              <a:buAutoNum type="arabicPeriod" startAt="7"/>
+            </a:pPr>
+            <a:r>
+              <a:rPr lang="en-US" dirty="0"/>
+              <a:t>(</a:t>
+            </a:r>
+            <a:r>
+              <a:rPr lang="en-US" dirty="0">
+                <a:solidFill>
+                  <a:schemeClr val="bg1">
+                    <a:lumMod val="50000"/>
+                  </a:schemeClr>
+                </a:solidFill>
+              </a:rPr>
+              <a:t>RSHIFT-3</a:t>
+            </a:r>
+            <a:r>
+              <a:rPr lang="en-US" dirty="0"/>
+              <a:t> 11110) </a:t>
+            </a:r>
+            <a:r>
+              <a:rPr lang="en-US" dirty="0">
+                <a:solidFill>
+                  <a:schemeClr val="bg1">
+                    <a:lumMod val="50000"/>
+                  </a:schemeClr>
+                </a:solidFill>
+              </a:rPr>
+              <a:t>AND</a:t>
+            </a:r>
+            <a:r>
+              <a:rPr lang="en-US" dirty="0"/>
+              <a:t> (</a:t>
+            </a:r>
+            <a:r>
+              <a:rPr lang="en-US" dirty="0">
+                <a:solidFill>
+                  <a:schemeClr val="bg1">
+                    <a:lumMod val="50000"/>
+                  </a:schemeClr>
+                </a:solidFill>
+              </a:rPr>
+              <a:t>LCIRC-1</a:t>
+            </a:r>
+            <a:r>
+              <a:rPr lang="en-US" dirty="0"/>
+              <a:t> 00111) </a:t>
+            </a:r>
+            <a:r>
+              <a:rPr lang="en-US" dirty="0">
+                <a:solidFill>
+                  <a:schemeClr val="bg1">
+                    <a:lumMod val="50000"/>
+                  </a:schemeClr>
+                </a:solidFill>
+              </a:rPr>
+              <a:t>OR</a:t>
+            </a:r>
+            <a:r>
+              <a:rPr lang="en-US" dirty="0"/>
+              <a:t> (</a:t>
+            </a:r>
+            <a:r>
+              <a:rPr lang="en-US" dirty="0">
+                <a:solidFill>
+                  <a:schemeClr val="bg1">
+                    <a:lumMod val="50000"/>
+                  </a:schemeClr>
+                </a:solidFill>
+              </a:rPr>
+              <a:t>LSHIFT-2</a:t>
+            </a:r>
+            <a:r>
+              <a:rPr lang="en-US" dirty="0"/>
+              <a:t> 01010)</a:t>
+            </a:r>
+          </a:p>
+          <a:p>
+            <a:pPr lvl="1"/>
+            <a:r>
+              <a:rPr lang="en-US" dirty="0"/>
+              <a:t>00011 AND 01110 OR (01000)</a:t>
+            </a:r>
+          </a:p>
+          <a:p>
+            <a:pPr lvl="1"/>
+            <a:r>
+              <a:rPr lang="en-US" dirty="0"/>
+              <a:t>00010 OR 01000</a:t>
+            </a:r>
+          </a:p>
+          <a:p>
+            <a:pPr lvl="1"/>
+            <a:r>
+              <a:rPr lang="en-US" b="1" dirty="0"/>
+              <a:t>01010</a:t>
+            </a:r>
+          </a:p>
+          <a:p>
+            <a:pPr marL="514350" indent="-514350">
+              <a:buFont typeface="+mj-lt"/>
+              <a:buAutoNum type="arabicPeriod" startAt="7"/>
+            </a:pPr>
+            <a:r>
+              <a:rPr lang="en-US" dirty="0"/>
+              <a:t>(</a:t>
+            </a:r>
+            <a:r>
+              <a:rPr lang="en-US" dirty="0">
+                <a:solidFill>
+                  <a:schemeClr val="bg1">
+                    <a:lumMod val="50000"/>
+                  </a:schemeClr>
+                </a:solidFill>
+              </a:rPr>
+              <a:t>LSHIFT-2</a:t>
+            </a:r>
+            <a:r>
+              <a:rPr lang="en-US" dirty="0"/>
+              <a:t> 01101) </a:t>
+            </a:r>
+            <a:r>
+              <a:rPr lang="en-US" dirty="0">
+                <a:solidFill>
+                  <a:schemeClr val="bg1">
+                    <a:lumMod val="50000"/>
+                  </a:schemeClr>
+                </a:solidFill>
+              </a:rPr>
+              <a:t>OR</a:t>
+            </a:r>
+            <a:r>
+              <a:rPr lang="en-US" dirty="0"/>
+              <a:t> (</a:t>
+            </a:r>
+            <a:r>
+              <a:rPr lang="en-US" dirty="0">
+                <a:solidFill>
+                  <a:schemeClr val="bg1">
+                    <a:lumMod val="50000"/>
+                  </a:schemeClr>
+                </a:solidFill>
+              </a:rPr>
+              <a:t>RCIRC-3</a:t>
+            </a:r>
+            <a:r>
+              <a:rPr lang="en-US" dirty="0"/>
+              <a:t> 10110) </a:t>
+            </a:r>
+            <a:r>
+              <a:rPr lang="en-US" dirty="0">
+                <a:solidFill>
+                  <a:schemeClr val="bg1">
+                    <a:lumMod val="50000"/>
+                  </a:schemeClr>
+                </a:solidFill>
+              </a:rPr>
+              <a:t>AND</a:t>
+            </a:r>
+            <a:r>
+              <a:rPr lang="en-US" dirty="0"/>
+              <a:t> (</a:t>
+            </a:r>
+            <a:r>
+              <a:rPr lang="en-US" dirty="0">
+                <a:solidFill>
+                  <a:schemeClr val="bg1">
+                    <a:lumMod val="50000"/>
+                  </a:schemeClr>
+                </a:solidFill>
+              </a:rPr>
+              <a:t>RSHIFT-1</a:t>
+            </a:r>
+            <a:r>
+              <a:rPr lang="en-US" dirty="0"/>
+              <a:t> 11011)</a:t>
+            </a:r>
+          </a:p>
+          <a:p>
+            <a:pPr lvl="1"/>
+            <a:r>
+              <a:rPr lang="en-US" dirty="0"/>
+              <a:t>11010 OR 11010 AND 01101</a:t>
+            </a:r>
+          </a:p>
+          <a:p>
+            <a:pPr lvl="1"/>
+            <a:r>
+              <a:rPr lang="en-US" dirty="0"/>
+              <a:t>11010 OR 01000</a:t>
+            </a:r>
+          </a:p>
+          <a:p>
+            <a:pPr lvl="1"/>
+            <a:r>
+              <a:rPr lang="en-US" b="1" dirty="0"/>
+              <a:t>11010</a:t>
+            </a:r>
+          </a:p>
+        </p:txBody>
+      </p:sp>
+    </p:spTree>
+    <p:extLst>
+      <p:ext uri="{BB962C8B-B14F-4D97-AF65-F5344CB8AC3E}">
+        <p14:creationId xmlns:p14="http://schemas.microsoft.com/office/powerpoint/2010/main" val="2930346915"/>
       </p:ext>
     </p:extLst>
   </p:cSld>

</xml_diff>

<commit_message>
What does this program do?
</commit_message>
<xml_diff>
--- a/all/ExploringCSConceptsViaACSLCompetitions_all.pptx
+++ b/all/ExploringCSConceptsViaACSLCompetitions_all.pptx
@@ -5,7 +5,7 @@
     <p:sldMasterId id="2147483648" r:id="rId1"/>
   </p:sldMasterIdLst>
   <p:notesMasterIdLst>
-    <p:notesMasterId r:id="rId57"/>
+    <p:notesMasterId r:id="rId71"/>
   </p:notesMasterIdLst>
   <p:sldIdLst>
     <p:sldId id="256" r:id="rId2"/>
@@ -63,6 +63,20 @@
     <p:sldId id="318" r:id="rId54"/>
     <p:sldId id="319" r:id="rId55"/>
     <p:sldId id="320" r:id="rId56"/>
+    <p:sldId id="321" r:id="rId57"/>
+    <p:sldId id="329" r:id="rId58"/>
+    <p:sldId id="322" r:id="rId59"/>
+    <p:sldId id="330" r:id="rId60"/>
+    <p:sldId id="323" r:id="rId61"/>
+    <p:sldId id="331" r:id="rId62"/>
+    <p:sldId id="324" r:id="rId63"/>
+    <p:sldId id="332" r:id="rId64"/>
+    <p:sldId id="326" r:id="rId65"/>
+    <p:sldId id="333" r:id="rId66"/>
+    <p:sldId id="327" r:id="rId67"/>
+    <p:sldId id="334" r:id="rId68"/>
+    <p:sldId id="328" r:id="rId69"/>
+    <p:sldId id="335" r:id="rId70"/>
   </p:sldIdLst>
   <p:sldSz cx="12192000" cy="6858000"/>
   <p:notesSz cx="6858000" cy="9144000"/>
@@ -440,7 +454,7 @@
           <a:p>
             <a:fld id="{15653688-98A8-4F3B-A740-8E6568AE1BCB}" type="datetimeFigureOut">
               <a:rPr lang="en-US" smtClean="0"/>
-              <a:t>2/2/2026</a:t>
+              <a:t>2/5/2026</a:t>
             </a:fld>
             <a:endParaRPr lang="en-US"/>
           </a:p>
@@ -899,6 +913,100 @@
 </p:notes>
 </file>
 
+<file path=ppt/notesSlides/notesSlide3.xml><?xml version="1.0" encoding="utf-8"?>
+<p:notes xmlns:a="http://schemas.openxmlformats.org/drawingml/2006/main" xmlns:r="http://schemas.openxmlformats.org/officeDocument/2006/relationships" xmlns:p="http://schemas.openxmlformats.org/presentationml/2006/main">
+  <p:cSld>
+    <p:spTree>
+      <p:nvGrpSpPr>
+        <p:cNvPr id="1" name=""/>
+        <p:cNvGrpSpPr/>
+        <p:nvPr/>
+      </p:nvGrpSpPr>
+      <p:grpSpPr>
+        <a:xfrm>
+          <a:off x="0" y="0"/>
+          <a:ext cx="0" cy="0"/>
+          <a:chOff x="0" y="0"/>
+          <a:chExt cx="0" cy="0"/>
+        </a:xfrm>
+      </p:grpSpPr>
+      <p:sp>
+        <p:nvSpPr>
+          <p:cNvPr id="2" name="Slide Image Placeholder 1"/>
+          <p:cNvSpPr>
+            <a:spLocks noGrp="1" noRot="1" noChangeAspect="1"/>
+          </p:cNvSpPr>
+          <p:nvPr>
+            <p:ph type="sldImg"/>
+          </p:nvPr>
+        </p:nvSpPr>
+        <p:spPr/>
+      </p:sp>
+      <p:sp>
+        <p:nvSpPr>
+          <p:cNvPr id="3" name="Notes Placeholder 2"/>
+          <p:cNvSpPr>
+            <a:spLocks noGrp="1"/>
+          </p:cNvSpPr>
+          <p:nvPr>
+            <p:ph type="body" idx="1"/>
+          </p:nvPr>
+        </p:nvSpPr>
+        <p:spPr/>
+        <p:txBody>
+          <a:bodyPr/>
+          <a:lstStyle/>
+          <a:p>
+            <a:r>
+              <a:rPr lang="en-US" dirty="0"/>
+              <a:t>2, 3 have outputs</a:t>
+            </a:r>
+            <a:br>
+              <a:rPr lang="en-US" dirty="0"/>
+            </a:br>
+            <a:r>
+              <a:rPr lang="en-US" dirty="0"/>
+              <a:t>4,5,6 don’t </a:t>
+            </a:r>
+          </a:p>
+        </p:txBody>
+      </p:sp>
+      <p:sp>
+        <p:nvSpPr>
+          <p:cNvPr id="4" name="Slide Number Placeholder 3"/>
+          <p:cNvSpPr>
+            <a:spLocks noGrp="1"/>
+          </p:cNvSpPr>
+          <p:nvPr>
+            <p:ph type="sldNum" sz="quarter" idx="5"/>
+          </p:nvPr>
+        </p:nvSpPr>
+        <p:spPr/>
+        <p:txBody>
+          <a:bodyPr/>
+          <a:lstStyle/>
+          <a:p>
+            <a:fld id="{24216765-C83A-46F1-AE07-8E4F9D1EDA94}" type="slidenum">
+              <a:rPr lang="en-US" smtClean="0"/>
+              <a:t>56</a:t>
+            </a:fld>
+            <a:endParaRPr lang="en-US"/>
+          </a:p>
+        </p:txBody>
+      </p:sp>
+    </p:spTree>
+    <p:extLst>
+      <p:ext uri="{BB962C8B-B14F-4D97-AF65-F5344CB8AC3E}">
+        <p14:creationId xmlns:p14="http://schemas.microsoft.com/office/powerpoint/2010/main" val="303176474"/>
+      </p:ext>
+    </p:extLst>
+  </p:cSld>
+  <p:clrMapOvr>
+    <a:masterClrMapping/>
+  </p:clrMapOvr>
+</p:notes>
+</file>
+
 <file path=ppt/slideLayouts/slideLayout1.xml><?xml version="1.0" encoding="utf-8"?>
 <p:sldLayout xmlns:a="http://schemas.openxmlformats.org/drawingml/2006/main" xmlns:r="http://schemas.openxmlformats.org/officeDocument/2006/relationships" xmlns:p="http://schemas.openxmlformats.org/presentationml/2006/main" type="title" preserve="1">
   <p:cSld name="Title Slide">
@@ -1046,7 +1154,7 @@
           <a:p>
             <a:fld id="{20CB266D-A331-4A79-AB46-FEF40B16CF9B}" type="datetimeFigureOut">
               <a:rPr lang="en-US" smtClean="0"/>
-              <a:t>2/2/2026</a:t>
+              <a:t>2/5/2026</a:t>
             </a:fld>
             <a:endParaRPr lang="en-US"/>
           </a:p>
@@ -1244,7 +1352,7 @@
           <a:p>
             <a:fld id="{20CB266D-A331-4A79-AB46-FEF40B16CF9B}" type="datetimeFigureOut">
               <a:rPr lang="en-US" smtClean="0"/>
-              <a:t>2/2/2026</a:t>
+              <a:t>2/5/2026</a:t>
             </a:fld>
             <a:endParaRPr lang="en-US"/>
           </a:p>
@@ -1452,7 +1560,7 @@
           <a:p>
             <a:fld id="{20CB266D-A331-4A79-AB46-FEF40B16CF9B}" type="datetimeFigureOut">
               <a:rPr lang="en-US" smtClean="0"/>
-              <a:t>2/2/2026</a:t>
+              <a:t>2/5/2026</a:t>
             </a:fld>
             <a:endParaRPr lang="en-US"/>
           </a:p>
@@ -1650,7 +1758,7 @@
           <a:p>
             <a:fld id="{20CB266D-A331-4A79-AB46-FEF40B16CF9B}" type="datetimeFigureOut">
               <a:rPr lang="en-US" smtClean="0"/>
-              <a:t>2/2/2026</a:t>
+              <a:t>2/5/2026</a:t>
             </a:fld>
             <a:endParaRPr lang="en-US"/>
           </a:p>
@@ -1925,7 +2033,7 @@
           <a:p>
             <a:fld id="{20CB266D-A331-4A79-AB46-FEF40B16CF9B}" type="datetimeFigureOut">
               <a:rPr lang="en-US" smtClean="0"/>
-              <a:t>2/2/2026</a:t>
+              <a:t>2/5/2026</a:t>
             </a:fld>
             <a:endParaRPr lang="en-US"/>
           </a:p>
@@ -2190,7 +2298,7 @@
           <a:p>
             <a:fld id="{20CB266D-A331-4A79-AB46-FEF40B16CF9B}" type="datetimeFigureOut">
               <a:rPr lang="en-US" smtClean="0"/>
-              <a:t>2/2/2026</a:t>
+              <a:t>2/5/2026</a:t>
             </a:fld>
             <a:endParaRPr lang="en-US"/>
           </a:p>
@@ -2602,7 +2710,7 @@
           <a:p>
             <a:fld id="{20CB266D-A331-4A79-AB46-FEF40B16CF9B}" type="datetimeFigureOut">
               <a:rPr lang="en-US" smtClean="0"/>
-              <a:t>2/2/2026</a:t>
+              <a:t>2/5/2026</a:t>
             </a:fld>
             <a:endParaRPr lang="en-US"/>
           </a:p>
@@ -2743,7 +2851,7 @@
           <a:p>
             <a:fld id="{20CB266D-A331-4A79-AB46-FEF40B16CF9B}" type="datetimeFigureOut">
               <a:rPr lang="en-US" smtClean="0"/>
-              <a:t>2/2/2026</a:t>
+              <a:t>2/5/2026</a:t>
             </a:fld>
             <a:endParaRPr lang="en-US"/>
           </a:p>
@@ -2856,7 +2964,7 @@
           <a:p>
             <a:fld id="{20CB266D-A331-4A79-AB46-FEF40B16CF9B}" type="datetimeFigureOut">
               <a:rPr lang="en-US" smtClean="0"/>
-              <a:t>2/2/2026</a:t>
+              <a:t>2/5/2026</a:t>
             </a:fld>
             <a:endParaRPr lang="en-US"/>
           </a:p>
@@ -3167,7 +3275,7 @@
           <a:p>
             <a:fld id="{20CB266D-A331-4A79-AB46-FEF40B16CF9B}" type="datetimeFigureOut">
               <a:rPr lang="en-US" smtClean="0"/>
-              <a:t>2/2/2026</a:t>
+              <a:t>2/5/2026</a:t>
             </a:fld>
             <a:endParaRPr lang="en-US"/>
           </a:p>
@@ -3455,7 +3563,7 @@
           <a:p>
             <a:fld id="{20CB266D-A331-4A79-AB46-FEF40B16CF9B}" type="datetimeFigureOut">
               <a:rPr lang="en-US" smtClean="0"/>
-              <a:t>2/2/2026</a:t>
+              <a:t>2/5/2026</a:t>
             </a:fld>
             <a:endParaRPr lang="en-US"/>
           </a:p>
@@ -3696,7 +3804,7 @@
           <a:p>
             <a:fld id="{20CB266D-A331-4A79-AB46-FEF40B16CF9B}" type="datetimeFigureOut">
               <a:rPr lang="en-US" smtClean="0"/>
-              <a:t>2/2/2026</a:t>
+              <a:t>2/5/2026</a:t>
             </a:fld>
             <a:endParaRPr lang="en-US"/>
           </a:p>
@@ -22533,6 +22641,954 @@
 </p:sld>
 </file>
 
+<file path=ppt/slides/slide56.xml><?xml version="1.0" encoding="utf-8"?>
+<p:sld xmlns:a="http://schemas.openxmlformats.org/drawingml/2006/main" xmlns:r="http://schemas.openxmlformats.org/officeDocument/2006/relationships" xmlns:p="http://schemas.openxmlformats.org/presentationml/2006/main">
+  <p:cSld>
+    <p:spTree>
+      <p:nvGrpSpPr>
+        <p:cNvPr id="1" name=""/>
+        <p:cNvGrpSpPr/>
+        <p:nvPr/>
+      </p:nvGrpSpPr>
+      <p:grpSpPr>
+        <a:xfrm>
+          <a:off x="0" y="0"/>
+          <a:ext cx="0" cy="0"/>
+          <a:chOff x="0" y="0"/>
+          <a:chExt cx="0" cy="0"/>
+        </a:xfrm>
+      </p:grpSpPr>
+      <p:sp>
+        <p:nvSpPr>
+          <p:cNvPr id="2" name="Title 1">
+            <a:extLst>
+              <a:ext uri="{FF2B5EF4-FFF2-40B4-BE49-F238E27FC236}">
+                <a16:creationId xmlns:a16="http://schemas.microsoft.com/office/drawing/2014/main" id="{E94E72D7-0D7A-A4BC-D0BB-73DEB229824E}"/>
+              </a:ext>
+            </a:extLst>
+          </p:cNvPr>
+          <p:cNvSpPr>
+            <a:spLocks noGrp="1"/>
+          </p:cNvSpPr>
+          <p:nvPr>
+            <p:ph type="title"/>
+          </p:nvPr>
+        </p:nvSpPr>
+        <p:spPr/>
+        <p:txBody>
+          <a:bodyPr/>
+          <a:lstStyle/>
+          <a:p>
+            <a:r>
+              <a:rPr lang="en-US" dirty="0"/>
+              <a:t>What does this Program do ? Q1.</a:t>
+            </a:r>
+          </a:p>
+        </p:txBody>
+      </p:sp>
+      <p:pic>
+        <p:nvPicPr>
+          <p:cNvPr id="9" name="Content Placeholder 8">
+            <a:extLst>
+              <a:ext uri="{FF2B5EF4-FFF2-40B4-BE49-F238E27FC236}">
+                <a16:creationId xmlns:a16="http://schemas.microsoft.com/office/drawing/2014/main" id="{D221D368-6BAD-6E79-AA4D-81A97D91F45C}"/>
+              </a:ext>
+            </a:extLst>
+          </p:cNvPr>
+          <p:cNvPicPr>
+            <a:picLocks noGrp="1" noChangeAspect="1"/>
+          </p:cNvPicPr>
+          <p:nvPr>
+            <p:ph idx="1"/>
+          </p:nvPr>
+        </p:nvPicPr>
+        <p:blipFill>
+          <a:blip r:embed="rId3"/>
+          <a:stretch>
+            <a:fillRect/>
+          </a:stretch>
+        </p:blipFill>
+        <p:spPr>
+          <a:xfrm>
+            <a:off x="1118414" y="1690688"/>
+            <a:ext cx="4367986" cy="4220906"/>
+          </a:xfrm>
+        </p:spPr>
+      </p:pic>
+    </p:spTree>
+    <p:extLst>
+      <p:ext uri="{BB962C8B-B14F-4D97-AF65-F5344CB8AC3E}">
+        <p14:creationId xmlns:p14="http://schemas.microsoft.com/office/powerpoint/2010/main" val="1366029758"/>
+      </p:ext>
+    </p:extLst>
+  </p:cSld>
+  <p:clrMapOvr>
+    <a:masterClrMapping/>
+  </p:clrMapOvr>
+</p:sld>
+</file>
+
+<file path=ppt/slides/slide57.xml><?xml version="1.0" encoding="utf-8"?>
+<p:sld xmlns:a="http://schemas.openxmlformats.org/drawingml/2006/main" xmlns:r="http://schemas.openxmlformats.org/officeDocument/2006/relationships" xmlns:p="http://schemas.openxmlformats.org/presentationml/2006/main">
+  <p:cSld>
+    <p:spTree>
+      <p:nvGrpSpPr>
+        <p:cNvPr id="1" name="">
+          <a:extLst>
+            <a:ext uri="{FF2B5EF4-FFF2-40B4-BE49-F238E27FC236}">
+              <a16:creationId xmlns:a16="http://schemas.microsoft.com/office/drawing/2014/main" id="{2F11F38E-FE26-1480-0E2C-4C0A63BA2042}"/>
+            </a:ext>
+          </a:extLst>
+        </p:cNvPr>
+        <p:cNvGrpSpPr/>
+        <p:nvPr/>
+      </p:nvGrpSpPr>
+      <p:grpSpPr>
+        <a:xfrm>
+          <a:off x="0" y="0"/>
+          <a:ext cx="0" cy="0"/>
+          <a:chOff x="0" y="0"/>
+          <a:chExt cx="0" cy="0"/>
+        </a:xfrm>
+      </p:grpSpPr>
+      <p:sp>
+        <p:nvSpPr>
+          <p:cNvPr id="2" name="Title 1">
+            <a:extLst>
+              <a:ext uri="{FF2B5EF4-FFF2-40B4-BE49-F238E27FC236}">
+                <a16:creationId xmlns:a16="http://schemas.microsoft.com/office/drawing/2014/main" id="{FD591228-AC4D-366F-3D99-F517F0A72654}"/>
+              </a:ext>
+            </a:extLst>
+          </p:cNvPr>
+          <p:cNvSpPr>
+            <a:spLocks noGrp="1"/>
+          </p:cNvSpPr>
+          <p:nvPr>
+            <p:ph type="title"/>
+          </p:nvPr>
+        </p:nvSpPr>
+        <p:spPr/>
+        <p:txBody>
+          <a:bodyPr/>
+          <a:lstStyle/>
+          <a:p>
+            <a:r>
+              <a:rPr lang="en-US" dirty="0"/>
+              <a:t>What does this Program do ? A1.</a:t>
+            </a:r>
+          </a:p>
+        </p:txBody>
+      </p:sp>
+      <p:sp>
+        <p:nvSpPr>
+          <p:cNvPr id="7" name="Content Placeholder 6">
+            <a:extLst>
+              <a:ext uri="{FF2B5EF4-FFF2-40B4-BE49-F238E27FC236}">
+                <a16:creationId xmlns:a16="http://schemas.microsoft.com/office/drawing/2014/main" id="{D1D49E56-D5D1-6578-D76A-29A85AAE673F}"/>
+              </a:ext>
+            </a:extLst>
+          </p:cNvPr>
+          <p:cNvSpPr>
+            <a:spLocks noGrp="1"/>
+          </p:cNvSpPr>
+          <p:nvPr>
+            <p:ph idx="1"/>
+          </p:nvPr>
+        </p:nvSpPr>
+        <p:spPr>
+          <a:xfrm>
+            <a:off x="783490" y="1777399"/>
+            <a:ext cx="10515600" cy="4351338"/>
+          </a:xfrm>
+        </p:spPr>
+        <p:txBody>
+          <a:bodyPr>
+            <a:normAutofit fontScale="85000" lnSpcReduction="20000"/>
+          </a:bodyPr>
+          <a:lstStyle/>
+          <a:p>
+            <a:r>
+              <a:rPr lang="en-US" dirty="0"/>
+              <a:t>i = 2 </a:t>
+            </a:r>
+          </a:p>
+          <a:p>
+            <a:pPr lvl="1"/>
+            <a:r>
+              <a:rPr lang="en-US" dirty="0"/>
+              <a:t>num = 72</a:t>
+            </a:r>
+          </a:p>
+          <a:p>
+            <a:pPr lvl="1"/>
+            <a:r>
+              <a:rPr lang="en-US" dirty="0"/>
+              <a:t>72 % 2 == 0 → yes</a:t>
+            </a:r>
+          </a:p>
+          <a:p>
+            <a:pPr lvl="2"/>
+            <a:r>
+              <a:rPr lang="en-US" dirty="0"/>
+              <a:t>num = 36, count = 1</a:t>
+            </a:r>
+          </a:p>
+          <a:p>
+            <a:pPr lvl="1"/>
+            <a:r>
+              <a:rPr lang="en-US" dirty="0"/>
+              <a:t>36 % 2 == 0 → yes</a:t>
+            </a:r>
+          </a:p>
+          <a:p>
+            <a:pPr lvl="2"/>
+            <a:r>
+              <a:rPr lang="en-US" dirty="0"/>
+              <a:t>num = 18, count = 2</a:t>
+            </a:r>
+          </a:p>
+          <a:p>
+            <a:pPr lvl="1"/>
+            <a:r>
+              <a:rPr lang="en-US" dirty="0"/>
+              <a:t>18 % 2 == 0 → yes</a:t>
+            </a:r>
+          </a:p>
+          <a:p>
+            <a:pPr lvl="2"/>
+            <a:r>
+              <a:rPr lang="en-US" dirty="0"/>
+              <a:t>num = 9, count = 3</a:t>
+            </a:r>
+          </a:p>
+          <a:p>
+            <a:pPr lvl="1"/>
+            <a:r>
+              <a:rPr lang="en-US" dirty="0"/>
+              <a:t>9 % 2 != 0 → stop</a:t>
+            </a:r>
+          </a:p>
+          <a:p>
+            <a:pPr lvl="1"/>
+            <a:r>
+              <a:rPr lang="en-US" dirty="0"/>
+              <a:t>output → 2 3</a:t>
+            </a:r>
+          </a:p>
+          <a:p>
+            <a:r>
+              <a:rPr lang="en-US" dirty="0"/>
+              <a:t>I =3 </a:t>
+            </a:r>
+          </a:p>
+          <a:p>
+            <a:pPr lvl="1"/>
+            <a:r>
+              <a:rPr lang="en-US" dirty="0"/>
+              <a:t>output → 3 2</a:t>
+            </a:r>
+          </a:p>
+          <a:p>
+            <a:r>
+              <a:rPr lang="en-US" dirty="0"/>
+              <a:t>I = 4 ,5, 6</a:t>
+            </a:r>
+          </a:p>
+          <a:p>
+            <a:pPr lvl="1"/>
+            <a:r>
+              <a:rPr lang="en-US" dirty="0"/>
+              <a:t>num = 1  ( not divisible by any)</a:t>
+            </a:r>
+          </a:p>
+          <a:p>
+            <a:pPr lvl="1"/>
+            <a:r>
+              <a:rPr lang="en-US" dirty="0"/>
+              <a:t>no output</a:t>
+            </a:r>
+          </a:p>
+          <a:p>
+            <a:pPr lvl="1"/>
+            <a:endParaRPr lang="en-US" dirty="0"/>
+          </a:p>
+        </p:txBody>
+      </p:sp>
+      <p:pic>
+        <p:nvPicPr>
+          <p:cNvPr id="8" name="Content Placeholder 8">
+            <a:extLst>
+              <a:ext uri="{FF2B5EF4-FFF2-40B4-BE49-F238E27FC236}">
+                <a16:creationId xmlns:a16="http://schemas.microsoft.com/office/drawing/2014/main" id="{2E061E9E-3254-CD26-4930-FE889E90EF52}"/>
+              </a:ext>
+            </a:extLst>
+          </p:cNvPr>
+          <p:cNvPicPr>
+            <a:picLocks noChangeAspect="1"/>
+          </p:cNvPicPr>
+          <p:nvPr/>
+        </p:nvPicPr>
+        <p:blipFill>
+          <a:blip r:embed="rId2"/>
+          <a:stretch>
+            <a:fillRect/>
+          </a:stretch>
+        </p:blipFill>
+        <p:spPr>
+          <a:xfrm>
+            <a:off x="7040524" y="1777399"/>
+            <a:ext cx="4367986" cy="4220906"/>
+          </a:xfrm>
+          <a:prstGeom prst="rect">
+            <a:avLst/>
+          </a:prstGeom>
+        </p:spPr>
+      </p:pic>
+    </p:spTree>
+    <p:extLst>
+      <p:ext uri="{BB962C8B-B14F-4D97-AF65-F5344CB8AC3E}">
+        <p14:creationId xmlns:p14="http://schemas.microsoft.com/office/powerpoint/2010/main" val="2555399279"/>
+      </p:ext>
+    </p:extLst>
+  </p:cSld>
+  <p:clrMapOvr>
+    <a:masterClrMapping/>
+  </p:clrMapOvr>
+</p:sld>
+</file>
+
+<file path=ppt/slides/slide58.xml><?xml version="1.0" encoding="utf-8"?>
+<p:sld xmlns:a="http://schemas.openxmlformats.org/drawingml/2006/main" xmlns:r="http://schemas.openxmlformats.org/officeDocument/2006/relationships" xmlns:p="http://schemas.openxmlformats.org/presentationml/2006/main">
+  <p:cSld>
+    <p:spTree>
+      <p:nvGrpSpPr>
+        <p:cNvPr id="1" name=""/>
+        <p:cNvGrpSpPr/>
+        <p:nvPr/>
+      </p:nvGrpSpPr>
+      <p:grpSpPr>
+        <a:xfrm>
+          <a:off x="0" y="0"/>
+          <a:ext cx="0" cy="0"/>
+          <a:chOff x="0" y="0"/>
+          <a:chExt cx="0" cy="0"/>
+        </a:xfrm>
+      </p:grpSpPr>
+      <p:sp>
+        <p:nvSpPr>
+          <p:cNvPr id="2" name="Title 1">
+            <a:extLst>
+              <a:ext uri="{FF2B5EF4-FFF2-40B4-BE49-F238E27FC236}">
+                <a16:creationId xmlns:a16="http://schemas.microsoft.com/office/drawing/2014/main" id="{FD919F7C-64A8-6BBF-B7BD-831EE93538D0}"/>
+              </a:ext>
+            </a:extLst>
+          </p:cNvPr>
+          <p:cNvSpPr>
+            <a:spLocks noGrp="1"/>
+          </p:cNvSpPr>
+          <p:nvPr>
+            <p:ph type="title"/>
+          </p:nvPr>
+        </p:nvSpPr>
+        <p:spPr/>
+        <p:txBody>
+          <a:bodyPr/>
+          <a:lstStyle/>
+          <a:p>
+            <a:r>
+              <a:rPr lang="en-US" dirty="0"/>
+              <a:t>What does this Program do ? Q2.</a:t>
+            </a:r>
+          </a:p>
+        </p:txBody>
+      </p:sp>
+      <p:pic>
+        <p:nvPicPr>
+          <p:cNvPr id="7" name="Content Placeholder 6">
+            <a:extLst>
+              <a:ext uri="{FF2B5EF4-FFF2-40B4-BE49-F238E27FC236}">
+                <a16:creationId xmlns:a16="http://schemas.microsoft.com/office/drawing/2014/main" id="{CB231ECF-E15A-8953-C520-04A6C2401B6D}"/>
+              </a:ext>
+            </a:extLst>
+          </p:cNvPr>
+          <p:cNvPicPr>
+            <a:picLocks noGrp="1" noChangeAspect="1"/>
+          </p:cNvPicPr>
+          <p:nvPr>
+            <p:ph idx="1"/>
+          </p:nvPr>
+        </p:nvPicPr>
+        <p:blipFill>
+          <a:blip r:embed="rId2"/>
+          <a:stretch>
+            <a:fillRect/>
+          </a:stretch>
+        </p:blipFill>
+        <p:spPr>
+          <a:xfrm>
+            <a:off x="1024692" y="2030998"/>
+            <a:ext cx="5260464" cy="3455402"/>
+          </a:xfrm>
+        </p:spPr>
+      </p:pic>
+    </p:spTree>
+    <p:extLst>
+      <p:ext uri="{BB962C8B-B14F-4D97-AF65-F5344CB8AC3E}">
+        <p14:creationId xmlns:p14="http://schemas.microsoft.com/office/powerpoint/2010/main" val="220731870"/>
+      </p:ext>
+    </p:extLst>
+  </p:cSld>
+  <p:clrMapOvr>
+    <a:masterClrMapping/>
+  </p:clrMapOvr>
+</p:sld>
+</file>
+
+<file path=ppt/slides/slide59.xml><?xml version="1.0" encoding="utf-8"?>
+<p:sld xmlns:a="http://schemas.openxmlformats.org/drawingml/2006/main" xmlns:r="http://schemas.openxmlformats.org/officeDocument/2006/relationships" xmlns:p="http://schemas.openxmlformats.org/presentationml/2006/main">
+  <p:cSld>
+    <p:spTree>
+      <p:nvGrpSpPr>
+        <p:cNvPr id="1" name="">
+          <a:extLst>
+            <a:ext uri="{FF2B5EF4-FFF2-40B4-BE49-F238E27FC236}">
+              <a16:creationId xmlns:a16="http://schemas.microsoft.com/office/drawing/2014/main" id="{594CE9ED-6524-DC6A-EE50-03751C9CCBDE}"/>
+            </a:ext>
+          </a:extLst>
+        </p:cNvPr>
+        <p:cNvGrpSpPr/>
+        <p:nvPr/>
+      </p:nvGrpSpPr>
+      <p:grpSpPr>
+        <a:xfrm>
+          <a:off x="0" y="0"/>
+          <a:ext cx="0" cy="0"/>
+          <a:chOff x="0" y="0"/>
+          <a:chExt cx="0" cy="0"/>
+        </a:xfrm>
+      </p:grpSpPr>
+      <p:sp>
+        <p:nvSpPr>
+          <p:cNvPr id="2" name="Title 1">
+            <a:extLst>
+              <a:ext uri="{FF2B5EF4-FFF2-40B4-BE49-F238E27FC236}">
+                <a16:creationId xmlns:a16="http://schemas.microsoft.com/office/drawing/2014/main" id="{98BB9C47-A844-8024-1E13-0A333A267FC2}"/>
+              </a:ext>
+            </a:extLst>
+          </p:cNvPr>
+          <p:cNvSpPr>
+            <a:spLocks noGrp="1"/>
+          </p:cNvSpPr>
+          <p:nvPr>
+            <p:ph type="title"/>
+          </p:nvPr>
+        </p:nvSpPr>
+        <p:spPr/>
+        <p:txBody>
+          <a:bodyPr/>
+          <a:lstStyle/>
+          <a:p>
+            <a:r>
+              <a:rPr lang="en-US" dirty="0"/>
+              <a:t>What does this Program do ? A2.</a:t>
+            </a:r>
+          </a:p>
+        </p:txBody>
+      </p:sp>
+      <p:pic>
+        <p:nvPicPr>
+          <p:cNvPr id="5" name="Content Placeholder 6">
+            <a:extLst>
+              <a:ext uri="{FF2B5EF4-FFF2-40B4-BE49-F238E27FC236}">
+                <a16:creationId xmlns:a16="http://schemas.microsoft.com/office/drawing/2014/main" id="{FB000280-F639-4E1F-E662-FF837C26BC2F}"/>
+              </a:ext>
+            </a:extLst>
+          </p:cNvPr>
+          <p:cNvPicPr>
+            <a:picLocks noChangeAspect="1"/>
+          </p:cNvPicPr>
+          <p:nvPr/>
+        </p:nvPicPr>
+        <p:blipFill>
+          <a:blip r:embed="rId2"/>
+          <a:stretch>
+            <a:fillRect/>
+          </a:stretch>
+        </p:blipFill>
+        <p:spPr>
+          <a:xfrm>
+            <a:off x="6321906" y="1896991"/>
+            <a:ext cx="5260464" cy="3455402"/>
+          </a:xfrm>
+          <a:prstGeom prst="rect">
+            <a:avLst/>
+          </a:prstGeom>
+        </p:spPr>
+      </p:pic>
+      <p:sp>
+        <p:nvSpPr>
+          <p:cNvPr id="9" name="Content Placeholder 8">
+            <a:extLst>
+              <a:ext uri="{FF2B5EF4-FFF2-40B4-BE49-F238E27FC236}">
+                <a16:creationId xmlns:a16="http://schemas.microsoft.com/office/drawing/2014/main" id="{DC5B5EE5-1473-E2E4-2C3B-DBE0CE8CDE9B}"/>
+              </a:ext>
+            </a:extLst>
+          </p:cNvPr>
+          <p:cNvSpPr>
+            <a:spLocks noGrp="1"/>
+          </p:cNvSpPr>
+          <p:nvPr>
+            <p:ph idx="1"/>
+          </p:nvPr>
+        </p:nvSpPr>
+        <p:spPr/>
+        <p:txBody>
+          <a:bodyPr/>
+          <a:lstStyle/>
+          <a:p>
+            <a:r>
+              <a:rPr lang="en-US" dirty="0"/>
+              <a:t>Nested loop sum : 35</a:t>
+            </a:r>
+            <a:br>
+              <a:rPr lang="en-US" dirty="0"/>
+            </a:br>
+            <a:endParaRPr lang="en-US" dirty="0"/>
+          </a:p>
+        </p:txBody>
+      </p:sp>
+      <p:graphicFrame>
+        <p:nvGraphicFramePr>
+          <p:cNvPr id="10" name="Content Placeholder 5">
+            <a:extLst>
+              <a:ext uri="{FF2B5EF4-FFF2-40B4-BE49-F238E27FC236}">
+                <a16:creationId xmlns:a16="http://schemas.microsoft.com/office/drawing/2014/main" id="{29C28563-5938-2EFF-BD4F-B2A285E2A72C}"/>
+              </a:ext>
+            </a:extLst>
+          </p:cNvPr>
+          <p:cNvGraphicFramePr>
+            <a:graphicFrameLocks/>
+          </p:cNvGraphicFramePr>
+          <p:nvPr>
+            <p:extLst>
+              <p:ext uri="{D42A27DB-BD31-4B8C-83A1-F6EECF244321}">
+                <p14:modId xmlns:p14="http://schemas.microsoft.com/office/powerpoint/2010/main" val="2137903152"/>
+              </p:ext>
+            </p:extLst>
+          </p:nvPr>
+        </p:nvGraphicFramePr>
+        <p:xfrm>
+          <a:off x="1103654" y="2385301"/>
+          <a:ext cx="4766441" cy="3526770"/>
+        </p:xfrm>
+        <a:graphic>
+          <a:graphicData uri="http://schemas.openxmlformats.org/drawingml/2006/table">
+            <a:tbl>
+              <a:tblPr firstRow="1" bandRow="1">
+                <a:tableStyleId>{5C22544A-7EE6-4342-B048-85BDC9FD1C3A}</a:tableStyleId>
+              </a:tblPr>
+              <a:tblGrid>
+                <a:gridCol w="1191610">
+                  <a:extLst>
+                    <a:ext uri="{9D8B030D-6E8A-4147-A177-3AD203B41FA5}">
+                      <a16:colId xmlns:a16="http://schemas.microsoft.com/office/drawing/2014/main" val="2829498307"/>
+                    </a:ext>
+                  </a:extLst>
+                </a:gridCol>
+                <a:gridCol w="1470135">
+                  <a:extLst>
+                    <a:ext uri="{9D8B030D-6E8A-4147-A177-3AD203B41FA5}">
+                      <a16:colId xmlns:a16="http://schemas.microsoft.com/office/drawing/2014/main" val="2236824969"/>
+                    </a:ext>
+                  </a:extLst>
+                </a:gridCol>
+                <a:gridCol w="913086">
+                  <a:extLst>
+                    <a:ext uri="{9D8B030D-6E8A-4147-A177-3AD203B41FA5}">
+                      <a16:colId xmlns:a16="http://schemas.microsoft.com/office/drawing/2014/main" val="2084030851"/>
+                    </a:ext>
+                  </a:extLst>
+                </a:gridCol>
+                <a:gridCol w="1191610">
+                  <a:extLst>
+                    <a:ext uri="{9D8B030D-6E8A-4147-A177-3AD203B41FA5}">
+                      <a16:colId xmlns:a16="http://schemas.microsoft.com/office/drawing/2014/main" val="1456409771"/>
+                    </a:ext>
+                  </a:extLst>
+                </a:gridCol>
+              </a:tblGrid>
+              <a:tr h="587795">
+                <a:tc>
+                  <a:txBody>
+                    <a:bodyPr/>
+                    <a:lstStyle/>
+                    <a:p>
+                      <a:r>
+                        <a:rPr lang="en-US" dirty="0" err="1"/>
+                        <a:t>i</a:t>
+                      </a:r>
+                      <a:endParaRPr lang="en-US" dirty="0"/>
+                    </a:p>
+                  </a:txBody>
+                  <a:tcPr/>
+                </a:tc>
+                <a:tc>
+                  <a:txBody>
+                    <a:bodyPr/>
+                    <a:lstStyle/>
+                    <a:p>
+                      <a:r>
+                        <a:rPr lang="en-US" dirty="0"/>
+                        <a:t>j</a:t>
+                      </a:r>
+                    </a:p>
+                  </a:txBody>
+                  <a:tcPr/>
+                </a:tc>
+                <a:tc>
+                  <a:txBody>
+                    <a:bodyPr/>
+                    <a:lstStyle/>
+                    <a:p>
+                      <a:r>
+                        <a:rPr lang="en-US" i="1" dirty="0"/>
+                        <a:t>Added</a:t>
+                      </a:r>
+                    </a:p>
+                  </a:txBody>
+                  <a:tcPr/>
+                </a:tc>
+                <a:tc>
+                  <a:txBody>
+                    <a:bodyPr/>
+                    <a:lstStyle/>
+                    <a:p>
+                      <a:r>
+                        <a:rPr lang="en-US" dirty="0"/>
+                        <a:t>sum</a:t>
+                      </a:r>
+                    </a:p>
+                  </a:txBody>
+                  <a:tcPr/>
+                </a:tc>
+                <a:extLst>
+                  <a:ext uri="{0D108BD9-81ED-4DB2-BD59-A6C34878D82A}">
+                    <a16:rowId xmlns:a16="http://schemas.microsoft.com/office/drawing/2014/main" val="3477576104"/>
+                  </a:ext>
+                </a:extLst>
+              </a:tr>
+              <a:tr h="587795">
+                <a:tc>
+                  <a:txBody>
+                    <a:bodyPr/>
+                    <a:lstStyle/>
+                    <a:p>
+                      <a:r>
+                        <a:rPr lang="en-US" dirty="0"/>
+                        <a:t>1</a:t>
+                      </a:r>
+                    </a:p>
+                  </a:txBody>
+                  <a:tcPr/>
+                </a:tc>
+                <a:tc>
+                  <a:txBody>
+                    <a:bodyPr/>
+                    <a:lstStyle/>
+                    <a:p>
+                      <a:r>
+                        <a:rPr lang="en-US" dirty="0"/>
+                        <a:t>1</a:t>
+                      </a:r>
+                    </a:p>
+                  </a:txBody>
+                  <a:tcPr/>
+                </a:tc>
+                <a:tc>
+                  <a:txBody>
+                    <a:bodyPr/>
+                    <a:lstStyle/>
+                    <a:p>
+                      <a:r>
+                        <a:rPr lang="en-US" dirty="0"/>
+                        <a:t>1</a:t>
+                      </a:r>
+                    </a:p>
+                  </a:txBody>
+                  <a:tcPr/>
+                </a:tc>
+                <a:tc>
+                  <a:txBody>
+                    <a:bodyPr/>
+                    <a:lstStyle/>
+                    <a:p>
+                      <a:r>
+                        <a:rPr lang="en-US" dirty="0"/>
+                        <a:t>1</a:t>
+                      </a:r>
+                    </a:p>
+                  </a:txBody>
+                  <a:tcPr/>
+                </a:tc>
+                <a:extLst>
+                  <a:ext uri="{0D108BD9-81ED-4DB2-BD59-A6C34878D82A}">
+                    <a16:rowId xmlns:a16="http://schemas.microsoft.com/office/drawing/2014/main" val="1561388876"/>
+                  </a:ext>
+                </a:extLst>
+              </a:tr>
+              <a:tr h="587795">
+                <a:tc>
+                  <a:txBody>
+                    <a:bodyPr/>
+                    <a:lstStyle/>
+                    <a:p>
+                      <a:r>
+                        <a:rPr lang="en-US" dirty="0"/>
+                        <a:t>2</a:t>
+                      </a:r>
+                    </a:p>
+                  </a:txBody>
+                  <a:tcPr/>
+                </a:tc>
+                <a:tc>
+                  <a:txBody>
+                    <a:bodyPr/>
+                    <a:lstStyle/>
+                    <a:p>
+                      <a:r>
+                        <a:rPr lang="en-US" dirty="0"/>
+                        <a:t>1+2</a:t>
+                      </a:r>
+                    </a:p>
+                  </a:txBody>
+                  <a:tcPr/>
+                </a:tc>
+                <a:tc>
+                  <a:txBody>
+                    <a:bodyPr/>
+                    <a:lstStyle/>
+                    <a:p>
+                      <a:r>
+                        <a:rPr lang="en-US" dirty="0"/>
+                        <a:t>3</a:t>
+                      </a:r>
+                    </a:p>
+                  </a:txBody>
+                  <a:tcPr/>
+                </a:tc>
+                <a:tc>
+                  <a:txBody>
+                    <a:bodyPr/>
+                    <a:lstStyle/>
+                    <a:p>
+                      <a:r>
+                        <a:rPr lang="en-US" dirty="0"/>
+                        <a:t>4</a:t>
+                      </a:r>
+                    </a:p>
+                  </a:txBody>
+                  <a:tcPr/>
+                </a:tc>
+                <a:extLst>
+                  <a:ext uri="{0D108BD9-81ED-4DB2-BD59-A6C34878D82A}">
+                    <a16:rowId xmlns:a16="http://schemas.microsoft.com/office/drawing/2014/main" val="2043299306"/>
+                  </a:ext>
+                </a:extLst>
+              </a:tr>
+              <a:tr h="587795">
+                <a:tc>
+                  <a:txBody>
+                    <a:bodyPr/>
+                    <a:lstStyle/>
+                    <a:p>
+                      <a:r>
+                        <a:rPr lang="en-US" dirty="0"/>
+                        <a:t>3</a:t>
+                      </a:r>
+                    </a:p>
+                  </a:txBody>
+                  <a:tcPr/>
+                </a:tc>
+                <a:tc>
+                  <a:txBody>
+                    <a:bodyPr/>
+                    <a:lstStyle/>
+                    <a:p>
+                      <a:r>
+                        <a:rPr lang="en-US" dirty="0"/>
+                        <a:t>1+2+3</a:t>
+                      </a:r>
+                    </a:p>
+                  </a:txBody>
+                  <a:tcPr/>
+                </a:tc>
+                <a:tc>
+                  <a:txBody>
+                    <a:bodyPr/>
+                    <a:lstStyle/>
+                    <a:p>
+                      <a:r>
+                        <a:rPr lang="en-US" dirty="0"/>
+                        <a:t>6</a:t>
+                      </a:r>
+                    </a:p>
+                  </a:txBody>
+                  <a:tcPr/>
+                </a:tc>
+                <a:tc>
+                  <a:txBody>
+                    <a:bodyPr/>
+                    <a:lstStyle/>
+                    <a:p>
+                      <a:r>
+                        <a:rPr lang="en-US" dirty="0"/>
+                        <a:t>10</a:t>
+                      </a:r>
+                    </a:p>
+                  </a:txBody>
+                  <a:tcPr/>
+                </a:tc>
+                <a:extLst>
+                  <a:ext uri="{0D108BD9-81ED-4DB2-BD59-A6C34878D82A}">
+                    <a16:rowId xmlns:a16="http://schemas.microsoft.com/office/drawing/2014/main" val="3224753527"/>
+                  </a:ext>
+                </a:extLst>
+              </a:tr>
+              <a:tr h="587795">
+                <a:tc>
+                  <a:txBody>
+                    <a:bodyPr/>
+                    <a:lstStyle/>
+                    <a:p>
+                      <a:r>
+                        <a:rPr lang="en-US" dirty="0"/>
+                        <a:t>4</a:t>
+                      </a:r>
+                    </a:p>
+                  </a:txBody>
+                  <a:tcPr/>
+                </a:tc>
+                <a:tc>
+                  <a:txBody>
+                    <a:bodyPr/>
+                    <a:lstStyle/>
+                    <a:p>
+                      <a:r>
+                        <a:rPr lang="en-US" dirty="0"/>
+                        <a:t>1+2+3+4</a:t>
+                      </a:r>
+                    </a:p>
+                  </a:txBody>
+                  <a:tcPr/>
+                </a:tc>
+                <a:tc>
+                  <a:txBody>
+                    <a:bodyPr/>
+                    <a:lstStyle/>
+                    <a:p>
+                      <a:r>
+                        <a:rPr lang="en-US" dirty="0"/>
+                        <a:t>10</a:t>
+                      </a:r>
+                    </a:p>
+                  </a:txBody>
+                  <a:tcPr/>
+                </a:tc>
+                <a:tc>
+                  <a:txBody>
+                    <a:bodyPr/>
+                    <a:lstStyle/>
+                    <a:p>
+                      <a:r>
+                        <a:rPr lang="en-US" dirty="0"/>
+                        <a:t>20</a:t>
+                      </a:r>
+                    </a:p>
+                  </a:txBody>
+                  <a:tcPr/>
+                </a:tc>
+                <a:extLst>
+                  <a:ext uri="{0D108BD9-81ED-4DB2-BD59-A6C34878D82A}">
+                    <a16:rowId xmlns:a16="http://schemas.microsoft.com/office/drawing/2014/main" val="3855088139"/>
+                  </a:ext>
+                </a:extLst>
+              </a:tr>
+              <a:tr h="587795">
+                <a:tc>
+                  <a:txBody>
+                    <a:bodyPr/>
+                    <a:lstStyle/>
+                    <a:p>
+                      <a:r>
+                        <a:rPr lang="en-US" dirty="0"/>
+                        <a:t>5</a:t>
+                      </a:r>
+                    </a:p>
+                  </a:txBody>
+                  <a:tcPr/>
+                </a:tc>
+                <a:tc>
+                  <a:txBody>
+                    <a:bodyPr/>
+                    <a:lstStyle/>
+                    <a:p>
+                      <a:r>
+                        <a:rPr lang="en-US" dirty="0"/>
+                        <a:t>1+2+3+4+5</a:t>
+                      </a:r>
+                    </a:p>
+                  </a:txBody>
+                  <a:tcPr/>
+                </a:tc>
+                <a:tc>
+                  <a:txBody>
+                    <a:bodyPr/>
+                    <a:lstStyle/>
+                    <a:p>
+                      <a:r>
+                        <a:rPr lang="en-US" dirty="0"/>
+                        <a:t>15</a:t>
+                      </a:r>
+                    </a:p>
+                  </a:txBody>
+                  <a:tcPr/>
+                </a:tc>
+                <a:tc>
+                  <a:txBody>
+                    <a:bodyPr/>
+                    <a:lstStyle/>
+                    <a:p>
+                      <a:r>
+                        <a:rPr lang="en-US" b="1" dirty="0"/>
+                        <a:t>35</a:t>
+                      </a:r>
+                    </a:p>
+                  </a:txBody>
+                  <a:tcPr/>
+                </a:tc>
+                <a:extLst>
+                  <a:ext uri="{0D108BD9-81ED-4DB2-BD59-A6C34878D82A}">
+                    <a16:rowId xmlns:a16="http://schemas.microsoft.com/office/drawing/2014/main" val="1027596678"/>
+                  </a:ext>
+                </a:extLst>
+              </a:tr>
+            </a:tbl>
+          </a:graphicData>
+        </a:graphic>
+      </p:graphicFrame>
+    </p:spTree>
+    <p:extLst>
+      <p:ext uri="{BB962C8B-B14F-4D97-AF65-F5344CB8AC3E}">
+        <p14:creationId xmlns:p14="http://schemas.microsoft.com/office/powerpoint/2010/main" val="554589667"/>
+      </p:ext>
+    </p:extLst>
+  </p:cSld>
+  <p:clrMapOvr>
+    <a:masterClrMapping/>
+  </p:clrMapOvr>
+</p:sld>
+</file>
+
 <file path=ppt/slides/slide6.xml><?xml version="1.0" encoding="utf-8"?>
 <p:sld xmlns:a="http://schemas.openxmlformats.org/drawingml/2006/main" xmlns:r="http://schemas.openxmlformats.org/officeDocument/2006/relationships" xmlns:p="http://schemas.openxmlformats.org/presentationml/2006/main">
   <p:cSld>
@@ -22896,6 +23952,1664 @@
     <p:extLst>
       <p:ext uri="{BB962C8B-B14F-4D97-AF65-F5344CB8AC3E}">
         <p14:creationId xmlns:p14="http://schemas.microsoft.com/office/powerpoint/2010/main" val="2155666429"/>
+      </p:ext>
+    </p:extLst>
+  </p:cSld>
+  <p:clrMapOvr>
+    <a:masterClrMapping/>
+  </p:clrMapOvr>
+</p:sld>
+</file>
+
+<file path=ppt/slides/slide60.xml><?xml version="1.0" encoding="utf-8"?>
+<p:sld xmlns:a="http://schemas.openxmlformats.org/drawingml/2006/main" xmlns:r="http://schemas.openxmlformats.org/officeDocument/2006/relationships" xmlns:p="http://schemas.openxmlformats.org/presentationml/2006/main">
+  <p:cSld>
+    <p:spTree>
+      <p:nvGrpSpPr>
+        <p:cNvPr id="1" name=""/>
+        <p:cNvGrpSpPr/>
+        <p:nvPr/>
+      </p:nvGrpSpPr>
+      <p:grpSpPr>
+        <a:xfrm>
+          <a:off x="0" y="0"/>
+          <a:ext cx="0" cy="0"/>
+          <a:chOff x="0" y="0"/>
+          <a:chExt cx="0" cy="0"/>
+        </a:xfrm>
+      </p:grpSpPr>
+      <p:sp>
+        <p:nvSpPr>
+          <p:cNvPr id="2" name="Title 1">
+            <a:extLst>
+              <a:ext uri="{FF2B5EF4-FFF2-40B4-BE49-F238E27FC236}">
+                <a16:creationId xmlns:a16="http://schemas.microsoft.com/office/drawing/2014/main" id="{E0598296-BCFA-A4FD-8C84-FABA6725583B}"/>
+              </a:ext>
+            </a:extLst>
+          </p:cNvPr>
+          <p:cNvSpPr>
+            <a:spLocks noGrp="1"/>
+          </p:cNvSpPr>
+          <p:nvPr>
+            <p:ph type="title"/>
+          </p:nvPr>
+        </p:nvSpPr>
+        <p:spPr/>
+        <p:txBody>
+          <a:bodyPr/>
+          <a:lstStyle/>
+          <a:p>
+            <a:r>
+              <a:rPr lang="en-US" dirty="0"/>
+              <a:t>What does this Program do ? Q3</a:t>
+            </a:r>
+          </a:p>
+        </p:txBody>
+      </p:sp>
+      <p:pic>
+        <p:nvPicPr>
+          <p:cNvPr id="10" name="Content Placeholder 4">
+            <a:extLst>
+              <a:ext uri="{FF2B5EF4-FFF2-40B4-BE49-F238E27FC236}">
+                <a16:creationId xmlns:a16="http://schemas.microsoft.com/office/drawing/2014/main" id="{B306B037-9002-F85B-D8E9-FE58D03DA7F8}"/>
+              </a:ext>
+            </a:extLst>
+          </p:cNvPr>
+          <p:cNvPicPr>
+            <a:picLocks noGrp="1" noChangeAspect="1"/>
+          </p:cNvPicPr>
+          <p:nvPr>
+            <p:ph idx="1"/>
+          </p:nvPr>
+        </p:nvPicPr>
+        <p:blipFill>
+          <a:blip r:embed="rId2"/>
+          <a:stretch>
+            <a:fillRect/>
+          </a:stretch>
+        </p:blipFill>
+        <p:spPr>
+          <a:xfrm>
+            <a:off x="1084885" y="1887466"/>
+            <a:ext cx="7176049" cy="3614700"/>
+          </a:xfrm>
+          <a:prstGeom prst="rect">
+            <a:avLst/>
+          </a:prstGeom>
+        </p:spPr>
+      </p:pic>
+    </p:spTree>
+    <p:extLst>
+      <p:ext uri="{BB962C8B-B14F-4D97-AF65-F5344CB8AC3E}">
+        <p14:creationId xmlns:p14="http://schemas.microsoft.com/office/powerpoint/2010/main" val="182018112"/>
+      </p:ext>
+    </p:extLst>
+  </p:cSld>
+  <p:clrMapOvr>
+    <a:masterClrMapping/>
+  </p:clrMapOvr>
+</p:sld>
+</file>
+
+<file path=ppt/slides/slide61.xml><?xml version="1.0" encoding="utf-8"?>
+<p:sld xmlns:a="http://schemas.openxmlformats.org/drawingml/2006/main" xmlns:r="http://schemas.openxmlformats.org/officeDocument/2006/relationships" xmlns:p="http://schemas.openxmlformats.org/presentationml/2006/main">
+  <p:cSld>
+    <p:spTree>
+      <p:nvGrpSpPr>
+        <p:cNvPr id="1" name="">
+          <a:extLst>
+            <a:ext uri="{FF2B5EF4-FFF2-40B4-BE49-F238E27FC236}">
+              <a16:creationId xmlns:a16="http://schemas.microsoft.com/office/drawing/2014/main" id="{7A185DBA-9053-3108-1DE3-ACD6F731486D}"/>
+            </a:ext>
+          </a:extLst>
+        </p:cNvPr>
+        <p:cNvGrpSpPr/>
+        <p:nvPr/>
+      </p:nvGrpSpPr>
+      <p:grpSpPr>
+        <a:xfrm>
+          <a:off x="0" y="0"/>
+          <a:ext cx="0" cy="0"/>
+          <a:chOff x="0" y="0"/>
+          <a:chExt cx="0" cy="0"/>
+        </a:xfrm>
+      </p:grpSpPr>
+      <p:sp>
+        <p:nvSpPr>
+          <p:cNvPr id="2" name="Title 1">
+            <a:extLst>
+              <a:ext uri="{FF2B5EF4-FFF2-40B4-BE49-F238E27FC236}">
+                <a16:creationId xmlns:a16="http://schemas.microsoft.com/office/drawing/2014/main" id="{FB8DE529-7D4D-7996-8BA8-098B84D614BB}"/>
+              </a:ext>
+            </a:extLst>
+          </p:cNvPr>
+          <p:cNvSpPr>
+            <a:spLocks noGrp="1"/>
+          </p:cNvSpPr>
+          <p:nvPr>
+            <p:ph type="title"/>
+          </p:nvPr>
+        </p:nvSpPr>
+        <p:spPr/>
+        <p:txBody>
+          <a:bodyPr/>
+          <a:lstStyle/>
+          <a:p>
+            <a:r>
+              <a:rPr lang="en-US" dirty="0"/>
+              <a:t>What does this Program do ? A3</a:t>
+            </a:r>
+          </a:p>
+        </p:txBody>
+      </p:sp>
+      <p:sp>
+        <p:nvSpPr>
+          <p:cNvPr id="7" name="Content Placeholder 6">
+            <a:extLst>
+              <a:ext uri="{FF2B5EF4-FFF2-40B4-BE49-F238E27FC236}">
+                <a16:creationId xmlns:a16="http://schemas.microsoft.com/office/drawing/2014/main" id="{D3988ECD-FF80-8C71-0489-3A4ED45427EB}"/>
+              </a:ext>
+            </a:extLst>
+          </p:cNvPr>
+          <p:cNvSpPr>
+            <a:spLocks noGrp="1"/>
+          </p:cNvSpPr>
+          <p:nvPr>
+            <p:ph idx="1"/>
+          </p:nvPr>
+        </p:nvSpPr>
+        <p:spPr/>
+        <p:txBody>
+          <a:bodyPr/>
+          <a:lstStyle/>
+          <a:p>
+            <a:r>
+              <a:rPr lang="en-US" dirty="0"/>
+              <a:t>We want </a:t>
+            </a:r>
+          </a:p>
+          <a:p>
+            <a:pPr lvl="1"/>
+            <a:r>
+              <a:rPr lang="en-US" dirty="0"/>
+              <a:t>Divisible by 3</a:t>
+            </a:r>
+          </a:p>
+          <a:p>
+            <a:pPr lvl="1"/>
+            <a:r>
+              <a:rPr lang="en-US" dirty="0"/>
+              <a:t>NOT divisible by 4</a:t>
+            </a:r>
+          </a:p>
+          <a:p>
+            <a:r>
+              <a:rPr lang="en-US" dirty="0"/>
+              <a:t>15 + 18 = 33</a:t>
+            </a:r>
+          </a:p>
+          <a:p>
+            <a:endParaRPr lang="en-US" dirty="0"/>
+          </a:p>
+        </p:txBody>
+      </p:sp>
+      <p:pic>
+        <p:nvPicPr>
+          <p:cNvPr id="8" name="Content Placeholder 4">
+            <a:extLst>
+              <a:ext uri="{FF2B5EF4-FFF2-40B4-BE49-F238E27FC236}">
+                <a16:creationId xmlns:a16="http://schemas.microsoft.com/office/drawing/2014/main" id="{6AD4C6A4-CD8E-35B8-ED9E-5CDCED20BA1A}"/>
+              </a:ext>
+            </a:extLst>
+          </p:cNvPr>
+          <p:cNvPicPr>
+            <a:picLocks noChangeAspect="1"/>
+          </p:cNvPicPr>
+          <p:nvPr/>
+        </p:nvPicPr>
+        <p:blipFill>
+          <a:blip r:embed="rId2"/>
+          <a:stretch>
+            <a:fillRect/>
+          </a:stretch>
+        </p:blipFill>
+        <p:spPr>
+          <a:xfrm>
+            <a:off x="5548858" y="2022694"/>
+            <a:ext cx="6049308" cy="3047141"/>
+          </a:xfrm>
+          <a:prstGeom prst="rect">
+            <a:avLst/>
+          </a:prstGeom>
+        </p:spPr>
+      </p:pic>
+      <p:graphicFrame>
+        <p:nvGraphicFramePr>
+          <p:cNvPr id="9" name="Table 8">
+            <a:extLst>
+              <a:ext uri="{FF2B5EF4-FFF2-40B4-BE49-F238E27FC236}">
+                <a16:creationId xmlns:a16="http://schemas.microsoft.com/office/drawing/2014/main" id="{7D247C17-E352-B075-5C45-0F11A18FF056}"/>
+              </a:ext>
+            </a:extLst>
+          </p:cNvPr>
+          <p:cNvGraphicFramePr>
+            <a:graphicFrameLocks noGrp="1"/>
+          </p:cNvGraphicFramePr>
+          <p:nvPr/>
+        </p:nvGraphicFramePr>
+        <p:xfrm>
+          <a:off x="1086068" y="4001294"/>
+          <a:ext cx="4069256" cy="1483360"/>
+        </p:xfrm>
+        <a:graphic>
+          <a:graphicData uri="http://schemas.openxmlformats.org/drawingml/2006/table">
+            <a:tbl>
+              <a:tblPr firstRow="1" bandRow="1">
+                <a:tableStyleId>{5C22544A-7EE6-4342-B048-85BDC9FD1C3A}</a:tableStyleId>
+              </a:tblPr>
+              <a:tblGrid>
+                <a:gridCol w="1017314">
+                  <a:extLst>
+                    <a:ext uri="{9D8B030D-6E8A-4147-A177-3AD203B41FA5}">
+                      <a16:colId xmlns:a16="http://schemas.microsoft.com/office/drawing/2014/main" val="2572898738"/>
+                    </a:ext>
+                  </a:extLst>
+                </a:gridCol>
+                <a:gridCol w="1017314">
+                  <a:extLst>
+                    <a:ext uri="{9D8B030D-6E8A-4147-A177-3AD203B41FA5}">
+                      <a16:colId xmlns:a16="http://schemas.microsoft.com/office/drawing/2014/main" val="3945718912"/>
+                    </a:ext>
+                  </a:extLst>
+                </a:gridCol>
+                <a:gridCol w="899511">
+                  <a:extLst>
+                    <a:ext uri="{9D8B030D-6E8A-4147-A177-3AD203B41FA5}">
+                      <a16:colId xmlns:a16="http://schemas.microsoft.com/office/drawing/2014/main" val="126023410"/>
+                    </a:ext>
+                  </a:extLst>
+                </a:gridCol>
+                <a:gridCol w="1135117">
+                  <a:extLst>
+                    <a:ext uri="{9D8B030D-6E8A-4147-A177-3AD203B41FA5}">
+                      <a16:colId xmlns:a16="http://schemas.microsoft.com/office/drawing/2014/main" val="984156430"/>
+                    </a:ext>
+                  </a:extLst>
+                </a:gridCol>
+              </a:tblGrid>
+              <a:tr h="370840">
+                <a:tc>
+                  <a:txBody>
+                    <a:bodyPr/>
+                    <a:lstStyle/>
+                    <a:p>
+                      <a:r>
+                        <a:rPr lang="en-US" dirty="0" err="1"/>
+                        <a:t>i</a:t>
+                      </a:r>
+                      <a:endParaRPr lang="en-US" dirty="0"/>
+                    </a:p>
+                  </a:txBody>
+                  <a:tcPr/>
+                </a:tc>
+                <a:tc>
+                  <a:txBody>
+                    <a:bodyPr/>
+                    <a:lstStyle/>
+                    <a:p>
+                      <a:r>
+                        <a:rPr lang="en-US" dirty="0"/>
+                        <a:t>%3</a:t>
+                      </a:r>
+                    </a:p>
+                  </a:txBody>
+                  <a:tcPr/>
+                </a:tc>
+                <a:tc>
+                  <a:txBody>
+                    <a:bodyPr/>
+                    <a:lstStyle/>
+                    <a:p>
+                      <a:r>
+                        <a:rPr lang="en-US" dirty="0"/>
+                        <a:t>%4</a:t>
+                      </a:r>
+                    </a:p>
+                  </a:txBody>
+                  <a:tcPr/>
+                </a:tc>
+                <a:tc>
+                  <a:txBody>
+                    <a:bodyPr/>
+                    <a:lstStyle/>
+                    <a:p>
+                      <a:r>
+                        <a:rPr lang="en-US" dirty="0"/>
+                        <a:t>Include?</a:t>
+                      </a:r>
+                    </a:p>
+                  </a:txBody>
+                  <a:tcPr/>
+                </a:tc>
+                <a:extLst>
+                  <a:ext uri="{0D108BD9-81ED-4DB2-BD59-A6C34878D82A}">
+                    <a16:rowId xmlns:a16="http://schemas.microsoft.com/office/drawing/2014/main" val="2058893458"/>
+                  </a:ext>
+                </a:extLst>
+              </a:tr>
+              <a:tr h="370840">
+                <a:tc>
+                  <a:txBody>
+                    <a:bodyPr/>
+                    <a:lstStyle/>
+                    <a:p>
+                      <a:r>
+                        <a:rPr lang="en-US" dirty="0"/>
+                        <a:t>12</a:t>
+                      </a:r>
+                    </a:p>
+                  </a:txBody>
+                  <a:tcPr/>
+                </a:tc>
+                <a:tc>
+                  <a:txBody>
+                    <a:bodyPr/>
+                    <a:lstStyle/>
+                    <a:p>
+                      <a:r>
+                        <a:rPr lang="en-US" dirty="0"/>
+                        <a:t>Y</a:t>
+                      </a:r>
+                    </a:p>
+                  </a:txBody>
+                  <a:tcPr/>
+                </a:tc>
+                <a:tc>
+                  <a:txBody>
+                    <a:bodyPr/>
+                    <a:lstStyle/>
+                    <a:p>
+                      <a:r>
+                        <a:rPr lang="en-US" dirty="0"/>
+                        <a:t>Y</a:t>
+                      </a:r>
+                    </a:p>
+                  </a:txBody>
+                  <a:tcPr/>
+                </a:tc>
+                <a:tc>
+                  <a:txBody>
+                    <a:bodyPr/>
+                    <a:lstStyle/>
+                    <a:p>
+                      <a:r>
+                        <a:rPr lang="en-US" dirty="0"/>
+                        <a:t>No</a:t>
+                      </a:r>
+                    </a:p>
+                  </a:txBody>
+                  <a:tcPr/>
+                </a:tc>
+                <a:extLst>
+                  <a:ext uri="{0D108BD9-81ED-4DB2-BD59-A6C34878D82A}">
+                    <a16:rowId xmlns:a16="http://schemas.microsoft.com/office/drawing/2014/main" val="592262212"/>
+                  </a:ext>
+                </a:extLst>
+              </a:tr>
+              <a:tr h="370840">
+                <a:tc>
+                  <a:txBody>
+                    <a:bodyPr/>
+                    <a:lstStyle/>
+                    <a:p>
+                      <a:r>
+                        <a:rPr lang="en-US" dirty="0"/>
+                        <a:t>15</a:t>
+                      </a:r>
+                    </a:p>
+                  </a:txBody>
+                  <a:tcPr/>
+                </a:tc>
+                <a:tc>
+                  <a:txBody>
+                    <a:bodyPr/>
+                    <a:lstStyle/>
+                    <a:p>
+                      <a:r>
+                        <a:rPr lang="en-US" dirty="0"/>
+                        <a:t>Y</a:t>
+                      </a:r>
+                    </a:p>
+                  </a:txBody>
+                  <a:tcPr/>
+                </a:tc>
+                <a:tc>
+                  <a:txBody>
+                    <a:bodyPr/>
+                    <a:lstStyle/>
+                    <a:p>
+                      <a:r>
+                        <a:rPr lang="en-US" dirty="0"/>
+                        <a:t>N</a:t>
+                      </a:r>
+                    </a:p>
+                  </a:txBody>
+                  <a:tcPr/>
+                </a:tc>
+                <a:tc>
+                  <a:txBody>
+                    <a:bodyPr/>
+                    <a:lstStyle/>
+                    <a:p>
+                      <a:r>
+                        <a:rPr lang="en-US" dirty="0"/>
+                        <a:t>Yes</a:t>
+                      </a:r>
+                    </a:p>
+                  </a:txBody>
+                  <a:tcPr/>
+                </a:tc>
+                <a:extLst>
+                  <a:ext uri="{0D108BD9-81ED-4DB2-BD59-A6C34878D82A}">
+                    <a16:rowId xmlns:a16="http://schemas.microsoft.com/office/drawing/2014/main" val="3728857931"/>
+                  </a:ext>
+                </a:extLst>
+              </a:tr>
+              <a:tr h="370840">
+                <a:tc>
+                  <a:txBody>
+                    <a:bodyPr/>
+                    <a:lstStyle/>
+                    <a:p>
+                      <a:r>
+                        <a:rPr lang="en-US" dirty="0"/>
+                        <a:t>18</a:t>
+                      </a:r>
+                    </a:p>
+                  </a:txBody>
+                  <a:tcPr/>
+                </a:tc>
+                <a:tc>
+                  <a:txBody>
+                    <a:bodyPr/>
+                    <a:lstStyle/>
+                    <a:p>
+                      <a:r>
+                        <a:rPr lang="en-US" dirty="0"/>
+                        <a:t>Y</a:t>
+                      </a:r>
+                    </a:p>
+                  </a:txBody>
+                  <a:tcPr/>
+                </a:tc>
+                <a:tc>
+                  <a:txBody>
+                    <a:bodyPr/>
+                    <a:lstStyle/>
+                    <a:p>
+                      <a:r>
+                        <a:rPr lang="en-US" dirty="0"/>
+                        <a:t>N</a:t>
+                      </a:r>
+                    </a:p>
+                  </a:txBody>
+                  <a:tcPr/>
+                </a:tc>
+                <a:tc>
+                  <a:txBody>
+                    <a:bodyPr/>
+                    <a:lstStyle/>
+                    <a:p>
+                      <a:r>
+                        <a:rPr lang="en-US" dirty="0"/>
+                        <a:t>Yes</a:t>
+                      </a:r>
+                    </a:p>
+                  </a:txBody>
+                  <a:tcPr/>
+                </a:tc>
+                <a:extLst>
+                  <a:ext uri="{0D108BD9-81ED-4DB2-BD59-A6C34878D82A}">
+                    <a16:rowId xmlns:a16="http://schemas.microsoft.com/office/drawing/2014/main" val="3250088344"/>
+                  </a:ext>
+                </a:extLst>
+              </a:tr>
+            </a:tbl>
+          </a:graphicData>
+        </a:graphic>
+      </p:graphicFrame>
+    </p:spTree>
+    <p:extLst>
+      <p:ext uri="{BB962C8B-B14F-4D97-AF65-F5344CB8AC3E}">
+        <p14:creationId xmlns:p14="http://schemas.microsoft.com/office/powerpoint/2010/main" val="1053282175"/>
+      </p:ext>
+    </p:extLst>
+  </p:cSld>
+  <p:clrMapOvr>
+    <a:masterClrMapping/>
+  </p:clrMapOvr>
+</p:sld>
+</file>
+
+<file path=ppt/slides/slide62.xml><?xml version="1.0" encoding="utf-8"?>
+<p:sld xmlns:a="http://schemas.openxmlformats.org/drawingml/2006/main" xmlns:r="http://schemas.openxmlformats.org/officeDocument/2006/relationships" xmlns:p="http://schemas.openxmlformats.org/presentationml/2006/main">
+  <p:cSld>
+    <p:spTree>
+      <p:nvGrpSpPr>
+        <p:cNvPr id="1" name="">
+          <a:extLst>
+            <a:ext uri="{FF2B5EF4-FFF2-40B4-BE49-F238E27FC236}">
+              <a16:creationId xmlns:a16="http://schemas.microsoft.com/office/drawing/2014/main" id="{E678A494-CB44-23E6-6167-3B208E6620E2}"/>
+            </a:ext>
+          </a:extLst>
+        </p:cNvPr>
+        <p:cNvGrpSpPr/>
+        <p:nvPr/>
+      </p:nvGrpSpPr>
+      <p:grpSpPr>
+        <a:xfrm>
+          <a:off x="0" y="0"/>
+          <a:ext cx="0" cy="0"/>
+          <a:chOff x="0" y="0"/>
+          <a:chExt cx="0" cy="0"/>
+        </a:xfrm>
+      </p:grpSpPr>
+      <p:sp>
+        <p:nvSpPr>
+          <p:cNvPr id="2" name="Title 1">
+            <a:extLst>
+              <a:ext uri="{FF2B5EF4-FFF2-40B4-BE49-F238E27FC236}">
+                <a16:creationId xmlns:a16="http://schemas.microsoft.com/office/drawing/2014/main" id="{DAD1C93A-4A24-101D-372C-39870A9743DA}"/>
+              </a:ext>
+            </a:extLst>
+          </p:cNvPr>
+          <p:cNvSpPr>
+            <a:spLocks noGrp="1"/>
+          </p:cNvSpPr>
+          <p:nvPr>
+            <p:ph type="title"/>
+          </p:nvPr>
+        </p:nvSpPr>
+        <p:spPr/>
+        <p:txBody>
+          <a:bodyPr/>
+          <a:lstStyle/>
+          <a:p>
+            <a:r>
+              <a:rPr lang="en-US" dirty="0"/>
+              <a:t>What does this Program do ? Q4</a:t>
+            </a:r>
+          </a:p>
+        </p:txBody>
+      </p:sp>
+      <p:pic>
+        <p:nvPicPr>
+          <p:cNvPr id="7" name="Content Placeholder 6">
+            <a:extLst>
+              <a:ext uri="{FF2B5EF4-FFF2-40B4-BE49-F238E27FC236}">
+                <a16:creationId xmlns:a16="http://schemas.microsoft.com/office/drawing/2014/main" id="{651F3A36-ABAF-E830-D679-95EBF73FA0A7}"/>
+              </a:ext>
+            </a:extLst>
+          </p:cNvPr>
+          <p:cNvPicPr>
+            <a:picLocks noGrp="1" noChangeAspect="1"/>
+          </p:cNvPicPr>
+          <p:nvPr>
+            <p:ph idx="1"/>
+          </p:nvPr>
+        </p:nvPicPr>
+        <p:blipFill>
+          <a:blip r:embed="rId2"/>
+          <a:stretch>
+            <a:fillRect/>
+          </a:stretch>
+        </p:blipFill>
+        <p:spPr>
+          <a:xfrm>
+            <a:off x="1106462" y="1867741"/>
+            <a:ext cx="5128799" cy="3975081"/>
+          </a:xfrm>
+        </p:spPr>
+      </p:pic>
+    </p:spTree>
+    <p:extLst>
+      <p:ext uri="{BB962C8B-B14F-4D97-AF65-F5344CB8AC3E}">
+        <p14:creationId xmlns:p14="http://schemas.microsoft.com/office/powerpoint/2010/main" val="472968941"/>
+      </p:ext>
+    </p:extLst>
+  </p:cSld>
+  <p:clrMapOvr>
+    <a:masterClrMapping/>
+  </p:clrMapOvr>
+</p:sld>
+</file>
+
+<file path=ppt/slides/slide63.xml><?xml version="1.0" encoding="utf-8"?>
+<p:sld xmlns:a="http://schemas.openxmlformats.org/drawingml/2006/main" xmlns:r="http://schemas.openxmlformats.org/officeDocument/2006/relationships" xmlns:p="http://schemas.openxmlformats.org/presentationml/2006/main">
+  <p:cSld>
+    <p:spTree>
+      <p:nvGrpSpPr>
+        <p:cNvPr id="1" name="">
+          <a:extLst>
+            <a:ext uri="{FF2B5EF4-FFF2-40B4-BE49-F238E27FC236}">
+              <a16:creationId xmlns:a16="http://schemas.microsoft.com/office/drawing/2014/main" id="{EE90E92F-AF49-7D7B-050E-B52B454BF420}"/>
+            </a:ext>
+          </a:extLst>
+        </p:cNvPr>
+        <p:cNvGrpSpPr/>
+        <p:nvPr/>
+      </p:nvGrpSpPr>
+      <p:grpSpPr>
+        <a:xfrm>
+          <a:off x="0" y="0"/>
+          <a:ext cx="0" cy="0"/>
+          <a:chOff x="0" y="0"/>
+          <a:chExt cx="0" cy="0"/>
+        </a:xfrm>
+      </p:grpSpPr>
+      <p:sp>
+        <p:nvSpPr>
+          <p:cNvPr id="2" name="Title 1">
+            <a:extLst>
+              <a:ext uri="{FF2B5EF4-FFF2-40B4-BE49-F238E27FC236}">
+                <a16:creationId xmlns:a16="http://schemas.microsoft.com/office/drawing/2014/main" id="{7CBDE6CA-C955-4AC7-D595-48528D43D35E}"/>
+              </a:ext>
+            </a:extLst>
+          </p:cNvPr>
+          <p:cNvSpPr>
+            <a:spLocks noGrp="1"/>
+          </p:cNvSpPr>
+          <p:nvPr>
+            <p:ph type="title"/>
+          </p:nvPr>
+        </p:nvSpPr>
+        <p:spPr/>
+        <p:txBody>
+          <a:bodyPr/>
+          <a:lstStyle/>
+          <a:p>
+            <a:r>
+              <a:rPr lang="en-US" dirty="0"/>
+              <a:t>What does this Program do ? A4</a:t>
+            </a:r>
+          </a:p>
+        </p:txBody>
+      </p:sp>
+      <p:sp>
+        <p:nvSpPr>
+          <p:cNvPr id="4" name="Content Placeholder 3">
+            <a:extLst>
+              <a:ext uri="{FF2B5EF4-FFF2-40B4-BE49-F238E27FC236}">
+                <a16:creationId xmlns:a16="http://schemas.microsoft.com/office/drawing/2014/main" id="{240B678F-4154-33E1-671D-916FE686C7E1}"/>
+              </a:ext>
+            </a:extLst>
+          </p:cNvPr>
+          <p:cNvSpPr>
+            <a:spLocks noGrp="1"/>
+          </p:cNvSpPr>
+          <p:nvPr>
+            <p:ph idx="1"/>
+          </p:nvPr>
+        </p:nvSpPr>
+        <p:spPr>
+          <a:xfrm>
+            <a:off x="838200" y="1809860"/>
+            <a:ext cx="10515600" cy="4351338"/>
+          </a:xfrm>
+        </p:spPr>
+        <p:txBody>
+          <a:bodyPr/>
+          <a:lstStyle/>
+          <a:p>
+            <a:r>
+              <a:rPr lang="en-US" dirty="0"/>
+              <a:t>Output 4</a:t>
+            </a:r>
+          </a:p>
+        </p:txBody>
+      </p:sp>
+      <p:pic>
+        <p:nvPicPr>
+          <p:cNvPr id="5" name="Content Placeholder 6">
+            <a:extLst>
+              <a:ext uri="{FF2B5EF4-FFF2-40B4-BE49-F238E27FC236}">
+                <a16:creationId xmlns:a16="http://schemas.microsoft.com/office/drawing/2014/main" id="{A9B3C22B-857E-640E-DCC7-9205A3777F0D}"/>
+              </a:ext>
+            </a:extLst>
+          </p:cNvPr>
+          <p:cNvPicPr>
+            <a:picLocks noChangeAspect="1"/>
+          </p:cNvPicPr>
+          <p:nvPr/>
+        </p:nvPicPr>
+        <p:blipFill>
+          <a:blip r:embed="rId2"/>
+          <a:stretch>
+            <a:fillRect/>
+          </a:stretch>
+        </p:blipFill>
+        <p:spPr>
+          <a:xfrm>
+            <a:off x="6372144" y="1749500"/>
+            <a:ext cx="5128799" cy="3975081"/>
+          </a:xfrm>
+          <a:prstGeom prst="rect">
+            <a:avLst/>
+          </a:prstGeom>
+        </p:spPr>
+      </p:pic>
+      <p:sp>
+        <p:nvSpPr>
+          <p:cNvPr id="9" name="TextBox 8">
+            <a:extLst>
+              <a:ext uri="{FF2B5EF4-FFF2-40B4-BE49-F238E27FC236}">
+                <a16:creationId xmlns:a16="http://schemas.microsoft.com/office/drawing/2014/main" id="{49BEE48A-F157-1798-7EAE-1B4D145A2EED}"/>
+              </a:ext>
+            </a:extLst>
+          </p:cNvPr>
+          <p:cNvSpPr txBox="1"/>
+          <p:nvPr/>
+        </p:nvSpPr>
+        <p:spPr>
+          <a:xfrm>
+            <a:off x="1062201" y="3545471"/>
+            <a:ext cx="4495144" cy="1477328"/>
+          </a:xfrm>
+          <a:prstGeom prst="rect">
+            <a:avLst/>
+          </a:prstGeom>
+          <a:noFill/>
+        </p:spPr>
+        <p:txBody>
+          <a:bodyPr wrap="square">
+            <a:spAutoFit/>
+          </a:bodyPr>
+          <a:lstStyle/>
+          <a:p>
+            <a:r>
+              <a:rPr lang="en-US" u="sng" dirty="0"/>
+              <a:t>Step	digit	even?	count</a:t>
+            </a:r>
+          </a:p>
+          <a:p>
+            <a:r>
+              <a:rPr lang="en-US" dirty="0"/>
+              <a:t>8	yes	1	1</a:t>
+            </a:r>
+          </a:p>
+          <a:p>
+            <a:r>
+              <a:rPr lang="en-US" dirty="0"/>
+              <a:t>6	yes	2	2</a:t>
+            </a:r>
+          </a:p>
+          <a:p>
+            <a:r>
+              <a:rPr lang="en-US" dirty="0"/>
+              <a:t>4	yes	3	3</a:t>
+            </a:r>
+          </a:p>
+          <a:p>
+            <a:r>
+              <a:rPr lang="en-US" dirty="0"/>
+              <a:t>2	yes	4	4</a:t>
+            </a:r>
+          </a:p>
+        </p:txBody>
+      </p:sp>
+    </p:spTree>
+    <p:extLst>
+      <p:ext uri="{BB962C8B-B14F-4D97-AF65-F5344CB8AC3E}">
+        <p14:creationId xmlns:p14="http://schemas.microsoft.com/office/powerpoint/2010/main" val="1526322078"/>
+      </p:ext>
+    </p:extLst>
+  </p:cSld>
+  <p:clrMapOvr>
+    <a:masterClrMapping/>
+  </p:clrMapOvr>
+</p:sld>
+</file>
+
+<file path=ppt/slides/slide64.xml><?xml version="1.0" encoding="utf-8"?>
+<p:sld xmlns:a="http://schemas.openxmlformats.org/drawingml/2006/main" xmlns:r="http://schemas.openxmlformats.org/officeDocument/2006/relationships" xmlns:p="http://schemas.openxmlformats.org/presentationml/2006/main">
+  <p:cSld>
+    <p:spTree>
+      <p:nvGrpSpPr>
+        <p:cNvPr id="1" name="">
+          <a:extLst>
+            <a:ext uri="{FF2B5EF4-FFF2-40B4-BE49-F238E27FC236}">
+              <a16:creationId xmlns:a16="http://schemas.microsoft.com/office/drawing/2014/main" id="{37C1662D-56D1-A890-3A90-E5804BAF2EA9}"/>
+            </a:ext>
+          </a:extLst>
+        </p:cNvPr>
+        <p:cNvGrpSpPr/>
+        <p:nvPr/>
+      </p:nvGrpSpPr>
+      <p:grpSpPr>
+        <a:xfrm>
+          <a:off x="0" y="0"/>
+          <a:ext cx="0" cy="0"/>
+          <a:chOff x="0" y="0"/>
+          <a:chExt cx="0" cy="0"/>
+        </a:xfrm>
+      </p:grpSpPr>
+      <p:sp>
+        <p:nvSpPr>
+          <p:cNvPr id="2" name="Title 1">
+            <a:extLst>
+              <a:ext uri="{FF2B5EF4-FFF2-40B4-BE49-F238E27FC236}">
+                <a16:creationId xmlns:a16="http://schemas.microsoft.com/office/drawing/2014/main" id="{F75A77DD-319B-B8CB-067B-809A82565BFD}"/>
+              </a:ext>
+            </a:extLst>
+          </p:cNvPr>
+          <p:cNvSpPr>
+            <a:spLocks noGrp="1"/>
+          </p:cNvSpPr>
+          <p:nvPr>
+            <p:ph type="title"/>
+          </p:nvPr>
+        </p:nvSpPr>
+        <p:spPr/>
+        <p:txBody>
+          <a:bodyPr/>
+          <a:lstStyle/>
+          <a:p>
+            <a:r>
+              <a:rPr lang="en-US" dirty="0"/>
+              <a:t>What does this Program do ? Q5</a:t>
+            </a:r>
+          </a:p>
+        </p:txBody>
+      </p:sp>
+      <p:pic>
+        <p:nvPicPr>
+          <p:cNvPr id="9" name="Content Placeholder 8">
+            <a:extLst>
+              <a:ext uri="{FF2B5EF4-FFF2-40B4-BE49-F238E27FC236}">
+                <a16:creationId xmlns:a16="http://schemas.microsoft.com/office/drawing/2014/main" id="{FC0C0A05-4862-B677-A23E-72B3ADC71989}"/>
+              </a:ext>
+            </a:extLst>
+          </p:cNvPr>
+          <p:cNvPicPr>
+            <a:picLocks noGrp="1" noChangeAspect="1"/>
+          </p:cNvPicPr>
+          <p:nvPr>
+            <p:ph idx="1"/>
+          </p:nvPr>
+        </p:nvPicPr>
+        <p:blipFill>
+          <a:blip r:embed="rId2"/>
+          <a:stretch>
+            <a:fillRect/>
+          </a:stretch>
+        </p:blipFill>
+        <p:spPr>
+          <a:xfrm>
+            <a:off x="980142" y="1974397"/>
+            <a:ext cx="5115858" cy="3761236"/>
+          </a:xfrm>
+        </p:spPr>
+      </p:pic>
+    </p:spTree>
+    <p:extLst>
+      <p:ext uri="{BB962C8B-B14F-4D97-AF65-F5344CB8AC3E}">
+        <p14:creationId xmlns:p14="http://schemas.microsoft.com/office/powerpoint/2010/main" val="2237300741"/>
+      </p:ext>
+    </p:extLst>
+  </p:cSld>
+  <p:clrMapOvr>
+    <a:masterClrMapping/>
+  </p:clrMapOvr>
+</p:sld>
+</file>
+
+<file path=ppt/slides/slide65.xml><?xml version="1.0" encoding="utf-8"?>
+<p:sld xmlns:a="http://schemas.openxmlformats.org/drawingml/2006/main" xmlns:r="http://schemas.openxmlformats.org/officeDocument/2006/relationships" xmlns:p="http://schemas.openxmlformats.org/presentationml/2006/main">
+  <p:cSld>
+    <p:spTree>
+      <p:nvGrpSpPr>
+        <p:cNvPr id="1" name="">
+          <a:extLst>
+            <a:ext uri="{FF2B5EF4-FFF2-40B4-BE49-F238E27FC236}">
+              <a16:creationId xmlns:a16="http://schemas.microsoft.com/office/drawing/2014/main" id="{2540BD29-74FC-E5C5-470F-3990F5AACF10}"/>
+            </a:ext>
+          </a:extLst>
+        </p:cNvPr>
+        <p:cNvGrpSpPr/>
+        <p:nvPr/>
+      </p:nvGrpSpPr>
+      <p:grpSpPr>
+        <a:xfrm>
+          <a:off x="0" y="0"/>
+          <a:ext cx="0" cy="0"/>
+          <a:chOff x="0" y="0"/>
+          <a:chExt cx="0" cy="0"/>
+        </a:xfrm>
+      </p:grpSpPr>
+      <p:sp>
+        <p:nvSpPr>
+          <p:cNvPr id="2" name="Title 1">
+            <a:extLst>
+              <a:ext uri="{FF2B5EF4-FFF2-40B4-BE49-F238E27FC236}">
+                <a16:creationId xmlns:a16="http://schemas.microsoft.com/office/drawing/2014/main" id="{37979C6D-9E88-105F-5872-247603B44F81}"/>
+              </a:ext>
+            </a:extLst>
+          </p:cNvPr>
+          <p:cNvSpPr>
+            <a:spLocks noGrp="1"/>
+          </p:cNvSpPr>
+          <p:nvPr>
+            <p:ph type="title"/>
+          </p:nvPr>
+        </p:nvSpPr>
+        <p:spPr/>
+        <p:txBody>
+          <a:bodyPr/>
+          <a:lstStyle/>
+          <a:p>
+            <a:r>
+              <a:rPr lang="en-US" dirty="0"/>
+              <a:t>What does this Program do ? A5</a:t>
+            </a:r>
+          </a:p>
+        </p:txBody>
+      </p:sp>
+      <p:sp>
+        <p:nvSpPr>
+          <p:cNvPr id="4" name="Content Placeholder 3">
+            <a:extLst>
+              <a:ext uri="{FF2B5EF4-FFF2-40B4-BE49-F238E27FC236}">
+                <a16:creationId xmlns:a16="http://schemas.microsoft.com/office/drawing/2014/main" id="{9334BE19-7D70-249A-4EC2-6DAB233B065E}"/>
+              </a:ext>
+            </a:extLst>
+          </p:cNvPr>
+          <p:cNvSpPr>
+            <a:spLocks noGrp="1"/>
+          </p:cNvSpPr>
+          <p:nvPr>
+            <p:ph idx="1"/>
+          </p:nvPr>
+        </p:nvSpPr>
+        <p:spPr/>
+        <p:txBody>
+          <a:bodyPr>
+            <a:normAutofit/>
+          </a:bodyPr>
+          <a:lstStyle/>
+          <a:p>
+            <a:r>
+              <a:rPr lang="en-US" dirty="0"/>
+              <a:t>Divide every element by 3</a:t>
+            </a:r>
+          </a:p>
+          <a:p>
+            <a:r>
+              <a:rPr lang="en-US" dirty="0"/>
+              <a:t>Output 1,2,3,4,5</a:t>
+            </a:r>
+          </a:p>
+          <a:p>
+            <a:endParaRPr lang="en-US" dirty="0"/>
+          </a:p>
+          <a:p>
+            <a:pPr marL="0" indent="0">
+              <a:buNone/>
+            </a:pPr>
+            <a:r>
+              <a:rPr lang="en-US" sz="2000" b="1" u="sng" dirty="0"/>
+              <a:t>Index	Original		New</a:t>
+            </a:r>
+          </a:p>
+          <a:p>
+            <a:pPr marL="0" indent="0">
+              <a:buNone/>
+            </a:pPr>
+            <a:r>
+              <a:rPr lang="en-US" sz="2000" dirty="0"/>
+              <a:t>0	3		1</a:t>
+            </a:r>
+          </a:p>
+          <a:p>
+            <a:pPr marL="0" indent="0">
+              <a:buNone/>
+            </a:pPr>
+            <a:r>
+              <a:rPr lang="en-US" sz="2000" dirty="0"/>
+              <a:t>1	6		2</a:t>
+            </a:r>
+          </a:p>
+          <a:p>
+            <a:pPr marL="0" indent="0">
+              <a:buNone/>
+            </a:pPr>
+            <a:r>
+              <a:rPr lang="en-US" sz="2000" dirty="0"/>
+              <a:t>2	9		3</a:t>
+            </a:r>
+          </a:p>
+          <a:p>
+            <a:pPr marL="0" indent="0">
+              <a:buNone/>
+            </a:pPr>
+            <a:r>
+              <a:rPr lang="en-US" sz="2000" dirty="0"/>
+              <a:t>3	12		4</a:t>
+            </a:r>
+          </a:p>
+          <a:p>
+            <a:pPr marL="0" indent="0">
+              <a:buNone/>
+            </a:pPr>
+            <a:r>
+              <a:rPr lang="en-US" sz="2000" dirty="0"/>
+              <a:t>4	15		5</a:t>
+            </a:r>
+          </a:p>
+        </p:txBody>
+      </p:sp>
+      <p:pic>
+        <p:nvPicPr>
+          <p:cNvPr id="5" name="Content Placeholder 8">
+            <a:extLst>
+              <a:ext uri="{FF2B5EF4-FFF2-40B4-BE49-F238E27FC236}">
+                <a16:creationId xmlns:a16="http://schemas.microsoft.com/office/drawing/2014/main" id="{F3508B81-D07D-9A2E-711A-108335FFF1E5}"/>
+              </a:ext>
+            </a:extLst>
+          </p:cNvPr>
+          <p:cNvPicPr>
+            <a:picLocks noChangeAspect="1"/>
+          </p:cNvPicPr>
+          <p:nvPr/>
+        </p:nvPicPr>
+        <p:blipFill>
+          <a:blip r:embed="rId2"/>
+          <a:stretch>
+            <a:fillRect/>
+          </a:stretch>
+        </p:blipFill>
+        <p:spPr>
+          <a:xfrm>
+            <a:off x="5804391" y="1825625"/>
+            <a:ext cx="5115858" cy="3761236"/>
+          </a:xfrm>
+          <a:prstGeom prst="rect">
+            <a:avLst/>
+          </a:prstGeom>
+        </p:spPr>
+      </p:pic>
+    </p:spTree>
+    <p:extLst>
+      <p:ext uri="{BB962C8B-B14F-4D97-AF65-F5344CB8AC3E}">
+        <p14:creationId xmlns:p14="http://schemas.microsoft.com/office/powerpoint/2010/main" val="3641379389"/>
+      </p:ext>
+    </p:extLst>
+  </p:cSld>
+  <p:clrMapOvr>
+    <a:masterClrMapping/>
+  </p:clrMapOvr>
+</p:sld>
+</file>
+
+<file path=ppt/slides/slide66.xml><?xml version="1.0" encoding="utf-8"?>
+<p:sld xmlns:a="http://schemas.openxmlformats.org/drawingml/2006/main" xmlns:r="http://schemas.openxmlformats.org/officeDocument/2006/relationships" xmlns:p="http://schemas.openxmlformats.org/presentationml/2006/main">
+  <p:cSld>
+    <p:spTree>
+      <p:nvGrpSpPr>
+        <p:cNvPr id="1" name="">
+          <a:extLst>
+            <a:ext uri="{FF2B5EF4-FFF2-40B4-BE49-F238E27FC236}">
+              <a16:creationId xmlns:a16="http://schemas.microsoft.com/office/drawing/2014/main" id="{2F39EAE1-601F-A56C-2093-29AE055F3DE0}"/>
+            </a:ext>
+          </a:extLst>
+        </p:cNvPr>
+        <p:cNvGrpSpPr/>
+        <p:nvPr/>
+      </p:nvGrpSpPr>
+      <p:grpSpPr>
+        <a:xfrm>
+          <a:off x="0" y="0"/>
+          <a:ext cx="0" cy="0"/>
+          <a:chOff x="0" y="0"/>
+          <a:chExt cx="0" cy="0"/>
+        </a:xfrm>
+      </p:grpSpPr>
+      <p:sp>
+        <p:nvSpPr>
+          <p:cNvPr id="2" name="Title 1">
+            <a:extLst>
+              <a:ext uri="{FF2B5EF4-FFF2-40B4-BE49-F238E27FC236}">
+                <a16:creationId xmlns:a16="http://schemas.microsoft.com/office/drawing/2014/main" id="{6FEDAB8B-D489-C7C1-2756-DEA23A56D41B}"/>
+              </a:ext>
+            </a:extLst>
+          </p:cNvPr>
+          <p:cNvSpPr>
+            <a:spLocks noGrp="1"/>
+          </p:cNvSpPr>
+          <p:nvPr>
+            <p:ph type="title"/>
+          </p:nvPr>
+        </p:nvSpPr>
+        <p:spPr/>
+        <p:txBody>
+          <a:bodyPr/>
+          <a:lstStyle/>
+          <a:p>
+            <a:r>
+              <a:rPr lang="en-US" dirty="0"/>
+              <a:t>What does this Program do ? Q6</a:t>
+            </a:r>
+          </a:p>
+        </p:txBody>
+      </p:sp>
+      <p:pic>
+        <p:nvPicPr>
+          <p:cNvPr id="11" name="Content Placeholder 10">
+            <a:extLst>
+              <a:ext uri="{FF2B5EF4-FFF2-40B4-BE49-F238E27FC236}">
+                <a16:creationId xmlns:a16="http://schemas.microsoft.com/office/drawing/2014/main" id="{72843AFF-E13C-780D-9B6E-B591AD0F0213}"/>
+              </a:ext>
+            </a:extLst>
+          </p:cNvPr>
+          <p:cNvPicPr>
+            <a:picLocks noGrp="1" noChangeAspect="1"/>
+          </p:cNvPicPr>
+          <p:nvPr>
+            <p:ph idx="1"/>
+          </p:nvPr>
+        </p:nvPicPr>
+        <p:blipFill>
+          <a:blip r:embed="rId2"/>
+          <a:stretch>
+            <a:fillRect/>
+          </a:stretch>
+        </p:blipFill>
+        <p:spPr>
+          <a:xfrm>
+            <a:off x="1146549" y="1797789"/>
+            <a:ext cx="4429201" cy="3822618"/>
+          </a:xfrm>
+        </p:spPr>
+      </p:pic>
+    </p:spTree>
+    <p:extLst>
+      <p:ext uri="{BB962C8B-B14F-4D97-AF65-F5344CB8AC3E}">
+        <p14:creationId xmlns:p14="http://schemas.microsoft.com/office/powerpoint/2010/main" val="569505228"/>
+      </p:ext>
+    </p:extLst>
+  </p:cSld>
+  <p:clrMapOvr>
+    <a:masterClrMapping/>
+  </p:clrMapOvr>
+</p:sld>
+</file>
+
+<file path=ppt/slides/slide67.xml><?xml version="1.0" encoding="utf-8"?>
+<p:sld xmlns:a="http://schemas.openxmlformats.org/drawingml/2006/main" xmlns:r="http://schemas.openxmlformats.org/officeDocument/2006/relationships" xmlns:p="http://schemas.openxmlformats.org/presentationml/2006/main">
+  <p:cSld>
+    <p:spTree>
+      <p:nvGrpSpPr>
+        <p:cNvPr id="1" name="">
+          <a:extLst>
+            <a:ext uri="{FF2B5EF4-FFF2-40B4-BE49-F238E27FC236}">
+              <a16:creationId xmlns:a16="http://schemas.microsoft.com/office/drawing/2014/main" id="{D6662DFB-A262-168F-C564-5942A84A8E23}"/>
+            </a:ext>
+          </a:extLst>
+        </p:cNvPr>
+        <p:cNvGrpSpPr/>
+        <p:nvPr/>
+      </p:nvGrpSpPr>
+      <p:grpSpPr>
+        <a:xfrm>
+          <a:off x="0" y="0"/>
+          <a:ext cx="0" cy="0"/>
+          <a:chOff x="0" y="0"/>
+          <a:chExt cx="0" cy="0"/>
+        </a:xfrm>
+      </p:grpSpPr>
+      <p:sp>
+        <p:nvSpPr>
+          <p:cNvPr id="2" name="Title 1">
+            <a:extLst>
+              <a:ext uri="{FF2B5EF4-FFF2-40B4-BE49-F238E27FC236}">
+                <a16:creationId xmlns:a16="http://schemas.microsoft.com/office/drawing/2014/main" id="{A358F048-1DC8-9E32-EFE2-3C47F27D689D}"/>
+              </a:ext>
+            </a:extLst>
+          </p:cNvPr>
+          <p:cNvSpPr>
+            <a:spLocks noGrp="1"/>
+          </p:cNvSpPr>
+          <p:nvPr>
+            <p:ph type="title"/>
+          </p:nvPr>
+        </p:nvSpPr>
+        <p:spPr/>
+        <p:txBody>
+          <a:bodyPr/>
+          <a:lstStyle/>
+          <a:p>
+            <a:r>
+              <a:rPr lang="en-US" dirty="0"/>
+              <a:t>What does this Program do ? A6</a:t>
+            </a:r>
+          </a:p>
+        </p:txBody>
+      </p:sp>
+      <p:sp>
+        <p:nvSpPr>
+          <p:cNvPr id="4" name="Content Placeholder 3">
+            <a:extLst>
+              <a:ext uri="{FF2B5EF4-FFF2-40B4-BE49-F238E27FC236}">
+                <a16:creationId xmlns:a16="http://schemas.microsoft.com/office/drawing/2014/main" id="{95021129-1CA9-751A-B267-B30A3E1BF83B}"/>
+              </a:ext>
+            </a:extLst>
+          </p:cNvPr>
+          <p:cNvSpPr>
+            <a:spLocks noGrp="1"/>
+          </p:cNvSpPr>
+          <p:nvPr>
+            <p:ph idx="1"/>
+          </p:nvPr>
+        </p:nvSpPr>
+        <p:spPr/>
+        <p:txBody>
+          <a:bodyPr/>
+          <a:lstStyle/>
+          <a:p>
+            <a:r>
+              <a:rPr lang="en-US" dirty="0"/>
+              <a:t>Single pass swap</a:t>
+            </a:r>
+          </a:p>
+          <a:p>
+            <a:pPr lvl="1"/>
+            <a:r>
+              <a:rPr lang="en-US" dirty="0"/>
+              <a:t>Output  : 1,4,2,5</a:t>
+            </a:r>
+          </a:p>
+          <a:p>
+            <a:pPr lvl="1"/>
+            <a:r>
+              <a:rPr lang="en-US" b="1" dirty="0"/>
+              <a:t>Note : not sorted</a:t>
+            </a:r>
+          </a:p>
+          <a:p>
+            <a:r>
+              <a:rPr lang="en-US" dirty="0"/>
+              <a:t>i =0 </a:t>
+            </a:r>
+          </a:p>
+          <a:p>
+            <a:pPr lvl="1"/>
+            <a:r>
+              <a:rPr lang="en-US" dirty="0"/>
+              <a:t>5 &gt; 1 → swap → [1, 5, 4, 2]</a:t>
+            </a:r>
+          </a:p>
+          <a:p>
+            <a:r>
+              <a:rPr lang="en-US" dirty="0"/>
+              <a:t>i =1 </a:t>
+            </a:r>
+          </a:p>
+          <a:p>
+            <a:pPr lvl="1"/>
+            <a:r>
+              <a:rPr lang="en-US" dirty="0"/>
+              <a:t>5 &gt; 4 → swap → [1, 4, 5, 2]</a:t>
+            </a:r>
+          </a:p>
+          <a:p>
+            <a:r>
+              <a:rPr lang="en-US" dirty="0"/>
+              <a:t>i = 2</a:t>
+            </a:r>
+          </a:p>
+          <a:p>
+            <a:pPr lvl="1"/>
+            <a:r>
+              <a:rPr lang="en-US" dirty="0"/>
+              <a:t>5 &gt; 2 → swap → [1, 4, 2, 5]</a:t>
+            </a:r>
+          </a:p>
+        </p:txBody>
+      </p:sp>
+      <p:pic>
+        <p:nvPicPr>
+          <p:cNvPr id="5" name="Content Placeholder 10">
+            <a:extLst>
+              <a:ext uri="{FF2B5EF4-FFF2-40B4-BE49-F238E27FC236}">
+                <a16:creationId xmlns:a16="http://schemas.microsoft.com/office/drawing/2014/main" id="{8FF07BF5-47E4-D416-E383-A4DE3956544D}"/>
+              </a:ext>
+            </a:extLst>
+          </p:cNvPr>
+          <p:cNvPicPr>
+            <a:picLocks noChangeAspect="1"/>
+          </p:cNvPicPr>
+          <p:nvPr/>
+        </p:nvPicPr>
+        <p:blipFill>
+          <a:blip r:embed="rId2"/>
+          <a:stretch>
+            <a:fillRect/>
+          </a:stretch>
+        </p:blipFill>
+        <p:spPr>
+          <a:xfrm>
+            <a:off x="6443763" y="1794094"/>
+            <a:ext cx="4429201" cy="3822618"/>
+          </a:xfrm>
+          <a:prstGeom prst="rect">
+            <a:avLst/>
+          </a:prstGeom>
+        </p:spPr>
+      </p:pic>
+    </p:spTree>
+    <p:extLst>
+      <p:ext uri="{BB962C8B-B14F-4D97-AF65-F5344CB8AC3E}">
+        <p14:creationId xmlns:p14="http://schemas.microsoft.com/office/powerpoint/2010/main" val="1506005300"/>
+      </p:ext>
+    </p:extLst>
+  </p:cSld>
+  <p:clrMapOvr>
+    <a:masterClrMapping/>
+  </p:clrMapOvr>
+</p:sld>
+</file>
+
+<file path=ppt/slides/slide68.xml><?xml version="1.0" encoding="utf-8"?>
+<p:sld xmlns:a="http://schemas.openxmlformats.org/drawingml/2006/main" xmlns:r="http://schemas.openxmlformats.org/officeDocument/2006/relationships" xmlns:p="http://schemas.openxmlformats.org/presentationml/2006/main">
+  <p:cSld>
+    <p:spTree>
+      <p:nvGrpSpPr>
+        <p:cNvPr id="1" name="">
+          <a:extLst>
+            <a:ext uri="{FF2B5EF4-FFF2-40B4-BE49-F238E27FC236}">
+              <a16:creationId xmlns:a16="http://schemas.microsoft.com/office/drawing/2014/main" id="{BCE41701-2B07-168C-3CE8-98E848A82FC0}"/>
+            </a:ext>
+          </a:extLst>
+        </p:cNvPr>
+        <p:cNvGrpSpPr/>
+        <p:nvPr/>
+      </p:nvGrpSpPr>
+      <p:grpSpPr>
+        <a:xfrm>
+          <a:off x="0" y="0"/>
+          <a:ext cx="0" cy="0"/>
+          <a:chOff x="0" y="0"/>
+          <a:chExt cx="0" cy="0"/>
+        </a:xfrm>
+      </p:grpSpPr>
+      <p:sp>
+        <p:nvSpPr>
+          <p:cNvPr id="2" name="Title 1">
+            <a:extLst>
+              <a:ext uri="{FF2B5EF4-FFF2-40B4-BE49-F238E27FC236}">
+                <a16:creationId xmlns:a16="http://schemas.microsoft.com/office/drawing/2014/main" id="{B02690C7-DB50-C566-790E-BA6542271B78}"/>
+              </a:ext>
+            </a:extLst>
+          </p:cNvPr>
+          <p:cNvSpPr>
+            <a:spLocks noGrp="1"/>
+          </p:cNvSpPr>
+          <p:nvPr>
+            <p:ph type="title"/>
+          </p:nvPr>
+        </p:nvSpPr>
+        <p:spPr/>
+        <p:txBody>
+          <a:bodyPr/>
+          <a:lstStyle/>
+          <a:p>
+            <a:r>
+              <a:rPr lang="en-US" dirty="0"/>
+              <a:t>What does this Program do ? Q7</a:t>
+            </a:r>
+          </a:p>
+        </p:txBody>
+      </p:sp>
+      <p:pic>
+        <p:nvPicPr>
+          <p:cNvPr id="10" name="Content Placeholder 9">
+            <a:extLst>
+              <a:ext uri="{FF2B5EF4-FFF2-40B4-BE49-F238E27FC236}">
+                <a16:creationId xmlns:a16="http://schemas.microsoft.com/office/drawing/2014/main" id="{25D88EB9-52CD-71F3-E0F2-B1C3E81007F7}"/>
+              </a:ext>
+            </a:extLst>
+          </p:cNvPr>
+          <p:cNvPicPr>
+            <a:picLocks noGrp="1" noChangeAspect="1"/>
+          </p:cNvPicPr>
+          <p:nvPr>
+            <p:ph idx="1"/>
+          </p:nvPr>
+        </p:nvPicPr>
+        <p:blipFill>
+          <a:blip r:embed="rId2"/>
+          <a:stretch>
+            <a:fillRect/>
+          </a:stretch>
+        </p:blipFill>
+        <p:spPr>
+          <a:xfrm>
+            <a:off x="993579" y="1865448"/>
+            <a:ext cx="6035752" cy="3857435"/>
+          </a:xfrm>
+        </p:spPr>
+      </p:pic>
+    </p:spTree>
+    <p:extLst>
+      <p:ext uri="{BB962C8B-B14F-4D97-AF65-F5344CB8AC3E}">
+        <p14:creationId xmlns:p14="http://schemas.microsoft.com/office/powerpoint/2010/main" val="2234398235"/>
+      </p:ext>
+    </p:extLst>
+  </p:cSld>
+  <p:clrMapOvr>
+    <a:masterClrMapping/>
+  </p:clrMapOvr>
+</p:sld>
+</file>
+
+<file path=ppt/slides/slide69.xml><?xml version="1.0" encoding="utf-8"?>
+<p:sld xmlns:a="http://schemas.openxmlformats.org/drawingml/2006/main" xmlns:r="http://schemas.openxmlformats.org/officeDocument/2006/relationships" xmlns:p="http://schemas.openxmlformats.org/presentationml/2006/main">
+  <p:cSld>
+    <p:spTree>
+      <p:nvGrpSpPr>
+        <p:cNvPr id="1" name="">
+          <a:extLst>
+            <a:ext uri="{FF2B5EF4-FFF2-40B4-BE49-F238E27FC236}">
+              <a16:creationId xmlns:a16="http://schemas.microsoft.com/office/drawing/2014/main" id="{DB6F3EA2-E343-1A42-A5E7-A2086BD5E62E}"/>
+            </a:ext>
+          </a:extLst>
+        </p:cNvPr>
+        <p:cNvGrpSpPr/>
+        <p:nvPr/>
+      </p:nvGrpSpPr>
+      <p:grpSpPr>
+        <a:xfrm>
+          <a:off x="0" y="0"/>
+          <a:ext cx="0" cy="0"/>
+          <a:chOff x="0" y="0"/>
+          <a:chExt cx="0" cy="0"/>
+        </a:xfrm>
+      </p:grpSpPr>
+      <p:sp>
+        <p:nvSpPr>
+          <p:cNvPr id="2" name="Title 1">
+            <a:extLst>
+              <a:ext uri="{FF2B5EF4-FFF2-40B4-BE49-F238E27FC236}">
+                <a16:creationId xmlns:a16="http://schemas.microsoft.com/office/drawing/2014/main" id="{54AC3823-B7E6-19CD-407F-88073F85EC24}"/>
+              </a:ext>
+            </a:extLst>
+          </p:cNvPr>
+          <p:cNvSpPr>
+            <a:spLocks noGrp="1"/>
+          </p:cNvSpPr>
+          <p:nvPr>
+            <p:ph type="title"/>
+          </p:nvPr>
+        </p:nvSpPr>
+        <p:spPr/>
+        <p:txBody>
+          <a:bodyPr/>
+          <a:lstStyle/>
+          <a:p>
+            <a:r>
+              <a:rPr lang="en-US" dirty="0"/>
+              <a:t>What does this Program do ? A7</a:t>
+            </a:r>
+          </a:p>
+        </p:txBody>
+      </p:sp>
+      <p:sp>
+        <p:nvSpPr>
+          <p:cNvPr id="4" name="Content Placeholder 3">
+            <a:extLst>
+              <a:ext uri="{FF2B5EF4-FFF2-40B4-BE49-F238E27FC236}">
+                <a16:creationId xmlns:a16="http://schemas.microsoft.com/office/drawing/2014/main" id="{E9B6A43E-791C-1ED0-32A3-D7FAA0FD798B}"/>
+              </a:ext>
+            </a:extLst>
+          </p:cNvPr>
+          <p:cNvSpPr>
+            <a:spLocks noGrp="1"/>
+          </p:cNvSpPr>
+          <p:nvPr>
+            <p:ph idx="1"/>
+          </p:nvPr>
+        </p:nvSpPr>
+        <p:spPr/>
+        <p:txBody>
+          <a:bodyPr>
+            <a:normAutofit/>
+          </a:bodyPr>
+          <a:lstStyle/>
+          <a:p>
+            <a:r>
+              <a:rPr lang="en-US" dirty="0"/>
+              <a:t>Print prime factors </a:t>
+            </a:r>
+          </a:p>
+          <a:p>
+            <a:pPr lvl="1"/>
+            <a:r>
+              <a:rPr lang="en-US" dirty="0"/>
+              <a:t>Output 2 2 5 5</a:t>
+            </a:r>
+          </a:p>
+          <a:p>
+            <a:pPr lvl="1"/>
+            <a:endParaRPr lang="en-US" dirty="0"/>
+          </a:p>
+          <a:p>
+            <a:pPr marL="457200" lvl="1" indent="0">
+              <a:buNone/>
+            </a:pPr>
+            <a:r>
+              <a:rPr lang="pt-BR" sz="2000" b="1" u="sng" dirty="0"/>
+              <a:t>Step  x	num	action</a:t>
+            </a:r>
+          </a:p>
+          <a:p>
+            <a:pPr marL="457200" lvl="1" indent="0">
+              <a:buNone/>
+            </a:pPr>
+            <a:r>
+              <a:rPr lang="pt-BR" sz="2000" dirty="0"/>
+              <a:t>1	   2	100	print 2 → num=50</a:t>
+            </a:r>
+          </a:p>
+          <a:p>
+            <a:pPr marL="457200" lvl="1" indent="0">
+              <a:buNone/>
+            </a:pPr>
+            <a:r>
+              <a:rPr lang="pt-BR" sz="2000" dirty="0"/>
+              <a:t>2	   2	50	print 2 → num=25</a:t>
+            </a:r>
+          </a:p>
+          <a:p>
+            <a:pPr marL="457200" lvl="1" indent="0">
+              <a:buNone/>
+            </a:pPr>
+            <a:r>
+              <a:rPr lang="pt-BR" sz="2000" dirty="0"/>
+              <a:t>3	   2	25	no → x=3</a:t>
+            </a:r>
+          </a:p>
+          <a:p>
+            <a:pPr marL="457200" lvl="1" indent="0">
+              <a:buNone/>
+            </a:pPr>
+            <a:r>
+              <a:rPr lang="pt-BR" sz="2000" dirty="0"/>
+              <a:t>4	   3	25	no → x=4</a:t>
+            </a:r>
+          </a:p>
+          <a:p>
+            <a:pPr marL="457200" lvl="1" indent="0">
+              <a:buNone/>
+            </a:pPr>
+            <a:r>
+              <a:rPr lang="pt-BR" sz="2000" dirty="0"/>
+              <a:t>5	   4	25	no → x=5</a:t>
+            </a:r>
+          </a:p>
+          <a:p>
+            <a:pPr marL="457200" lvl="1" indent="0">
+              <a:buNone/>
+            </a:pPr>
+            <a:r>
+              <a:rPr lang="pt-BR" sz="2000" dirty="0"/>
+              <a:t>6	   5	25	print 5 → num=5</a:t>
+            </a:r>
+          </a:p>
+          <a:p>
+            <a:pPr marL="457200" lvl="1" indent="0">
+              <a:buNone/>
+            </a:pPr>
+            <a:r>
+              <a:rPr lang="pt-BR" sz="2000" dirty="0"/>
+              <a:t>7	   5	5	print 5 → num=1</a:t>
+            </a:r>
+            <a:endParaRPr lang="en-US" sz="2000" dirty="0"/>
+          </a:p>
+        </p:txBody>
+      </p:sp>
+      <p:pic>
+        <p:nvPicPr>
+          <p:cNvPr id="5" name="Content Placeholder 9">
+            <a:extLst>
+              <a:ext uri="{FF2B5EF4-FFF2-40B4-BE49-F238E27FC236}">
+                <a16:creationId xmlns:a16="http://schemas.microsoft.com/office/drawing/2014/main" id="{7A3A6A90-E3AB-179D-99A4-778692989F89}"/>
+              </a:ext>
+            </a:extLst>
+          </p:cNvPr>
+          <p:cNvPicPr>
+            <a:picLocks noChangeAspect="1"/>
+          </p:cNvPicPr>
+          <p:nvPr/>
+        </p:nvPicPr>
+        <p:blipFill>
+          <a:blip r:embed="rId2"/>
+          <a:stretch>
+            <a:fillRect/>
+          </a:stretch>
+        </p:blipFill>
+        <p:spPr>
+          <a:xfrm>
+            <a:off x="5762648" y="2072576"/>
+            <a:ext cx="6035752" cy="3857435"/>
+          </a:xfrm>
+          <a:prstGeom prst="rect">
+            <a:avLst/>
+          </a:prstGeom>
+        </p:spPr>
+      </p:pic>
+    </p:spTree>
+    <p:extLst>
+      <p:ext uri="{BB962C8B-B14F-4D97-AF65-F5344CB8AC3E}">
+        <p14:creationId xmlns:p14="http://schemas.microsoft.com/office/powerpoint/2010/main" val="3150378485"/>
       </p:ext>
     </p:extLst>
   </p:cSld>

</xml_diff>

<commit_message>
Boolean algebra and cleanup
</commit_message>
<xml_diff>
--- a/all/ExploringCSConceptsViaACSLCompetitions_all.pptx
+++ b/all/ExploringCSConceptsViaACSLCompetitions_all.pptx
@@ -5,7 +5,7 @@
     <p:sldMasterId id="2147483648" r:id="rId1"/>
   </p:sldMasterIdLst>
   <p:notesMasterIdLst>
-    <p:notesMasterId r:id="rId71"/>
+    <p:notesMasterId r:id="rId77"/>
   </p:notesMasterIdLst>
   <p:sldIdLst>
     <p:sldId id="256" r:id="rId2"/>
@@ -77,6 +77,12 @@
     <p:sldId id="334" r:id="rId68"/>
     <p:sldId id="328" r:id="rId69"/>
     <p:sldId id="335" r:id="rId70"/>
+    <p:sldId id="336" r:id="rId71"/>
+    <p:sldId id="338" r:id="rId72"/>
+    <p:sldId id="339" r:id="rId73"/>
+    <p:sldId id="340" r:id="rId74"/>
+    <p:sldId id="341" r:id="rId75"/>
+    <p:sldId id="342" r:id="rId76"/>
   </p:sldIdLst>
   <p:sldSz cx="12192000" cy="6858000"/>
   <p:notesSz cx="6858000" cy="9144000"/>
@@ -454,7 +460,7 @@
           <a:p>
             <a:fld id="{15653688-98A8-4F3B-A740-8E6568AE1BCB}" type="datetimeFigureOut">
               <a:rPr lang="en-US" smtClean="0"/>
-              <a:t>2/5/2026</a:t>
+              <a:t>2/19/2026</a:t>
             </a:fld>
             <a:endParaRPr lang="en-US"/>
           </a:p>
@@ -1007,6 +1013,476 @@
 </p:notes>
 </file>
 
+<file path=ppt/notesSlides/notesSlide4.xml><?xml version="1.0" encoding="utf-8"?>
+<p:notes xmlns:a="http://schemas.openxmlformats.org/drawingml/2006/main" xmlns:r="http://schemas.openxmlformats.org/officeDocument/2006/relationships" xmlns:p="http://schemas.openxmlformats.org/presentationml/2006/main">
+  <p:cSld>
+    <p:spTree>
+      <p:nvGrpSpPr>
+        <p:cNvPr id="1" name=""/>
+        <p:cNvGrpSpPr/>
+        <p:nvPr/>
+      </p:nvGrpSpPr>
+      <p:grpSpPr>
+        <a:xfrm>
+          <a:off x="0" y="0"/>
+          <a:ext cx="0" cy="0"/>
+          <a:chOff x="0" y="0"/>
+          <a:chExt cx="0" cy="0"/>
+        </a:xfrm>
+      </p:grpSpPr>
+      <p:sp>
+        <p:nvSpPr>
+          <p:cNvPr id="2" name="Slide Image Placeholder 1"/>
+          <p:cNvSpPr>
+            <a:spLocks noGrp="1" noRot="1" noChangeAspect="1"/>
+          </p:cNvSpPr>
+          <p:nvPr>
+            <p:ph type="sldImg"/>
+          </p:nvPr>
+        </p:nvSpPr>
+        <p:spPr/>
+      </p:sp>
+      <mc:AlternateContent xmlns:mc="http://schemas.openxmlformats.org/markup-compatibility/2006">
+        <mc:Choice xmlns:a14="http://schemas.microsoft.com/office/drawing/2010/main" Requires="a14">
+          <p:sp>
+            <p:nvSpPr>
+              <p:cNvPr id="3" name="Notes Placeholder 2"/>
+              <p:cNvSpPr>
+                <a:spLocks noGrp="1"/>
+              </p:cNvSpPr>
+              <p:nvPr>
+                <p:ph type="body" idx="1"/>
+              </p:nvPr>
+            </p:nvSpPr>
+            <p:spPr/>
+            <p:txBody>
+              <a:bodyPr/>
+              <a:lstStyle/>
+              <a:p>
+                <a:pPr marL="457200" marR="0" lvl="1" indent="0" algn="l" defTabSz="914400" rtl="0" eaLnBrk="1" fontAlgn="auto" latinLnBrk="0" hangingPunct="1">
+                  <a:lnSpc>
+                    <a:spcPct val="100000"/>
+                  </a:lnSpc>
+                  <a:spcBef>
+                    <a:spcPts val="0"/>
+                  </a:spcBef>
+                  <a:spcAft>
+                    <a:spcPts val="0"/>
+                  </a:spcAft>
+                  <a:buClrTx/>
+                  <a:buSzTx/>
+                  <a:buFontTx/>
+                  <a:buNone/>
+                  <a:tabLst/>
+                  <a:defRPr/>
+                </a:pPr>
+                <a14:m>
+                  <m:oMathPara xmlns:m="http://schemas.openxmlformats.org/officeDocument/2006/math">
+                    <m:oMathParaPr>
+                      <m:jc m:val="centerGroup"/>
+                    </m:oMathParaPr>
+                    <m:oMath xmlns:m="http://schemas.openxmlformats.org/officeDocument/2006/math">
+                      <m:d>
+                        <m:dPr>
+                          <m:ctrlPr>
+                            <a:rPr lang="en-US" b="0" i="1" smtClean="0">
+                              <a:latin typeface="Cambria Math" panose="02040503050406030204" pitchFamily="18" charset="0"/>
+                            </a:rPr>
+                          </m:ctrlPr>
+                        </m:dPr>
+                        <m:e>
+                          <m:r>
+                            <a:rPr lang="en-US" b="0" i="1" smtClean="0">
+                              <a:latin typeface="Cambria Math" panose="02040503050406030204" pitchFamily="18" charset="0"/>
+                            </a:rPr>
+                            <m:t>𝐴</m:t>
+                          </m:r>
+                          <m:r>
+                            <a:rPr lang="en-US" b="0" i="1" smtClean="0">
+                              <a:latin typeface="Cambria Math" panose="02040503050406030204" pitchFamily="18" charset="0"/>
+                            </a:rPr>
+                            <m:t>+</m:t>
+                          </m:r>
+                          <m:r>
+                            <a:rPr lang="en-US" b="0" i="1" smtClean="0">
+                              <a:latin typeface="Cambria Math" panose="02040503050406030204" pitchFamily="18" charset="0"/>
+                            </a:rPr>
+                            <m:t>𝐵</m:t>
+                          </m:r>
+                        </m:e>
+                      </m:d>
+                      <m:r>
+                        <a:rPr lang="en-US" b="0" i="1" smtClean="0">
+                          <a:latin typeface="Cambria Math" panose="02040503050406030204" pitchFamily="18" charset="0"/>
+                        </a:rPr>
+                        <m:t>.</m:t>
+                      </m:r>
+                      <m:d>
+                        <m:dPr>
+                          <m:ctrlPr>
+                            <a:rPr lang="en-US" b="0" i="1" smtClean="0">
+                              <a:latin typeface="Cambria Math" panose="02040503050406030204" pitchFamily="18" charset="0"/>
+                            </a:rPr>
+                          </m:ctrlPr>
+                        </m:dPr>
+                        <m:e>
+                          <m:acc>
+                            <m:accPr>
+                              <m:chr m:val="̅"/>
+                              <m:ctrlPr>
+                                <a:rPr lang="en-US" b="0" i="1" smtClean="0">
+                                  <a:latin typeface="Cambria Math" panose="02040503050406030204" pitchFamily="18" charset="0"/>
+                                </a:rPr>
+                              </m:ctrlPr>
+                            </m:accPr>
+                            <m:e>
+                              <m:r>
+                                <a:rPr lang="en-US" b="0" i="1" smtClean="0">
+                                  <a:latin typeface="Cambria Math" panose="02040503050406030204" pitchFamily="18" charset="0"/>
+                                </a:rPr>
+                                <m:t>𝐴</m:t>
+                              </m:r>
+                            </m:e>
+                          </m:acc>
+                          <m:r>
+                            <a:rPr lang="en-US" b="0" i="1" smtClean="0">
+                              <a:latin typeface="Cambria Math" panose="02040503050406030204" pitchFamily="18" charset="0"/>
+                            </a:rPr>
+                            <m:t>+</m:t>
+                          </m:r>
+                          <m:r>
+                            <a:rPr lang="en-US" b="0" i="1" smtClean="0">
+                              <a:latin typeface="Cambria Math" panose="02040503050406030204" pitchFamily="18" charset="0"/>
+                            </a:rPr>
+                            <m:t>𝐶</m:t>
+                          </m:r>
+                        </m:e>
+                      </m:d>
+                      <m:r>
+                        <a:rPr lang="en-US" b="0" i="1" smtClean="0">
+                          <a:latin typeface="Cambria Math" panose="02040503050406030204" pitchFamily="18" charset="0"/>
+                        </a:rPr>
+                        <m:t>=</m:t>
+                      </m:r>
+                      <m:r>
+                        <a:rPr lang="en-US" b="0" i="1" smtClean="0">
+                          <a:latin typeface="Cambria Math" panose="02040503050406030204" pitchFamily="18" charset="0"/>
+                        </a:rPr>
+                        <m:t>𝐴𝐶</m:t>
+                      </m:r>
+                      <m:r>
+                        <a:rPr lang="en-US" b="0" i="1" smtClean="0">
+                          <a:latin typeface="Cambria Math" panose="02040503050406030204" pitchFamily="18" charset="0"/>
+                        </a:rPr>
+                        <m:t>+</m:t>
+                      </m:r>
+                      <m:acc>
+                        <m:accPr>
+                          <m:chr m:val="̅"/>
+                          <m:ctrlPr>
+                            <a:rPr lang="en-US" b="0" i="1" smtClean="0">
+                              <a:latin typeface="Cambria Math" panose="02040503050406030204" pitchFamily="18" charset="0"/>
+                            </a:rPr>
+                          </m:ctrlPr>
+                        </m:accPr>
+                        <m:e>
+                          <m:r>
+                            <a:rPr lang="en-US" b="0" i="1" smtClean="0">
+                              <a:latin typeface="Cambria Math" panose="02040503050406030204" pitchFamily="18" charset="0"/>
+                            </a:rPr>
+                            <m:t>𝐴</m:t>
+                          </m:r>
+                        </m:e>
+                      </m:acc>
+                      <m:r>
+                        <m:rPr>
+                          <m:sty m:val="p"/>
+                        </m:rPr>
+                        <a:rPr lang="en-US" b="0" i="0" smtClean="0">
+                          <a:latin typeface="Cambria Math" panose="02040503050406030204" pitchFamily="18" charset="0"/>
+                        </a:rPr>
+                        <m:t>B</m:t>
+                      </m:r>
+                      <m:r>
+                        <a:rPr lang="en-US" b="0" i="0" smtClean="0">
+                          <a:latin typeface="Cambria Math" panose="02040503050406030204" pitchFamily="18" charset="0"/>
+                        </a:rPr>
+                        <m:t> </m:t>
+                      </m:r>
+                    </m:oMath>
+                    <m:oMath xmlns:m="http://schemas.openxmlformats.org/officeDocument/2006/math">
+                      <m:r>
+                        <a:rPr lang="en-US" b="0" i="1" smtClean="0">
+                          <a:latin typeface="Cambria Math" panose="02040503050406030204" pitchFamily="18" charset="0"/>
+                        </a:rPr>
+                        <m:t>        </m:t>
+                      </m:r>
+                      <m:r>
+                        <a:rPr lang="en-US" b="0" i="1" smtClean="0">
+                          <a:latin typeface="Cambria Math" panose="02040503050406030204" pitchFamily="18" charset="0"/>
+                        </a:rPr>
+                        <m:t>𝐴</m:t>
+                      </m:r>
+                      <m:d>
+                        <m:dPr>
+                          <m:ctrlPr>
+                            <a:rPr lang="en-US" b="0" i="1" smtClean="0">
+                              <a:latin typeface="Cambria Math" panose="02040503050406030204" pitchFamily="18" charset="0"/>
+                            </a:rPr>
+                          </m:ctrlPr>
+                        </m:dPr>
+                        <m:e>
+                          <m:acc>
+                            <m:accPr>
+                              <m:chr m:val="̅"/>
+                              <m:ctrlPr>
+                                <a:rPr lang="en-US" b="0" i="1" smtClean="0">
+                                  <a:latin typeface="Cambria Math" panose="02040503050406030204" pitchFamily="18" charset="0"/>
+                                </a:rPr>
+                              </m:ctrlPr>
+                            </m:accPr>
+                            <m:e>
+                              <m:r>
+                                <a:rPr lang="en-US" b="0" i="1" smtClean="0">
+                                  <a:latin typeface="Cambria Math" panose="02040503050406030204" pitchFamily="18" charset="0"/>
+                                </a:rPr>
+                                <m:t>𝐴</m:t>
+                              </m:r>
+                            </m:e>
+                          </m:acc>
+                          <m:r>
+                            <a:rPr lang="en-US" b="0" i="1" smtClean="0">
+                              <a:latin typeface="Cambria Math" panose="02040503050406030204" pitchFamily="18" charset="0"/>
+                            </a:rPr>
+                            <m:t>+</m:t>
+                          </m:r>
+                          <m:r>
+                            <a:rPr lang="en-US" b="0" i="1" smtClean="0">
+                              <a:latin typeface="Cambria Math" panose="02040503050406030204" pitchFamily="18" charset="0"/>
+                            </a:rPr>
+                            <m:t>𝐵</m:t>
+                          </m:r>
+                          <m:r>
+                            <a:rPr lang="en-US" b="0" i="1" smtClean="0">
+                              <a:latin typeface="Cambria Math" panose="02040503050406030204" pitchFamily="18" charset="0"/>
+                            </a:rPr>
+                            <m:t> </m:t>
+                          </m:r>
+                        </m:e>
+                      </m:d>
+                      <m:r>
+                        <a:rPr lang="en-US" b="0" i="1" smtClean="0">
+                          <a:latin typeface="Cambria Math" panose="02040503050406030204" pitchFamily="18" charset="0"/>
+                        </a:rPr>
+                        <m:t>=</m:t>
+                      </m:r>
+                      <m:r>
+                        <a:rPr lang="en-US" b="0" i="1" smtClean="0">
+                          <a:latin typeface="Cambria Math" panose="02040503050406030204" pitchFamily="18" charset="0"/>
+                        </a:rPr>
+                        <m:t>𝐴</m:t>
+                      </m:r>
+                      <m:r>
+                        <a:rPr lang="en-US" b="0" i="1" smtClean="0">
+                          <a:latin typeface="Cambria Math" panose="02040503050406030204" pitchFamily="18" charset="0"/>
+                        </a:rPr>
+                        <m:t>.</m:t>
+                      </m:r>
+                      <m:r>
+                        <a:rPr lang="en-US" b="0" i="1" smtClean="0">
+                          <a:latin typeface="Cambria Math" panose="02040503050406030204" pitchFamily="18" charset="0"/>
+                        </a:rPr>
+                        <m:t>𝐵</m:t>
+                      </m:r>
+                    </m:oMath>
+                  </m:oMathPara>
+                </a14:m>
+                <a:endParaRPr lang="en-US" b="0" dirty="0"/>
+              </a:p>
+              <a:p>
+                <a:pPr lvl="1"/>
+                <a14:m>
+                  <m:oMathPara xmlns:m="http://schemas.openxmlformats.org/officeDocument/2006/math">
+                    <m:oMathParaPr>
+                      <m:jc m:val="centerGroup"/>
+                    </m:oMathParaPr>
+                    <m:oMath xmlns:m="http://schemas.openxmlformats.org/officeDocument/2006/math">
+                      <m:r>
+                        <a:rPr lang="en-US" b="0" i="1" smtClean="0">
+                          <a:latin typeface="Cambria Math" panose="02040503050406030204" pitchFamily="18" charset="0"/>
+                        </a:rPr>
+                        <m:t>𝐴</m:t>
+                      </m:r>
+                      <m:r>
+                        <a:rPr lang="en-US" b="0" i="1" smtClean="0">
+                          <a:latin typeface="Cambria Math" panose="02040503050406030204" pitchFamily="18" charset="0"/>
+                        </a:rPr>
+                        <m:t>+</m:t>
+                      </m:r>
+                      <m:acc>
+                        <m:accPr>
+                          <m:chr m:val="̅"/>
+                          <m:ctrlPr>
+                            <a:rPr lang="en-US" b="0" i="1" smtClean="0">
+                              <a:latin typeface="Cambria Math" panose="02040503050406030204" pitchFamily="18" charset="0"/>
+                            </a:rPr>
+                          </m:ctrlPr>
+                        </m:accPr>
+                        <m:e>
+                          <m:r>
+                            <a:rPr lang="en-US" b="0" i="1" smtClean="0">
+                              <a:latin typeface="Cambria Math" panose="02040503050406030204" pitchFamily="18" charset="0"/>
+                            </a:rPr>
+                            <m:t>𝐴</m:t>
+                          </m:r>
+                        </m:e>
+                      </m:acc>
+                      <m:r>
+                        <a:rPr lang="en-US" b="0" i="1" smtClean="0">
+                          <a:latin typeface="Cambria Math" panose="02040503050406030204" pitchFamily="18" charset="0"/>
+                        </a:rPr>
+                        <m:t>𝐵</m:t>
+                      </m:r>
+                      <m:r>
+                        <a:rPr lang="en-US" b="0" i="1" smtClean="0">
+                          <a:latin typeface="Cambria Math" panose="02040503050406030204" pitchFamily="18" charset="0"/>
+                        </a:rPr>
+                        <m:t>=</m:t>
+                      </m:r>
+                      <m:r>
+                        <a:rPr lang="en-US" b="0" i="1" smtClean="0">
+                          <a:latin typeface="Cambria Math" panose="02040503050406030204" pitchFamily="18" charset="0"/>
+                        </a:rPr>
+                        <m:t>𝐴</m:t>
+                      </m:r>
+                      <m:r>
+                        <a:rPr lang="en-US" b="0" i="1" smtClean="0">
+                          <a:latin typeface="Cambria Math" panose="02040503050406030204" pitchFamily="18" charset="0"/>
+                        </a:rPr>
+                        <m:t>+</m:t>
+                      </m:r>
+                      <m:r>
+                        <a:rPr lang="en-US" b="0" i="1" smtClean="0">
+                          <a:latin typeface="Cambria Math" panose="02040503050406030204" pitchFamily="18" charset="0"/>
+                        </a:rPr>
+                        <m:t>𝐵</m:t>
+                      </m:r>
+                    </m:oMath>
+                  </m:oMathPara>
+                </a14:m>
+                <a:endParaRPr lang="en-US" b="0" dirty="0"/>
+              </a:p>
+              <a:p>
+                <a:endParaRPr lang="en-US" dirty="0"/>
+              </a:p>
+            </p:txBody>
+          </p:sp>
+        </mc:Choice>
+        <mc:Fallback>
+          <p:sp>
+            <p:nvSpPr>
+              <p:cNvPr id="3" name="Notes Placeholder 2"/>
+              <p:cNvSpPr>
+                <a:spLocks noGrp="1"/>
+              </p:cNvSpPr>
+              <p:nvPr>
+                <p:ph type="body" idx="1"/>
+              </p:nvPr>
+            </p:nvSpPr>
+            <p:spPr/>
+            <p:txBody>
+              <a:bodyPr/>
+              <a:lstStyle/>
+              <a:p>
+                <a:pPr marL="457200" marR="0" lvl="1" indent="0" algn="l" defTabSz="914400" rtl="0" eaLnBrk="1" fontAlgn="auto" latinLnBrk="0" hangingPunct="1">
+                  <a:lnSpc>
+                    <a:spcPct val="100000"/>
+                  </a:lnSpc>
+                  <a:spcBef>
+                    <a:spcPts val="0"/>
+                  </a:spcBef>
+                  <a:spcAft>
+                    <a:spcPts val="0"/>
+                  </a:spcAft>
+                  <a:buClrTx/>
+                  <a:buSzTx/>
+                  <a:buFontTx/>
+                  <a:buNone/>
+                  <a:tabLst/>
+                  <a:defRPr/>
+                </a:pPr>
+                <a:r>
+                  <a:rPr lang="en-US" b="0" i="0">
+                    <a:latin typeface="Cambria Math" panose="02040503050406030204" pitchFamily="18" charset="0"/>
+                  </a:rPr>
+                  <a:t>(𝐴+𝐵).(𝐴 ̅+𝐶)=𝐴𝐶+𝐴 ̅B </a:t>
+                </a:r>
+                <a:br>
+                  <a:rPr lang="en-US" b="0" i="1" dirty="0">
+                    <a:latin typeface="Cambria Math" panose="02040503050406030204" pitchFamily="18" charset="0"/>
+                  </a:rPr>
+                </a:br>
+                <a:r>
+                  <a:rPr lang="en-US" b="0" i="0">
+                    <a:latin typeface="Cambria Math" panose="02040503050406030204" pitchFamily="18" charset="0"/>
+                  </a:rPr>
+                  <a:t>        𝐴(𝐴 ̅+𝐵 )=𝐴.𝐵</a:t>
+                </a:r>
+                <a:endParaRPr lang="en-US" b="0" dirty="0"/>
+              </a:p>
+              <a:p>
+                <a:pPr lvl="1"/>
+                <a:r>
+                  <a:rPr lang="en-US" b="0" i="0">
+                    <a:latin typeface="Cambria Math" panose="02040503050406030204" pitchFamily="18" charset="0"/>
+                  </a:rPr>
+                  <a:t>𝐴+𝐴 ̅𝐵=𝐴+𝐵</a:t>
+                </a:r>
+                <a:endParaRPr lang="en-US" b="0" dirty="0"/>
+              </a:p>
+              <a:p>
+                <a:endParaRPr lang="en-US" dirty="0"/>
+              </a:p>
+            </p:txBody>
+          </p:sp>
+        </mc:Fallback>
+      </mc:AlternateContent>
+      <p:sp>
+        <p:nvSpPr>
+          <p:cNvPr id="4" name="Slide Number Placeholder 3"/>
+          <p:cNvSpPr>
+            <a:spLocks noGrp="1"/>
+          </p:cNvSpPr>
+          <p:nvPr>
+            <p:ph type="sldNum" sz="quarter" idx="5"/>
+          </p:nvPr>
+        </p:nvSpPr>
+        <p:spPr/>
+        <p:txBody>
+          <a:bodyPr/>
+          <a:lstStyle/>
+          <a:p>
+            <a:fld id="{24216765-C83A-46F1-AE07-8E4F9D1EDA94}" type="slidenum">
+              <a:rPr lang="en-US" smtClean="0"/>
+              <a:t>75</a:t>
+            </a:fld>
+            <a:endParaRPr lang="en-US"/>
+          </a:p>
+        </p:txBody>
+      </p:sp>
+    </p:spTree>
+    <p:extLst>
+      <p:ext uri="{BB962C8B-B14F-4D97-AF65-F5344CB8AC3E}">
+        <p14:creationId xmlns:p14="http://schemas.microsoft.com/office/powerpoint/2010/main" val="317372962"/>
+      </p:ext>
+    </p:extLst>
+  </p:cSld>
+  <p:clrMapOvr>
+    <a:masterClrMapping/>
+  </p:clrMapOvr>
+</p:notes>
+</file>
+
 <file path=ppt/slideLayouts/slideLayout1.xml><?xml version="1.0" encoding="utf-8"?>
 <p:sldLayout xmlns:a="http://schemas.openxmlformats.org/drawingml/2006/main" xmlns:r="http://schemas.openxmlformats.org/officeDocument/2006/relationships" xmlns:p="http://schemas.openxmlformats.org/presentationml/2006/main" type="title" preserve="1">
   <p:cSld name="Title Slide">
@@ -1154,7 +1630,7 @@
           <a:p>
             <a:fld id="{20CB266D-A331-4A79-AB46-FEF40B16CF9B}" type="datetimeFigureOut">
               <a:rPr lang="en-US" smtClean="0"/>
-              <a:t>2/5/2026</a:t>
+              <a:t>2/19/2026</a:t>
             </a:fld>
             <a:endParaRPr lang="en-US"/>
           </a:p>
@@ -1352,7 +1828,7 @@
           <a:p>
             <a:fld id="{20CB266D-A331-4A79-AB46-FEF40B16CF9B}" type="datetimeFigureOut">
               <a:rPr lang="en-US" smtClean="0"/>
-              <a:t>2/5/2026</a:t>
+              <a:t>2/19/2026</a:t>
             </a:fld>
             <a:endParaRPr lang="en-US"/>
           </a:p>
@@ -1560,7 +2036,7 @@
           <a:p>
             <a:fld id="{20CB266D-A331-4A79-AB46-FEF40B16CF9B}" type="datetimeFigureOut">
               <a:rPr lang="en-US" smtClean="0"/>
-              <a:t>2/5/2026</a:t>
+              <a:t>2/19/2026</a:t>
             </a:fld>
             <a:endParaRPr lang="en-US"/>
           </a:p>
@@ -1758,7 +2234,7 @@
           <a:p>
             <a:fld id="{20CB266D-A331-4A79-AB46-FEF40B16CF9B}" type="datetimeFigureOut">
               <a:rPr lang="en-US" smtClean="0"/>
-              <a:t>2/5/2026</a:t>
+              <a:t>2/19/2026</a:t>
             </a:fld>
             <a:endParaRPr lang="en-US"/>
           </a:p>
@@ -2033,7 +2509,7 @@
           <a:p>
             <a:fld id="{20CB266D-A331-4A79-AB46-FEF40B16CF9B}" type="datetimeFigureOut">
               <a:rPr lang="en-US" smtClean="0"/>
-              <a:t>2/5/2026</a:t>
+              <a:t>2/19/2026</a:t>
             </a:fld>
             <a:endParaRPr lang="en-US"/>
           </a:p>
@@ -2298,7 +2774,7 @@
           <a:p>
             <a:fld id="{20CB266D-A331-4A79-AB46-FEF40B16CF9B}" type="datetimeFigureOut">
               <a:rPr lang="en-US" smtClean="0"/>
-              <a:t>2/5/2026</a:t>
+              <a:t>2/19/2026</a:t>
             </a:fld>
             <a:endParaRPr lang="en-US"/>
           </a:p>
@@ -2710,7 +3186,7 @@
           <a:p>
             <a:fld id="{20CB266D-A331-4A79-AB46-FEF40B16CF9B}" type="datetimeFigureOut">
               <a:rPr lang="en-US" smtClean="0"/>
-              <a:t>2/5/2026</a:t>
+              <a:t>2/19/2026</a:t>
             </a:fld>
             <a:endParaRPr lang="en-US"/>
           </a:p>
@@ -2851,7 +3327,7 @@
           <a:p>
             <a:fld id="{20CB266D-A331-4A79-AB46-FEF40B16CF9B}" type="datetimeFigureOut">
               <a:rPr lang="en-US" smtClean="0"/>
-              <a:t>2/5/2026</a:t>
+              <a:t>2/19/2026</a:t>
             </a:fld>
             <a:endParaRPr lang="en-US"/>
           </a:p>
@@ -2964,7 +3440,7 @@
           <a:p>
             <a:fld id="{20CB266D-A331-4A79-AB46-FEF40B16CF9B}" type="datetimeFigureOut">
               <a:rPr lang="en-US" smtClean="0"/>
-              <a:t>2/5/2026</a:t>
+              <a:t>2/19/2026</a:t>
             </a:fld>
             <a:endParaRPr lang="en-US"/>
           </a:p>
@@ -3275,7 +3751,7 @@
           <a:p>
             <a:fld id="{20CB266D-A331-4A79-AB46-FEF40B16CF9B}" type="datetimeFigureOut">
               <a:rPr lang="en-US" smtClean="0"/>
-              <a:t>2/5/2026</a:t>
+              <a:t>2/19/2026</a:t>
             </a:fld>
             <a:endParaRPr lang="en-US"/>
           </a:p>
@@ -3563,7 +4039,7 @@
           <a:p>
             <a:fld id="{20CB266D-A331-4A79-AB46-FEF40B16CF9B}" type="datetimeFigureOut">
               <a:rPr lang="en-US" smtClean="0"/>
-              <a:t>2/5/2026</a:t>
+              <a:t>2/19/2026</a:t>
             </a:fld>
             <a:endParaRPr lang="en-US"/>
           </a:p>
@@ -3804,7 +4280,7 @@
           <a:p>
             <a:fld id="{20CB266D-A331-4A79-AB46-FEF40B16CF9B}" type="datetimeFigureOut">
               <a:rPr lang="en-US" smtClean="0"/>
-              <a:t>2/5/2026</a:t>
+              <a:t>2/19/2026</a:t>
             </a:fld>
             <a:endParaRPr lang="en-US"/>
           </a:p>
@@ -25487,14 +25963,7 @@
           <a:p>
             <a:r>
               <a:rPr lang="en-US" dirty="0"/>
-              <a:t>Print prime factors </a:t>
-            </a:r>
-          </a:p>
-          <a:p>
-            <a:pPr lvl="1"/>
-            <a:r>
-              <a:rPr lang="en-US" dirty="0"/>
-              <a:t>Output 2 2 5 5</a:t>
+              <a:t>Output 5</a:t>
             </a:r>
           </a:p>
           <a:p>
@@ -25507,7 +25976,7 @@
             </a:pPr>
             <a:r>
               <a:rPr lang="pt-BR" sz="2000" b="1" u="sng" dirty="0"/>
-              <a:t>Step  x	num	action</a:t>
+              <a:t>Step  i	result	action</a:t>
             </a:r>
           </a:p>
           <a:p>
@@ -25516,7 +25985,7 @@
             </a:pPr>
             <a:r>
               <a:rPr lang="pt-BR" sz="2000" dirty="0"/>
-              <a:t>1	   2	100	print 2 → num=50</a:t>
+              <a:t>1	   1	1	result &lt; 50 continue</a:t>
             </a:r>
           </a:p>
           <a:p>
@@ -25525,7 +25994,7 @@
             </a:pPr>
             <a:r>
               <a:rPr lang="pt-BR" sz="2000" dirty="0"/>
-              <a:t>2	   2	50	print 2 → num=25</a:t>
+              <a:t>2	   2	2	result &lt; 50 continue</a:t>
             </a:r>
           </a:p>
           <a:p>
@@ -25534,7 +26003,7 @@
             </a:pPr>
             <a:r>
               <a:rPr lang="pt-BR" sz="2000" dirty="0"/>
-              <a:t>3	   2	25	no → x=3</a:t>
+              <a:t>3	   3	6	result &lt; 50 continue</a:t>
             </a:r>
           </a:p>
           <a:p>
@@ -25543,7 +26012,7 @@
             </a:pPr>
             <a:r>
               <a:rPr lang="pt-BR" sz="2000" dirty="0"/>
-              <a:t>4	   3	25	no → x=4</a:t>
+              <a:t>4	   4	24	result &lt; 50 continue</a:t>
             </a:r>
           </a:p>
           <a:p>
@@ -25552,27 +26021,18 @@
             </a:pPr>
             <a:r>
               <a:rPr lang="pt-BR" sz="2000" dirty="0"/>
-              <a:t>5	   4	25	no → x=5</a:t>
+              <a:t>5	   5	120	</a:t>
+            </a:r>
+            <a:r>
+              <a:rPr lang="pt-BR" sz="2000" b="1" dirty="0"/>
+              <a:t>result &gt; 50 break</a:t>
             </a:r>
           </a:p>
           <a:p>
             <a:pPr marL="457200" lvl="1" indent="0">
               <a:buNone/>
             </a:pPr>
-            <a:r>
-              <a:rPr lang="pt-BR" sz="2000" dirty="0"/>
-              <a:t>6	   5	25	print 5 → num=5</a:t>
-            </a:r>
-          </a:p>
-          <a:p>
-            <a:pPr marL="457200" lvl="1" indent="0">
-              <a:buNone/>
-            </a:pPr>
-            <a:r>
-              <a:rPr lang="pt-BR" sz="2000" dirty="0"/>
-              <a:t>7	   5	5	print 5 → num=1</a:t>
-            </a:r>
-            <a:endParaRPr lang="en-US" sz="2000" dirty="0"/>
+            <a:endParaRPr lang="pt-BR" sz="2000" dirty="0"/>
           </a:p>
         </p:txBody>
       </p:sp>
@@ -26044,6 +26504,3310 @@
     <p:extLst>
       <p:ext uri="{BB962C8B-B14F-4D97-AF65-F5344CB8AC3E}">
         <p14:creationId xmlns:p14="http://schemas.microsoft.com/office/powerpoint/2010/main" val="4212858966"/>
+      </p:ext>
+    </p:extLst>
+  </p:cSld>
+  <p:clrMapOvr>
+    <a:masterClrMapping/>
+  </p:clrMapOvr>
+</p:sld>
+</file>
+
+<file path=ppt/slides/slide70.xml><?xml version="1.0" encoding="utf-8"?>
+<p:sld xmlns:a="http://schemas.openxmlformats.org/drawingml/2006/main" xmlns:r="http://schemas.openxmlformats.org/officeDocument/2006/relationships" xmlns:p="http://schemas.openxmlformats.org/presentationml/2006/main">
+  <p:cSld>
+    <p:spTree>
+      <p:nvGrpSpPr>
+        <p:cNvPr id="1" name=""/>
+        <p:cNvGrpSpPr/>
+        <p:nvPr/>
+      </p:nvGrpSpPr>
+      <p:grpSpPr>
+        <a:xfrm>
+          <a:off x="0" y="0"/>
+          <a:ext cx="0" cy="0"/>
+          <a:chOff x="0" y="0"/>
+          <a:chExt cx="0" cy="0"/>
+        </a:xfrm>
+      </p:grpSpPr>
+      <p:sp>
+        <p:nvSpPr>
+          <p:cNvPr id="2" name="Title 1">
+            <a:extLst>
+              <a:ext uri="{FF2B5EF4-FFF2-40B4-BE49-F238E27FC236}">
+                <a16:creationId xmlns:a16="http://schemas.microsoft.com/office/drawing/2014/main" id="{A28B562B-2D71-9CBF-878B-99DEB217296E}"/>
+              </a:ext>
+            </a:extLst>
+          </p:cNvPr>
+          <p:cNvSpPr>
+            <a:spLocks noGrp="1"/>
+          </p:cNvSpPr>
+          <p:nvPr>
+            <p:ph type="title"/>
+          </p:nvPr>
+        </p:nvSpPr>
+        <p:spPr/>
+        <p:txBody>
+          <a:bodyPr/>
+          <a:lstStyle/>
+          <a:p>
+            <a:r>
+              <a:rPr lang="en-US" dirty="0"/>
+              <a:t>Boolean Logic/Algebra</a:t>
+            </a:r>
+          </a:p>
+        </p:txBody>
+      </p:sp>
+      <mc:AlternateContent xmlns:mc="http://schemas.openxmlformats.org/markup-compatibility/2006">
+        <mc:Choice xmlns:a14="http://schemas.microsoft.com/office/drawing/2010/main" Requires="a14">
+          <p:sp>
+            <p:nvSpPr>
+              <p:cNvPr id="3" name="Content Placeholder 2">
+                <a:extLst>
+                  <a:ext uri="{FF2B5EF4-FFF2-40B4-BE49-F238E27FC236}">
+                    <a16:creationId xmlns:a16="http://schemas.microsoft.com/office/drawing/2014/main" id="{6DD7531D-AC28-E02E-BDE8-C3CB0B38303B}"/>
+                  </a:ext>
+                </a:extLst>
+              </p:cNvPr>
+              <p:cNvSpPr>
+                <a:spLocks noGrp="1"/>
+              </p:cNvSpPr>
+              <p:nvPr>
+                <p:ph idx="1"/>
+              </p:nvPr>
+            </p:nvSpPr>
+            <p:spPr/>
+            <p:txBody>
+              <a:bodyPr/>
+              <a:lstStyle/>
+              <a:p>
+                <a:r>
+                  <a:rPr lang="en-US" dirty="0"/>
+                  <a:t>The inputs are    : 0,1 {only}</a:t>
+                </a:r>
+              </a:p>
+              <a:p>
+                <a:r>
+                  <a:rPr lang="en-US" dirty="0"/>
+                  <a:t>The outputs are : 0,1 {only}</a:t>
+                </a:r>
+              </a:p>
+              <a:p>
+                <a:r>
+                  <a:rPr lang="en-US" dirty="0"/>
+                  <a:t>Operators </a:t>
+                </a:r>
+              </a:p>
+              <a:p>
+                <a:pPr lvl="1"/>
+                <a:r>
+                  <a:rPr lang="en-US" dirty="0"/>
+                  <a:t>()</a:t>
+                </a:r>
+              </a:p>
+              <a:p>
+                <a:pPr lvl="1"/>
+                <a:r>
+                  <a:rPr lang="en-US" dirty="0"/>
+                  <a:t>NOT </a:t>
+                </a:r>
+                <a:r>
+                  <a:rPr lang="en-US" dirty="0">
+                    <a:sym typeface="Wingdings" panose="05000000000000000000" pitchFamily="2" charset="2"/>
+                  </a:rPr>
+                  <a:t> </a:t>
+                </a:r>
+                <a14:m>
+                  <m:oMath xmlns:m="http://schemas.openxmlformats.org/officeDocument/2006/math">
+                    <m:acc>
+                      <m:accPr>
+                        <m:chr m:val="̅"/>
+                        <m:ctrlPr>
+                          <a:rPr lang="en-US" b="0" i="1" smtClean="0">
+                            <a:latin typeface="Cambria Math" panose="02040503050406030204" pitchFamily="18" charset="0"/>
+                            <a:sym typeface="Wingdings" panose="05000000000000000000" pitchFamily="2" charset="2"/>
+                          </a:rPr>
+                        </m:ctrlPr>
+                      </m:accPr>
+                      <m:e>
+                        <m:r>
+                          <a:rPr lang="en-US" b="0" i="1" smtClean="0">
+                            <a:latin typeface="Cambria Math" panose="02040503050406030204" pitchFamily="18" charset="0"/>
+                            <a:sym typeface="Wingdings" panose="05000000000000000000" pitchFamily="2" charset="2"/>
+                          </a:rPr>
+                          <m:t>𝐴</m:t>
+                        </m:r>
+                      </m:e>
+                    </m:acc>
+                  </m:oMath>
+                </a14:m>
+                <a:endParaRPr lang="en-US" dirty="0">
+                  <a:sym typeface="Wingdings" panose="05000000000000000000" pitchFamily="2" charset="2"/>
+                </a:endParaRPr>
+              </a:p>
+              <a:p>
+                <a:pPr lvl="1"/>
+                <a:r>
+                  <a:rPr lang="en-US" dirty="0"/>
+                  <a:t>AND</a:t>
+                </a:r>
+                <a:r>
+                  <a:rPr lang="en-US" dirty="0">
+                    <a:sym typeface="Wingdings" panose="05000000000000000000" pitchFamily="2" charset="2"/>
+                  </a:rPr>
+                  <a:t> </a:t>
+                </a:r>
+                <a14:m>
+                  <m:oMath xmlns:m="http://schemas.openxmlformats.org/officeDocument/2006/math">
+                    <m:r>
+                      <a:rPr lang="en-US" b="0" i="1" smtClean="0">
+                        <a:latin typeface="Cambria Math" panose="02040503050406030204" pitchFamily="18" charset="0"/>
+                        <a:sym typeface="Wingdings" panose="05000000000000000000" pitchFamily="2" charset="2"/>
+                      </a:rPr>
+                      <m:t>𝐴</m:t>
+                    </m:r>
+                    <m:r>
+                      <a:rPr lang="en-US" b="0" i="1" smtClean="0">
+                        <a:latin typeface="Cambria Math" panose="02040503050406030204" pitchFamily="18" charset="0"/>
+                        <a:sym typeface="Wingdings" panose="05000000000000000000" pitchFamily="2" charset="2"/>
+                      </a:rPr>
+                      <m:t> .</m:t>
+                    </m:r>
+                    <m:r>
+                      <a:rPr lang="en-US" b="0" i="1" smtClean="0">
+                        <a:latin typeface="Cambria Math" panose="02040503050406030204" pitchFamily="18" charset="0"/>
+                        <a:sym typeface="Wingdings" panose="05000000000000000000" pitchFamily="2" charset="2"/>
+                      </a:rPr>
+                      <m:t>𝐵</m:t>
+                    </m:r>
+                  </m:oMath>
+                </a14:m>
+                <a:endParaRPr lang="en-US" dirty="0">
+                  <a:sym typeface="Wingdings" panose="05000000000000000000" pitchFamily="2" charset="2"/>
+                </a:endParaRPr>
+              </a:p>
+              <a:p>
+                <a:pPr lvl="1"/>
+                <a:r>
+                  <a:rPr lang="en-US" dirty="0"/>
+                  <a:t>XOR </a:t>
+                </a:r>
+                <a:r>
+                  <a:rPr lang="en-US" dirty="0">
+                    <a:sym typeface="Wingdings" panose="05000000000000000000" pitchFamily="2" charset="2"/>
+                  </a:rPr>
+                  <a:t></a:t>
+                </a:r>
+                <a14:m>
+                  <m:oMath xmlns:m="http://schemas.openxmlformats.org/officeDocument/2006/math">
+                    <m:r>
+                      <a:rPr lang="en-US" b="0" i="1" dirty="0" smtClean="0">
+                        <a:latin typeface="Cambria Math" panose="02040503050406030204" pitchFamily="18" charset="0"/>
+                        <a:sym typeface="Wingdings" panose="05000000000000000000" pitchFamily="2" charset="2"/>
+                      </a:rPr>
+                      <m:t>𝐴</m:t>
+                    </m:r>
+                    <m:r>
+                      <a:rPr lang="en-US" b="0" i="1" dirty="0" smtClean="0">
+                        <a:latin typeface="Cambria Math" panose="02040503050406030204" pitchFamily="18" charset="0"/>
+                        <a:sym typeface="Wingdings" panose="05000000000000000000" pitchFamily="2" charset="2"/>
+                      </a:rPr>
+                      <m:t>⊕</m:t>
+                    </m:r>
+                    <m:r>
+                      <a:rPr lang="en-US" b="0" i="1" dirty="0" smtClean="0">
+                        <a:latin typeface="Cambria Math" panose="02040503050406030204" pitchFamily="18" charset="0"/>
+                        <a:sym typeface="Wingdings" panose="05000000000000000000" pitchFamily="2" charset="2"/>
+                      </a:rPr>
+                      <m:t>𝐵</m:t>
+                    </m:r>
+                  </m:oMath>
+                </a14:m>
+                <a:endParaRPr lang="en-US" dirty="0"/>
+              </a:p>
+              <a:p>
+                <a:pPr lvl="2"/>
+                <a:r>
+                  <a:rPr lang="en-US" dirty="0"/>
+                  <a:t>XNOR </a:t>
+                </a:r>
+                <a:r>
+                  <a:rPr lang="en-US" dirty="0">
+                    <a:sym typeface="Wingdings" panose="05000000000000000000" pitchFamily="2" charset="2"/>
+                  </a:rPr>
+                  <a:t> </a:t>
+                </a:r>
+                <a14:m>
+                  <m:oMath xmlns:m="http://schemas.openxmlformats.org/officeDocument/2006/math">
+                    <m:acc>
+                      <m:accPr>
+                        <m:chr m:val="̅"/>
+                        <m:ctrlPr>
+                          <a:rPr lang="en-US" b="0" i="1" dirty="0" smtClean="0">
+                            <a:latin typeface="Cambria Math" panose="02040503050406030204" pitchFamily="18" charset="0"/>
+                            <a:sym typeface="Wingdings" panose="05000000000000000000" pitchFamily="2" charset="2"/>
+                          </a:rPr>
+                        </m:ctrlPr>
+                      </m:accPr>
+                      <m:e>
+                        <m:r>
+                          <a:rPr lang="en-US" i="1" dirty="0">
+                            <a:latin typeface="Cambria Math" panose="02040503050406030204" pitchFamily="18" charset="0"/>
+                            <a:sym typeface="Wingdings" panose="05000000000000000000" pitchFamily="2" charset="2"/>
+                          </a:rPr>
+                          <m:t>𝐴</m:t>
+                        </m:r>
+                        <m:r>
+                          <a:rPr lang="en-US" i="1" dirty="0">
+                            <a:latin typeface="Cambria Math" panose="02040503050406030204" pitchFamily="18" charset="0"/>
+                            <a:sym typeface="Wingdings" panose="05000000000000000000" pitchFamily="2" charset="2"/>
+                          </a:rPr>
+                          <m:t>⊕</m:t>
+                        </m:r>
+                        <m:r>
+                          <a:rPr lang="en-US" i="1" dirty="0">
+                            <a:latin typeface="Cambria Math" panose="02040503050406030204" pitchFamily="18" charset="0"/>
+                            <a:sym typeface="Wingdings" panose="05000000000000000000" pitchFamily="2" charset="2"/>
+                          </a:rPr>
+                          <m:t>𝐵</m:t>
+                        </m:r>
+                      </m:e>
+                    </m:acc>
+                  </m:oMath>
+                </a14:m>
+                <a:endParaRPr lang="en-US" dirty="0"/>
+              </a:p>
+              <a:p>
+                <a:pPr lvl="1"/>
+                <a:r>
+                  <a:rPr lang="en-US" dirty="0"/>
+                  <a:t>OR    </a:t>
+                </a:r>
+                <a:r>
+                  <a:rPr lang="en-US" dirty="0">
+                    <a:sym typeface="Wingdings" panose="05000000000000000000" pitchFamily="2" charset="2"/>
+                  </a:rPr>
+                  <a:t></a:t>
+                </a:r>
+                <a14:m>
+                  <m:oMath xmlns:m="http://schemas.openxmlformats.org/officeDocument/2006/math">
+                    <m:r>
+                      <a:rPr lang="en-US" b="0" i="1" smtClean="0">
+                        <a:latin typeface="Cambria Math" panose="02040503050406030204" pitchFamily="18" charset="0"/>
+                        <a:sym typeface="Wingdings" panose="05000000000000000000" pitchFamily="2" charset="2"/>
+                      </a:rPr>
+                      <m:t>𝐴</m:t>
+                    </m:r>
+                    <m:r>
+                      <a:rPr lang="en-US" b="0" i="1" smtClean="0">
+                        <a:latin typeface="Cambria Math" panose="02040503050406030204" pitchFamily="18" charset="0"/>
+                        <a:sym typeface="Wingdings" panose="05000000000000000000" pitchFamily="2" charset="2"/>
+                      </a:rPr>
+                      <m:t>+</m:t>
+                    </m:r>
+                    <m:r>
+                      <a:rPr lang="en-US" b="0" i="1" smtClean="0">
+                        <a:latin typeface="Cambria Math" panose="02040503050406030204" pitchFamily="18" charset="0"/>
+                        <a:sym typeface="Wingdings" panose="05000000000000000000" pitchFamily="2" charset="2"/>
+                      </a:rPr>
+                      <m:t>𝐵</m:t>
+                    </m:r>
+                  </m:oMath>
+                </a14:m>
+                <a:endParaRPr lang="en-US" dirty="0"/>
+              </a:p>
+              <a:p>
+                <a:pPr lvl="2"/>
+                <a:endParaRPr lang="en-US" dirty="0"/>
+              </a:p>
+            </p:txBody>
+          </p:sp>
+        </mc:Choice>
+        <mc:Fallback>
+          <p:sp>
+            <p:nvSpPr>
+              <p:cNvPr id="3" name="Content Placeholder 2">
+                <a:extLst>
+                  <a:ext uri="{FF2B5EF4-FFF2-40B4-BE49-F238E27FC236}">
+                    <a16:creationId xmlns:a16="http://schemas.microsoft.com/office/drawing/2014/main" id="{6DD7531D-AC28-E02E-BDE8-C3CB0B38303B}"/>
+                  </a:ext>
+                </a:extLst>
+              </p:cNvPr>
+              <p:cNvSpPr>
+                <a:spLocks noGrp="1" noRot="1" noChangeAspect="1" noMove="1" noResize="1" noEditPoints="1" noAdjustHandles="1" noChangeArrowheads="1" noChangeShapeType="1" noTextEdit="1"/>
+              </p:cNvSpPr>
+              <p:nvPr>
+                <p:ph idx="1"/>
+              </p:nvPr>
+            </p:nvSpPr>
+            <p:spPr>
+              <a:blipFill>
+                <a:blip r:embed="rId2"/>
+                <a:stretch>
+                  <a:fillRect l="-1043" t="-2381"/>
+                </a:stretch>
+              </a:blipFill>
+            </p:spPr>
+            <p:txBody>
+              <a:bodyPr/>
+              <a:lstStyle/>
+              <a:p>
+                <a:r>
+                  <a:rPr lang="en-US">
+                    <a:noFill/>
+                  </a:rPr>
+                  <a:t> </a:t>
+                </a:r>
+              </a:p>
+            </p:txBody>
+          </p:sp>
+        </mc:Fallback>
+      </mc:AlternateContent>
+    </p:spTree>
+    <p:extLst>
+      <p:ext uri="{BB962C8B-B14F-4D97-AF65-F5344CB8AC3E}">
+        <p14:creationId xmlns:p14="http://schemas.microsoft.com/office/powerpoint/2010/main" val="2952314869"/>
+      </p:ext>
+    </p:extLst>
+  </p:cSld>
+  <p:clrMapOvr>
+    <a:masterClrMapping/>
+  </p:clrMapOvr>
+</p:sld>
+</file>
+
+<file path=ppt/slides/slide71.xml><?xml version="1.0" encoding="utf-8"?>
+<p:sld xmlns:a="http://schemas.openxmlformats.org/drawingml/2006/main" xmlns:r="http://schemas.openxmlformats.org/officeDocument/2006/relationships" xmlns:p="http://schemas.openxmlformats.org/presentationml/2006/main">
+  <p:cSld>
+    <p:spTree>
+      <p:nvGrpSpPr>
+        <p:cNvPr id="1" name="">
+          <a:extLst>
+            <a:ext uri="{FF2B5EF4-FFF2-40B4-BE49-F238E27FC236}">
+              <a16:creationId xmlns:a16="http://schemas.microsoft.com/office/drawing/2014/main" id="{6ACEF463-8E69-9B0E-5E1E-A8A4361A30F4}"/>
+            </a:ext>
+          </a:extLst>
+        </p:cNvPr>
+        <p:cNvGrpSpPr/>
+        <p:nvPr/>
+      </p:nvGrpSpPr>
+      <p:grpSpPr>
+        <a:xfrm>
+          <a:off x="0" y="0"/>
+          <a:ext cx="0" cy="0"/>
+          <a:chOff x="0" y="0"/>
+          <a:chExt cx="0" cy="0"/>
+        </a:xfrm>
+      </p:grpSpPr>
+      <p:sp>
+        <p:nvSpPr>
+          <p:cNvPr id="2" name="Title 1">
+            <a:extLst>
+              <a:ext uri="{FF2B5EF4-FFF2-40B4-BE49-F238E27FC236}">
+                <a16:creationId xmlns:a16="http://schemas.microsoft.com/office/drawing/2014/main" id="{2369F375-B6F2-5C4F-0378-385B893AA528}"/>
+              </a:ext>
+            </a:extLst>
+          </p:cNvPr>
+          <p:cNvSpPr>
+            <a:spLocks noGrp="1"/>
+          </p:cNvSpPr>
+          <p:nvPr>
+            <p:ph type="title"/>
+          </p:nvPr>
+        </p:nvSpPr>
+        <p:spPr/>
+        <p:txBody>
+          <a:bodyPr/>
+          <a:lstStyle/>
+          <a:p>
+            <a:r>
+              <a:rPr lang="en-US" dirty="0"/>
+              <a:t>Truth Tables </a:t>
+            </a:r>
+            <a:r>
+              <a:rPr lang="en-US" sz="2000" dirty="0"/>
+              <a:t>( same as bitwise operations </a:t>
+            </a:r>
+            <a:r>
+              <a:rPr lang="en-US" sz="2000" dirty="0">
+                <a:sym typeface="Wingdings" panose="05000000000000000000" pitchFamily="2" charset="2"/>
+              </a:rPr>
+              <a:t> easy</a:t>
+            </a:r>
+            <a:r>
+              <a:rPr lang="en-US" sz="2000" dirty="0"/>
+              <a:t>)</a:t>
+            </a:r>
+          </a:p>
+        </p:txBody>
+      </p:sp>
+      <mc:AlternateContent xmlns:mc="http://schemas.openxmlformats.org/markup-compatibility/2006">
+        <mc:Choice xmlns:a14="http://schemas.microsoft.com/office/drawing/2010/main" Requires="a14">
+          <p:graphicFrame>
+            <p:nvGraphicFramePr>
+              <p:cNvPr id="4" name="Content Placeholder 3">
+                <a:extLst>
+                  <a:ext uri="{FF2B5EF4-FFF2-40B4-BE49-F238E27FC236}">
+                    <a16:creationId xmlns:a16="http://schemas.microsoft.com/office/drawing/2014/main" id="{85C206E2-06FC-C7B2-FAED-73E2B11D88E4}"/>
+                  </a:ext>
+                </a:extLst>
+              </p:cNvPr>
+              <p:cNvGraphicFramePr>
+                <a:graphicFrameLocks noGrp="1"/>
+              </p:cNvGraphicFramePr>
+              <p:nvPr>
+                <p:ph idx="1"/>
+                <p:extLst>
+                  <p:ext uri="{D42A27DB-BD31-4B8C-83A1-F6EECF244321}">
+                    <p14:modId xmlns:p14="http://schemas.microsoft.com/office/powerpoint/2010/main" val="683151470"/>
+                  </p:ext>
+                </p:extLst>
+              </p:nvPr>
+            </p:nvGraphicFramePr>
+            <p:xfrm>
+              <a:off x="950310" y="3429000"/>
+              <a:ext cx="8784895" cy="1899360"/>
+            </p:xfrm>
+            <a:graphic>
+              <a:graphicData uri="http://schemas.openxmlformats.org/drawingml/2006/table">
+                <a:tbl>
+                  <a:tblPr firstRow="1" bandRow="1">
+                    <a:tableStyleId>{5C22544A-7EE6-4342-B048-85BDC9FD1C3A}</a:tableStyleId>
+                  </a:tblPr>
+                  <a:tblGrid>
+                    <a:gridCol w="1756979">
+                      <a:extLst>
+                        <a:ext uri="{9D8B030D-6E8A-4147-A177-3AD203B41FA5}">
+                          <a16:colId xmlns:a16="http://schemas.microsoft.com/office/drawing/2014/main" val="4184432793"/>
+                        </a:ext>
+                      </a:extLst>
+                    </a:gridCol>
+                    <a:gridCol w="1756979">
+                      <a:extLst>
+                        <a:ext uri="{9D8B030D-6E8A-4147-A177-3AD203B41FA5}">
+                          <a16:colId xmlns:a16="http://schemas.microsoft.com/office/drawing/2014/main" val="1084674688"/>
+                        </a:ext>
+                      </a:extLst>
+                    </a:gridCol>
+                    <a:gridCol w="1756979">
+                      <a:extLst>
+                        <a:ext uri="{9D8B030D-6E8A-4147-A177-3AD203B41FA5}">
+                          <a16:colId xmlns:a16="http://schemas.microsoft.com/office/drawing/2014/main" val="2121035788"/>
+                        </a:ext>
+                      </a:extLst>
+                    </a:gridCol>
+                    <a:gridCol w="1756979">
+                      <a:extLst>
+                        <a:ext uri="{9D8B030D-6E8A-4147-A177-3AD203B41FA5}">
+                          <a16:colId xmlns:a16="http://schemas.microsoft.com/office/drawing/2014/main" val="1496895670"/>
+                        </a:ext>
+                      </a:extLst>
+                    </a:gridCol>
+                    <a:gridCol w="1756979">
+                      <a:extLst>
+                        <a:ext uri="{9D8B030D-6E8A-4147-A177-3AD203B41FA5}">
+                          <a16:colId xmlns:a16="http://schemas.microsoft.com/office/drawing/2014/main" val="4230776581"/>
+                        </a:ext>
+                      </a:extLst>
+                    </a:gridCol>
+                  </a:tblGrid>
+                  <a:tr h="379872">
+                    <a:tc>
+                      <a:txBody>
+                        <a:bodyPr/>
+                        <a:lstStyle/>
+                        <a:p>
+                          <a:r>
+                            <a:rPr lang="en-US" dirty="0"/>
+                            <a:t>X</a:t>
+                          </a:r>
+                        </a:p>
+                      </a:txBody>
+                      <a:tcPr/>
+                    </a:tc>
+                    <a:tc>
+                      <a:txBody>
+                        <a:bodyPr/>
+                        <a:lstStyle/>
+                        <a:p>
+                          <a:r>
+                            <a:rPr lang="en-US" dirty="0"/>
+                            <a:t>Y</a:t>
+                          </a:r>
+                        </a:p>
+                      </a:txBody>
+                      <a:tcPr/>
+                    </a:tc>
+                    <a:tc>
+                      <a:txBody>
+                        <a:bodyPr/>
+                        <a:lstStyle/>
+                        <a:p>
+                          <a14:m>
+                            <m:oMathPara xmlns:m="http://schemas.openxmlformats.org/officeDocument/2006/math">
+                              <m:oMathParaPr>
+                                <m:jc m:val="centerGroup"/>
+                              </m:oMathParaPr>
+                              <m:oMath xmlns:m="http://schemas.openxmlformats.org/officeDocument/2006/math">
+                                <m:r>
+                                  <a:rPr lang="en-US" b="1" i="1" smtClean="0">
+                                    <a:latin typeface="Cambria Math" panose="02040503050406030204" pitchFamily="18" charset="0"/>
+                                  </a:rPr>
+                                  <m:t>𝑿</m:t>
+                                </m:r>
+                                <m:r>
+                                  <a:rPr lang="en-US" b="1" i="1" smtClean="0">
+                                    <a:latin typeface="Cambria Math" panose="02040503050406030204" pitchFamily="18" charset="0"/>
+                                  </a:rPr>
+                                  <m:t>.</m:t>
+                                </m:r>
+                                <m:r>
+                                  <a:rPr lang="en-US" b="1" i="1" smtClean="0">
+                                    <a:latin typeface="Cambria Math" panose="02040503050406030204" pitchFamily="18" charset="0"/>
+                                  </a:rPr>
+                                  <m:t>𝒀</m:t>
+                                </m:r>
+                              </m:oMath>
+                            </m:oMathPara>
+                          </a14:m>
+                          <a:endParaRPr lang="en-US" dirty="0"/>
+                        </a:p>
+                      </a:txBody>
+                      <a:tcPr/>
+                    </a:tc>
+                    <a:tc>
+                      <a:txBody>
+                        <a:bodyPr/>
+                        <a:lstStyle/>
+                        <a:p>
+                          <a14:m>
+                            <m:oMathPara xmlns:m="http://schemas.openxmlformats.org/officeDocument/2006/math">
+                              <m:oMathParaPr>
+                                <m:jc m:val="centerGroup"/>
+                              </m:oMathParaPr>
+                              <m:oMath xmlns:m="http://schemas.openxmlformats.org/officeDocument/2006/math">
+                                <m:r>
+                                  <a:rPr lang="en-US" b="1" i="1" dirty="0" smtClean="0">
+                                    <a:latin typeface="Cambria Math" panose="02040503050406030204" pitchFamily="18" charset="0"/>
+                                  </a:rPr>
+                                  <m:t>𝑿</m:t>
+                                </m:r>
+                                <m:r>
+                                  <a:rPr lang="en-US" b="1" i="1" dirty="0" smtClean="0">
+                                    <a:latin typeface="Cambria Math" panose="02040503050406030204" pitchFamily="18" charset="0"/>
+                                  </a:rPr>
+                                  <m:t>+</m:t>
+                                </m:r>
+                                <m:r>
+                                  <a:rPr lang="en-US" b="1" i="1" dirty="0" smtClean="0">
+                                    <a:latin typeface="Cambria Math" panose="02040503050406030204" pitchFamily="18" charset="0"/>
+                                  </a:rPr>
+                                  <m:t>𝒀</m:t>
+                                </m:r>
+                              </m:oMath>
+                            </m:oMathPara>
+                          </a14:m>
+                          <a:endParaRPr lang="en-US" dirty="0"/>
+                        </a:p>
+                      </a:txBody>
+                      <a:tcPr/>
+                    </a:tc>
+                    <a:tc>
+                      <a:txBody>
+                        <a:bodyPr/>
+                        <a:lstStyle/>
+                        <a:p>
+                          <a:pPr marL="0" marR="0" lvl="0" indent="0" algn="l" defTabSz="914400" rtl="0" eaLnBrk="1" fontAlgn="auto" latinLnBrk="0" hangingPunct="1">
+                            <a:lnSpc>
+                              <a:spcPct val="100000"/>
+                            </a:lnSpc>
+                            <a:spcBef>
+                              <a:spcPts val="0"/>
+                            </a:spcBef>
+                            <a:spcAft>
+                              <a:spcPts val="0"/>
+                            </a:spcAft>
+                            <a:buClrTx/>
+                            <a:buSzTx/>
+                            <a:buFontTx/>
+                            <a:buNone/>
+                            <a:tabLst/>
+                            <a:defRPr/>
+                          </a:pPr>
+                          <a14:m>
+                            <m:oMathPara xmlns:m="http://schemas.openxmlformats.org/officeDocument/2006/math">
+                              <m:oMathParaPr>
+                                <m:jc m:val="centerGroup"/>
+                              </m:oMathParaPr>
+                              <m:oMath xmlns:m="http://schemas.openxmlformats.org/officeDocument/2006/math">
+                                <m:r>
+                                  <a:rPr lang="en-US" b="1" i="1" smtClean="0">
+                                    <a:latin typeface="Cambria Math" panose="02040503050406030204" pitchFamily="18" charset="0"/>
+                                  </a:rPr>
+                                  <m:t>𝑿</m:t>
+                                </m:r>
+                                <m:r>
+                                  <a:rPr lang="en-US" b="0" i="1" dirty="0" smtClean="0">
+                                    <a:latin typeface="Cambria Math" panose="02040503050406030204" pitchFamily="18" charset="0"/>
+                                    <a:sym typeface="Wingdings" panose="05000000000000000000" pitchFamily="2" charset="2"/>
+                                  </a:rPr>
+                                  <m:t>⊕</m:t>
+                                </m:r>
+                                <m:r>
+                                  <m:rPr>
+                                    <m:nor/>
+                                  </m:rPr>
+                                  <a:rPr lang="en-US" dirty="0"/>
+                                  <m:t> </m:t>
+                                </m:r>
+                                <m:r>
+                                  <m:rPr>
+                                    <m:nor/>
+                                  </m:rPr>
+                                  <a:rPr lang="en-US" dirty="0"/>
+                                  <m:t>Y</m:t>
+                                </m:r>
+                              </m:oMath>
+                            </m:oMathPara>
+                          </a14:m>
+                          <a:endParaRPr lang="en-US" dirty="0"/>
+                        </a:p>
+                      </a:txBody>
+                      <a:tcPr/>
+                    </a:tc>
+                    <a:extLst>
+                      <a:ext uri="{0D108BD9-81ED-4DB2-BD59-A6C34878D82A}">
+                        <a16:rowId xmlns:a16="http://schemas.microsoft.com/office/drawing/2014/main" val="1094535812"/>
+                      </a:ext>
+                    </a:extLst>
+                  </a:tr>
+                  <a:tr h="379872">
+                    <a:tc>
+                      <a:txBody>
+                        <a:bodyPr/>
+                        <a:lstStyle/>
+                        <a:p>
+                          <a:r>
+                            <a:rPr lang="en-US" dirty="0"/>
+                            <a:t>0</a:t>
+                          </a:r>
+                        </a:p>
+                      </a:txBody>
+                      <a:tcPr/>
+                    </a:tc>
+                    <a:tc>
+                      <a:txBody>
+                        <a:bodyPr/>
+                        <a:lstStyle/>
+                        <a:p>
+                          <a:r>
+                            <a:rPr lang="en-US" dirty="0"/>
+                            <a:t>0</a:t>
+                          </a:r>
+                        </a:p>
+                      </a:txBody>
+                      <a:tcPr/>
+                    </a:tc>
+                    <a:tc>
+                      <a:txBody>
+                        <a:bodyPr/>
+                        <a:lstStyle/>
+                        <a:p>
+                          <a:r>
+                            <a:rPr lang="en-US" dirty="0"/>
+                            <a:t>0</a:t>
+                          </a:r>
+                        </a:p>
+                      </a:txBody>
+                      <a:tcPr/>
+                    </a:tc>
+                    <a:tc>
+                      <a:txBody>
+                        <a:bodyPr/>
+                        <a:lstStyle/>
+                        <a:p>
+                          <a:r>
+                            <a:rPr lang="en-US" dirty="0"/>
+                            <a:t>0</a:t>
+                          </a:r>
+                        </a:p>
+                      </a:txBody>
+                      <a:tcPr/>
+                    </a:tc>
+                    <a:tc>
+                      <a:txBody>
+                        <a:bodyPr/>
+                        <a:lstStyle/>
+                        <a:p>
+                          <a:r>
+                            <a:rPr lang="en-US" dirty="0"/>
+                            <a:t>0</a:t>
+                          </a:r>
+                        </a:p>
+                      </a:txBody>
+                      <a:tcPr/>
+                    </a:tc>
+                    <a:extLst>
+                      <a:ext uri="{0D108BD9-81ED-4DB2-BD59-A6C34878D82A}">
+                        <a16:rowId xmlns:a16="http://schemas.microsoft.com/office/drawing/2014/main" val="3087256894"/>
+                      </a:ext>
+                    </a:extLst>
+                  </a:tr>
+                  <a:tr h="379872">
+                    <a:tc>
+                      <a:txBody>
+                        <a:bodyPr/>
+                        <a:lstStyle/>
+                        <a:p>
+                          <a:r>
+                            <a:rPr lang="en-US" dirty="0"/>
+                            <a:t>0</a:t>
+                          </a:r>
+                        </a:p>
+                      </a:txBody>
+                      <a:tcPr/>
+                    </a:tc>
+                    <a:tc>
+                      <a:txBody>
+                        <a:bodyPr/>
+                        <a:lstStyle/>
+                        <a:p>
+                          <a:r>
+                            <a:rPr lang="en-US" dirty="0"/>
+                            <a:t>1</a:t>
+                          </a:r>
+                        </a:p>
+                      </a:txBody>
+                      <a:tcPr/>
+                    </a:tc>
+                    <a:tc>
+                      <a:txBody>
+                        <a:bodyPr/>
+                        <a:lstStyle/>
+                        <a:p>
+                          <a:r>
+                            <a:rPr lang="en-US" dirty="0"/>
+                            <a:t>0</a:t>
+                          </a:r>
+                        </a:p>
+                      </a:txBody>
+                      <a:tcPr/>
+                    </a:tc>
+                    <a:tc>
+                      <a:txBody>
+                        <a:bodyPr/>
+                        <a:lstStyle/>
+                        <a:p>
+                          <a:r>
+                            <a:rPr lang="en-US" dirty="0"/>
+                            <a:t>1</a:t>
+                          </a:r>
+                        </a:p>
+                      </a:txBody>
+                      <a:tcPr/>
+                    </a:tc>
+                    <a:tc>
+                      <a:txBody>
+                        <a:bodyPr/>
+                        <a:lstStyle/>
+                        <a:p>
+                          <a:r>
+                            <a:rPr lang="en-US" dirty="0"/>
+                            <a:t>1</a:t>
+                          </a:r>
+                        </a:p>
+                      </a:txBody>
+                      <a:tcPr/>
+                    </a:tc>
+                    <a:extLst>
+                      <a:ext uri="{0D108BD9-81ED-4DB2-BD59-A6C34878D82A}">
+                        <a16:rowId xmlns:a16="http://schemas.microsoft.com/office/drawing/2014/main" val="3194711834"/>
+                      </a:ext>
+                    </a:extLst>
+                  </a:tr>
+                  <a:tr h="379872">
+                    <a:tc>
+                      <a:txBody>
+                        <a:bodyPr/>
+                        <a:lstStyle/>
+                        <a:p>
+                          <a:r>
+                            <a:rPr lang="en-US" dirty="0"/>
+                            <a:t>1</a:t>
+                          </a:r>
+                        </a:p>
+                      </a:txBody>
+                      <a:tcPr/>
+                    </a:tc>
+                    <a:tc>
+                      <a:txBody>
+                        <a:bodyPr/>
+                        <a:lstStyle/>
+                        <a:p>
+                          <a:r>
+                            <a:rPr lang="en-US" dirty="0"/>
+                            <a:t>0</a:t>
+                          </a:r>
+                        </a:p>
+                      </a:txBody>
+                      <a:tcPr/>
+                    </a:tc>
+                    <a:tc>
+                      <a:txBody>
+                        <a:bodyPr/>
+                        <a:lstStyle/>
+                        <a:p>
+                          <a:r>
+                            <a:rPr lang="en-US" dirty="0"/>
+                            <a:t>0</a:t>
+                          </a:r>
+                        </a:p>
+                      </a:txBody>
+                      <a:tcPr/>
+                    </a:tc>
+                    <a:tc>
+                      <a:txBody>
+                        <a:bodyPr/>
+                        <a:lstStyle/>
+                        <a:p>
+                          <a:r>
+                            <a:rPr lang="en-US" dirty="0"/>
+                            <a:t>1</a:t>
+                          </a:r>
+                        </a:p>
+                      </a:txBody>
+                      <a:tcPr/>
+                    </a:tc>
+                    <a:tc>
+                      <a:txBody>
+                        <a:bodyPr/>
+                        <a:lstStyle/>
+                        <a:p>
+                          <a:r>
+                            <a:rPr lang="en-US" dirty="0"/>
+                            <a:t>1</a:t>
+                          </a:r>
+                        </a:p>
+                      </a:txBody>
+                      <a:tcPr/>
+                    </a:tc>
+                    <a:extLst>
+                      <a:ext uri="{0D108BD9-81ED-4DB2-BD59-A6C34878D82A}">
+                        <a16:rowId xmlns:a16="http://schemas.microsoft.com/office/drawing/2014/main" val="486581744"/>
+                      </a:ext>
+                    </a:extLst>
+                  </a:tr>
+                  <a:tr h="379872">
+                    <a:tc>
+                      <a:txBody>
+                        <a:bodyPr/>
+                        <a:lstStyle/>
+                        <a:p>
+                          <a:r>
+                            <a:rPr lang="en-US" dirty="0"/>
+                            <a:t>1</a:t>
+                          </a:r>
+                        </a:p>
+                      </a:txBody>
+                      <a:tcPr/>
+                    </a:tc>
+                    <a:tc>
+                      <a:txBody>
+                        <a:bodyPr/>
+                        <a:lstStyle/>
+                        <a:p>
+                          <a:r>
+                            <a:rPr lang="en-US" dirty="0"/>
+                            <a:t>1</a:t>
+                          </a:r>
+                        </a:p>
+                      </a:txBody>
+                      <a:tcPr/>
+                    </a:tc>
+                    <a:tc>
+                      <a:txBody>
+                        <a:bodyPr/>
+                        <a:lstStyle/>
+                        <a:p>
+                          <a:r>
+                            <a:rPr lang="en-US" dirty="0"/>
+                            <a:t>1</a:t>
+                          </a:r>
+                        </a:p>
+                      </a:txBody>
+                      <a:tcPr/>
+                    </a:tc>
+                    <a:tc>
+                      <a:txBody>
+                        <a:bodyPr/>
+                        <a:lstStyle/>
+                        <a:p>
+                          <a:r>
+                            <a:rPr lang="en-US" dirty="0"/>
+                            <a:t>1</a:t>
+                          </a:r>
+                        </a:p>
+                      </a:txBody>
+                      <a:tcPr/>
+                    </a:tc>
+                    <a:tc>
+                      <a:txBody>
+                        <a:bodyPr/>
+                        <a:lstStyle/>
+                        <a:p>
+                          <a:r>
+                            <a:rPr lang="en-US" dirty="0"/>
+                            <a:t>0</a:t>
+                          </a:r>
+                        </a:p>
+                      </a:txBody>
+                      <a:tcPr/>
+                    </a:tc>
+                    <a:extLst>
+                      <a:ext uri="{0D108BD9-81ED-4DB2-BD59-A6C34878D82A}">
+                        <a16:rowId xmlns:a16="http://schemas.microsoft.com/office/drawing/2014/main" val="1671252828"/>
+                      </a:ext>
+                    </a:extLst>
+                  </a:tr>
+                </a:tbl>
+              </a:graphicData>
+            </a:graphic>
+          </p:graphicFrame>
+        </mc:Choice>
+        <mc:Fallback>
+          <p:graphicFrame>
+            <p:nvGraphicFramePr>
+              <p:cNvPr id="4" name="Content Placeholder 3">
+                <a:extLst>
+                  <a:ext uri="{FF2B5EF4-FFF2-40B4-BE49-F238E27FC236}">
+                    <a16:creationId xmlns:a16="http://schemas.microsoft.com/office/drawing/2014/main" id="{85C206E2-06FC-C7B2-FAED-73E2B11D88E4}"/>
+                  </a:ext>
+                </a:extLst>
+              </p:cNvPr>
+              <p:cNvGraphicFramePr>
+                <a:graphicFrameLocks noGrp="1"/>
+              </p:cNvGraphicFramePr>
+              <p:nvPr>
+                <p:ph idx="1"/>
+                <p:extLst>
+                  <p:ext uri="{D42A27DB-BD31-4B8C-83A1-F6EECF244321}">
+                    <p14:modId xmlns:p14="http://schemas.microsoft.com/office/powerpoint/2010/main" val="683151470"/>
+                  </p:ext>
+                </p:extLst>
+              </p:nvPr>
+            </p:nvGraphicFramePr>
+            <p:xfrm>
+              <a:off x="950310" y="3429000"/>
+              <a:ext cx="8784895" cy="1899360"/>
+            </p:xfrm>
+            <a:graphic>
+              <a:graphicData uri="http://schemas.openxmlformats.org/drawingml/2006/table">
+                <a:tbl>
+                  <a:tblPr firstRow="1" bandRow="1">
+                    <a:tableStyleId>{5C22544A-7EE6-4342-B048-85BDC9FD1C3A}</a:tableStyleId>
+                  </a:tblPr>
+                  <a:tblGrid>
+                    <a:gridCol w="1756979">
+                      <a:extLst>
+                        <a:ext uri="{9D8B030D-6E8A-4147-A177-3AD203B41FA5}">
+                          <a16:colId xmlns:a16="http://schemas.microsoft.com/office/drawing/2014/main" val="4184432793"/>
+                        </a:ext>
+                      </a:extLst>
+                    </a:gridCol>
+                    <a:gridCol w="1756979">
+                      <a:extLst>
+                        <a:ext uri="{9D8B030D-6E8A-4147-A177-3AD203B41FA5}">
+                          <a16:colId xmlns:a16="http://schemas.microsoft.com/office/drawing/2014/main" val="1084674688"/>
+                        </a:ext>
+                      </a:extLst>
+                    </a:gridCol>
+                    <a:gridCol w="1756979">
+                      <a:extLst>
+                        <a:ext uri="{9D8B030D-6E8A-4147-A177-3AD203B41FA5}">
+                          <a16:colId xmlns:a16="http://schemas.microsoft.com/office/drawing/2014/main" val="2121035788"/>
+                        </a:ext>
+                      </a:extLst>
+                    </a:gridCol>
+                    <a:gridCol w="1756979">
+                      <a:extLst>
+                        <a:ext uri="{9D8B030D-6E8A-4147-A177-3AD203B41FA5}">
+                          <a16:colId xmlns:a16="http://schemas.microsoft.com/office/drawing/2014/main" val="1496895670"/>
+                        </a:ext>
+                      </a:extLst>
+                    </a:gridCol>
+                    <a:gridCol w="1756979">
+                      <a:extLst>
+                        <a:ext uri="{9D8B030D-6E8A-4147-A177-3AD203B41FA5}">
+                          <a16:colId xmlns:a16="http://schemas.microsoft.com/office/drawing/2014/main" val="4230776581"/>
+                        </a:ext>
+                      </a:extLst>
+                    </a:gridCol>
+                  </a:tblGrid>
+                  <a:tr h="379872">
+                    <a:tc>
+                      <a:txBody>
+                        <a:bodyPr/>
+                        <a:lstStyle/>
+                        <a:p>
+                          <a:r>
+                            <a:rPr lang="en-US" dirty="0"/>
+                            <a:t>X</a:t>
+                          </a:r>
+                        </a:p>
+                      </a:txBody>
+                      <a:tcPr/>
+                    </a:tc>
+                    <a:tc>
+                      <a:txBody>
+                        <a:bodyPr/>
+                        <a:lstStyle/>
+                        <a:p>
+                          <a:r>
+                            <a:rPr lang="en-US" dirty="0"/>
+                            <a:t>Y</a:t>
+                          </a:r>
+                        </a:p>
+                      </a:txBody>
+                      <a:tcPr/>
+                    </a:tc>
+                    <a:tc>
+                      <a:txBody>
+                        <a:bodyPr/>
+                        <a:lstStyle/>
+                        <a:p>
+                          <a:endParaRPr lang="en-US"/>
+                        </a:p>
+                      </a:txBody>
+                      <a:tcPr>
+                        <a:blipFill>
+                          <a:blip r:embed="rId2"/>
+                          <a:stretch>
+                            <a:fillRect l="-200694" t="-6349" r="-202083" b="-419048"/>
+                          </a:stretch>
+                        </a:blipFill>
+                      </a:tcPr>
+                    </a:tc>
+                    <a:tc>
+                      <a:txBody>
+                        <a:bodyPr/>
+                        <a:lstStyle/>
+                        <a:p>
+                          <a:endParaRPr lang="en-US"/>
+                        </a:p>
+                      </a:txBody>
+                      <a:tcPr>
+                        <a:blipFill>
+                          <a:blip r:embed="rId2"/>
+                          <a:stretch>
+                            <a:fillRect l="-299654" t="-6349" r="-101384" b="-419048"/>
+                          </a:stretch>
+                        </a:blipFill>
+                      </a:tcPr>
+                    </a:tc>
+                    <a:tc>
+                      <a:txBody>
+                        <a:bodyPr/>
+                        <a:lstStyle/>
+                        <a:p>
+                          <a:endParaRPr lang="en-US"/>
+                        </a:p>
+                      </a:txBody>
+                      <a:tcPr>
+                        <a:blipFill>
+                          <a:blip r:embed="rId2"/>
+                          <a:stretch>
+                            <a:fillRect l="-401042" t="-6349" r="-1736" b="-419048"/>
+                          </a:stretch>
+                        </a:blipFill>
+                      </a:tcPr>
+                    </a:tc>
+                    <a:extLst>
+                      <a:ext uri="{0D108BD9-81ED-4DB2-BD59-A6C34878D82A}">
+                        <a16:rowId xmlns:a16="http://schemas.microsoft.com/office/drawing/2014/main" val="1094535812"/>
+                      </a:ext>
+                    </a:extLst>
+                  </a:tr>
+                  <a:tr h="379872">
+                    <a:tc>
+                      <a:txBody>
+                        <a:bodyPr/>
+                        <a:lstStyle/>
+                        <a:p>
+                          <a:r>
+                            <a:rPr lang="en-US" dirty="0"/>
+                            <a:t>0</a:t>
+                          </a:r>
+                        </a:p>
+                      </a:txBody>
+                      <a:tcPr/>
+                    </a:tc>
+                    <a:tc>
+                      <a:txBody>
+                        <a:bodyPr/>
+                        <a:lstStyle/>
+                        <a:p>
+                          <a:r>
+                            <a:rPr lang="en-US" dirty="0"/>
+                            <a:t>0</a:t>
+                          </a:r>
+                        </a:p>
+                      </a:txBody>
+                      <a:tcPr/>
+                    </a:tc>
+                    <a:tc>
+                      <a:txBody>
+                        <a:bodyPr/>
+                        <a:lstStyle/>
+                        <a:p>
+                          <a:r>
+                            <a:rPr lang="en-US" dirty="0"/>
+                            <a:t>0</a:t>
+                          </a:r>
+                        </a:p>
+                      </a:txBody>
+                      <a:tcPr/>
+                    </a:tc>
+                    <a:tc>
+                      <a:txBody>
+                        <a:bodyPr/>
+                        <a:lstStyle/>
+                        <a:p>
+                          <a:r>
+                            <a:rPr lang="en-US" dirty="0"/>
+                            <a:t>0</a:t>
+                          </a:r>
+                        </a:p>
+                      </a:txBody>
+                      <a:tcPr/>
+                    </a:tc>
+                    <a:tc>
+                      <a:txBody>
+                        <a:bodyPr/>
+                        <a:lstStyle/>
+                        <a:p>
+                          <a:r>
+                            <a:rPr lang="en-US" dirty="0"/>
+                            <a:t>0</a:t>
+                          </a:r>
+                        </a:p>
+                      </a:txBody>
+                      <a:tcPr/>
+                    </a:tc>
+                    <a:extLst>
+                      <a:ext uri="{0D108BD9-81ED-4DB2-BD59-A6C34878D82A}">
+                        <a16:rowId xmlns:a16="http://schemas.microsoft.com/office/drawing/2014/main" val="3087256894"/>
+                      </a:ext>
+                    </a:extLst>
+                  </a:tr>
+                  <a:tr h="379872">
+                    <a:tc>
+                      <a:txBody>
+                        <a:bodyPr/>
+                        <a:lstStyle/>
+                        <a:p>
+                          <a:r>
+                            <a:rPr lang="en-US" dirty="0"/>
+                            <a:t>0</a:t>
+                          </a:r>
+                        </a:p>
+                      </a:txBody>
+                      <a:tcPr/>
+                    </a:tc>
+                    <a:tc>
+                      <a:txBody>
+                        <a:bodyPr/>
+                        <a:lstStyle/>
+                        <a:p>
+                          <a:r>
+                            <a:rPr lang="en-US" dirty="0"/>
+                            <a:t>1</a:t>
+                          </a:r>
+                        </a:p>
+                      </a:txBody>
+                      <a:tcPr/>
+                    </a:tc>
+                    <a:tc>
+                      <a:txBody>
+                        <a:bodyPr/>
+                        <a:lstStyle/>
+                        <a:p>
+                          <a:r>
+                            <a:rPr lang="en-US" dirty="0"/>
+                            <a:t>0</a:t>
+                          </a:r>
+                        </a:p>
+                      </a:txBody>
+                      <a:tcPr/>
+                    </a:tc>
+                    <a:tc>
+                      <a:txBody>
+                        <a:bodyPr/>
+                        <a:lstStyle/>
+                        <a:p>
+                          <a:r>
+                            <a:rPr lang="en-US" dirty="0"/>
+                            <a:t>1</a:t>
+                          </a:r>
+                        </a:p>
+                      </a:txBody>
+                      <a:tcPr/>
+                    </a:tc>
+                    <a:tc>
+                      <a:txBody>
+                        <a:bodyPr/>
+                        <a:lstStyle/>
+                        <a:p>
+                          <a:r>
+                            <a:rPr lang="en-US" dirty="0"/>
+                            <a:t>1</a:t>
+                          </a:r>
+                        </a:p>
+                      </a:txBody>
+                      <a:tcPr/>
+                    </a:tc>
+                    <a:extLst>
+                      <a:ext uri="{0D108BD9-81ED-4DB2-BD59-A6C34878D82A}">
+                        <a16:rowId xmlns:a16="http://schemas.microsoft.com/office/drawing/2014/main" val="3194711834"/>
+                      </a:ext>
+                    </a:extLst>
+                  </a:tr>
+                  <a:tr h="379872">
+                    <a:tc>
+                      <a:txBody>
+                        <a:bodyPr/>
+                        <a:lstStyle/>
+                        <a:p>
+                          <a:r>
+                            <a:rPr lang="en-US" dirty="0"/>
+                            <a:t>1</a:t>
+                          </a:r>
+                        </a:p>
+                      </a:txBody>
+                      <a:tcPr/>
+                    </a:tc>
+                    <a:tc>
+                      <a:txBody>
+                        <a:bodyPr/>
+                        <a:lstStyle/>
+                        <a:p>
+                          <a:r>
+                            <a:rPr lang="en-US" dirty="0"/>
+                            <a:t>0</a:t>
+                          </a:r>
+                        </a:p>
+                      </a:txBody>
+                      <a:tcPr/>
+                    </a:tc>
+                    <a:tc>
+                      <a:txBody>
+                        <a:bodyPr/>
+                        <a:lstStyle/>
+                        <a:p>
+                          <a:r>
+                            <a:rPr lang="en-US" dirty="0"/>
+                            <a:t>0</a:t>
+                          </a:r>
+                        </a:p>
+                      </a:txBody>
+                      <a:tcPr/>
+                    </a:tc>
+                    <a:tc>
+                      <a:txBody>
+                        <a:bodyPr/>
+                        <a:lstStyle/>
+                        <a:p>
+                          <a:r>
+                            <a:rPr lang="en-US" dirty="0"/>
+                            <a:t>1</a:t>
+                          </a:r>
+                        </a:p>
+                      </a:txBody>
+                      <a:tcPr/>
+                    </a:tc>
+                    <a:tc>
+                      <a:txBody>
+                        <a:bodyPr/>
+                        <a:lstStyle/>
+                        <a:p>
+                          <a:r>
+                            <a:rPr lang="en-US" dirty="0"/>
+                            <a:t>1</a:t>
+                          </a:r>
+                        </a:p>
+                      </a:txBody>
+                      <a:tcPr/>
+                    </a:tc>
+                    <a:extLst>
+                      <a:ext uri="{0D108BD9-81ED-4DB2-BD59-A6C34878D82A}">
+                        <a16:rowId xmlns:a16="http://schemas.microsoft.com/office/drawing/2014/main" val="486581744"/>
+                      </a:ext>
+                    </a:extLst>
+                  </a:tr>
+                  <a:tr h="379872">
+                    <a:tc>
+                      <a:txBody>
+                        <a:bodyPr/>
+                        <a:lstStyle/>
+                        <a:p>
+                          <a:r>
+                            <a:rPr lang="en-US" dirty="0"/>
+                            <a:t>1</a:t>
+                          </a:r>
+                        </a:p>
+                      </a:txBody>
+                      <a:tcPr/>
+                    </a:tc>
+                    <a:tc>
+                      <a:txBody>
+                        <a:bodyPr/>
+                        <a:lstStyle/>
+                        <a:p>
+                          <a:r>
+                            <a:rPr lang="en-US" dirty="0"/>
+                            <a:t>1</a:t>
+                          </a:r>
+                        </a:p>
+                      </a:txBody>
+                      <a:tcPr/>
+                    </a:tc>
+                    <a:tc>
+                      <a:txBody>
+                        <a:bodyPr/>
+                        <a:lstStyle/>
+                        <a:p>
+                          <a:r>
+                            <a:rPr lang="en-US" dirty="0"/>
+                            <a:t>1</a:t>
+                          </a:r>
+                        </a:p>
+                      </a:txBody>
+                      <a:tcPr/>
+                    </a:tc>
+                    <a:tc>
+                      <a:txBody>
+                        <a:bodyPr/>
+                        <a:lstStyle/>
+                        <a:p>
+                          <a:r>
+                            <a:rPr lang="en-US" dirty="0"/>
+                            <a:t>1</a:t>
+                          </a:r>
+                        </a:p>
+                      </a:txBody>
+                      <a:tcPr/>
+                    </a:tc>
+                    <a:tc>
+                      <a:txBody>
+                        <a:bodyPr/>
+                        <a:lstStyle/>
+                        <a:p>
+                          <a:r>
+                            <a:rPr lang="en-US" dirty="0"/>
+                            <a:t>0</a:t>
+                          </a:r>
+                        </a:p>
+                      </a:txBody>
+                      <a:tcPr/>
+                    </a:tc>
+                    <a:extLst>
+                      <a:ext uri="{0D108BD9-81ED-4DB2-BD59-A6C34878D82A}">
+                        <a16:rowId xmlns:a16="http://schemas.microsoft.com/office/drawing/2014/main" val="1671252828"/>
+                      </a:ext>
+                    </a:extLst>
+                  </a:tr>
+                </a:tbl>
+              </a:graphicData>
+            </a:graphic>
+          </p:graphicFrame>
+        </mc:Fallback>
+      </mc:AlternateContent>
+      <mc:AlternateContent xmlns:mc="http://schemas.openxmlformats.org/markup-compatibility/2006">
+        <mc:Choice xmlns:a14="http://schemas.microsoft.com/office/drawing/2010/main" Requires="a14">
+          <p:graphicFrame>
+            <p:nvGraphicFramePr>
+              <p:cNvPr id="5" name="Table 4">
+                <a:extLst>
+                  <a:ext uri="{FF2B5EF4-FFF2-40B4-BE49-F238E27FC236}">
+                    <a16:creationId xmlns:a16="http://schemas.microsoft.com/office/drawing/2014/main" id="{04EA78DC-E72B-AA3F-DD05-4D1D66508E42}"/>
+                  </a:ext>
+                </a:extLst>
+              </p:cNvPr>
+              <p:cNvGraphicFramePr>
+                <a:graphicFrameLocks noGrp="1"/>
+              </p:cNvGraphicFramePr>
+              <p:nvPr>
+                <p:extLst>
+                  <p:ext uri="{D42A27DB-BD31-4B8C-83A1-F6EECF244321}">
+                    <p14:modId xmlns:p14="http://schemas.microsoft.com/office/powerpoint/2010/main" val="960588175"/>
+                  </p:ext>
+                </p:extLst>
+              </p:nvPr>
+            </p:nvGraphicFramePr>
+            <p:xfrm>
+              <a:off x="950310" y="1839017"/>
+              <a:ext cx="3619938" cy="1112520"/>
+            </p:xfrm>
+            <a:graphic>
+              <a:graphicData uri="http://schemas.openxmlformats.org/drawingml/2006/table">
+                <a:tbl>
+                  <a:tblPr firstRow="1" bandRow="1">
+                    <a:tableStyleId>{5C22544A-7EE6-4342-B048-85BDC9FD1C3A}</a:tableStyleId>
+                  </a:tblPr>
+                  <a:tblGrid>
+                    <a:gridCol w="1809969">
+                      <a:extLst>
+                        <a:ext uri="{9D8B030D-6E8A-4147-A177-3AD203B41FA5}">
+                          <a16:colId xmlns:a16="http://schemas.microsoft.com/office/drawing/2014/main" val="923450553"/>
+                        </a:ext>
+                      </a:extLst>
+                    </a:gridCol>
+                    <a:gridCol w="1809969">
+                      <a:extLst>
+                        <a:ext uri="{9D8B030D-6E8A-4147-A177-3AD203B41FA5}">
+                          <a16:colId xmlns:a16="http://schemas.microsoft.com/office/drawing/2014/main" val="301574198"/>
+                        </a:ext>
+                      </a:extLst>
+                    </a:gridCol>
+                  </a:tblGrid>
+                  <a:tr h="370840">
+                    <a:tc>
+                      <a:txBody>
+                        <a:bodyPr/>
+                        <a:lstStyle/>
+                        <a:p>
+                          <a:r>
+                            <a:rPr lang="en-US" dirty="0"/>
+                            <a:t>X</a:t>
+                          </a:r>
+                        </a:p>
+                      </a:txBody>
+                      <a:tcPr/>
+                    </a:tc>
+                    <a:tc>
+                      <a:txBody>
+                        <a:bodyPr/>
+                        <a:lstStyle/>
+                        <a:p>
+                          <a14:m>
+                            <m:oMathPara xmlns:m="http://schemas.openxmlformats.org/officeDocument/2006/math">
+                              <m:oMathParaPr>
+                                <m:jc m:val="centerGroup"/>
+                              </m:oMathParaPr>
+                              <m:oMath xmlns:m="http://schemas.openxmlformats.org/officeDocument/2006/math">
+                                <m:acc>
+                                  <m:accPr>
+                                    <m:chr m:val="̅"/>
+                                    <m:ctrlPr>
+                                      <a:rPr lang="en-US" i="1" smtClean="0">
+                                        <a:latin typeface="Cambria Math" panose="02040503050406030204" pitchFamily="18" charset="0"/>
+                                      </a:rPr>
+                                    </m:ctrlPr>
+                                  </m:accPr>
+                                  <m:e>
+                                    <m:r>
+                                      <a:rPr lang="en-US" b="1" i="1" smtClean="0">
+                                        <a:latin typeface="Cambria Math" panose="02040503050406030204" pitchFamily="18" charset="0"/>
+                                      </a:rPr>
+                                      <m:t>𝑿</m:t>
+                                    </m:r>
+                                  </m:e>
+                                </m:acc>
+                              </m:oMath>
+                            </m:oMathPara>
+                          </a14:m>
+                          <a:endParaRPr lang="en-US" dirty="0"/>
+                        </a:p>
+                      </a:txBody>
+                      <a:tcPr/>
+                    </a:tc>
+                    <a:extLst>
+                      <a:ext uri="{0D108BD9-81ED-4DB2-BD59-A6C34878D82A}">
+                        <a16:rowId xmlns:a16="http://schemas.microsoft.com/office/drawing/2014/main" val="1814864935"/>
+                      </a:ext>
+                    </a:extLst>
+                  </a:tr>
+                  <a:tr h="370840">
+                    <a:tc>
+                      <a:txBody>
+                        <a:bodyPr/>
+                        <a:lstStyle/>
+                        <a:p>
+                          <a:r>
+                            <a:rPr lang="en-US" dirty="0"/>
+                            <a:t>0</a:t>
+                          </a:r>
+                        </a:p>
+                      </a:txBody>
+                      <a:tcPr/>
+                    </a:tc>
+                    <a:tc>
+                      <a:txBody>
+                        <a:bodyPr/>
+                        <a:lstStyle/>
+                        <a:p>
+                          <a:r>
+                            <a:rPr lang="en-US" dirty="0"/>
+                            <a:t>1</a:t>
+                          </a:r>
+                        </a:p>
+                      </a:txBody>
+                      <a:tcPr/>
+                    </a:tc>
+                    <a:extLst>
+                      <a:ext uri="{0D108BD9-81ED-4DB2-BD59-A6C34878D82A}">
+                        <a16:rowId xmlns:a16="http://schemas.microsoft.com/office/drawing/2014/main" val="2737463139"/>
+                      </a:ext>
+                    </a:extLst>
+                  </a:tr>
+                  <a:tr h="370840">
+                    <a:tc>
+                      <a:txBody>
+                        <a:bodyPr/>
+                        <a:lstStyle/>
+                        <a:p>
+                          <a:r>
+                            <a:rPr lang="en-US" dirty="0"/>
+                            <a:t>1</a:t>
+                          </a:r>
+                        </a:p>
+                      </a:txBody>
+                      <a:tcPr/>
+                    </a:tc>
+                    <a:tc>
+                      <a:txBody>
+                        <a:bodyPr/>
+                        <a:lstStyle/>
+                        <a:p>
+                          <a:r>
+                            <a:rPr lang="en-US" dirty="0"/>
+                            <a:t>0</a:t>
+                          </a:r>
+                        </a:p>
+                      </a:txBody>
+                      <a:tcPr/>
+                    </a:tc>
+                    <a:extLst>
+                      <a:ext uri="{0D108BD9-81ED-4DB2-BD59-A6C34878D82A}">
+                        <a16:rowId xmlns:a16="http://schemas.microsoft.com/office/drawing/2014/main" val="3684500155"/>
+                      </a:ext>
+                    </a:extLst>
+                  </a:tr>
+                </a:tbl>
+              </a:graphicData>
+            </a:graphic>
+          </p:graphicFrame>
+        </mc:Choice>
+        <mc:Fallback>
+          <p:graphicFrame>
+            <p:nvGraphicFramePr>
+              <p:cNvPr id="5" name="Table 4">
+                <a:extLst>
+                  <a:ext uri="{FF2B5EF4-FFF2-40B4-BE49-F238E27FC236}">
+                    <a16:creationId xmlns:a16="http://schemas.microsoft.com/office/drawing/2014/main" id="{04EA78DC-E72B-AA3F-DD05-4D1D66508E42}"/>
+                  </a:ext>
+                </a:extLst>
+              </p:cNvPr>
+              <p:cNvGraphicFramePr>
+                <a:graphicFrameLocks noGrp="1"/>
+              </p:cNvGraphicFramePr>
+              <p:nvPr>
+                <p:extLst>
+                  <p:ext uri="{D42A27DB-BD31-4B8C-83A1-F6EECF244321}">
+                    <p14:modId xmlns:p14="http://schemas.microsoft.com/office/powerpoint/2010/main" val="960588175"/>
+                  </p:ext>
+                </p:extLst>
+              </p:nvPr>
+            </p:nvGraphicFramePr>
+            <p:xfrm>
+              <a:off x="950310" y="1839017"/>
+              <a:ext cx="3619938" cy="1112520"/>
+            </p:xfrm>
+            <a:graphic>
+              <a:graphicData uri="http://schemas.openxmlformats.org/drawingml/2006/table">
+                <a:tbl>
+                  <a:tblPr firstRow="1" bandRow="1">
+                    <a:tableStyleId>{5C22544A-7EE6-4342-B048-85BDC9FD1C3A}</a:tableStyleId>
+                  </a:tblPr>
+                  <a:tblGrid>
+                    <a:gridCol w="1809969">
+                      <a:extLst>
+                        <a:ext uri="{9D8B030D-6E8A-4147-A177-3AD203B41FA5}">
+                          <a16:colId xmlns:a16="http://schemas.microsoft.com/office/drawing/2014/main" val="923450553"/>
+                        </a:ext>
+                      </a:extLst>
+                    </a:gridCol>
+                    <a:gridCol w="1809969">
+                      <a:extLst>
+                        <a:ext uri="{9D8B030D-6E8A-4147-A177-3AD203B41FA5}">
+                          <a16:colId xmlns:a16="http://schemas.microsoft.com/office/drawing/2014/main" val="301574198"/>
+                        </a:ext>
+                      </a:extLst>
+                    </a:gridCol>
+                  </a:tblGrid>
+                  <a:tr h="370840">
+                    <a:tc>
+                      <a:txBody>
+                        <a:bodyPr/>
+                        <a:lstStyle/>
+                        <a:p>
+                          <a:r>
+                            <a:rPr lang="en-US" dirty="0"/>
+                            <a:t>X</a:t>
+                          </a:r>
+                        </a:p>
+                      </a:txBody>
+                      <a:tcPr/>
+                    </a:tc>
+                    <a:tc>
+                      <a:txBody>
+                        <a:bodyPr/>
+                        <a:lstStyle/>
+                        <a:p>
+                          <a:endParaRPr lang="en-US"/>
+                        </a:p>
+                      </a:txBody>
+                      <a:tcPr>
+                        <a:blipFill>
+                          <a:blip r:embed="rId3"/>
+                          <a:stretch>
+                            <a:fillRect l="-100673" t="-6557" r="-1347" b="-226230"/>
+                          </a:stretch>
+                        </a:blipFill>
+                      </a:tcPr>
+                    </a:tc>
+                    <a:extLst>
+                      <a:ext uri="{0D108BD9-81ED-4DB2-BD59-A6C34878D82A}">
+                        <a16:rowId xmlns:a16="http://schemas.microsoft.com/office/drawing/2014/main" val="1814864935"/>
+                      </a:ext>
+                    </a:extLst>
+                  </a:tr>
+                  <a:tr h="370840">
+                    <a:tc>
+                      <a:txBody>
+                        <a:bodyPr/>
+                        <a:lstStyle/>
+                        <a:p>
+                          <a:r>
+                            <a:rPr lang="en-US" dirty="0"/>
+                            <a:t>0</a:t>
+                          </a:r>
+                        </a:p>
+                      </a:txBody>
+                      <a:tcPr/>
+                    </a:tc>
+                    <a:tc>
+                      <a:txBody>
+                        <a:bodyPr/>
+                        <a:lstStyle/>
+                        <a:p>
+                          <a:r>
+                            <a:rPr lang="en-US" dirty="0"/>
+                            <a:t>1</a:t>
+                          </a:r>
+                        </a:p>
+                      </a:txBody>
+                      <a:tcPr/>
+                    </a:tc>
+                    <a:extLst>
+                      <a:ext uri="{0D108BD9-81ED-4DB2-BD59-A6C34878D82A}">
+                        <a16:rowId xmlns:a16="http://schemas.microsoft.com/office/drawing/2014/main" val="2737463139"/>
+                      </a:ext>
+                    </a:extLst>
+                  </a:tr>
+                  <a:tr h="370840">
+                    <a:tc>
+                      <a:txBody>
+                        <a:bodyPr/>
+                        <a:lstStyle/>
+                        <a:p>
+                          <a:r>
+                            <a:rPr lang="en-US" dirty="0"/>
+                            <a:t>1</a:t>
+                          </a:r>
+                        </a:p>
+                      </a:txBody>
+                      <a:tcPr/>
+                    </a:tc>
+                    <a:tc>
+                      <a:txBody>
+                        <a:bodyPr/>
+                        <a:lstStyle/>
+                        <a:p>
+                          <a:r>
+                            <a:rPr lang="en-US" dirty="0"/>
+                            <a:t>0</a:t>
+                          </a:r>
+                        </a:p>
+                      </a:txBody>
+                      <a:tcPr/>
+                    </a:tc>
+                    <a:extLst>
+                      <a:ext uri="{0D108BD9-81ED-4DB2-BD59-A6C34878D82A}">
+                        <a16:rowId xmlns:a16="http://schemas.microsoft.com/office/drawing/2014/main" val="3684500155"/>
+                      </a:ext>
+                    </a:extLst>
+                  </a:tr>
+                </a:tbl>
+              </a:graphicData>
+            </a:graphic>
+          </p:graphicFrame>
+        </mc:Fallback>
+      </mc:AlternateContent>
+      <p:sp>
+        <p:nvSpPr>
+          <p:cNvPr id="7" name="Footer Placeholder 6">
+            <a:extLst>
+              <a:ext uri="{FF2B5EF4-FFF2-40B4-BE49-F238E27FC236}">
+                <a16:creationId xmlns:a16="http://schemas.microsoft.com/office/drawing/2014/main" id="{6AD3397B-377F-7A84-0DDF-99BD55E4C213}"/>
+              </a:ext>
+            </a:extLst>
+          </p:cNvPr>
+          <p:cNvSpPr>
+            <a:spLocks noGrp="1"/>
+          </p:cNvSpPr>
+          <p:nvPr>
+            <p:ph type="ftr" sz="quarter" idx="11"/>
+          </p:nvPr>
+        </p:nvSpPr>
+        <p:spPr/>
+        <p:txBody>
+          <a:bodyPr/>
+          <a:lstStyle/>
+          <a:p>
+            <a:r>
+              <a:rPr lang="en-US"/>
+              <a:t>Week 7</a:t>
+            </a:r>
+          </a:p>
+        </p:txBody>
+      </p:sp>
+    </p:spTree>
+    <p:extLst>
+      <p:ext uri="{BB962C8B-B14F-4D97-AF65-F5344CB8AC3E}">
+        <p14:creationId xmlns:p14="http://schemas.microsoft.com/office/powerpoint/2010/main" val="2380609652"/>
+      </p:ext>
+    </p:extLst>
+  </p:cSld>
+  <p:clrMapOvr>
+    <a:masterClrMapping/>
+  </p:clrMapOvr>
+</p:sld>
+</file>
+
+<file path=ppt/slides/slide72.xml><?xml version="1.0" encoding="utf-8"?>
+<p:sld xmlns:a="http://schemas.openxmlformats.org/drawingml/2006/main" xmlns:r="http://schemas.openxmlformats.org/officeDocument/2006/relationships" xmlns:p="http://schemas.openxmlformats.org/presentationml/2006/main">
+  <p:cSld>
+    <p:spTree>
+      <p:nvGrpSpPr>
+        <p:cNvPr id="1" name=""/>
+        <p:cNvGrpSpPr/>
+        <p:nvPr/>
+      </p:nvGrpSpPr>
+      <p:grpSpPr>
+        <a:xfrm>
+          <a:off x="0" y="0"/>
+          <a:ext cx="0" cy="0"/>
+          <a:chOff x="0" y="0"/>
+          <a:chExt cx="0" cy="0"/>
+        </a:xfrm>
+      </p:grpSpPr>
+      <p:sp>
+        <p:nvSpPr>
+          <p:cNvPr id="2" name="Title 1">
+            <a:extLst>
+              <a:ext uri="{FF2B5EF4-FFF2-40B4-BE49-F238E27FC236}">
+                <a16:creationId xmlns:a16="http://schemas.microsoft.com/office/drawing/2014/main" id="{5103C287-FA78-3AE8-013F-3406E803B2F0}"/>
+              </a:ext>
+            </a:extLst>
+          </p:cNvPr>
+          <p:cNvSpPr>
+            <a:spLocks noGrp="1"/>
+          </p:cNvSpPr>
+          <p:nvPr>
+            <p:ph type="title"/>
+          </p:nvPr>
+        </p:nvSpPr>
+        <p:spPr/>
+        <p:txBody>
+          <a:bodyPr/>
+          <a:lstStyle/>
+          <a:p>
+            <a:r>
+              <a:rPr lang="en-US" dirty="0"/>
+              <a:t>Some expressions</a:t>
+            </a:r>
+          </a:p>
+        </p:txBody>
+      </p:sp>
+      <mc:AlternateContent xmlns:mc="http://schemas.openxmlformats.org/markup-compatibility/2006">
+        <mc:Choice xmlns:a14="http://schemas.microsoft.com/office/drawing/2010/main" Requires="a14">
+          <p:sp>
+            <p:nvSpPr>
+              <p:cNvPr id="3" name="Content Placeholder 2">
+                <a:extLst>
+                  <a:ext uri="{FF2B5EF4-FFF2-40B4-BE49-F238E27FC236}">
+                    <a16:creationId xmlns:a16="http://schemas.microsoft.com/office/drawing/2014/main" id="{503F2FEC-2754-1535-B2D9-82B5447468FD}"/>
+                  </a:ext>
+                </a:extLst>
+              </p:cNvPr>
+              <p:cNvSpPr>
+                <a:spLocks noGrp="1"/>
+              </p:cNvSpPr>
+              <p:nvPr>
+                <p:ph idx="1"/>
+              </p:nvPr>
+            </p:nvSpPr>
+            <p:spPr/>
+            <p:txBody>
+              <a:bodyPr/>
+              <a:lstStyle/>
+              <a:p>
+                <a:r>
+                  <a:rPr lang="en-US" dirty="0"/>
+                  <a:t>Evaluate for A = 1 , B = 0 , C =0</a:t>
+                </a:r>
+              </a:p>
+              <a:p>
+                <a:pPr lvl="1"/>
+                <a14:m>
+                  <m:oMath xmlns:m="http://schemas.openxmlformats.org/officeDocument/2006/math">
+                    <m:r>
+                      <a:rPr lang="en-US" b="0" i="1" smtClean="0">
+                        <a:latin typeface="Cambria Math" panose="02040503050406030204" pitchFamily="18" charset="0"/>
+                      </a:rPr>
+                      <m:t>𝐴</m:t>
+                    </m:r>
+                    <m:r>
+                      <a:rPr lang="en-US" b="0" i="1" smtClean="0">
+                        <a:latin typeface="Cambria Math" panose="02040503050406030204" pitchFamily="18" charset="0"/>
+                      </a:rPr>
+                      <m:t>.</m:t>
+                    </m:r>
+                    <m:d>
+                      <m:dPr>
+                        <m:ctrlPr>
+                          <a:rPr lang="en-US" b="0" i="1" smtClean="0">
+                            <a:latin typeface="Cambria Math" panose="02040503050406030204" pitchFamily="18" charset="0"/>
+                          </a:rPr>
+                        </m:ctrlPr>
+                      </m:dPr>
+                      <m:e>
+                        <m:r>
+                          <a:rPr lang="en-US" b="0" i="1" smtClean="0">
+                            <a:latin typeface="Cambria Math" panose="02040503050406030204" pitchFamily="18" charset="0"/>
+                          </a:rPr>
+                          <m:t>𝐵</m:t>
+                        </m:r>
+                        <m:r>
+                          <a:rPr lang="en-US" b="0" i="1" smtClean="0">
+                            <a:latin typeface="Cambria Math" panose="02040503050406030204" pitchFamily="18" charset="0"/>
+                          </a:rPr>
+                          <m:t>+</m:t>
+                        </m:r>
+                        <m:r>
+                          <a:rPr lang="en-US" b="0" i="1" smtClean="0">
+                            <a:latin typeface="Cambria Math" panose="02040503050406030204" pitchFamily="18" charset="0"/>
+                          </a:rPr>
+                          <m:t>𝐶</m:t>
+                        </m:r>
+                      </m:e>
+                    </m:d>
+                  </m:oMath>
+                </a14:m>
+                <a:endParaRPr lang="en-US" b="0" dirty="0"/>
+              </a:p>
+              <a:p>
+                <a:pPr lvl="1"/>
+                <a14:m>
+                  <m:oMath xmlns:m="http://schemas.openxmlformats.org/officeDocument/2006/math">
+                    <m:acc>
+                      <m:accPr>
+                        <m:chr m:val="̅"/>
+                        <m:ctrlPr>
+                          <a:rPr lang="en-US" b="0" i="1" smtClean="0">
+                            <a:latin typeface="Cambria Math" panose="02040503050406030204" pitchFamily="18" charset="0"/>
+                          </a:rPr>
+                        </m:ctrlPr>
+                      </m:accPr>
+                      <m:e>
+                        <m:r>
+                          <a:rPr lang="en-US" i="1">
+                            <a:latin typeface="Cambria Math" panose="02040503050406030204" pitchFamily="18" charset="0"/>
+                          </a:rPr>
+                          <m:t>𝐴</m:t>
+                        </m:r>
+                      </m:e>
+                    </m:acc>
+                    <m:r>
+                      <a:rPr lang="en-US" b="0" i="1" smtClean="0">
+                        <a:latin typeface="Cambria Math" panose="02040503050406030204" pitchFamily="18" charset="0"/>
+                      </a:rPr>
+                      <m:t>.</m:t>
+                    </m:r>
+                    <m:d>
+                      <m:dPr>
+                        <m:ctrlPr>
+                          <a:rPr lang="en-US" b="0" i="1" smtClean="0">
+                            <a:latin typeface="Cambria Math" panose="02040503050406030204" pitchFamily="18" charset="0"/>
+                          </a:rPr>
+                        </m:ctrlPr>
+                      </m:dPr>
+                      <m:e>
+                        <m:r>
+                          <a:rPr lang="en-US" b="0" i="1" smtClean="0">
+                            <a:latin typeface="Cambria Math" panose="02040503050406030204" pitchFamily="18" charset="0"/>
+                          </a:rPr>
+                          <m:t>𝐵</m:t>
+                        </m:r>
+                        <m:r>
+                          <a:rPr lang="en-US" b="0" i="1" smtClean="0">
+                            <a:latin typeface="Cambria Math" panose="02040503050406030204" pitchFamily="18" charset="0"/>
+                          </a:rPr>
+                          <m:t>+</m:t>
+                        </m:r>
+                        <m:r>
+                          <a:rPr lang="en-US" b="0" i="1" smtClean="0">
+                            <a:latin typeface="Cambria Math" panose="02040503050406030204" pitchFamily="18" charset="0"/>
+                          </a:rPr>
+                          <m:t>𝐶</m:t>
+                        </m:r>
+                      </m:e>
+                    </m:d>
+                  </m:oMath>
+                </a14:m>
+                <a:endParaRPr lang="en-US" b="0" dirty="0"/>
+              </a:p>
+              <a:p>
+                <a:pPr lvl="1"/>
+                <a14:m>
+                  <m:oMath xmlns:m="http://schemas.openxmlformats.org/officeDocument/2006/math">
+                    <m:r>
+                      <a:rPr lang="en-US" b="0" i="1" smtClean="0">
+                        <a:latin typeface="Cambria Math" panose="02040503050406030204" pitchFamily="18" charset="0"/>
+                      </a:rPr>
+                      <m:t>𝐴</m:t>
+                    </m:r>
+                    <m:r>
+                      <a:rPr lang="en-US" b="0" i="1" smtClean="0">
+                        <a:latin typeface="Cambria Math" panose="02040503050406030204" pitchFamily="18" charset="0"/>
+                      </a:rPr>
+                      <m:t>.</m:t>
+                    </m:r>
+                    <m:d>
+                      <m:dPr>
+                        <m:ctrlPr>
+                          <a:rPr lang="en-US" b="0" i="1" smtClean="0">
+                            <a:latin typeface="Cambria Math" panose="02040503050406030204" pitchFamily="18" charset="0"/>
+                          </a:rPr>
+                        </m:ctrlPr>
+                      </m:dPr>
+                      <m:e>
+                        <m:acc>
+                          <m:accPr>
+                            <m:chr m:val="̅"/>
+                            <m:ctrlPr>
+                              <a:rPr lang="en-US" b="0" i="1" smtClean="0">
+                                <a:latin typeface="Cambria Math" panose="02040503050406030204" pitchFamily="18" charset="0"/>
+                              </a:rPr>
+                            </m:ctrlPr>
+                          </m:accPr>
+                          <m:e>
+                            <m:r>
+                              <a:rPr lang="en-US" b="0" i="1" smtClean="0">
+                                <a:latin typeface="Cambria Math" panose="02040503050406030204" pitchFamily="18" charset="0"/>
+                              </a:rPr>
+                              <m:t>𝐵</m:t>
+                            </m:r>
+                          </m:e>
+                        </m:acc>
+                        <m:r>
+                          <a:rPr lang="en-US" b="0" i="1" smtClean="0">
+                            <a:latin typeface="Cambria Math" panose="02040503050406030204" pitchFamily="18" charset="0"/>
+                          </a:rPr>
+                          <m:t>+</m:t>
+                        </m:r>
+                        <m:r>
+                          <a:rPr lang="en-US" b="0" i="1" smtClean="0">
+                            <a:latin typeface="Cambria Math" panose="02040503050406030204" pitchFamily="18" charset="0"/>
+                          </a:rPr>
+                          <m:t>𝐶</m:t>
+                        </m:r>
+                      </m:e>
+                    </m:d>
+                  </m:oMath>
+                </a14:m>
+                <a:endParaRPr lang="en-US" b="0" dirty="0"/>
+              </a:p>
+              <a:p>
+                <a:pPr lvl="1"/>
+                <a14:m>
+                  <m:oMath xmlns:m="http://schemas.openxmlformats.org/officeDocument/2006/math">
+                    <m:d>
+                      <m:dPr>
+                        <m:ctrlPr>
+                          <a:rPr lang="en-US" b="0" i="1" smtClean="0">
+                            <a:latin typeface="Cambria Math" panose="02040503050406030204" pitchFamily="18" charset="0"/>
+                          </a:rPr>
+                        </m:ctrlPr>
+                      </m:dPr>
+                      <m:e>
+                        <m:r>
+                          <a:rPr lang="en-US" b="0" i="1" smtClean="0">
+                            <a:latin typeface="Cambria Math" panose="02040503050406030204" pitchFamily="18" charset="0"/>
+                          </a:rPr>
+                          <m:t>𝐴</m:t>
+                        </m:r>
+                        <m:r>
+                          <a:rPr lang="en-US" b="0" i="1" smtClean="0">
+                            <a:latin typeface="Cambria Math" panose="02040503050406030204" pitchFamily="18" charset="0"/>
+                          </a:rPr>
+                          <m:t>+</m:t>
+                        </m:r>
+                        <m:r>
+                          <a:rPr lang="en-US" b="0" i="1" smtClean="0">
+                            <a:latin typeface="Cambria Math" panose="02040503050406030204" pitchFamily="18" charset="0"/>
+                          </a:rPr>
+                          <m:t>𝐵</m:t>
+                        </m:r>
+                      </m:e>
+                    </m:d>
+                    <m:d>
+                      <m:dPr>
+                        <m:ctrlPr>
+                          <a:rPr lang="en-US" b="0" i="1" smtClean="0">
+                            <a:latin typeface="Cambria Math" panose="02040503050406030204" pitchFamily="18" charset="0"/>
+                          </a:rPr>
+                        </m:ctrlPr>
+                      </m:dPr>
+                      <m:e>
+                        <m:r>
+                          <a:rPr lang="en-US" b="0" i="1" smtClean="0">
+                            <a:latin typeface="Cambria Math" panose="02040503050406030204" pitchFamily="18" charset="0"/>
+                          </a:rPr>
+                          <m:t>𝐴</m:t>
+                        </m:r>
+                        <m:r>
+                          <a:rPr lang="en-US" b="0" i="1" smtClean="0">
+                            <a:latin typeface="Cambria Math" panose="02040503050406030204" pitchFamily="18" charset="0"/>
+                          </a:rPr>
+                          <m:t>+</m:t>
+                        </m:r>
+                        <m:r>
+                          <a:rPr lang="en-US" b="0" i="1" smtClean="0">
+                            <a:latin typeface="Cambria Math" panose="02040503050406030204" pitchFamily="18" charset="0"/>
+                          </a:rPr>
+                          <m:t>𝐶</m:t>
+                        </m:r>
+                      </m:e>
+                    </m:d>
+                  </m:oMath>
+                </a14:m>
+                <a:endParaRPr lang="en-US" b="0" dirty="0"/>
+              </a:p>
+              <a:p>
+                <a:pPr lvl="1"/>
+                <a14:m>
+                  <m:oMath xmlns:m="http://schemas.openxmlformats.org/officeDocument/2006/math">
+                    <m:r>
+                      <a:rPr lang="en-US" b="0" i="1" smtClean="0">
+                        <a:latin typeface="Cambria Math" panose="02040503050406030204" pitchFamily="18" charset="0"/>
+                      </a:rPr>
+                      <m:t>𝐴</m:t>
+                    </m:r>
+                    <m:r>
+                      <a:rPr lang="en-US" b="0" i="1" smtClean="0">
+                        <a:latin typeface="Cambria Math" panose="02040503050406030204" pitchFamily="18" charset="0"/>
+                      </a:rPr>
+                      <m:t>+</m:t>
+                    </m:r>
+                    <m:acc>
+                      <m:accPr>
+                        <m:chr m:val="̅"/>
+                        <m:ctrlPr>
+                          <a:rPr lang="en-US" b="0" i="1" smtClean="0">
+                            <a:latin typeface="Cambria Math" panose="02040503050406030204" pitchFamily="18" charset="0"/>
+                          </a:rPr>
+                        </m:ctrlPr>
+                      </m:accPr>
+                      <m:e>
+                        <m:r>
+                          <a:rPr lang="en-US" b="0" i="1" smtClean="0">
+                            <a:latin typeface="Cambria Math" panose="02040503050406030204" pitchFamily="18" charset="0"/>
+                          </a:rPr>
+                          <m:t>𝐴</m:t>
+                        </m:r>
+                      </m:e>
+                    </m:acc>
+                  </m:oMath>
+                </a14:m>
+                <a:r>
+                  <a:rPr lang="en-US" dirty="0"/>
+                  <a:t>.B</a:t>
+                </a:r>
+              </a:p>
+              <a:p>
+                <a:pPr lvl="1"/>
+                <a14:m>
+                  <m:oMath xmlns:m="http://schemas.openxmlformats.org/officeDocument/2006/math">
+                    <m:r>
+                      <a:rPr lang="en-US" b="0" i="1" smtClean="0">
+                        <a:latin typeface="Cambria Math" panose="02040503050406030204" pitchFamily="18" charset="0"/>
+                      </a:rPr>
+                      <m:t>𝐴</m:t>
+                    </m:r>
+                    <m:r>
+                      <a:rPr lang="en-US" b="0" i="1" smtClean="0">
+                        <a:latin typeface="Cambria Math" panose="02040503050406030204" pitchFamily="18" charset="0"/>
+                      </a:rPr>
+                      <m:t>+</m:t>
+                    </m:r>
+                    <m:r>
+                      <a:rPr lang="en-US" b="0" i="1" smtClean="0">
+                        <a:latin typeface="Cambria Math" panose="02040503050406030204" pitchFamily="18" charset="0"/>
+                      </a:rPr>
+                      <m:t>𝐴𝐵</m:t>
+                    </m:r>
+                  </m:oMath>
+                </a14:m>
+                <a:endParaRPr lang="en-US" b="0" dirty="0"/>
+              </a:p>
+            </p:txBody>
+          </p:sp>
+        </mc:Choice>
+        <mc:Fallback>
+          <p:sp>
+            <p:nvSpPr>
+              <p:cNvPr id="3" name="Content Placeholder 2">
+                <a:extLst>
+                  <a:ext uri="{FF2B5EF4-FFF2-40B4-BE49-F238E27FC236}">
+                    <a16:creationId xmlns:a16="http://schemas.microsoft.com/office/drawing/2014/main" id="{503F2FEC-2754-1535-B2D9-82B5447468FD}"/>
+                  </a:ext>
+                </a:extLst>
+              </p:cNvPr>
+              <p:cNvSpPr>
+                <a:spLocks noGrp="1" noRot="1" noChangeAspect="1" noMove="1" noResize="1" noEditPoints="1" noAdjustHandles="1" noChangeArrowheads="1" noChangeShapeType="1" noTextEdit="1"/>
+              </p:cNvSpPr>
+              <p:nvPr>
+                <p:ph idx="1"/>
+              </p:nvPr>
+            </p:nvSpPr>
+            <p:spPr>
+              <a:blipFill>
+                <a:blip r:embed="rId2"/>
+                <a:stretch>
+                  <a:fillRect l="-1043" t="-2381"/>
+                </a:stretch>
+              </a:blipFill>
+            </p:spPr>
+            <p:txBody>
+              <a:bodyPr/>
+              <a:lstStyle/>
+              <a:p>
+                <a:r>
+                  <a:rPr lang="en-US">
+                    <a:noFill/>
+                  </a:rPr>
+                  <a:t> </a:t>
+                </a:r>
+              </a:p>
+            </p:txBody>
+          </p:sp>
+        </mc:Fallback>
+      </mc:AlternateContent>
+    </p:spTree>
+    <p:extLst>
+      <p:ext uri="{BB962C8B-B14F-4D97-AF65-F5344CB8AC3E}">
+        <p14:creationId xmlns:p14="http://schemas.microsoft.com/office/powerpoint/2010/main" val="1748809675"/>
+      </p:ext>
+    </p:extLst>
+  </p:cSld>
+  <p:clrMapOvr>
+    <a:masterClrMapping/>
+  </p:clrMapOvr>
+</p:sld>
+</file>
+
+<file path=ppt/slides/slide73.xml><?xml version="1.0" encoding="utf-8"?>
+<p:sld xmlns:a="http://schemas.openxmlformats.org/drawingml/2006/main" xmlns:r="http://schemas.openxmlformats.org/officeDocument/2006/relationships" xmlns:p="http://schemas.openxmlformats.org/presentationml/2006/main">
+  <p:cSld>
+    <p:spTree>
+      <p:nvGrpSpPr>
+        <p:cNvPr id="1" name=""/>
+        <p:cNvGrpSpPr/>
+        <p:nvPr/>
+      </p:nvGrpSpPr>
+      <p:grpSpPr>
+        <a:xfrm>
+          <a:off x="0" y="0"/>
+          <a:ext cx="0" cy="0"/>
+          <a:chOff x="0" y="0"/>
+          <a:chExt cx="0" cy="0"/>
+        </a:xfrm>
+      </p:grpSpPr>
+      <p:sp>
+        <p:nvSpPr>
+          <p:cNvPr id="2" name="Title 1">
+            <a:extLst>
+              <a:ext uri="{FF2B5EF4-FFF2-40B4-BE49-F238E27FC236}">
+                <a16:creationId xmlns:a16="http://schemas.microsoft.com/office/drawing/2014/main" id="{92AE6A50-A7B2-0EAB-DAA1-4E6F7C1B0D03}"/>
+              </a:ext>
+            </a:extLst>
+          </p:cNvPr>
+          <p:cNvSpPr>
+            <a:spLocks noGrp="1"/>
+          </p:cNvSpPr>
+          <p:nvPr>
+            <p:ph type="title"/>
+          </p:nvPr>
+        </p:nvSpPr>
+        <p:spPr/>
+        <p:txBody>
+          <a:bodyPr/>
+          <a:lstStyle/>
+          <a:p>
+            <a:r>
+              <a:rPr lang="en-US" dirty="0"/>
+              <a:t>Rules/Discovery</a:t>
+            </a:r>
+          </a:p>
+        </p:txBody>
+      </p:sp>
+      <mc:AlternateContent xmlns:mc="http://schemas.openxmlformats.org/markup-compatibility/2006">
+        <mc:Choice xmlns:a14="http://schemas.microsoft.com/office/drawing/2010/main" Requires="a14">
+          <p:sp>
+            <p:nvSpPr>
+              <p:cNvPr id="3" name="Content Placeholder 2">
+                <a:extLst>
+                  <a:ext uri="{FF2B5EF4-FFF2-40B4-BE49-F238E27FC236}">
+                    <a16:creationId xmlns:a16="http://schemas.microsoft.com/office/drawing/2014/main" id="{7509C67C-D956-457B-6C5F-D3356D10E3B2}"/>
+                  </a:ext>
+                </a:extLst>
+              </p:cNvPr>
+              <p:cNvSpPr>
+                <a:spLocks noGrp="1"/>
+              </p:cNvSpPr>
+              <p:nvPr>
+                <p:ph idx="1"/>
+              </p:nvPr>
+            </p:nvSpPr>
+            <p:spPr/>
+            <p:txBody>
+              <a:bodyPr>
+                <a:normAutofit lnSpcReduction="10000"/>
+              </a:bodyPr>
+              <a:lstStyle/>
+              <a:p>
+                <a:r>
+                  <a:rPr lang="en-US" dirty="0"/>
+                  <a:t>Identity</a:t>
+                </a:r>
+              </a:p>
+              <a:p>
+                <a:pPr lvl="1"/>
+                <a:r>
+                  <a:rPr lang="en-US" dirty="0"/>
+                  <a:t>A + 0 = A</a:t>
+                </a:r>
+              </a:p>
+              <a:p>
+                <a:pPr lvl="1"/>
+                <a:r>
+                  <a:rPr lang="en-US" dirty="0"/>
+                  <a:t>A  . 1 = A</a:t>
+                </a:r>
+              </a:p>
+              <a:p>
+                <a:pPr lvl="1"/>
+                <a:r>
+                  <a:rPr lang="en-US" dirty="0"/>
+                  <a:t>A + 1 = 1</a:t>
+                </a:r>
+              </a:p>
+              <a:p>
+                <a:pPr lvl="1"/>
+                <a:r>
+                  <a:rPr lang="en-US" dirty="0"/>
+                  <a:t>A  . 0 = 0 </a:t>
+                </a:r>
+              </a:p>
+              <a:p>
+                <a:r>
+                  <a:rPr lang="en-US" dirty="0"/>
+                  <a:t>Idempotent</a:t>
+                </a:r>
+              </a:p>
+              <a:p>
+                <a:pPr lvl="1"/>
+                <a14:m>
+                  <m:oMath xmlns:m="http://schemas.openxmlformats.org/officeDocument/2006/math">
+                    <m:r>
+                      <a:rPr lang="en-US" i="1">
+                        <a:latin typeface="Cambria Math" panose="02040503050406030204" pitchFamily="18" charset="0"/>
+                      </a:rPr>
+                      <m:t>𝐴</m:t>
+                    </m:r>
+                    <m:r>
+                      <a:rPr lang="en-US" i="1">
+                        <a:latin typeface="Cambria Math" panose="02040503050406030204" pitchFamily="18" charset="0"/>
+                      </a:rPr>
+                      <m:t>+</m:t>
+                    </m:r>
+                    <m:r>
+                      <a:rPr lang="en-US" i="1">
+                        <a:latin typeface="Cambria Math" panose="02040503050406030204" pitchFamily="18" charset="0"/>
+                      </a:rPr>
+                      <m:t>𝐴</m:t>
+                    </m:r>
+                  </m:oMath>
+                </a14:m>
+                <a:r>
+                  <a:rPr lang="en-US" dirty="0"/>
+                  <a:t> = ?</a:t>
+                </a:r>
+              </a:p>
+              <a:p>
+                <a:pPr lvl="1"/>
+                <a14:m>
+                  <m:oMath xmlns:m="http://schemas.openxmlformats.org/officeDocument/2006/math">
+                    <m:r>
+                      <a:rPr lang="en-US" i="1" smtClean="0">
+                        <a:latin typeface="Cambria Math" panose="02040503050406030204" pitchFamily="18" charset="0"/>
+                      </a:rPr>
+                      <m:t>𝐴</m:t>
+                    </m:r>
+                    <m:r>
+                      <a:rPr lang="en-US" b="0" i="1" smtClean="0">
+                        <a:latin typeface="Cambria Math" panose="02040503050406030204" pitchFamily="18" charset="0"/>
+                      </a:rPr>
+                      <m:t>.</m:t>
+                    </m:r>
+                    <m:r>
+                      <a:rPr lang="en-US" i="1" smtClean="0">
+                        <a:latin typeface="Cambria Math" panose="02040503050406030204" pitchFamily="18" charset="0"/>
+                      </a:rPr>
+                      <m:t>𝐴</m:t>
+                    </m:r>
+                  </m:oMath>
+                </a14:m>
+                <a:r>
+                  <a:rPr lang="en-US" dirty="0"/>
+                  <a:t> = ?</a:t>
+                </a:r>
+              </a:p>
+              <a:p>
+                <a:r>
+                  <a:rPr lang="en-US" dirty="0"/>
+                  <a:t>Complement </a:t>
+                </a:r>
+              </a:p>
+              <a:p>
+                <a:pPr lvl="1"/>
+                <a14:m>
+                  <m:oMath xmlns:m="http://schemas.openxmlformats.org/officeDocument/2006/math">
+                    <m:r>
+                      <a:rPr lang="en-US" b="0" i="1" smtClean="0">
+                        <a:latin typeface="Cambria Math" panose="02040503050406030204" pitchFamily="18" charset="0"/>
+                      </a:rPr>
+                      <m:t>𝐴</m:t>
+                    </m:r>
+                    <m:r>
+                      <a:rPr lang="en-US" b="0" i="1" smtClean="0">
+                        <a:latin typeface="Cambria Math" panose="02040503050406030204" pitchFamily="18" charset="0"/>
+                      </a:rPr>
+                      <m:t>+</m:t>
+                    </m:r>
+                    <m:acc>
+                      <m:accPr>
+                        <m:chr m:val="̅"/>
+                        <m:ctrlPr>
+                          <a:rPr lang="en-US" b="0" i="1" smtClean="0">
+                            <a:latin typeface="Cambria Math" panose="02040503050406030204" pitchFamily="18" charset="0"/>
+                          </a:rPr>
+                        </m:ctrlPr>
+                      </m:accPr>
+                      <m:e>
+                        <m:r>
+                          <a:rPr lang="en-US" b="0" i="1" smtClean="0">
+                            <a:latin typeface="Cambria Math" panose="02040503050406030204" pitchFamily="18" charset="0"/>
+                          </a:rPr>
+                          <m:t>𝐴</m:t>
+                        </m:r>
+                      </m:e>
+                    </m:acc>
+                  </m:oMath>
+                </a14:m>
+                <a:r>
+                  <a:rPr lang="en-US" dirty="0"/>
+                  <a:t> = ?</a:t>
+                </a:r>
+              </a:p>
+              <a:p>
+                <a:pPr lvl="1"/>
+                <a14:m>
+                  <m:oMath xmlns:m="http://schemas.openxmlformats.org/officeDocument/2006/math">
+                    <m:r>
+                      <a:rPr lang="en-US" i="1">
+                        <a:latin typeface="Cambria Math" panose="02040503050406030204" pitchFamily="18" charset="0"/>
+                      </a:rPr>
+                      <m:t>𝐴</m:t>
+                    </m:r>
+                    <m:r>
+                      <a:rPr lang="en-US" b="0" i="1" smtClean="0">
+                        <a:latin typeface="Cambria Math" panose="02040503050406030204" pitchFamily="18" charset="0"/>
+                      </a:rPr>
+                      <m:t>. </m:t>
+                    </m:r>
+                    <m:acc>
+                      <m:accPr>
+                        <m:chr m:val="̅"/>
+                        <m:ctrlPr>
+                          <a:rPr lang="en-US" i="1">
+                            <a:latin typeface="Cambria Math" panose="02040503050406030204" pitchFamily="18" charset="0"/>
+                          </a:rPr>
+                        </m:ctrlPr>
+                      </m:accPr>
+                      <m:e>
+                        <m:r>
+                          <a:rPr lang="en-US" i="1">
+                            <a:latin typeface="Cambria Math" panose="02040503050406030204" pitchFamily="18" charset="0"/>
+                          </a:rPr>
+                          <m:t>𝐴</m:t>
+                        </m:r>
+                      </m:e>
+                    </m:acc>
+                    <m:r>
+                      <m:rPr>
+                        <m:nor/>
+                      </m:rPr>
+                      <a:rPr lang="en-US" dirty="0"/>
+                      <m:t> = ?</m:t>
+                    </m:r>
+                  </m:oMath>
+                </a14:m>
+                <a:endParaRPr lang="en-US" dirty="0"/>
+              </a:p>
+              <a:p>
+                <a:pPr lvl="1"/>
+                <a:endParaRPr lang="en-US" dirty="0"/>
+              </a:p>
+              <a:p>
+                <a:pPr lvl="1"/>
+                <a:endParaRPr lang="en-US" dirty="0"/>
+              </a:p>
+              <a:p>
+                <a:pPr lvl="1"/>
+                <a:endParaRPr lang="en-US" dirty="0"/>
+              </a:p>
+              <a:p>
+                <a:pPr lvl="1"/>
+                <a:endParaRPr lang="en-US" dirty="0"/>
+              </a:p>
+            </p:txBody>
+          </p:sp>
+        </mc:Choice>
+        <mc:Fallback>
+          <p:sp>
+            <p:nvSpPr>
+              <p:cNvPr id="3" name="Content Placeholder 2">
+                <a:extLst>
+                  <a:ext uri="{FF2B5EF4-FFF2-40B4-BE49-F238E27FC236}">
+                    <a16:creationId xmlns:a16="http://schemas.microsoft.com/office/drawing/2014/main" id="{7509C67C-D956-457B-6C5F-D3356D10E3B2}"/>
+                  </a:ext>
+                </a:extLst>
+              </p:cNvPr>
+              <p:cNvSpPr>
+                <a:spLocks noGrp="1" noRot="1" noChangeAspect="1" noMove="1" noResize="1" noEditPoints="1" noAdjustHandles="1" noChangeArrowheads="1" noChangeShapeType="1" noTextEdit="1"/>
+              </p:cNvSpPr>
+              <p:nvPr>
+                <p:ph idx="1"/>
+              </p:nvPr>
+            </p:nvSpPr>
+            <p:spPr>
+              <a:blipFill>
+                <a:blip r:embed="rId2"/>
+                <a:stretch>
+                  <a:fillRect l="-1043" t="-3081" b="-420"/>
+                </a:stretch>
+              </a:blipFill>
+            </p:spPr>
+            <p:txBody>
+              <a:bodyPr/>
+              <a:lstStyle/>
+              <a:p>
+                <a:r>
+                  <a:rPr lang="en-US">
+                    <a:noFill/>
+                  </a:rPr>
+                  <a:t> </a:t>
+                </a:r>
+              </a:p>
+            </p:txBody>
+          </p:sp>
+        </mc:Fallback>
+      </mc:AlternateContent>
+    </p:spTree>
+    <p:extLst>
+      <p:ext uri="{BB962C8B-B14F-4D97-AF65-F5344CB8AC3E}">
+        <p14:creationId xmlns:p14="http://schemas.microsoft.com/office/powerpoint/2010/main" val="1488007270"/>
+      </p:ext>
+    </p:extLst>
+  </p:cSld>
+  <p:clrMapOvr>
+    <a:masterClrMapping/>
+  </p:clrMapOvr>
+</p:sld>
+</file>
+
+<file path=ppt/slides/slide74.xml><?xml version="1.0" encoding="utf-8"?>
+<p:sld xmlns:a="http://schemas.openxmlformats.org/drawingml/2006/main" xmlns:r="http://schemas.openxmlformats.org/officeDocument/2006/relationships" xmlns:p="http://schemas.openxmlformats.org/presentationml/2006/main">
+  <p:cSld>
+    <p:spTree>
+      <p:nvGrpSpPr>
+        <p:cNvPr id="1" name=""/>
+        <p:cNvGrpSpPr/>
+        <p:nvPr/>
+      </p:nvGrpSpPr>
+      <p:grpSpPr>
+        <a:xfrm>
+          <a:off x="0" y="0"/>
+          <a:ext cx="0" cy="0"/>
+          <a:chOff x="0" y="0"/>
+          <a:chExt cx="0" cy="0"/>
+        </a:xfrm>
+      </p:grpSpPr>
+      <p:sp>
+        <p:nvSpPr>
+          <p:cNvPr id="2" name="Title 1">
+            <a:extLst>
+              <a:ext uri="{FF2B5EF4-FFF2-40B4-BE49-F238E27FC236}">
+                <a16:creationId xmlns:a16="http://schemas.microsoft.com/office/drawing/2014/main" id="{F84FF6AD-9969-0048-8C5F-54BA5AA34FBC}"/>
+              </a:ext>
+            </a:extLst>
+          </p:cNvPr>
+          <p:cNvSpPr>
+            <a:spLocks noGrp="1"/>
+          </p:cNvSpPr>
+          <p:nvPr>
+            <p:ph type="title"/>
+          </p:nvPr>
+        </p:nvSpPr>
+        <p:spPr/>
+        <p:txBody>
+          <a:bodyPr/>
+          <a:lstStyle/>
+          <a:p>
+            <a:r>
+              <a:rPr lang="en-US" dirty="0"/>
+              <a:t>Some more rules</a:t>
+            </a:r>
+          </a:p>
+        </p:txBody>
+      </p:sp>
+      <mc:AlternateContent xmlns:mc="http://schemas.openxmlformats.org/markup-compatibility/2006">
+        <mc:Choice xmlns:a14="http://schemas.microsoft.com/office/drawing/2010/main" Requires="a14">
+          <p:sp>
+            <p:nvSpPr>
+              <p:cNvPr id="3" name="Content Placeholder 2">
+                <a:extLst>
+                  <a:ext uri="{FF2B5EF4-FFF2-40B4-BE49-F238E27FC236}">
+                    <a16:creationId xmlns:a16="http://schemas.microsoft.com/office/drawing/2014/main" id="{EECA680E-8CFC-1B8B-7486-EFBB399E03EA}"/>
+                  </a:ext>
+                </a:extLst>
+              </p:cNvPr>
+              <p:cNvSpPr>
+                <a:spLocks noGrp="1"/>
+              </p:cNvSpPr>
+              <p:nvPr>
+                <p:ph idx="1"/>
+              </p:nvPr>
+            </p:nvSpPr>
+            <p:spPr/>
+            <p:txBody>
+              <a:bodyPr>
+                <a:normAutofit/>
+              </a:bodyPr>
+              <a:lstStyle/>
+              <a:p>
+                <a:r>
+                  <a:rPr lang="en-US" dirty="0"/>
+                  <a:t>Double Negation</a:t>
+                </a:r>
+              </a:p>
+              <a:p>
+                <a:pPr lvl="1"/>
+                <a14:m>
+                  <m:oMath xmlns:m="http://schemas.openxmlformats.org/officeDocument/2006/math">
+                    <m:acc>
+                      <m:accPr>
+                        <m:chr m:val="̿"/>
+                        <m:ctrlPr>
+                          <a:rPr lang="en-US" i="1" smtClean="0">
+                            <a:latin typeface="Cambria Math" panose="02040503050406030204" pitchFamily="18" charset="0"/>
+                          </a:rPr>
+                        </m:ctrlPr>
+                      </m:accPr>
+                      <m:e>
+                        <m:r>
+                          <a:rPr lang="en-US" b="0" i="1" smtClean="0">
+                            <a:latin typeface="Cambria Math" panose="02040503050406030204" pitchFamily="18" charset="0"/>
+                          </a:rPr>
+                          <m:t>𝐴</m:t>
+                        </m:r>
+                      </m:e>
+                    </m:acc>
+                    <m:r>
+                      <a:rPr lang="en-US" b="0" i="1" smtClean="0">
+                        <a:latin typeface="Cambria Math" panose="02040503050406030204" pitchFamily="18" charset="0"/>
+                      </a:rPr>
+                      <m:t>=</m:t>
+                    </m:r>
+                    <m:r>
+                      <a:rPr lang="en-US" b="0" i="1" smtClean="0">
+                        <a:latin typeface="Cambria Math" panose="02040503050406030204" pitchFamily="18" charset="0"/>
+                      </a:rPr>
+                      <m:t>𝐴</m:t>
+                    </m:r>
+                  </m:oMath>
+                </a14:m>
+                <a:endParaRPr lang="en-US" dirty="0"/>
+              </a:p>
+              <a:p>
+                <a:r>
+                  <a:rPr lang="en-US" b="0" dirty="0"/>
+                  <a:t>Absorption law</a:t>
+                </a:r>
+                <a:endParaRPr lang="en-US" b="0" i="1" dirty="0">
+                  <a:latin typeface="Cambria Math" panose="02040503050406030204" pitchFamily="18" charset="0"/>
+                </a:endParaRPr>
+              </a:p>
+              <a:p>
+                <a:pPr lvl="1"/>
+                <a14:m>
+                  <m:oMath xmlns:m="http://schemas.openxmlformats.org/officeDocument/2006/math">
+                    <m:r>
+                      <a:rPr lang="en-US" b="0" i="1" smtClean="0">
+                        <a:latin typeface="Cambria Math" panose="02040503050406030204" pitchFamily="18" charset="0"/>
+                      </a:rPr>
+                      <m:t>𝐴</m:t>
+                    </m:r>
+                    <m:r>
+                      <a:rPr lang="en-US" b="0" i="1" smtClean="0">
+                        <a:latin typeface="Cambria Math" panose="02040503050406030204" pitchFamily="18" charset="0"/>
+                      </a:rPr>
+                      <m:t>+</m:t>
+                    </m:r>
+                    <m:r>
+                      <a:rPr lang="en-US" b="0" i="1" smtClean="0">
+                        <a:latin typeface="Cambria Math" panose="02040503050406030204" pitchFamily="18" charset="0"/>
+                      </a:rPr>
+                      <m:t>𝐴</m:t>
+                    </m:r>
+                    <m:r>
+                      <a:rPr lang="en-US" b="0" i="1" smtClean="0">
+                        <a:latin typeface="Cambria Math" panose="02040503050406030204" pitchFamily="18" charset="0"/>
+                      </a:rPr>
+                      <m:t>.</m:t>
+                    </m:r>
+                    <m:r>
+                      <a:rPr lang="en-US" b="0" i="1" smtClean="0">
+                        <a:latin typeface="Cambria Math" panose="02040503050406030204" pitchFamily="18" charset="0"/>
+                      </a:rPr>
+                      <m:t>𝐵</m:t>
+                    </m:r>
+                    <m:r>
+                      <a:rPr lang="en-US" b="0" i="1" smtClean="0">
+                        <a:latin typeface="Cambria Math" panose="02040503050406030204" pitchFamily="18" charset="0"/>
+                      </a:rPr>
+                      <m:t>=</m:t>
+                    </m:r>
+                    <m:r>
+                      <a:rPr lang="en-US" b="0" i="1" smtClean="0">
+                        <a:latin typeface="Cambria Math" panose="02040503050406030204" pitchFamily="18" charset="0"/>
+                      </a:rPr>
+                      <m:t>𝐴</m:t>
+                    </m:r>
+                  </m:oMath>
+                </a14:m>
+                <a:endParaRPr lang="en-US" b="0" dirty="0"/>
+              </a:p>
+              <a:p>
+                <a:pPr lvl="1"/>
+                <a14:m>
+                  <m:oMath xmlns:m="http://schemas.openxmlformats.org/officeDocument/2006/math">
+                    <m:r>
+                      <a:rPr lang="en-US" b="0" i="1" smtClean="0">
+                        <a:latin typeface="Cambria Math" panose="02040503050406030204" pitchFamily="18" charset="0"/>
+                      </a:rPr>
+                      <m:t>𝐴</m:t>
+                    </m:r>
+                    <m:r>
+                      <a:rPr lang="en-US" b="0" i="1" smtClean="0">
+                        <a:latin typeface="Cambria Math" panose="02040503050406030204" pitchFamily="18" charset="0"/>
+                      </a:rPr>
+                      <m:t>.</m:t>
+                    </m:r>
+                    <m:d>
+                      <m:dPr>
+                        <m:ctrlPr>
+                          <a:rPr lang="en-US" b="0" i="1" smtClean="0">
+                            <a:latin typeface="Cambria Math" panose="02040503050406030204" pitchFamily="18" charset="0"/>
+                          </a:rPr>
+                        </m:ctrlPr>
+                      </m:dPr>
+                      <m:e>
+                        <m:r>
+                          <a:rPr lang="en-US" b="0" i="1" smtClean="0">
+                            <a:latin typeface="Cambria Math" panose="02040503050406030204" pitchFamily="18" charset="0"/>
+                          </a:rPr>
+                          <m:t>𝐴</m:t>
+                        </m:r>
+                        <m:r>
+                          <a:rPr lang="en-US" b="0" i="1" smtClean="0">
+                            <a:latin typeface="Cambria Math" panose="02040503050406030204" pitchFamily="18" charset="0"/>
+                          </a:rPr>
+                          <m:t>+</m:t>
+                        </m:r>
+                        <m:r>
+                          <a:rPr lang="en-US" b="0" i="1" smtClean="0">
+                            <a:latin typeface="Cambria Math" panose="02040503050406030204" pitchFamily="18" charset="0"/>
+                          </a:rPr>
+                          <m:t>𝐵</m:t>
+                        </m:r>
+                      </m:e>
+                    </m:d>
+                    <m:r>
+                      <a:rPr lang="en-US" b="0" i="1" smtClean="0">
+                        <a:latin typeface="Cambria Math" panose="02040503050406030204" pitchFamily="18" charset="0"/>
+                      </a:rPr>
+                      <m:t>=</m:t>
+                    </m:r>
+                    <m:r>
+                      <a:rPr lang="en-US" b="0" i="1" smtClean="0">
+                        <a:latin typeface="Cambria Math" panose="02040503050406030204" pitchFamily="18" charset="0"/>
+                      </a:rPr>
+                      <m:t>𝐴</m:t>
+                    </m:r>
+                  </m:oMath>
+                </a14:m>
+                <a:endParaRPr lang="en-US" b="0" dirty="0"/>
+              </a:p>
+              <a:p>
+                <a:pPr marL="457200" lvl="1" indent="0">
+                  <a:buNone/>
+                </a:pPr>
+                <a:endParaRPr lang="en-US" dirty="0"/>
+              </a:p>
+              <a:p>
+                <a:pPr lvl="1"/>
+                <a:endParaRPr lang="en-US" dirty="0"/>
+              </a:p>
+              <a:p>
+                <a:endParaRPr lang="en-US" dirty="0"/>
+              </a:p>
+            </p:txBody>
+          </p:sp>
+        </mc:Choice>
+        <mc:Fallback>
+          <p:sp>
+            <p:nvSpPr>
+              <p:cNvPr id="3" name="Content Placeholder 2">
+                <a:extLst>
+                  <a:ext uri="{FF2B5EF4-FFF2-40B4-BE49-F238E27FC236}">
+                    <a16:creationId xmlns:a16="http://schemas.microsoft.com/office/drawing/2014/main" id="{EECA680E-8CFC-1B8B-7486-EFBB399E03EA}"/>
+                  </a:ext>
+                </a:extLst>
+              </p:cNvPr>
+              <p:cNvSpPr>
+                <a:spLocks noGrp="1" noRot="1" noChangeAspect="1" noMove="1" noResize="1" noEditPoints="1" noAdjustHandles="1" noChangeArrowheads="1" noChangeShapeType="1" noTextEdit="1"/>
+              </p:cNvSpPr>
+              <p:nvPr>
+                <p:ph idx="1"/>
+              </p:nvPr>
+            </p:nvSpPr>
+            <p:spPr>
+              <a:blipFill>
+                <a:blip r:embed="rId2"/>
+                <a:stretch>
+                  <a:fillRect l="-1043" t="-2381"/>
+                </a:stretch>
+              </a:blipFill>
+            </p:spPr>
+            <p:txBody>
+              <a:bodyPr/>
+              <a:lstStyle/>
+              <a:p>
+                <a:r>
+                  <a:rPr lang="en-US">
+                    <a:noFill/>
+                  </a:rPr>
+                  <a:t> </a:t>
+                </a:r>
+              </a:p>
+            </p:txBody>
+          </p:sp>
+        </mc:Fallback>
+      </mc:AlternateContent>
+    </p:spTree>
+    <p:extLst>
+      <p:ext uri="{BB962C8B-B14F-4D97-AF65-F5344CB8AC3E}">
+        <p14:creationId xmlns:p14="http://schemas.microsoft.com/office/powerpoint/2010/main" val="2624609008"/>
+      </p:ext>
+    </p:extLst>
+  </p:cSld>
+  <p:clrMapOvr>
+    <a:masterClrMapping/>
+  </p:clrMapOvr>
+</p:sld>
+</file>
+
+<file path=ppt/slides/slide75.xml><?xml version="1.0" encoding="utf-8"?>
+<p:sld xmlns:a="http://schemas.openxmlformats.org/drawingml/2006/main" xmlns:r="http://schemas.openxmlformats.org/officeDocument/2006/relationships" xmlns:p="http://schemas.openxmlformats.org/presentationml/2006/main">
+  <p:cSld>
+    <p:spTree>
+      <p:nvGrpSpPr>
+        <p:cNvPr id="1" name=""/>
+        <p:cNvGrpSpPr/>
+        <p:nvPr/>
+      </p:nvGrpSpPr>
+      <p:grpSpPr>
+        <a:xfrm>
+          <a:off x="0" y="0"/>
+          <a:ext cx="0" cy="0"/>
+          <a:chOff x="0" y="0"/>
+          <a:chExt cx="0" cy="0"/>
+        </a:xfrm>
+      </p:grpSpPr>
+      <p:sp>
+        <p:nvSpPr>
+          <p:cNvPr id="2" name="Title 1">
+            <a:extLst>
+              <a:ext uri="{FF2B5EF4-FFF2-40B4-BE49-F238E27FC236}">
+                <a16:creationId xmlns:a16="http://schemas.microsoft.com/office/drawing/2014/main" id="{13C4F640-25A8-B0E4-213D-D5B78CE0B609}"/>
+              </a:ext>
+            </a:extLst>
+          </p:cNvPr>
+          <p:cNvSpPr>
+            <a:spLocks noGrp="1"/>
+          </p:cNvSpPr>
+          <p:nvPr>
+            <p:ph type="title"/>
+          </p:nvPr>
+        </p:nvSpPr>
+        <p:spPr/>
+        <p:txBody>
+          <a:bodyPr/>
+          <a:lstStyle/>
+          <a:p>
+            <a:r>
+              <a:rPr lang="en-US" dirty="0"/>
+              <a:t>Do it yourself </a:t>
+            </a:r>
+          </a:p>
+        </p:txBody>
+      </p:sp>
+      <mc:AlternateContent xmlns:mc="http://schemas.openxmlformats.org/markup-compatibility/2006">
+        <mc:Choice xmlns:a14="http://schemas.microsoft.com/office/drawing/2010/main" Requires="a14">
+          <p:sp>
+            <p:nvSpPr>
+              <p:cNvPr id="3" name="Content Placeholder 2">
+                <a:extLst>
+                  <a:ext uri="{FF2B5EF4-FFF2-40B4-BE49-F238E27FC236}">
+                    <a16:creationId xmlns:a16="http://schemas.microsoft.com/office/drawing/2014/main" id="{F2EB442C-84D6-F51D-7B8F-DF5C3E1F83E3}"/>
+                  </a:ext>
+                </a:extLst>
+              </p:cNvPr>
+              <p:cNvSpPr>
+                <a:spLocks noGrp="1"/>
+              </p:cNvSpPr>
+              <p:nvPr>
+                <p:ph idx="1"/>
+              </p:nvPr>
+            </p:nvSpPr>
+            <p:spPr/>
+            <p:txBody>
+              <a:bodyPr/>
+              <a:lstStyle/>
+              <a:p>
+                <a:r>
+                  <a:rPr lang="en-US" dirty="0"/>
+                  <a:t>Hint : These may </a:t>
+                </a:r>
+                <a:r>
+                  <a:rPr lang="en-US"/>
+                  <a:t>be actual theorems</a:t>
+                </a:r>
+                <a:endParaRPr lang="en-US" dirty="0"/>
+              </a:p>
+              <a:p>
+                <a:pPr lvl="1"/>
+                <a14:m>
+                  <m:oMath xmlns:m="http://schemas.openxmlformats.org/officeDocument/2006/math">
+                    <m:acc>
+                      <m:accPr>
+                        <m:chr m:val="̅"/>
+                        <m:ctrlPr>
+                          <a:rPr lang="en-US" i="1" smtClean="0">
+                            <a:latin typeface="Cambria Math" panose="02040503050406030204" pitchFamily="18" charset="0"/>
+                          </a:rPr>
+                        </m:ctrlPr>
+                      </m:accPr>
+                      <m:e>
+                        <m:r>
+                          <a:rPr lang="en-US" b="0" i="1" smtClean="0">
+                            <a:latin typeface="Cambria Math" panose="02040503050406030204" pitchFamily="18" charset="0"/>
+                          </a:rPr>
+                          <m:t>𝐴</m:t>
+                        </m:r>
+                        <m:r>
+                          <a:rPr lang="en-US" b="0" i="1" smtClean="0">
+                            <a:latin typeface="Cambria Math" panose="02040503050406030204" pitchFamily="18" charset="0"/>
+                          </a:rPr>
+                          <m:t>.</m:t>
+                        </m:r>
+                        <m:r>
+                          <a:rPr lang="en-US" b="0" i="1" smtClean="0">
+                            <a:latin typeface="Cambria Math" panose="02040503050406030204" pitchFamily="18" charset="0"/>
+                          </a:rPr>
+                          <m:t>𝐵</m:t>
+                        </m:r>
+                      </m:e>
+                    </m:acc>
+                    <m:r>
+                      <a:rPr lang="en-US" b="0" i="1" smtClean="0">
+                        <a:latin typeface="Cambria Math" panose="02040503050406030204" pitchFamily="18" charset="0"/>
+                      </a:rPr>
+                      <m:t>=</m:t>
+                    </m:r>
+                    <m:r>
+                      <a:rPr lang="en-US" b="0" i="1" smtClean="0">
+                        <a:latin typeface="Cambria Math" panose="02040503050406030204" pitchFamily="18" charset="0"/>
+                      </a:rPr>
+                      <m:t>?</m:t>
+                    </m:r>
+                  </m:oMath>
+                </a14:m>
+                <a:endParaRPr lang="en-US" dirty="0"/>
+              </a:p>
+              <a:p>
+                <a:pPr lvl="1"/>
+                <a14:m>
+                  <m:oMath xmlns:m="http://schemas.openxmlformats.org/officeDocument/2006/math">
+                    <m:acc>
+                      <m:accPr>
+                        <m:chr m:val="̅"/>
+                        <m:ctrlPr>
+                          <a:rPr lang="en-US" i="1" smtClean="0">
+                            <a:latin typeface="Cambria Math" panose="02040503050406030204" pitchFamily="18" charset="0"/>
+                          </a:rPr>
+                        </m:ctrlPr>
+                      </m:accPr>
+                      <m:e>
+                        <m:r>
+                          <a:rPr lang="en-US" b="0" i="1" smtClean="0">
+                            <a:latin typeface="Cambria Math" panose="02040503050406030204" pitchFamily="18" charset="0"/>
+                          </a:rPr>
+                          <m:t>𝐴</m:t>
+                        </m:r>
+                        <m:r>
+                          <a:rPr lang="en-US" b="0" i="1" smtClean="0">
+                            <a:latin typeface="Cambria Math" panose="02040503050406030204" pitchFamily="18" charset="0"/>
+                          </a:rPr>
+                          <m:t>+</m:t>
+                        </m:r>
+                        <m:r>
+                          <a:rPr lang="en-US" b="0" i="1" smtClean="0">
+                            <a:latin typeface="Cambria Math" panose="02040503050406030204" pitchFamily="18" charset="0"/>
+                          </a:rPr>
+                          <m:t>𝐵</m:t>
+                        </m:r>
+                      </m:e>
+                    </m:acc>
+                    <m:r>
+                      <a:rPr lang="en-US" b="0" i="1" smtClean="0">
+                        <a:latin typeface="Cambria Math" panose="02040503050406030204" pitchFamily="18" charset="0"/>
+                      </a:rPr>
+                      <m:t>=</m:t>
+                    </m:r>
+                    <m:r>
+                      <a:rPr lang="en-US" b="0" i="1" smtClean="0">
+                        <a:latin typeface="Cambria Math" panose="02040503050406030204" pitchFamily="18" charset="0"/>
+                      </a:rPr>
+                      <m:t>?</m:t>
+                    </m:r>
+                  </m:oMath>
+                </a14:m>
+                <a:endParaRPr lang="en-US" b="0" i="1" dirty="0">
+                  <a:latin typeface="Cambria Math" panose="02040503050406030204" pitchFamily="18" charset="0"/>
+                </a:endParaRPr>
+              </a:p>
+              <a:p>
+                <a:pPr lvl="1"/>
+                <a14:m>
+                  <m:oMath xmlns:m="http://schemas.openxmlformats.org/officeDocument/2006/math">
+                    <m:d>
+                      <m:dPr>
+                        <m:ctrlPr>
+                          <a:rPr lang="en-US" b="0" i="1" smtClean="0">
+                            <a:latin typeface="Cambria Math" panose="02040503050406030204" pitchFamily="18" charset="0"/>
+                          </a:rPr>
+                        </m:ctrlPr>
+                      </m:dPr>
+                      <m:e>
+                        <m:r>
+                          <a:rPr lang="en-US" b="0" i="1" smtClean="0">
+                            <a:latin typeface="Cambria Math" panose="02040503050406030204" pitchFamily="18" charset="0"/>
+                          </a:rPr>
+                          <m:t>𝐴</m:t>
+                        </m:r>
+                        <m:r>
+                          <a:rPr lang="en-US" b="0" i="1" smtClean="0">
+                            <a:latin typeface="Cambria Math" panose="02040503050406030204" pitchFamily="18" charset="0"/>
+                          </a:rPr>
+                          <m:t>+</m:t>
+                        </m:r>
+                        <m:r>
+                          <a:rPr lang="en-US" b="0" i="1" smtClean="0">
+                            <a:latin typeface="Cambria Math" panose="02040503050406030204" pitchFamily="18" charset="0"/>
+                          </a:rPr>
+                          <m:t>𝐵</m:t>
+                        </m:r>
+                      </m:e>
+                    </m:d>
+                    <m:r>
+                      <a:rPr lang="en-US" b="0" i="1" smtClean="0">
+                        <a:latin typeface="Cambria Math" panose="02040503050406030204" pitchFamily="18" charset="0"/>
+                      </a:rPr>
+                      <m:t>.</m:t>
+                    </m:r>
+                    <m:d>
+                      <m:dPr>
+                        <m:ctrlPr>
+                          <a:rPr lang="en-US" b="0" i="1" smtClean="0">
+                            <a:latin typeface="Cambria Math" panose="02040503050406030204" pitchFamily="18" charset="0"/>
+                          </a:rPr>
+                        </m:ctrlPr>
+                      </m:dPr>
+                      <m:e>
+                        <m:acc>
+                          <m:accPr>
+                            <m:chr m:val="̅"/>
+                            <m:ctrlPr>
+                              <a:rPr lang="en-US" b="0" i="1" smtClean="0">
+                                <a:latin typeface="Cambria Math" panose="02040503050406030204" pitchFamily="18" charset="0"/>
+                              </a:rPr>
+                            </m:ctrlPr>
+                          </m:accPr>
+                          <m:e>
+                            <m:r>
+                              <a:rPr lang="en-US" b="0" i="1" smtClean="0">
+                                <a:latin typeface="Cambria Math" panose="02040503050406030204" pitchFamily="18" charset="0"/>
+                              </a:rPr>
+                              <m:t>𝐴</m:t>
+                            </m:r>
+                          </m:e>
+                        </m:acc>
+                        <m:r>
+                          <a:rPr lang="en-US" b="0" i="1" smtClean="0">
+                            <a:latin typeface="Cambria Math" panose="02040503050406030204" pitchFamily="18" charset="0"/>
+                          </a:rPr>
+                          <m:t>+</m:t>
+                        </m:r>
+                        <m:r>
+                          <a:rPr lang="en-US" b="0" i="1" smtClean="0">
+                            <a:latin typeface="Cambria Math" panose="02040503050406030204" pitchFamily="18" charset="0"/>
+                          </a:rPr>
+                          <m:t>𝐶</m:t>
+                        </m:r>
+                      </m:e>
+                    </m:d>
+                    <m:r>
+                      <a:rPr lang="en-US" b="0" i="1" smtClean="0">
+                        <a:latin typeface="Cambria Math" panose="02040503050406030204" pitchFamily="18" charset="0"/>
+                      </a:rPr>
+                      <m:t>= ?</m:t>
+                    </m:r>
+                  </m:oMath>
+                </a14:m>
+                <a:endParaRPr lang="en-US" b="0" dirty="0"/>
+              </a:p>
+              <a:p>
+                <a:pPr lvl="1"/>
+                <a14:m>
+                  <m:oMath xmlns:m="http://schemas.openxmlformats.org/officeDocument/2006/math">
+                    <m:r>
+                      <a:rPr lang="en-US" b="0" i="1" smtClean="0">
+                        <a:latin typeface="Cambria Math" panose="02040503050406030204" pitchFamily="18" charset="0"/>
+                      </a:rPr>
+                      <m:t>𝐴</m:t>
+                    </m:r>
+                    <m:d>
+                      <m:dPr>
+                        <m:ctrlPr>
+                          <a:rPr lang="en-US" b="0" i="1" smtClean="0">
+                            <a:latin typeface="Cambria Math" panose="02040503050406030204" pitchFamily="18" charset="0"/>
+                          </a:rPr>
+                        </m:ctrlPr>
+                      </m:dPr>
+                      <m:e>
+                        <m:acc>
+                          <m:accPr>
+                            <m:chr m:val="̅"/>
+                            <m:ctrlPr>
+                              <a:rPr lang="en-US" b="0" i="1" smtClean="0">
+                                <a:latin typeface="Cambria Math" panose="02040503050406030204" pitchFamily="18" charset="0"/>
+                              </a:rPr>
+                            </m:ctrlPr>
+                          </m:accPr>
+                          <m:e>
+                            <m:r>
+                              <a:rPr lang="en-US" b="0" i="1" smtClean="0">
+                                <a:latin typeface="Cambria Math" panose="02040503050406030204" pitchFamily="18" charset="0"/>
+                              </a:rPr>
+                              <m:t>𝐴</m:t>
+                            </m:r>
+                          </m:e>
+                        </m:acc>
+                        <m:r>
+                          <a:rPr lang="en-US" b="0" i="1" smtClean="0">
+                            <a:latin typeface="Cambria Math" panose="02040503050406030204" pitchFamily="18" charset="0"/>
+                          </a:rPr>
+                          <m:t>+</m:t>
+                        </m:r>
+                        <m:r>
+                          <a:rPr lang="en-US" b="0" i="1" smtClean="0">
+                            <a:latin typeface="Cambria Math" panose="02040503050406030204" pitchFamily="18" charset="0"/>
+                          </a:rPr>
+                          <m:t>𝐵</m:t>
+                        </m:r>
+                        <m:r>
+                          <a:rPr lang="en-US" b="0" i="1" smtClean="0">
+                            <a:latin typeface="Cambria Math" panose="02040503050406030204" pitchFamily="18" charset="0"/>
+                          </a:rPr>
+                          <m:t> </m:t>
+                        </m:r>
+                      </m:e>
+                    </m:d>
+                    <m:r>
+                      <a:rPr lang="en-US" b="0" i="1" smtClean="0">
+                        <a:latin typeface="Cambria Math" panose="02040503050406030204" pitchFamily="18" charset="0"/>
+                      </a:rPr>
+                      <m:t>=</m:t>
+                    </m:r>
+                    <m:r>
+                      <a:rPr lang="en-US" b="0" i="1" smtClean="0">
+                        <a:latin typeface="Cambria Math" panose="02040503050406030204" pitchFamily="18" charset="0"/>
+                      </a:rPr>
+                      <m:t> ?</m:t>
+                    </m:r>
+                  </m:oMath>
+                </a14:m>
+                <a:endParaRPr lang="en-US" b="0" dirty="0"/>
+              </a:p>
+              <a:p>
+                <a:pPr lvl="1"/>
+                <a14:m>
+                  <m:oMath xmlns:m="http://schemas.openxmlformats.org/officeDocument/2006/math">
+                    <m:r>
+                      <a:rPr lang="en-US" b="0" i="1" smtClean="0">
+                        <a:latin typeface="Cambria Math" panose="02040503050406030204" pitchFamily="18" charset="0"/>
+                      </a:rPr>
+                      <m:t>𝐴</m:t>
+                    </m:r>
+                    <m:r>
+                      <a:rPr lang="en-US" b="0" i="1" smtClean="0">
+                        <a:latin typeface="Cambria Math" panose="02040503050406030204" pitchFamily="18" charset="0"/>
+                      </a:rPr>
+                      <m:t>+</m:t>
+                    </m:r>
+                    <m:acc>
+                      <m:accPr>
+                        <m:chr m:val="̅"/>
+                        <m:ctrlPr>
+                          <a:rPr lang="en-US" b="0" i="1" smtClean="0">
+                            <a:latin typeface="Cambria Math" panose="02040503050406030204" pitchFamily="18" charset="0"/>
+                          </a:rPr>
+                        </m:ctrlPr>
+                      </m:accPr>
+                      <m:e>
+                        <m:r>
+                          <a:rPr lang="en-US" b="0" i="1" smtClean="0">
+                            <a:latin typeface="Cambria Math" panose="02040503050406030204" pitchFamily="18" charset="0"/>
+                          </a:rPr>
+                          <m:t>𝐴</m:t>
+                        </m:r>
+                      </m:e>
+                    </m:acc>
+                    <m:r>
+                      <a:rPr lang="en-US" b="0" i="1" smtClean="0">
+                        <a:latin typeface="Cambria Math" panose="02040503050406030204" pitchFamily="18" charset="0"/>
+                      </a:rPr>
+                      <m:t>𝐵</m:t>
+                    </m:r>
+                    <m:r>
+                      <a:rPr lang="en-US" b="0" i="1" smtClean="0">
+                        <a:latin typeface="Cambria Math" panose="02040503050406030204" pitchFamily="18" charset="0"/>
+                      </a:rPr>
+                      <m:t>= ?</m:t>
+                    </m:r>
+                  </m:oMath>
+                </a14:m>
+                <a:endParaRPr lang="en-US" b="0" dirty="0"/>
+              </a:p>
+              <a:p>
+                <a:pPr lvl="1"/>
+                <a:endParaRPr lang="en-US" b="0" dirty="0"/>
+              </a:p>
+              <a:p>
+                <a:pPr lvl="1"/>
+                <a:endParaRPr lang="en-US" dirty="0"/>
+              </a:p>
+            </p:txBody>
+          </p:sp>
+        </mc:Choice>
+        <mc:Fallback>
+          <p:sp>
+            <p:nvSpPr>
+              <p:cNvPr id="3" name="Content Placeholder 2">
+                <a:extLst>
+                  <a:ext uri="{FF2B5EF4-FFF2-40B4-BE49-F238E27FC236}">
+                    <a16:creationId xmlns:a16="http://schemas.microsoft.com/office/drawing/2014/main" id="{F2EB442C-84D6-F51D-7B8F-DF5C3E1F83E3}"/>
+                  </a:ext>
+                </a:extLst>
+              </p:cNvPr>
+              <p:cNvSpPr>
+                <a:spLocks noGrp="1" noRot="1" noChangeAspect="1" noMove="1" noResize="1" noEditPoints="1" noAdjustHandles="1" noChangeArrowheads="1" noChangeShapeType="1" noTextEdit="1"/>
+              </p:cNvSpPr>
+              <p:nvPr>
+                <p:ph idx="1"/>
+              </p:nvPr>
+            </p:nvSpPr>
+            <p:spPr>
+              <a:blipFill>
+                <a:blip r:embed="rId3"/>
+                <a:stretch>
+                  <a:fillRect l="-1043" t="-2381"/>
+                </a:stretch>
+              </a:blipFill>
+            </p:spPr>
+            <p:txBody>
+              <a:bodyPr/>
+              <a:lstStyle/>
+              <a:p>
+                <a:r>
+                  <a:rPr lang="en-US">
+                    <a:noFill/>
+                  </a:rPr>
+                  <a:t> </a:t>
+                </a:r>
+              </a:p>
+            </p:txBody>
+          </p:sp>
+        </mc:Fallback>
+      </mc:AlternateContent>
+    </p:spTree>
+    <p:extLst>
+      <p:ext uri="{BB962C8B-B14F-4D97-AF65-F5344CB8AC3E}">
+        <p14:creationId xmlns:p14="http://schemas.microsoft.com/office/powerpoint/2010/main" val="2731649206"/>
       </p:ext>
     </p:extLst>
   </p:cSld>

</xml_diff>